<commit_message>
update the overview diagram
</commit_message>
<xml_diff>
--- a/docs/diagrams.pptx
+++ b/docs/diagrams.pptx
@@ -270,7 +270,7 @@
           <a:p>
             <a:fld id="{ADEA6865-5F8B-9C4A-950D-1D161D0F2BB5}" type="datetimeFigureOut">
               <a:rPr kumimoji="1" lang="zh-CN" altLang="en-US" smtClean="0"/>
-              <a:t>2022/4/27</a:t>
+              <a:t>2022/5/9</a:t>
             </a:fld>
             <a:endParaRPr kumimoji="1" lang="zh-CN" altLang="en-US"/>
           </a:p>
@@ -468,7 +468,7 @@
           <a:p>
             <a:fld id="{ADEA6865-5F8B-9C4A-950D-1D161D0F2BB5}" type="datetimeFigureOut">
               <a:rPr kumimoji="1" lang="zh-CN" altLang="en-US" smtClean="0"/>
-              <a:t>2022/4/27</a:t>
+              <a:t>2022/5/9</a:t>
             </a:fld>
             <a:endParaRPr kumimoji="1" lang="zh-CN" altLang="en-US"/>
           </a:p>
@@ -676,7 +676,7 @@
           <a:p>
             <a:fld id="{ADEA6865-5F8B-9C4A-950D-1D161D0F2BB5}" type="datetimeFigureOut">
               <a:rPr kumimoji="1" lang="zh-CN" altLang="en-US" smtClean="0"/>
-              <a:t>2022/4/27</a:t>
+              <a:t>2022/5/9</a:t>
             </a:fld>
             <a:endParaRPr kumimoji="1" lang="zh-CN" altLang="en-US"/>
           </a:p>
@@ -874,7 +874,7 @@
           <a:p>
             <a:fld id="{ADEA6865-5F8B-9C4A-950D-1D161D0F2BB5}" type="datetimeFigureOut">
               <a:rPr kumimoji="1" lang="zh-CN" altLang="en-US" smtClean="0"/>
-              <a:t>2022/4/27</a:t>
+              <a:t>2022/5/9</a:t>
             </a:fld>
             <a:endParaRPr kumimoji="1" lang="zh-CN" altLang="en-US"/>
           </a:p>
@@ -1149,7 +1149,7 @@
           <a:p>
             <a:fld id="{ADEA6865-5F8B-9C4A-950D-1D161D0F2BB5}" type="datetimeFigureOut">
               <a:rPr kumimoji="1" lang="zh-CN" altLang="en-US" smtClean="0"/>
-              <a:t>2022/4/27</a:t>
+              <a:t>2022/5/9</a:t>
             </a:fld>
             <a:endParaRPr kumimoji="1" lang="zh-CN" altLang="en-US"/>
           </a:p>
@@ -1414,7 +1414,7 @@
           <a:p>
             <a:fld id="{ADEA6865-5F8B-9C4A-950D-1D161D0F2BB5}" type="datetimeFigureOut">
               <a:rPr kumimoji="1" lang="zh-CN" altLang="en-US" smtClean="0"/>
-              <a:t>2022/4/27</a:t>
+              <a:t>2022/5/9</a:t>
             </a:fld>
             <a:endParaRPr kumimoji="1" lang="zh-CN" altLang="en-US"/>
           </a:p>
@@ -1826,7 +1826,7 @@
           <a:p>
             <a:fld id="{ADEA6865-5F8B-9C4A-950D-1D161D0F2BB5}" type="datetimeFigureOut">
               <a:rPr kumimoji="1" lang="zh-CN" altLang="en-US" smtClean="0"/>
-              <a:t>2022/4/27</a:t>
+              <a:t>2022/5/9</a:t>
             </a:fld>
             <a:endParaRPr kumimoji="1" lang="zh-CN" altLang="en-US"/>
           </a:p>
@@ -1967,7 +1967,7 @@
           <a:p>
             <a:fld id="{ADEA6865-5F8B-9C4A-950D-1D161D0F2BB5}" type="datetimeFigureOut">
               <a:rPr kumimoji="1" lang="zh-CN" altLang="en-US" smtClean="0"/>
-              <a:t>2022/4/27</a:t>
+              <a:t>2022/5/9</a:t>
             </a:fld>
             <a:endParaRPr kumimoji="1" lang="zh-CN" altLang="en-US"/>
           </a:p>
@@ -2080,7 +2080,7 @@
           <a:p>
             <a:fld id="{ADEA6865-5F8B-9C4A-950D-1D161D0F2BB5}" type="datetimeFigureOut">
               <a:rPr kumimoji="1" lang="zh-CN" altLang="en-US" smtClean="0"/>
-              <a:t>2022/4/27</a:t>
+              <a:t>2022/5/9</a:t>
             </a:fld>
             <a:endParaRPr kumimoji="1" lang="zh-CN" altLang="en-US"/>
           </a:p>
@@ -2391,7 +2391,7 @@
           <a:p>
             <a:fld id="{ADEA6865-5F8B-9C4A-950D-1D161D0F2BB5}" type="datetimeFigureOut">
               <a:rPr kumimoji="1" lang="zh-CN" altLang="en-US" smtClean="0"/>
-              <a:t>2022/4/27</a:t>
+              <a:t>2022/5/9</a:t>
             </a:fld>
             <a:endParaRPr kumimoji="1" lang="zh-CN" altLang="en-US"/>
           </a:p>
@@ -2679,7 +2679,7 @@
           <a:p>
             <a:fld id="{ADEA6865-5F8B-9C4A-950D-1D161D0F2BB5}" type="datetimeFigureOut">
               <a:rPr kumimoji="1" lang="zh-CN" altLang="en-US" smtClean="0"/>
-              <a:t>2022/4/27</a:t>
+              <a:t>2022/5/9</a:t>
             </a:fld>
             <a:endParaRPr kumimoji="1" lang="zh-CN" altLang="en-US"/>
           </a:p>
@@ -2920,7 +2920,7 @@
           <a:p>
             <a:fld id="{ADEA6865-5F8B-9C4A-950D-1D161D0F2BB5}" type="datetimeFigureOut">
               <a:rPr kumimoji="1" lang="zh-CN" altLang="en-US" smtClean="0"/>
-              <a:t>2022/4/27</a:t>
+              <a:t>2022/5/9</a:t>
             </a:fld>
             <a:endParaRPr kumimoji="1" lang="zh-CN" altLang="en-US"/>
           </a:p>
@@ -6099,7 +6099,7 @@
         </p:nvGrpSpPr>
         <p:grpSpPr>
           <a:xfrm>
-            <a:off x="8671036" y="3270191"/>
+            <a:off x="8683634" y="3097466"/>
             <a:ext cx="470000" cy="679715"/>
             <a:chOff x="9372487" y="1367754"/>
             <a:chExt cx="470000" cy="679715"/>
@@ -6202,7 +6202,7 @@
         </p:nvGrpSpPr>
         <p:grpSpPr>
           <a:xfrm>
-            <a:off x="9406400" y="3273318"/>
+            <a:off x="9418998" y="3100593"/>
             <a:ext cx="583814" cy="676588"/>
             <a:chOff x="10160020" y="1361565"/>
             <a:chExt cx="583814" cy="676588"/>
@@ -6311,7 +6311,7 @@
         </p:nvGrpSpPr>
         <p:grpSpPr>
           <a:xfrm>
-            <a:off x="10113219" y="3228414"/>
+            <a:off x="10125817" y="3055689"/>
             <a:ext cx="676788" cy="721492"/>
             <a:chOff x="9372487" y="2082656"/>
             <a:chExt cx="676788" cy="721492"/>
@@ -6414,7 +6414,7 @@
         </p:nvGrpSpPr>
         <p:grpSpPr>
           <a:xfrm>
-            <a:off x="9321131" y="2385779"/>
+            <a:off x="9333729" y="2213054"/>
             <a:ext cx="671979" cy="736261"/>
             <a:chOff x="10076827" y="2062616"/>
             <a:chExt cx="671979" cy="736261"/>
@@ -6540,7 +6540,7 @@
         </p:nvGrpSpPr>
         <p:grpSpPr>
           <a:xfrm>
-            <a:off x="9461241" y="4109912"/>
+            <a:off x="9473839" y="3937187"/>
             <a:ext cx="474133" cy="664335"/>
             <a:chOff x="10230401" y="3715563"/>
             <a:chExt cx="474133" cy="664335"/>
@@ -6643,7 +6643,7 @@
         </p:nvGrpSpPr>
         <p:grpSpPr>
           <a:xfrm>
-            <a:off x="8457035" y="4109979"/>
+            <a:off x="8469633" y="3937254"/>
             <a:ext cx="898003" cy="664268"/>
             <a:chOff x="9935576" y="4496187"/>
             <a:chExt cx="898003" cy="664268"/>
@@ -6770,7 +6770,7 @@
         </p:nvGrpSpPr>
         <p:grpSpPr>
           <a:xfrm>
-            <a:off x="10128448" y="4077072"/>
+            <a:off x="10141046" y="3904347"/>
             <a:ext cx="646331" cy="697175"/>
             <a:chOff x="9317095" y="5490246"/>
             <a:chExt cx="646331" cy="697175"/>
@@ -6835,7 +6835,7 @@
             <a:lstStyle/>
             <a:p>
               <a:r>
-                <a:rPr kumimoji="1" lang="en-US" altLang="zh-CN" sz="1000" dirty="0" err="1">
+                <a:rPr kumimoji="1" lang="en-US" altLang="zh-CN" sz="1000" dirty="0">
                   <a:solidFill>
                     <a:schemeClr val="tx1">
                       <a:lumMod val="65000"/>
@@ -6873,7 +6873,7 @@
         </p:nvGrpSpPr>
         <p:grpSpPr>
           <a:xfrm>
-            <a:off x="8671036" y="2376860"/>
+            <a:off x="8683634" y="2204135"/>
             <a:ext cx="470001" cy="755330"/>
             <a:chOff x="8715440" y="3658513"/>
             <a:chExt cx="470001" cy="755330"/>
@@ -7171,7 +7171,7 @@
         </p:nvGrpSpPr>
         <p:grpSpPr>
           <a:xfrm>
-            <a:off x="10145842" y="2373784"/>
+            <a:off x="10158440" y="2201059"/>
             <a:ext cx="555546" cy="767184"/>
             <a:chOff x="9854490" y="1725846"/>
             <a:chExt cx="555546" cy="767184"/>
@@ -7431,6 +7431,337 @@
           </a:p>
         </p:txBody>
       </p:sp>
+      <p:grpSp>
+        <p:nvGrpSpPr>
+          <p:cNvPr id="14" name="组合 13">
+            <a:extLst>
+              <a:ext uri="{FF2B5EF4-FFF2-40B4-BE49-F238E27FC236}">
+                <a16:creationId xmlns:a16="http://schemas.microsoft.com/office/drawing/2014/main" id="{DB94F5BF-92B4-CBF0-71F0-7E158BB7CE17}"/>
+              </a:ext>
+            </a:extLst>
+          </p:cNvPr>
+          <p:cNvGrpSpPr/>
+          <p:nvPr/>
+        </p:nvGrpSpPr>
+        <p:grpSpPr>
+          <a:xfrm>
+            <a:off x="8668246" y="4672311"/>
+            <a:ext cx="490840" cy="617447"/>
+            <a:chOff x="8624518" y="4844946"/>
+            <a:chExt cx="490840" cy="617447"/>
+          </a:xfrm>
+        </p:grpSpPr>
+        <p:pic>
+          <p:nvPicPr>
+            <p:cNvPr id="4" name="图形 3">
+              <a:extLst>
+                <a:ext uri="{FF2B5EF4-FFF2-40B4-BE49-F238E27FC236}">
+                  <a16:creationId xmlns:a16="http://schemas.microsoft.com/office/drawing/2014/main" id="{157F7577-7066-BCD1-9E24-40B5ADB088B7}"/>
+                </a:ext>
+              </a:extLst>
+            </p:cNvPr>
+            <p:cNvPicPr>
+              <a:picLocks noChangeAspect="1"/>
+            </p:cNvPicPr>
+            <p:nvPr/>
+          </p:nvPicPr>
+          <p:blipFill>
+            <a:blip r:embed="rId32">
+              <a:extLst>
+                <a:ext uri="{96DAC541-7B7A-43D3-8B79-37D633B846F1}">
+                  <asvg:svgBlip xmlns:asvg="http://schemas.microsoft.com/office/drawing/2016/SVG/main" r:embed="rId33"/>
+                </a:ext>
+              </a:extLst>
+            </a:blip>
+            <a:stretch>
+              <a:fillRect/>
+            </a:stretch>
+          </p:blipFill>
+          <p:spPr>
+            <a:xfrm>
+              <a:off x="8660496" y="4844946"/>
+              <a:ext cx="418885" cy="418885"/>
+            </a:xfrm>
+            <a:prstGeom prst="rect">
+              <a:avLst/>
+            </a:prstGeom>
+          </p:spPr>
+        </p:pic>
+        <p:sp>
+          <p:nvSpPr>
+            <p:cNvPr id="120" name="文本框 119">
+              <a:extLst>
+                <a:ext uri="{FF2B5EF4-FFF2-40B4-BE49-F238E27FC236}">
+                  <a16:creationId xmlns:a16="http://schemas.microsoft.com/office/drawing/2014/main" id="{04BA8B20-166B-1E9D-FB68-ED82B498E2E7}"/>
+                </a:ext>
+              </a:extLst>
+            </p:cNvPr>
+            <p:cNvSpPr txBox="1"/>
+            <p:nvPr/>
+          </p:nvSpPr>
+          <p:spPr>
+            <a:xfrm>
+              <a:off x="8624518" y="5238556"/>
+              <a:ext cx="490840" cy="223837"/>
+            </a:xfrm>
+            <a:prstGeom prst="rect">
+              <a:avLst/>
+            </a:prstGeom>
+            <a:noFill/>
+          </p:spPr>
+          <p:txBody>
+            <a:bodyPr wrap="none" rtlCol="0">
+              <a:spAutoFit/>
+            </a:bodyPr>
+            <a:lstStyle/>
+            <a:p>
+              <a:r>
+                <a:rPr kumimoji="1" lang="en-US" altLang="zh-CN" sz="1000" dirty="0">
+                  <a:solidFill>
+                    <a:schemeClr val="tx1">
+                      <a:lumMod val="65000"/>
+                      <a:lumOff val="35000"/>
+                    </a:schemeClr>
+                  </a:solidFill>
+                  <a:latin typeface="Francois One" panose="02000503040000020004" pitchFamily="2" charset="0"/>
+                </a:rPr>
+                <a:t>Twilio</a:t>
+              </a:r>
+              <a:endParaRPr kumimoji="1" lang="zh-CN" altLang="en-US" sz="1000" dirty="0">
+                <a:solidFill>
+                  <a:schemeClr val="tx1">
+                    <a:lumMod val="65000"/>
+                    <a:lumOff val="35000"/>
+                  </a:schemeClr>
+                </a:solidFill>
+                <a:latin typeface="Francois One" panose="02000503040000020004" pitchFamily="2" charset="0"/>
+              </a:endParaRPr>
+            </a:p>
+          </p:txBody>
+        </p:sp>
+      </p:grpSp>
+      <p:grpSp>
+        <p:nvGrpSpPr>
+          <p:cNvPr id="15" name="组合 14">
+            <a:extLst>
+              <a:ext uri="{FF2B5EF4-FFF2-40B4-BE49-F238E27FC236}">
+                <a16:creationId xmlns:a16="http://schemas.microsoft.com/office/drawing/2014/main" id="{4996E95E-6F11-9C19-93B6-E93E35FE3EF2}"/>
+              </a:ext>
+            </a:extLst>
+          </p:cNvPr>
+          <p:cNvGrpSpPr/>
+          <p:nvPr/>
+        </p:nvGrpSpPr>
+        <p:grpSpPr>
+          <a:xfrm>
+            <a:off x="9424816" y="4617412"/>
+            <a:ext cx="540533" cy="672256"/>
+            <a:chOff x="9412218" y="4790137"/>
+            <a:chExt cx="540533" cy="672256"/>
+          </a:xfrm>
+        </p:grpSpPr>
+        <p:pic>
+          <p:nvPicPr>
+            <p:cNvPr id="1028" name="Picture 4" descr="Nexmo · GitHub">
+              <a:extLst>
+                <a:ext uri="{FF2B5EF4-FFF2-40B4-BE49-F238E27FC236}">
+                  <a16:creationId xmlns:a16="http://schemas.microsoft.com/office/drawing/2014/main" id="{75972A4B-93E1-7775-62E6-1D44F646ED53}"/>
+                </a:ext>
+              </a:extLst>
+            </p:cNvPr>
+            <p:cNvPicPr>
+              <a:picLocks noChangeAspect="1" noChangeArrowheads="1"/>
+            </p:cNvPicPr>
+            <p:nvPr/>
+          </p:nvPicPr>
+          <p:blipFill>
+            <a:blip r:embed="rId34">
+              <a:extLst>
+                <a:ext uri="{28A0092B-C50C-407E-A947-70E740481C1C}">
+                  <a14:useLocalDpi xmlns:a14="http://schemas.microsoft.com/office/drawing/2010/main" val="0"/>
+                </a:ext>
+              </a:extLst>
+            </a:blip>
+            <a:srcRect/>
+            <a:stretch>
+              <a:fillRect/>
+            </a:stretch>
+          </p:blipFill>
+          <p:spPr bwMode="auto">
+            <a:xfrm>
+              <a:off x="9422120" y="4790137"/>
+              <a:ext cx="520729" cy="520729"/>
+            </a:xfrm>
+            <a:prstGeom prst="rect">
+              <a:avLst/>
+            </a:prstGeom>
+            <a:noFill/>
+            <a:extLst>
+              <a:ext uri="{909E8E84-426E-40DD-AFC4-6F175D3DCCD1}">
+                <a14:hiddenFill xmlns:a14="http://schemas.microsoft.com/office/drawing/2010/main">
+                  <a:solidFill>
+                    <a:srgbClr val="FFFFFF"/>
+                  </a:solidFill>
+                </a14:hiddenFill>
+              </a:ext>
+            </a:extLst>
+          </p:spPr>
+        </p:pic>
+        <p:sp>
+          <p:nvSpPr>
+            <p:cNvPr id="124" name="文本框 123">
+              <a:extLst>
+                <a:ext uri="{FF2B5EF4-FFF2-40B4-BE49-F238E27FC236}">
+                  <a16:creationId xmlns:a16="http://schemas.microsoft.com/office/drawing/2014/main" id="{D9AD630B-F136-4779-F520-86EB095ECC7D}"/>
+                </a:ext>
+              </a:extLst>
+            </p:cNvPr>
+            <p:cNvSpPr txBox="1"/>
+            <p:nvPr/>
+          </p:nvSpPr>
+          <p:spPr>
+            <a:xfrm>
+              <a:off x="9412218" y="5238556"/>
+              <a:ext cx="540533" cy="223837"/>
+            </a:xfrm>
+            <a:prstGeom prst="rect">
+              <a:avLst/>
+            </a:prstGeom>
+            <a:noFill/>
+          </p:spPr>
+          <p:txBody>
+            <a:bodyPr wrap="none" rtlCol="0">
+              <a:spAutoFit/>
+            </a:bodyPr>
+            <a:lstStyle/>
+            <a:p>
+              <a:r>
+                <a:rPr kumimoji="1" lang="en-US" altLang="zh-CN" sz="1000" dirty="0">
+                  <a:solidFill>
+                    <a:schemeClr val="tx1">
+                      <a:lumMod val="65000"/>
+                      <a:lumOff val="35000"/>
+                    </a:schemeClr>
+                  </a:solidFill>
+                  <a:latin typeface="Francois One" panose="02000503040000020004" pitchFamily="2" charset="0"/>
+                </a:rPr>
+                <a:t>Nexmo</a:t>
+              </a:r>
+              <a:endParaRPr kumimoji="1" lang="zh-CN" altLang="en-US" sz="1000" dirty="0">
+                <a:solidFill>
+                  <a:schemeClr val="tx1">
+                    <a:lumMod val="65000"/>
+                    <a:lumOff val="35000"/>
+                  </a:schemeClr>
+                </a:solidFill>
+                <a:latin typeface="Francois One" panose="02000503040000020004" pitchFamily="2" charset="0"/>
+              </a:endParaRPr>
+            </a:p>
+          </p:txBody>
+        </p:sp>
+      </p:grpSp>
+      <p:grpSp>
+        <p:nvGrpSpPr>
+          <p:cNvPr id="16" name="组合 15">
+            <a:extLst>
+              <a:ext uri="{FF2B5EF4-FFF2-40B4-BE49-F238E27FC236}">
+                <a16:creationId xmlns:a16="http://schemas.microsoft.com/office/drawing/2014/main" id="{564B2A5D-4040-8684-BB4B-1FC45E236F7E}"/>
+              </a:ext>
+            </a:extLst>
+          </p:cNvPr>
+          <p:cNvGrpSpPr/>
+          <p:nvPr/>
+        </p:nvGrpSpPr>
+        <p:grpSpPr>
+          <a:xfrm>
+            <a:off x="10184042" y="4696713"/>
+            <a:ext cx="619080" cy="592955"/>
+            <a:chOff x="10171444" y="4869438"/>
+            <a:chExt cx="619080" cy="592955"/>
+          </a:xfrm>
+        </p:grpSpPr>
+        <p:pic>
+          <p:nvPicPr>
+            <p:cNvPr id="12" name="图片 11">
+              <a:extLst>
+                <a:ext uri="{FF2B5EF4-FFF2-40B4-BE49-F238E27FC236}">
+                  <a16:creationId xmlns:a16="http://schemas.microsoft.com/office/drawing/2014/main" id="{5343D331-F760-A8E4-2793-F916730AE4C4}"/>
+                </a:ext>
+              </a:extLst>
+            </p:cNvPr>
+            <p:cNvPicPr>
+              <a:picLocks noChangeAspect="1"/>
+            </p:cNvPicPr>
+            <p:nvPr/>
+          </p:nvPicPr>
+          <p:blipFill rotWithShape="1">
+            <a:blip r:embed="rId35"/>
+            <a:srcRect l="6426" t="-737" r="52506" b="737"/>
+            <a:stretch/>
+          </p:blipFill>
+          <p:spPr>
+            <a:xfrm>
+              <a:off x="10228203" y="4869438"/>
+              <a:ext cx="505563" cy="385846"/>
+            </a:xfrm>
+            <a:prstGeom prst="rect">
+              <a:avLst/>
+            </a:prstGeom>
+          </p:spPr>
+        </p:pic>
+        <p:sp>
+          <p:nvSpPr>
+            <p:cNvPr id="125" name="文本框 124">
+              <a:extLst>
+                <a:ext uri="{FF2B5EF4-FFF2-40B4-BE49-F238E27FC236}">
+                  <a16:creationId xmlns:a16="http://schemas.microsoft.com/office/drawing/2014/main" id="{F649CC27-689A-EAFE-B621-A5F226F25F4D}"/>
+                </a:ext>
+              </a:extLst>
+            </p:cNvPr>
+            <p:cNvSpPr txBox="1"/>
+            <p:nvPr/>
+          </p:nvSpPr>
+          <p:spPr>
+            <a:xfrm>
+              <a:off x="10171444" y="5238556"/>
+              <a:ext cx="619080" cy="223837"/>
+            </a:xfrm>
+            <a:prstGeom prst="rect">
+              <a:avLst/>
+            </a:prstGeom>
+            <a:noFill/>
+          </p:spPr>
+          <p:txBody>
+            <a:bodyPr wrap="none" rtlCol="0">
+              <a:spAutoFit/>
+            </a:bodyPr>
+            <a:lstStyle/>
+            <a:p>
+              <a:r>
+                <a:rPr kumimoji="1" lang="en-US" altLang="zh-CN" sz="1000" dirty="0">
+                  <a:solidFill>
+                    <a:schemeClr val="tx1">
+                      <a:lumMod val="65000"/>
+                      <a:lumOff val="35000"/>
+                    </a:schemeClr>
+                  </a:solidFill>
+                  <a:latin typeface="Francois One" panose="02000503040000020004" pitchFamily="2" charset="0"/>
+                </a:rPr>
+                <a:t>YunPian</a:t>
+              </a:r>
+              <a:endParaRPr kumimoji="1" lang="zh-CN" altLang="en-US" sz="1000" dirty="0">
+                <a:solidFill>
+                  <a:schemeClr val="tx1">
+                    <a:lumMod val="65000"/>
+                    <a:lumOff val="35000"/>
+                  </a:schemeClr>
+                </a:solidFill>
+                <a:latin typeface="Francois One" panose="02000503040000020004" pitchFamily="2" charset="0"/>
+              </a:endParaRPr>
+            </a:p>
+          </p:txBody>
+        </p:sp>
+      </p:grpSp>
     </p:spTree>
     <p:extLst>
       <p:ext uri="{BB962C8B-B14F-4D97-AF65-F5344CB8AC3E}">

</xml_diff>

<commit_message>
feat: Support to export the metrics to Prometheus (#95)
* [WIP] support prometheus exporter

* adjust the status metric value

* add the host metrics - cpu, memory, disk

* refactory the code

* fix the unit test after change the status value

* refactory and add http metrics

* add shell and ssh metrics

* add license

* update the documents

* add the SLA metric

* update the grafana demo snapshot

* refactory the code base on the comments

* remove the - from valid chars

* change the inner fields to start with lower case
</commit_message>
<xml_diff>
--- a/docs/diagrams.pptx
+++ b/docs/diagrams.pptx
@@ -270,7 +270,7 @@
           <a:p>
             <a:fld id="{ADEA6865-5F8B-9C4A-950D-1D161D0F2BB5}" type="datetimeFigureOut">
               <a:rPr kumimoji="1" lang="zh-CN" altLang="en-US" smtClean="0"/>
-              <a:t>2022/5/9</a:t>
+              <a:t>2022/5/20</a:t>
             </a:fld>
             <a:endParaRPr kumimoji="1" lang="zh-CN" altLang="en-US"/>
           </a:p>
@@ -468,7 +468,7 @@
           <a:p>
             <a:fld id="{ADEA6865-5F8B-9C4A-950D-1D161D0F2BB5}" type="datetimeFigureOut">
               <a:rPr kumimoji="1" lang="zh-CN" altLang="en-US" smtClean="0"/>
-              <a:t>2022/5/9</a:t>
+              <a:t>2022/5/20</a:t>
             </a:fld>
             <a:endParaRPr kumimoji="1" lang="zh-CN" altLang="en-US"/>
           </a:p>
@@ -676,7 +676,7 @@
           <a:p>
             <a:fld id="{ADEA6865-5F8B-9C4A-950D-1D161D0F2BB5}" type="datetimeFigureOut">
               <a:rPr kumimoji="1" lang="zh-CN" altLang="en-US" smtClean="0"/>
-              <a:t>2022/5/9</a:t>
+              <a:t>2022/5/20</a:t>
             </a:fld>
             <a:endParaRPr kumimoji="1" lang="zh-CN" altLang="en-US"/>
           </a:p>
@@ -874,7 +874,7 @@
           <a:p>
             <a:fld id="{ADEA6865-5F8B-9C4A-950D-1D161D0F2BB5}" type="datetimeFigureOut">
               <a:rPr kumimoji="1" lang="zh-CN" altLang="en-US" smtClean="0"/>
-              <a:t>2022/5/9</a:t>
+              <a:t>2022/5/20</a:t>
             </a:fld>
             <a:endParaRPr kumimoji="1" lang="zh-CN" altLang="en-US"/>
           </a:p>
@@ -1149,7 +1149,7 @@
           <a:p>
             <a:fld id="{ADEA6865-5F8B-9C4A-950D-1D161D0F2BB5}" type="datetimeFigureOut">
               <a:rPr kumimoji="1" lang="zh-CN" altLang="en-US" smtClean="0"/>
-              <a:t>2022/5/9</a:t>
+              <a:t>2022/5/20</a:t>
             </a:fld>
             <a:endParaRPr kumimoji="1" lang="zh-CN" altLang="en-US"/>
           </a:p>
@@ -1414,7 +1414,7 @@
           <a:p>
             <a:fld id="{ADEA6865-5F8B-9C4A-950D-1D161D0F2BB5}" type="datetimeFigureOut">
               <a:rPr kumimoji="1" lang="zh-CN" altLang="en-US" smtClean="0"/>
-              <a:t>2022/5/9</a:t>
+              <a:t>2022/5/20</a:t>
             </a:fld>
             <a:endParaRPr kumimoji="1" lang="zh-CN" altLang="en-US"/>
           </a:p>
@@ -1826,7 +1826,7 @@
           <a:p>
             <a:fld id="{ADEA6865-5F8B-9C4A-950D-1D161D0F2BB5}" type="datetimeFigureOut">
               <a:rPr kumimoji="1" lang="zh-CN" altLang="en-US" smtClean="0"/>
-              <a:t>2022/5/9</a:t>
+              <a:t>2022/5/20</a:t>
             </a:fld>
             <a:endParaRPr kumimoji="1" lang="zh-CN" altLang="en-US"/>
           </a:p>
@@ -1967,7 +1967,7 @@
           <a:p>
             <a:fld id="{ADEA6865-5F8B-9C4A-950D-1D161D0F2BB5}" type="datetimeFigureOut">
               <a:rPr kumimoji="1" lang="zh-CN" altLang="en-US" smtClean="0"/>
-              <a:t>2022/5/9</a:t>
+              <a:t>2022/5/20</a:t>
             </a:fld>
             <a:endParaRPr kumimoji="1" lang="zh-CN" altLang="en-US"/>
           </a:p>
@@ -2080,7 +2080,7 @@
           <a:p>
             <a:fld id="{ADEA6865-5F8B-9C4A-950D-1D161D0F2BB5}" type="datetimeFigureOut">
               <a:rPr kumimoji="1" lang="zh-CN" altLang="en-US" smtClean="0"/>
-              <a:t>2022/5/9</a:t>
+              <a:t>2022/5/20</a:t>
             </a:fld>
             <a:endParaRPr kumimoji="1" lang="zh-CN" altLang="en-US"/>
           </a:p>
@@ -2391,7 +2391,7 @@
           <a:p>
             <a:fld id="{ADEA6865-5F8B-9C4A-950D-1D161D0F2BB5}" type="datetimeFigureOut">
               <a:rPr kumimoji="1" lang="zh-CN" altLang="en-US" smtClean="0"/>
-              <a:t>2022/5/9</a:t>
+              <a:t>2022/5/20</a:t>
             </a:fld>
             <a:endParaRPr kumimoji="1" lang="zh-CN" altLang="en-US"/>
           </a:p>
@@ -2679,7 +2679,7 @@
           <a:p>
             <a:fld id="{ADEA6865-5F8B-9C4A-950D-1D161D0F2BB5}" type="datetimeFigureOut">
               <a:rPr kumimoji="1" lang="zh-CN" altLang="en-US" smtClean="0"/>
-              <a:t>2022/5/9</a:t>
+              <a:t>2022/5/20</a:t>
             </a:fld>
             <a:endParaRPr kumimoji="1" lang="zh-CN" altLang="en-US"/>
           </a:p>
@@ -2920,7 +2920,7 @@
           <a:p>
             <a:fld id="{ADEA6865-5F8B-9C4A-950D-1D161D0F2BB5}" type="datetimeFigureOut">
               <a:rPr kumimoji="1" lang="zh-CN" altLang="en-US" smtClean="0"/>
-              <a:t>2022/5/9</a:t>
+              <a:t>2022/5/20</a:t>
             </a:fld>
             <a:endParaRPr kumimoji="1" lang="zh-CN" altLang="en-US"/>
           </a:p>
@@ -6001,7 +6001,7 @@
         </p:nvSpPr>
         <p:spPr>
           <a:xfrm>
-            <a:off x="2997669" y="651788"/>
+            <a:off x="2842600" y="647595"/>
             <a:ext cx="1754391" cy="646331"/>
           </a:xfrm>
           <a:prstGeom prst="rect">
@@ -6050,7 +6050,7 @@
         </p:nvSpPr>
         <p:spPr>
           <a:xfrm>
-            <a:off x="6383873" y="647595"/>
+            <a:off x="6456040" y="647595"/>
             <a:ext cx="3182281" cy="646331"/>
           </a:xfrm>
           <a:prstGeom prst="rect">
@@ -6099,7 +6099,7 @@
         </p:nvGrpSpPr>
         <p:grpSpPr>
           <a:xfrm>
-            <a:off x="8683634" y="3097466"/>
+            <a:off x="8683634" y="2381191"/>
             <a:ext cx="470000" cy="679715"/>
             <a:chOff x="9372487" y="1367754"/>
             <a:chExt cx="470000" cy="679715"/>
@@ -6202,7 +6202,7 @@
         </p:nvGrpSpPr>
         <p:grpSpPr>
           <a:xfrm>
-            <a:off x="9418998" y="3100593"/>
+            <a:off x="9418998" y="2384318"/>
             <a:ext cx="583814" cy="676588"/>
             <a:chOff x="10160020" y="1361565"/>
             <a:chExt cx="583814" cy="676588"/>
@@ -6311,7 +6311,7 @@
         </p:nvGrpSpPr>
         <p:grpSpPr>
           <a:xfrm>
-            <a:off x="10125817" y="3055689"/>
+            <a:off x="10125817" y="2339414"/>
             <a:ext cx="676788" cy="721492"/>
             <a:chOff x="9372487" y="2082656"/>
             <a:chExt cx="676788" cy="721492"/>
@@ -6414,7 +6414,7 @@
         </p:nvGrpSpPr>
         <p:grpSpPr>
           <a:xfrm>
-            <a:off x="9333729" y="2213054"/>
+            <a:off x="9333729" y="1496779"/>
             <a:ext cx="671979" cy="736261"/>
             <a:chOff x="10076827" y="2062616"/>
             <a:chExt cx="671979" cy="736261"/>
@@ -6540,7 +6540,7 @@
         </p:nvGrpSpPr>
         <p:grpSpPr>
           <a:xfrm>
-            <a:off x="9473839" y="3937187"/>
+            <a:off x="9473839" y="3220912"/>
             <a:ext cx="474133" cy="664335"/>
             <a:chOff x="10230401" y="3715563"/>
             <a:chExt cx="474133" cy="664335"/>
@@ -6643,7 +6643,7 @@
         </p:nvGrpSpPr>
         <p:grpSpPr>
           <a:xfrm>
-            <a:off x="8469633" y="3937254"/>
+            <a:off x="8469633" y="3220979"/>
             <a:ext cx="898003" cy="664268"/>
             <a:chOff x="9935576" y="4496187"/>
             <a:chExt cx="898003" cy="664268"/>
@@ -6770,7 +6770,7 @@
         </p:nvGrpSpPr>
         <p:grpSpPr>
           <a:xfrm>
-            <a:off x="10141046" y="3904347"/>
+            <a:off x="10141046" y="3188072"/>
             <a:ext cx="646331" cy="697175"/>
             <a:chOff x="9317095" y="5490246"/>
             <a:chExt cx="646331" cy="697175"/>
@@ -6873,7 +6873,7 @@
         </p:nvGrpSpPr>
         <p:grpSpPr>
           <a:xfrm>
-            <a:off x="8683634" y="2204135"/>
+            <a:off x="8683634" y="1487860"/>
             <a:ext cx="470001" cy="755330"/>
             <a:chOff x="8715440" y="3658513"/>
             <a:chExt cx="470001" cy="755330"/>
@@ -6976,7 +6976,7 @@
         </p:nvSpPr>
         <p:spPr>
           <a:xfrm>
-            <a:off x="6558970" y="2844435"/>
+            <a:off x="6558970" y="2316145"/>
             <a:ext cx="1128408" cy="340468"/>
           </a:xfrm>
           <a:prstGeom prst="roundRect">
@@ -7041,7 +7041,7 @@
         </p:nvSpPr>
         <p:spPr>
           <a:xfrm>
-            <a:off x="6558970" y="3429345"/>
+            <a:off x="6558970" y="2901055"/>
             <a:ext cx="1128408" cy="340468"/>
           </a:xfrm>
           <a:prstGeom prst="roundRect">
@@ -7106,7 +7106,7 @@
         </p:nvSpPr>
         <p:spPr>
           <a:xfrm>
-            <a:off x="6558970" y="4048870"/>
+            <a:off x="6558970" y="3520580"/>
             <a:ext cx="1128408" cy="340468"/>
           </a:xfrm>
           <a:prstGeom prst="roundRect">
@@ -7171,7 +7171,7 @@
         </p:nvGrpSpPr>
         <p:grpSpPr>
           <a:xfrm>
-            <a:off x="10158440" y="2201059"/>
+            <a:off x="10158440" y="1484784"/>
             <a:ext cx="555546" cy="767184"/>
             <a:chOff x="9854490" y="1725846"/>
             <a:chExt cx="555546" cy="767184"/>
@@ -7274,7 +7274,7 @@
         </p:nvCxnSpPr>
         <p:spPr>
           <a:xfrm>
-            <a:off x="7880971" y="2978158"/>
+            <a:off x="7880971" y="2449868"/>
             <a:ext cx="504056" cy="0"/>
           </a:xfrm>
           <a:prstGeom prst="straightConnector1">
@@ -7313,7 +7313,7 @@
         </p:nvCxnSpPr>
         <p:spPr>
           <a:xfrm>
-            <a:off x="7890285" y="3599579"/>
+            <a:off x="7890285" y="3071289"/>
             <a:ext cx="504056" cy="0"/>
           </a:xfrm>
           <a:prstGeom prst="straightConnector1">
@@ -7352,7 +7352,7 @@
         </p:nvCxnSpPr>
         <p:spPr>
           <a:xfrm>
-            <a:off x="7880971" y="4209933"/>
+            <a:off x="7880971" y="3681643"/>
             <a:ext cx="504056" cy="0"/>
           </a:xfrm>
           <a:prstGeom prst="straightConnector1">
@@ -7391,7 +7391,7 @@
         </p:nvSpPr>
         <p:spPr>
           <a:xfrm>
-            <a:off x="4974674" y="3317471"/>
+            <a:off x="4998690" y="2826243"/>
             <a:ext cx="1019896" cy="627835"/>
           </a:xfrm>
           <a:prstGeom prst="rightArrow">
@@ -7445,7 +7445,7 @@
         </p:nvGrpSpPr>
         <p:grpSpPr>
           <a:xfrm>
-            <a:off x="8668246" y="4672311"/>
+            <a:off x="8668246" y="3956036"/>
             <a:ext cx="490840" cy="617447"/>
             <a:chOff x="8624518" y="4844946"/>
             <a:chExt cx="490840" cy="617447"/>
@@ -7554,7 +7554,7 @@
         </p:nvGrpSpPr>
         <p:grpSpPr>
           <a:xfrm>
-            <a:off x="9424816" y="4617412"/>
+            <a:off x="9424816" y="3901137"/>
             <a:ext cx="540533" cy="672256"/>
             <a:chOff x="9412218" y="4790137"/>
             <a:chExt cx="540533" cy="672256"/>
@@ -7674,7 +7674,7 @@
         </p:nvGrpSpPr>
         <p:grpSpPr>
           <a:xfrm>
-            <a:off x="10184042" y="4696713"/>
+            <a:off x="10184042" y="3980438"/>
             <a:ext cx="619080" cy="592955"/>
             <a:chOff x="10171444" y="4869438"/>
             <a:chExt cx="619080" cy="592955"/>
@@ -7762,6 +7762,465 @@
           </p:txBody>
         </p:sp>
       </p:grpSp>
+      <p:sp>
+        <p:nvSpPr>
+          <p:cNvPr id="127" name="右箭头 126">
+            <a:extLst>
+              <a:ext uri="{FF2B5EF4-FFF2-40B4-BE49-F238E27FC236}">
+                <a16:creationId xmlns:a16="http://schemas.microsoft.com/office/drawing/2014/main" id="{19E1D767-BAD7-F201-EA8A-A6FB05F08DE0}"/>
+              </a:ext>
+            </a:extLst>
+          </p:cNvPr>
+          <p:cNvSpPr/>
+          <p:nvPr/>
+        </p:nvSpPr>
+        <p:spPr>
+          <a:xfrm>
+            <a:off x="4941093" y="4653136"/>
+            <a:ext cx="1019896" cy="627835"/>
+          </a:xfrm>
+          <a:prstGeom prst="rightArrow">
+            <a:avLst/>
+          </a:prstGeom>
+          <a:solidFill>
+            <a:srgbClr val="2342BF"/>
+          </a:solidFill>
+          <a:ln>
+            <a:solidFill>
+              <a:srgbClr val="2342BF"/>
+            </a:solidFill>
+          </a:ln>
+        </p:spPr>
+        <p:style>
+          <a:lnRef idx="2">
+            <a:schemeClr val="accent1">
+              <a:shade val="50000"/>
+            </a:schemeClr>
+          </a:lnRef>
+          <a:fillRef idx="1">
+            <a:schemeClr val="accent1"/>
+          </a:fillRef>
+          <a:effectRef idx="0">
+            <a:schemeClr val="accent1"/>
+          </a:effectRef>
+          <a:fontRef idx="minor">
+            <a:schemeClr val="lt1"/>
+          </a:fontRef>
+        </p:style>
+        <p:txBody>
+          <a:bodyPr rtlCol="0" anchor="ctr"/>
+          <a:lstStyle/>
+          <a:p>
+            <a:pPr algn="ctr"/>
+            <a:endParaRPr kumimoji="1" lang="zh-CN" altLang="en-US"/>
+          </a:p>
+        </p:txBody>
+      </p:sp>
+      <p:sp>
+        <p:nvSpPr>
+          <p:cNvPr id="128" name="圆角矩形 127">
+            <a:extLst>
+              <a:ext uri="{FF2B5EF4-FFF2-40B4-BE49-F238E27FC236}">
+                <a16:creationId xmlns:a16="http://schemas.microsoft.com/office/drawing/2014/main" id="{EAB2C897-CDED-45BA-C46A-0F63CBA0E499}"/>
+              </a:ext>
+            </a:extLst>
+          </p:cNvPr>
+          <p:cNvSpPr/>
+          <p:nvPr/>
+        </p:nvSpPr>
+        <p:spPr>
+          <a:xfrm>
+            <a:off x="6558970" y="4869160"/>
+            <a:ext cx="1128408" cy="340468"/>
+          </a:xfrm>
+          <a:prstGeom prst="roundRect">
+            <a:avLst/>
+          </a:prstGeom>
+          <a:solidFill>
+            <a:srgbClr val="2342BF"/>
+          </a:solidFill>
+          <a:ln>
+            <a:solidFill>
+              <a:srgbClr val="2342BF"/>
+            </a:solidFill>
+          </a:ln>
+        </p:spPr>
+        <p:style>
+          <a:lnRef idx="2">
+            <a:schemeClr val="accent1">
+              <a:shade val="50000"/>
+            </a:schemeClr>
+          </a:lnRef>
+          <a:fillRef idx="1">
+            <a:schemeClr val="accent1"/>
+          </a:fillRef>
+          <a:effectRef idx="0">
+            <a:schemeClr val="accent1"/>
+          </a:effectRef>
+          <a:fontRef idx="minor">
+            <a:schemeClr val="lt1"/>
+          </a:fontRef>
+        </p:style>
+        <p:txBody>
+          <a:bodyPr rtlCol="0" anchor="ctr"/>
+          <a:lstStyle/>
+          <a:p>
+            <a:pPr algn="ctr"/>
+            <a:r>
+              <a:rPr kumimoji="1" lang="en-US" altLang="zh-CN" b="1" dirty="0">
+                <a:latin typeface="Open Sans" panose="020B0606030504020204" pitchFamily="34" charset="0"/>
+                <a:ea typeface="Open Sans" panose="020B0606030504020204" pitchFamily="34" charset="0"/>
+                <a:cs typeface="Open Sans" panose="020B0606030504020204" pitchFamily="34" charset="0"/>
+              </a:rPr>
+              <a:t>Metrics</a:t>
+            </a:r>
+            <a:endParaRPr kumimoji="1" lang="zh-CN" altLang="en-US" b="1" dirty="0">
+              <a:latin typeface="Open Sans" panose="020B0606030504020204" pitchFamily="34" charset="0"/>
+              <a:cs typeface="Open Sans" panose="020B0606030504020204" pitchFamily="34" charset="0"/>
+            </a:endParaRPr>
+          </a:p>
+        </p:txBody>
+      </p:sp>
+      <p:grpSp>
+        <p:nvGrpSpPr>
+          <p:cNvPr id="129" name="组合 128">
+            <a:extLst>
+              <a:ext uri="{FF2B5EF4-FFF2-40B4-BE49-F238E27FC236}">
+                <a16:creationId xmlns:a16="http://schemas.microsoft.com/office/drawing/2014/main" id="{9EF92ED4-5A06-C271-A81C-3DF075B60F58}"/>
+              </a:ext>
+            </a:extLst>
+          </p:cNvPr>
+          <p:cNvGrpSpPr/>
+          <p:nvPr/>
+        </p:nvGrpSpPr>
+        <p:grpSpPr>
+          <a:xfrm>
+            <a:off x="8582501" y="4741739"/>
+            <a:ext cx="825867" cy="677862"/>
+            <a:chOff x="1125642" y="682053"/>
+            <a:chExt cx="569547" cy="467478"/>
+          </a:xfrm>
+        </p:grpSpPr>
+        <p:pic>
+          <p:nvPicPr>
+            <p:cNvPr id="130" name="图形 129">
+              <a:extLst>
+                <a:ext uri="{FF2B5EF4-FFF2-40B4-BE49-F238E27FC236}">
+                  <a16:creationId xmlns:a16="http://schemas.microsoft.com/office/drawing/2014/main" id="{EB0E55A2-1B13-F7BD-939B-4B57727B0784}"/>
+                </a:ext>
+              </a:extLst>
+            </p:cNvPr>
+            <p:cNvPicPr>
+              <a:picLocks noChangeAspect="1"/>
+            </p:cNvPicPr>
+            <p:nvPr/>
+          </p:nvPicPr>
+          <p:blipFill>
+            <a:blip r:embed="rId5">
+              <a:extLst>
+                <a:ext uri="{96DAC541-7B7A-43D3-8B79-37D633B846F1}">
+                  <asvg:svgBlip xmlns:asvg="http://schemas.microsoft.com/office/drawing/2016/SVG/main" r:embed="rId6"/>
+                </a:ext>
+              </a:extLst>
+            </a:blip>
+            <a:stretch>
+              <a:fillRect/>
+            </a:stretch>
+          </p:blipFill>
+          <p:spPr>
+            <a:xfrm>
+              <a:off x="1254563" y="682053"/>
+              <a:ext cx="311705" cy="311706"/>
+            </a:xfrm>
+            <a:prstGeom prst="rect">
+              <a:avLst/>
+            </a:prstGeom>
+          </p:spPr>
+        </p:pic>
+        <p:sp>
+          <p:nvSpPr>
+            <p:cNvPr id="131" name="文本框 130">
+              <a:extLst>
+                <a:ext uri="{FF2B5EF4-FFF2-40B4-BE49-F238E27FC236}">
+                  <a16:creationId xmlns:a16="http://schemas.microsoft.com/office/drawing/2014/main" id="{3C8A7A63-80A3-7191-5214-B37E794D0F41}"/>
+                </a:ext>
+              </a:extLst>
+            </p:cNvPr>
+            <p:cNvSpPr txBox="1"/>
+            <p:nvPr/>
+          </p:nvSpPr>
+          <p:spPr>
+            <a:xfrm>
+              <a:off x="1125642" y="979728"/>
+              <a:ext cx="569547" cy="169803"/>
+            </a:xfrm>
+            <a:prstGeom prst="rect">
+              <a:avLst/>
+            </a:prstGeom>
+            <a:noFill/>
+          </p:spPr>
+          <p:txBody>
+            <a:bodyPr wrap="none" rtlCol="0">
+              <a:spAutoFit/>
+            </a:bodyPr>
+            <a:lstStyle/>
+            <a:p>
+              <a:pPr algn="ctr"/>
+              <a:r>
+                <a:rPr kumimoji="1" lang="en-US" altLang="zh-CN" sz="1000" dirty="0">
+                  <a:solidFill>
+                    <a:schemeClr val="tx1">
+                      <a:lumMod val="65000"/>
+                      <a:lumOff val="35000"/>
+                    </a:schemeClr>
+                  </a:solidFill>
+                  <a:latin typeface="Francois One" panose="02000503040000020004" pitchFamily="2" charset="0"/>
+                </a:rPr>
+                <a:t>Prometheus</a:t>
+              </a:r>
+              <a:endParaRPr kumimoji="1" lang="zh-CN" altLang="en-US" sz="1000" dirty="0">
+                <a:solidFill>
+                  <a:schemeClr val="tx1">
+                    <a:lumMod val="65000"/>
+                    <a:lumOff val="35000"/>
+                  </a:schemeClr>
+                </a:solidFill>
+                <a:latin typeface="Francois One" panose="02000503040000020004" pitchFamily="2" charset="0"/>
+              </a:endParaRPr>
+            </a:p>
+          </p:txBody>
+        </p:sp>
+      </p:grpSp>
+      <p:cxnSp>
+        <p:nvCxnSpPr>
+          <p:cNvPr id="132" name="直线箭头连接符 131">
+            <a:extLst>
+              <a:ext uri="{FF2B5EF4-FFF2-40B4-BE49-F238E27FC236}">
+                <a16:creationId xmlns:a16="http://schemas.microsoft.com/office/drawing/2014/main" id="{5DE6E08A-B662-00A7-949C-5715CB4241A4}"/>
+              </a:ext>
+            </a:extLst>
+          </p:cNvPr>
+          <p:cNvCxnSpPr/>
+          <p:nvPr/>
+        </p:nvCxnSpPr>
+        <p:spPr>
+          <a:xfrm>
+            <a:off x="7935014" y="5054785"/>
+            <a:ext cx="504056" cy="0"/>
+          </a:xfrm>
+          <a:prstGeom prst="straightConnector1">
+            <a:avLst/>
+          </a:prstGeom>
+          <a:ln>
+            <a:tailEnd type="triangle"/>
+          </a:ln>
+        </p:spPr>
+        <p:style>
+          <a:lnRef idx="1">
+            <a:schemeClr val="accent1"/>
+          </a:lnRef>
+          <a:fillRef idx="0">
+            <a:schemeClr val="accent1"/>
+          </a:fillRef>
+          <a:effectRef idx="0">
+            <a:schemeClr val="accent1"/>
+          </a:effectRef>
+          <a:fontRef idx="minor">
+            <a:schemeClr val="tx1"/>
+          </a:fontRef>
+        </p:style>
+      </p:cxnSp>
+      <p:cxnSp>
+        <p:nvCxnSpPr>
+          <p:cNvPr id="133" name="直线连接符 132">
+            <a:extLst>
+              <a:ext uri="{FF2B5EF4-FFF2-40B4-BE49-F238E27FC236}">
+                <a16:creationId xmlns:a16="http://schemas.microsoft.com/office/drawing/2014/main" id="{CEE6FAA4-4FD1-4265-6AF9-D41BFA504ACC}"/>
+              </a:ext>
+            </a:extLst>
+          </p:cNvPr>
+          <p:cNvCxnSpPr>
+            <a:cxnSpLocks/>
+          </p:cNvCxnSpPr>
+          <p:nvPr/>
+        </p:nvCxnSpPr>
+        <p:spPr>
+          <a:xfrm>
+            <a:off x="6558970" y="4637733"/>
+            <a:ext cx="4433574" cy="0"/>
+          </a:xfrm>
+          <a:prstGeom prst="line">
+            <a:avLst/>
+          </a:prstGeom>
+          <a:ln w="9525">
+            <a:solidFill>
+              <a:schemeClr val="bg2">
+                <a:lumMod val="90000"/>
+              </a:schemeClr>
+            </a:solidFill>
+            <a:prstDash val="dash"/>
+          </a:ln>
+        </p:spPr>
+        <p:style>
+          <a:lnRef idx="1">
+            <a:schemeClr val="accent1"/>
+          </a:lnRef>
+          <a:fillRef idx="0">
+            <a:schemeClr val="accent1"/>
+          </a:fillRef>
+          <a:effectRef idx="0">
+            <a:schemeClr val="accent1"/>
+          </a:effectRef>
+          <a:fontRef idx="minor">
+            <a:schemeClr val="tx1"/>
+          </a:fontRef>
+        </p:style>
+      </p:cxnSp>
+      <p:grpSp>
+        <p:nvGrpSpPr>
+          <p:cNvPr id="18" name="组合 17">
+            <a:extLst>
+              <a:ext uri="{FF2B5EF4-FFF2-40B4-BE49-F238E27FC236}">
+                <a16:creationId xmlns:a16="http://schemas.microsoft.com/office/drawing/2014/main" id="{93D4C549-CCFB-8B15-5463-E329BE87B151}"/>
+              </a:ext>
+            </a:extLst>
+          </p:cNvPr>
+          <p:cNvGrpSpPr/>
+          <p:nvPr/>
+        </p:nvGrpSpPr>
+        <p:grpSpPr>
+          <a:xfrm>
+            <a:off x="10200456" y="4708868"/>
+            <a:ext cx="601448" cy="710733"/>
+            <a:chOff x="9441498" y="4704429"/>
+            <a:chExt cx="601448" cy="710733"/>
+          </a:xfrm>
+        </p:grpSpPr>
+        <p:pic>
+          <p:nvPicPr>
+            <p:cNvPr id="6" name="图片 5">
+              <a:extLst>
+                <a:ext uri="{FF2B5EF4-FFF2-40B4-BE49-F238E27FC236}">
+                  <a16:creationId xmlns:a16="http://schemas.microsoft.com/office/drawing/2014/main" id="{B36B8E33-E498-057F-0BA8-61076C6135E7}"/>
+                </a:ext>
+              </a:extLst>
+            </p:cNvPr>
+            <p:cNvPicPr>
+              <a:picLocks noChangeAspect="1"/>
+            </p:cNvPicPr>
+            <p:nvPr/>
+          </p:nvPicPr>
+          <p:blipFill>
+            <a:blip r:embed="rId36"/>
+            <a:stretch>
+              <a:fillRect/>
+            </a:stretch>
+          </p:blipFill>
+          <p:spPr>
+            <a:xfrm>
+              <a:off x="9478334" y="4704429"/>
+              <a:ext cx="489706" cy="489706"/>
+            </a:xfrm>
+            <a:prstGeom prst="rect">
+              <a:avLst/>
+            </a:prstGeom>
+          </p:spPr>
+        </p:pic>
+        <p:sp>
+          <p:nvSpPr>
+            <p:cNvPr id="134" name="文本框 133">
+              <a:extLst>
+                <a:ext uri="{FF2B5EF4-FFF2-40B4-BE49-F238E27FC236}">
+                  <a16:creationId xmlns:a16="http://schemas.microsoft.com/office/drawing/2014/main" id="{46200AF6-D8AF-AA0F-0B5A-620BC89DCA86}"/>
+                </a:ext>
+              </a:extLst>
+            </p:cNvPr>
+            <p:cNvSpPr txBox="1"/>
+            <p:nvPr/>
+          </p:nvSpPr>
+          <p:spPr>
+            <a:xfrm>
+              <a:off x="9441498" y="5168941"/>
+              <a:ext cx="601448" cy="246221"/>
+            </a:xfrm>
+            <a:prstGeom prst="rect">
+              <a:avLst/>
+            </a:prstGeom>
+            <a:noFill/>
+          </p:spPr>
+          <p:txBody>
+            <a:bodyPr wrap="none" rtlCol="0">
+              <a:spAutoFit/>
+            </a:bodyPr>
+            <a:lstStyle/>
+            <a:p>
+              <a:pPr algn="ctr"/>
+              <a:r>
+                <a:rPr kumimoji="1" lang="en-US" altLang="zh-CN" sz="1000" dirty="0">
+                  <a:solidFill>
+                    <a:schemeClr val="tx1">
+                      <a:lumMod val="65000"/>
+                      <a:lumOff val="35000"/>
+                    </a:schemeClr>
+                  </a:solidFill>
+                  <a:latin typeface="Francois One" panose="02000503040000020004" pitchFamily="2" charset="0"/>
+                </a:rPr>
+                <a:t>Grafana</a:t>
+              </a:r>
+              <a:endParaRPr kumimoji="1" lang="zh-CN" altLang="en-US" sz="1000" dirty="0">
+                <a:solidFill>
+                  <a:schemeClr val="tx1">
+                    <a:lumMod val="65000"/>
+                    <a:lumOff val="35000"/>
+                  </a:schemeClr>
+                </a:solidFill>
+                <a:latin typeface="Francois One" panose="02000503040000020004" pitchFamily="2" charset="0"/>
+              </a:endParaRPr>
+            </a:p>
+          </p:txBody>
+        </p:sp>
+      </p:grpSp>
+      <p:cxnSp>
+        <p:nvCxnSpPr>
+          <p:cNvPr id="135" name="直线箭头连接符 134">
+            <a:extLst>
+              <a:ext uri="{FF2B5EF4-FFF2-40B4-BE49-F238E27FC236}">
+                <a16:creationId xmlns:a16="http://schemas.microsoft.com/office/drawing/2014/main" id="{EEF1C411-0712-4064-0D05-DD6528E99F63}"/>
+              </a:ext>
+            </a:extLst>
+          </p:cNvPr>
+          <p:cNvCxnSpPr>
+            <a:cxnSpLocks/>
+          </p:cNvCxnSpPr>
+          <p:nvPr/>
+        </p:nvCxnSpPr>
+        <p:spPr>
+          <a:xfrm>
+            <a:off x="9470179" y="4995318"/>
+            <a:ext cx="586261" cy="0"/>
+          </a:xfrm>
+          <a:prstGeom prst="straightConnector1">
+            <a:avLst/>
+          </a:prstGeom>
+          <a:ln>
+            <a:tailEnd type="triangle"/>
+          </a:ln>
+        </p:spPr>
+        <p:style>
+          <a:lnRef idx="1">
+            <a:schemeClr val="accent1"/>
+          </a:lnRef>
+          <a:fillRef idx="0">
+            <a:schemeClr val="accent1"/>
+          </a:fillRef>
+          <a:effectRef idx="0">
+            <a:schemeClr val="accent1"/>
+          </a:effectRef>
+          <a:fontRef idx="minor">
+            <a:schemeClr val="tx1"/>
+          </a:fontRef>
+        </p:style>
+      </p:cxnSp>
     </p:spTree>
     <p:extLst>
       <p:ext uri="{BB962C8B-B14F-4D97-AF65-F5344CB8AC3E}">

</xml_diff>

<commit_message>
update the overview.png and README.md
</commit_message>
<xml_diff>
--- a/docs/diagrams.pptx
+++ b/docs/diagrams.pptx
@@ -2,18 +2,18 @@
 <file path=ppt/presentation.xml><?xml version="1.0" encoding="utf-8"?>
 <p:presentation xmlns:a="http://schemas.openxmlformats.org/drawingml/2006/main" xmlns:r="http://schemas.openxmlformats.org/officeDocument/2006/relationships" xmlns:p="http://schemas.openxmlformats.org/presentationml/2006/main" saveSubsetFonts="1" autoCompressPictures="0">
   <p:sldMasterIdLst>
-    <p:sldMasterId id="2147483648" r:id="rId1"/>
+    <p:sldMasterId id="2147483660" r:id="rId1"/>
   </p:sldMasterIdLst>
   <p:sldIdLst>
     <p:sldId id="256" r:id="rId2"/>
   </p:sldIdLst>
-  <p:sldSz cx="12192000" cy="6858000"/>
+  <p:sldSz cx="12192000" cy="10799763"/>
   <p:notesSz cx="6858000" cy="9144000"/>
   <p:defaultTextStyle>
     <a:defPPr>
-      <a:defRPr lang="zh-CN"/>
+      <a:defRPr lang="en-US"/>
     </a:defPPr>
-    <a:lvl1pPr marL="0" algn="l" defTabSz="914400" rtl="0" eaLnBrk="1" latinLnBrk="0" hangingPunct="1">
+    <a:lvl1pPr marL="0" algn="l" defTabSz="457200" rtl="0" eaLnBrk="1" latinLnBrk="0" hangingPunct="1">
       <a:defRPr sz="1800" kern="1200">
         <a:solidFill>
           <a:schemeClr val="tx1"/>
@@ -23,7 +23,7 @@
         <a:cs typeface="+mn-cs"/>
       </a:defRPr>
     </a:lvl1pPr>
-    <a:lvl2pPr marL="457200" algn="l" defTabSz="914400" rtl="0" eaLnBrk="1" latinLnBrk="0" hangingPunct="1">
+    <a:lvl2pPr marL="457200" algn="l" defTabSz="457200" rtl="0" eaLnBrk="1" latinLnBrk="0" hangingPunct="1">
       <a:defRPr sz="1800" kern="1200">
         <a:solidFill>
           <a:schemeClr val="tx1"/>
@@ -33,7 +33,7 @@
         <a:cs typeface="+mn-cs"/>
       </a:defRPr>
     </a:lvl2pPr>
-    <a:lvl3pPr marL="914400" algn="l" defTabSz="914400" rtl="0" eaLnBrk="1" latinLnBrk="0" hangingPunct="1">
+    <a:lvl3pPr marL="914400" algn="l" defTabSz="457200" rtl="0" eaLnBrk="1" latinLnBrk="0" hangingPunct="1">
       <a:defRPr sz="1800" kern="1200">
         <a:solidFill>
           <a:schemeClr val="tx1"/>
@@ -43,7 +43,7 @@
         <a:cs typeface="+mn-cs"/>
       </a:defRPr>
     </a:lvl3pPr>
-    <a:lvl4pPr marL="1371600" algn="l" defTabSz="914400" rtl="0" eaLnBrk="1" latinLnBrk="0" hangingPunct="1">
+    <a:lvl4pPr marL="1371600" algn="l" defTabSz="457200" rtl="0" eaLnBrk="1" latinLnBrk="0" hangingPunct="1">
       <a:defRPr sz="1800" kern="1200">
         <a:solidFill>
           <a:schemeClr val="tx1"/>
@@ -53,7 +53,7 @@
         <a:cs typeface="+mn-cs"/>
       </a:defRPr>
     </a:lvl4pPr>
-    <a:lvl5pPr marL="1828800" algn="l" defTabSz="914400" rtl="0" eaLnBrk="1" latinLnBrk="0" hangingPunct="1">
+    <a:lvl5pPr marL="1828800" algn="l" defTabSz="457200" rtl="0" eaLnBrk="1" latinLnBrk="0" hangingPunct="1">
       <a:defRPr sz="1800" kern="1200">
         <a:solidFill>
           <a:schemeClr val="tx1"/>
@@ -63,7 +63,7 @@
         <a:cs typeface="+mn-cs"/>
       </a:defRPr>
     </a:lvl5pPr>
-    <a:lvl6pPr marL="2286000" algn="l" defTabSz="914400" rtl="0" eaLnBrk="1" latinLnBrk="0" hangingPunct="1">
+    <a:lvl6pPr marL="2286000" algn="l" defTabSz="457200" rtl="0" eaLnBrk="1" latinLnBrk="0" hangingPunct="1">
       <a:defRPr sz="1800" kern="1200">
         <a:solidFill>
           <a:schemeClr val="tx1"/>
@@ -73,7 +73,7 @@
         <a:cs typeface="+mn-cs"/>
       </a:defRPr>
     </a:lvl6pPr>
-    <a:lvl7pPr marL="2743200" algn="l" defTabSz="914400" rtl="0" eaLnBrk="1" latinLnBrk="0" hangingPunct="1">
+    <a:lvl7pPr marL="2743200" algn="l" defTabSz="457200" rtl="0" eaLnBrk="1" latinLnBrk="0" hangingPunct="1">
       <a:defRPr sz="1800" kern="1200">
         <a:solidFill>
           <a:schemeClr val="tx1"/>
@@ -83,7 +83,7 @@
         <a:cs typeface="+mn-cs"/>
       </a:defRPr>
     </a:lvl7pPr>
-    <a:lvl8pPr marL="3200400" algn="l" defTabSz="914400" rtl="0" eaLnBrk="1" latinLnBrk="0" hangingPunct="1">
+    <a:lvl8pPr marL="3200400" algn="l" defTabSz="457200" rtl="0" eaLnBrk="1" latinLnBrk="0" hangingPunct="1">
       <a:defRPr sz="1800" kern="1200">
         <a:solidFill>
           <a:schemeClr val="tx1"/>
@@ -93,7 +93,7 @@
         <a:cs typeface="+mn-cs"/>
       </a:defRPr>
     </a:lvl8pPr>
-    <a:lvl9pPr marL="3657600" algn="l" defTabSz="914400" rtl="0" eaLnBrk="1" latinLnBrk="0" hangingPunct="1">
+    <a:lvl9pPr marL="3657600" algn="l" defTabSz="457200" rtl="0" eaLnBrk="1" latinLnBrk="0" hangingPunct="1">
       <a:defRPr sz="1800" kern="1200">
         <a:solidFill>
           <a:schemeClr val="tx1"/>
@@ -107,7 +107,7 @@
   <p:extLst>
     <p:ext uri="{EFAFB233-063F-42B5-8137-9DF3F51BA10A}">
       <p15:sldGuideLst xmlns:p15="http://schemas.microsoft.com/office/powerpoint/2012/main">
-        <p15:guide id="1" orient="horz" pos="1888" userDrawn="1">
+        <p15:guide id="1" orient="horz" pos="2973" userDrawn="1">
           <p15:clr>
             <a:srgbClr val="A4A3A4"/>
           </p15:clr>
@@ -142,13 +142,7 @@
       </p:grpSpPr>
       <p:sp>
         <p:nvSpPr>
-          <p:cNvPr id="2" name="标题 1">
-            <a:extLst>
-              <a:ext uri="{FF2B5EF4-FFF2-40B4-BE49-F238E27FC236}">
-                <a16:creationId xmlns:a16="http://schemas.microsoft.com/office/drawing/2014/main" id="{B0F67E69-0D92-8DBE-7A87-6F39D31B49D2}"/>
-              </a:ext>
-            </a:extLst>
-          </p:cNvPr>
+          <p:cNvPr id="2" name="Title 1"/>
           <p:cNvSpPr>
             <a:spLocks noGrp="1"/>
           </p:cNvSpPr>
@@ -158,34 +152,29 @@
         </p:nvSpPr>
         <p:spPr>
           <a:xfrm>
-            <a:off x="1524000" y="1122363"/>
-            <a:ext cx="9144000" cy="2387600"/>
+            <a:off x="914400" y="1767462"/>
+            <a:ext cx="10363200" cy="3759917"/>
           </a:xfrm>
         </p:spPr>
         <p:txBody>
           <a:bodyPr anchor="b"/>
           <a:lstStyle>
             <a:lvl1pPr algn="ctr">
-              <a:defRPr sz="6000"/>
+              <a:defRPr sz="8000"/>
             </a:lvl1pPr>
           </a:lstStyle>
           <a:p>
             <a:r>
-              <a:rPr kumimoji="1" lang="zh-CN" altLang="en-US"/>
+              <a:rPr lang="zh-CN" altLang="en-US"/>
               <a:t>单击此处编辑母版标题样式</a:t>
             </a:r>
+            <a:endParaRPr lang="en-US" dirty="0"/>
           </a:p>
         </p:txBody>
       </p:sp>
       <p:sp>
         <p:nvSpPr>
-          <p:cNvPr id="3" name="副标题 2">
-            <a:extLst>
-              <a:ext uri="{FF2B5EF4-FFF2-40B4-BE49-F238E27FC236}">
-                <a16:creationId xmlns:a16="http://schemas.microsoft.com/office/drawing/2014/main" id="{05E33B14-FC86-682A-5DDD-68BC5EE6792F}"/>
-              </a:ext>
-            </a:extLst>
-          </p:cNvPr>
+          <p:cNvPr id="3" name="Subtitle 2"/>
           <p:cNvSpPr>
             <a:spLocks noGrp="1"/>
           </p:cNvSpPr>
@@ -195,8 +184,8 @@
         </p:nvSpPr>
         <p:spPr>
           <a:xfrm>
-            <a:off x="1524000" y="3602038"/>
-            <a:ext cx="9144000" cy="1655762"/>
+            <a:off x="1524000" y="5672376"/>
+            <a:ext cx="9144000" cy="2607442"/>
           </a:xfrm>
         </p:spPr>
         <p:txBody>
@@ -204,58 +193,53 @@
           <a:lstStyle>
             <a:lvl1pPr marL="0" indent="0" algn="ctr">
               <a:buNone/>
+              <a:defRPr sz="3200"/>
+            </a:lvl1pPr>
+            <a:lvl2pPr marL="609585" indent="0" algn="ctr">
+              <a:buNone/>
+              <a:defRPr sz="2667"/>
+            </a:lvl2pPr>
+            <a:lvl3pPr marL="1219170" indent="0" algn="ctr">
+              <a:buNone/>
               <a:defRPr sz="2400"/>
-            </a:lvl1pPr>
-            <a:lvl2pPr marL="457200" indent="0" algn="ctr">
+            </a:lvl3pPr>
+            <a:lvl4pPr marL="1828754" indent="0" algn="ctr">
               <a:buNone/>
-              <a:defRPr sz="2000"/>
-            </a:lvl2pPr>
-            <a:lvl3pPr marL="914400" indent="0" algn="ctr">
+              <a:defRPr sz="2133"/>
+            </a:lvl4pPr>
+            <a:lvl5pPr marL="2438339" indent="0" algn="ctr">
               <a:buNone/>
-              <a:defRPr sz="1800"/>
-            </a:lvl3pPr>
-            <a:lvl4pPr marL="1371600" indent="0" algn="ctr">
+              <a:defRPr sz="2133"/>
+            </a:lvl5pPr>
+            <a:lvl6pPr marL="3047924" indent="0" algn="ctr">
               <a:buNone/>
-              <a:defRPr sz="1600"/>
-            </a:lvl4pPr>
-            <a:lvl5pPr marL="1828800" indent="0" algn="ctr">
+              <a:defRPr sz="2133"/>
+            </a:lvl6pPr>
+            <a:lvl7pPr marL="3657509" indent="0" algn="ctr">
               <a:buNone/>
-              <a:defRPr sz="1600"/>
-            </a:lvl5pPr>
-            <a:lvl6pPr marL="2286000" indent="0" algn="ctr">
+              <a:defRPr sz="2133"/>
+            </a:lvl7pPr>
+            <a:lvl8pPr marL="4267093" indent="0" algn="ctr">
               <a:buNone/>
-              <a:defRPr sz="1600"/>
-            </a:lvl6pPr>
-            <a:lvl7pPr marL="2743200" indent="0" algn="ctr">
+              <a:defRPr sz="2133"/>
+            </a:lvl8pPr>
+            <a:lvl9pPr marL="4876678" indent="0" algn="ctr">
               <a:buNone/>
-              <a:defRPr sz="1600"/>
-            </a:lvl7pPr>
-            <a:lvl8pPr marL="3200400" indent="0" algn="ctr">
-              <a:buNone/>
-              <a:defRPr sz="1600"/>
-            </a:lvl8pPr>
-            <a:lvl9pPr marL="3657600" indent="0" algn="ctr">
-              <a:buNone/>
-              <a:defRPr sz="1600"/>
+              <a:defRPr sz="2133"/>
             </a:lvl9pPr>
           </a:lstStyle>
           <a:p>
             <a:r>
-              <a:rPr kumimoji="1" lang="zh-CN" altLang="en-US"/>
+              <a:rPr lang="zh-CN" altLang="en-US"/>
               <a:t>单击此处编辑母版副标题样式</a:t>
             </a:r>
+            <a:endParaRPr lang="en-US" dirty="0"/>
           </a:p>
         </p:txBody>
       </p:sp>
       <p:sp>
         <p:nvSpPr>
-          <p:cNvPr id="4" name="日期占位符 3">
-            <a:extLst>
-              <a:ext uri="{FF2B5EF4-FFF2-40B4-BE49-F238E27FC236}">
-                <a16:creationId xmlns:a16="http://schemas.microsoft.com/office/drawing/2014/main" id="{E8F1B470-62ED-B51A-2B81-756AB15D480A}"/>
-              </a:ext>
-            </a:extLst>
-          </p:cNvPr>
+          <p:cNvPr id="4" name="Date Placeholder 3"/>
           <p:cNvSpPr>
             <a:spLocks noGrp="1"/>
           </p:cNvSpPr>
@@ -270,7 +254,7 @@
           <a:p>
             <a:fld id="{ADEA6865-5F8B-9C4A-950D-1D161D0F2BB5}" type="datetimeFigureOut">
               <a:rPr kumimoji="1" lang="zh-CN" altLang="en-US" smtClean="0"/>
-              <a:t>2022/5/20</a:t>
+              <a:t>2022/6/8</a:t>
             </a:fld>
             <a:endParaRPr kumimoji="1" lang="zh-CN" altLang="en-US"/>
           </a:p>
@@ -278,13 +262,7 @@
       </p:sp>
       <p:sp>
         <p:nvSpPr>
-          <p:cNvPr id="5" name="页脚占位符 4">
-            <a:extLst>
-              <a:ext uri="{FF2B5EF4-FFF2-40B4-BE49-F238E27FC236}">
-                <a16:creationId xmlns:a16="http://schemas.microsoft.com/office/drawing/2014/main" id="{FC5A697C-6B09-44AE-8AAE-B4A3C7FAA499}"/>
-              </a:ext>
-            </a:extLst>
-          </p:cNvPr>
+          <p:cNvPr id="5" name="Footer Placeholder 4"/>
           <p:cNvSpPr>
             <a:spLocks noGrp="1"/>
           </p:cNvSpPr>
@@ -303,13 +281,7 @@
       </p:sp>
       <p:sp>
         <p:nvSpPr>
-          <p:cNvPr id="6" name="灯片编号占位符 5">
-            <a:extLst>
-              <a:ext uri="{FF2B5EF4-FFF2-40B4-BE49-F238E27FC236}">
-                <a16:creationId xmlns:a16="http://schemas.microsoft.com/office/drawing/2014/main" id="{6F582A0C-43EC-AD7D-AA2D-06FA6C9F05FB}"/>
-              </a:ext>
-            </a:extLst>
-          </p:cNvPr>
+          <p:cNvPr id="6" name="Slide Number Placeholder 5"/>
           <p:cNvSpPr>
             <a:spLocks noGrp="1"/>
           </p:cNvSpPr>
@@ -333,7 +305,7 @@
     </p:spTree>
     <p:extLst>
       <p:ext uri="{BB962C8B-B14F-4D97-AF65-F5344CB8AC3E}">
-        <p14:creationId xmlns:p14="http://schemas.microsoft.com/office/powerpoint/2010/main" val="1258341022"/>
+        <p14:creationId xmlns:p14="http://schemas.microsoft.com/office/powerpoint/2010/main" val="3951476254"/>
       </p:ext>
     </p:extLst>
   </p:cSld>
@@ -362,13 +334,7 @@
       </p:grpSpPr>
       <p:sp>
         <p:nvSpPr>
-          <p:cNvPr id="2" name="标题 1">
-            <a:extLst>
-              <a:ext uri="{FF2B5EF4-FFF2-40B4-BE49-F238E27FC236}">
-                <a16:creationId xmlns:a16="http://schemas.microsoft.com/office/drawing/2014/main" id="{202DFC00-9D68-D07E-B524-FEA0A40E2D79}"/>
-              </a:ext>
-            </a:extLst>
-          </p:cNvPr>
+          <p:cNvPr id="2" name="Title 1"/>
           <p:cNvSpPr>
             <a:spLocks noGrp="1"/>
           </p:cNvSpPr>
@@ -382,21 +348,16 @@
           <a:lstStyle/>
           <a:p>
             <a:r>
-              <a:rPr kumimoji="1" lang="zh-CN" altLang="en-US"/>
+              <a:rPr lang="zh-CN" altLang="en-US"/>
               <a:t>单击此处编辑母版标题样式</a:t>
             </a:r>
+            <a:endParaRPr lang="en-US" dirty="0"/>
           </a:p>
         </p:txBody>
       </p:sp>
       <p:sp>
         <p:nvSpPr>
-          <p:cNvPr id="3" name="竖排文字占位符 2">
-            <a:extLst>
-              <a:ext uri="{FF2B5EF4-FFF2-40B4-BE49-F238E27FC236}">
-                <a16:creationId xmlns:a16="http://schemas.microsoft.com/office/drawing/2014/main" id="{BCA13691-64BE-8845-3865-DE9664C3C8E5}"/>
-              </a:ext>
-            </a:extLst>
-          </p:cNvPr>
+          <p:cNvPr id="3" name="Vertical Text Placeholder 2"/>
           <p:cNvSpPr>
             <a:spLocks noGrp="1"/>
           </p:cNvSpPr>
@@ -411,49 +372,44 @@
           <a:p>
             <a:pPr lvl="0"/>
             <a:r>
-              <a:rPr kumimoji="1" lang="zh-CN" altLang="en-US"/>
+              <a:rPr lang="zh-CN" altLang="en-US"/>
               <a:t>单击此处编辑母版文本样式</a:t>
             </a:r>
           </a:p>
           <a:p>
             <a:pPr lvl="1"/>
             <a:r>
-              <a:rPr kumimoji="1" lang="zh-CN" altLang="en-US"/>
+              <a:rPr lang="zh-CN" altLang="en-US"/>
               <a:t>二级</a:t>
             </a:r>
           </a:p>
           <a:p>
             <a:pPr lvl="2"/>
             <a:r>
-              <a:rPr kumimoji="1" lang="zh-CN" altLang="en-US"/>
+              <a:rPr lang="zh-CN" altLang="en-US"/>
               <a:t>三级</a:t>
             </a:r>
           </a:p>
           <a:p>
             <a:pPr lvl="3"/>
             <a:r>
-              <a:rPr kumimoji="1" lang="zh-CN" altLang="en-US"/>
+              <a:rPr lang="zh-CN" altLang="en-US"/>
               <a:t>四级</a:t>
             </a:r>
           </a:p>
           <a:p>
             <a:pPr lvl="4"/>
             <a:r>
-              <a:rPr kumimoji="1" lang="zh-CN" altLang="en-US"/>
+              <a:rPr lang="zh-CN" altLang="en-US"/>
               <a:t>五级</a:t>
             </a:r>
+            <a:endParaRPr lang="en-US" dirty="0"/>
           </a:p>
         </p:txBody>
       </p:sp>
       <p:sp>
         <p:nvSpPr>
-          <p:cNvPr id="4" name="日期占位符 3">
-            <a:extLst>
-              <a:ext uri="{FF2B5EF4-FFF2-40B4-BE49-F238E27FC236}">
-                <a16:creationId xmlns:a16="http://schemas.microsoft.com/office/drawing/2014/main" id="{89AC1F24-BC6F-DCB7-31FE-CB99BECE7AC3}"/>
-              </a:ext>
-            </a:extLst>
-          </p:cNvPr>
+          <p:cNvPr id="4" name="Date Placeholder 3"/>
           <p:cNvSpPr>
             <a:spLocks noGrp="1"/>
           </p:cNvSpPr>
@@ -468,7 +424,7 @@
           <a:p>
             <a:fld id="{ADEA6865-5F8B-9C4A-950D-1D161D0F2BB5}" type="datetimeFigureOut">
               <a:rPr kumimoji="1" lang="zh-CN" altLang="en-US" smtClean="0"/>
-              <a:t>2022/5/20</a:t>
+              <a:t>2022/6/8</a:t>
             </a:fld>
             <a:endParaRPr kumimoji="1" lang="zh-CN" altLang="en-US"/>
           </a:p>
@@ -476,13 +432,7 @@
       </p:sp>
       <p:sp>
         <p:nvSpPr>
-          <p:cNvPr id="5" name="页脚占位符 4">
-            <a:extLst>
-              <a:ext uri="{FF2B5EF4-FFF2-40B4-BE49-F238E27FC236}">
-                <a16:creationId xmlns:a16="http://schemas.microsoft.com/office/drawing/2014/main" id="{2AA4A291-5811-9881-12D0-14E61D19A37B}"/>
-              </a:ext>
-            </a:extLst>
-          </p:cNvPr>
+          <p:cNvPr id="5" name="Footer Placeholder 4"/>
           <p:cNvSpPr>
             <a:spLocks noGrp="1"/>
           </p:cNvSpPr>
@@ -501,13 +451,7 @@
       </p:sp>
       <p:sp>
         <p:nvSpPr>
-          <p:cNvPr id="6" name="灯片编号占位符 5">
-            <a:extLst>
-              <a:ext uri="{FF2B5EF4-FFF2-40B4-BE49-F238E27FC236}">
-                <a16:creationId xmlns:a16="http://schemas.microsoft.com/office/drawing/2014/main" id="{2086FD03-5650-E699-C9D9-FF3CFA43FD1D}"/>
-              </a:ext>
-            </a:extLst>
-          </p:cNvPr>
+          <p:cNvPr id="6" name="Slide Number Placeholder 5"/>
           <p:cNvSpPr>
             <a:spLocks noGrp="1"/>
           </p:cNvSpPr>
@@ -531,7 +475,7 @@
     </p:spTree>
     <p:extLst>
       <p:ext uri="{BB962C8B-B14F-4D97-AF65-F5344CB8AC3E}">
-        <p14:creationId xmlns:p14="http://schemas.microsoft.com/office/powerpoint/2010/main" val="4056843560"/>
+        <p14:creationId xmlns:p14="http://schemas.microsoft.com/office/powerpoint/2010/main" val="1579169042"/>
       </p:ext>
     </p:extLst>
   </p:cSld>
@@ -560,13 +504,7 @@
       </p:grpSpPr>
       <p:sp>
         <p:nvSpPr>
-          <p:cNvPr id="2" name="竖排标题 1">
-            <a:extLst>
-              <a:ext uri="{FF2B5EF4-FFF2-40B4-BE49-F238E27FC236}">
-                <a16:creationId xmlns:a16="http://schemas.microsoft.com/office/drawing/2014/main" id="{90C1F934-C762-A5D8-4D19-2E215005B281}"/>
-              </a:ext>
-            </a:extLst>
-          </p:cNvPr>
+          <p:cNvPr id="2" name="Vertical Title 1"/>
           <p:cNvSpPr>
             <a:spLocks noGrp="1"/>
           </p:cNvSpPr>
@@ -576,8 +514,8 @@
         </p:nvSpPr>
         <p:spPr>
           <a:xfrm>
-            <a:off x="8724900" y="365125"/>
-            <a:ext cx="2628900" cy="5811838"/>
+            <a:off x="8724901" y="574987"/>
+            <a:ext cx="2628900" cy="9152300"/>
           </a:xfrm>
         </p:spPr>
         <p:txBody>
@@ -585,21 +523,16 @@
           <a:lstStyle/>
           <a:p>
             <a:r>
-              <a:rPr kumimoji="1" lang="zh-CN" altLang="en-US"/>
+              <a:rPr lang="zh-CN" altLang="en-US"/>
               <a:t>单击此处编辑母版标题样式</a:t>
             </a:r>
+            <a:endParaRPr lang="en-US" dirty="0"/>
           </a:p>
         </p:txBody>
       </p:sp>
       <p:sp>
         <p:nvSpPr>
-          <p:cNvPr id="3" name="竖排文字占位符 2">
-            <a:extLst>
-              <a:ext uri="{FF2B5EF4-FFF2-40B4-BE49-F238E27FC236}">
-                <a16:creationId xmlns:a16="http://schemas.microsoft.com/office/drawing/2014/main" id="{472E4F1E-467C-3E81-9109-DF321C9F03F0}"/>
-              </a:ext>
-            </a:extLst>
-          </p:cNvPr>
+          <p:cNvPr id="3" name="Vertical Text Placeholder 2"/>
           <p:cNvSpPr>
             <a:spLocks noGrp="1"/>
           </p:cNvSpPr>
@@ -609,8 +542,8 @@
         </p:nvSpPr>
         <p:spPr>
           <a:xfrm>
-            <a:off x="838200" y="365125"/>
-            <a:ext cx="7734300" cy="5811838"/>
+            <a:off x="838201" y="574987"/>
+            <a:ext cx="7734300" cy="9152300"/>
           </a:xfrm>
         </p:spPr>
         <p:txBody>
@@ -619,49 +552,44 @@
           <a:p>
             <a:pPr lvl="0"/>
             <a:r>
-              <a:rPr kumimoji="1" lang="zh-CN" altLang="en-US"/>
+              <a:rPr lang="zh-CN" altLang="en-US"/>
               <a:t>单击此处编辑母版文本样式</a:t>
             </a:r>
           </a:p>
           <a:p>
             <a:pPr lvl="1"/>
             <a:r>
-              <a:rPr kumimoji="1" lang="zh-CN" altLang="en-US"/>
+              <a:rPr lang="zh-CN" altLang="en-US"/>
               <a:t>二级</a:t>
             </a:r>
           </a:p>
           <a:p>
             <a:pPr lvl="2"/>
             <a:r>
-              <a:rPr kumimoji="1" lang="zh-CN" altLang="en-US"/>
+              <a:rPr lang="zh-CN" altLang="en-US"/>
               <a:t>三级</a:t>
             </a:r>
           </a:p>
           <a:p>
             <a:pPr lvl="3"/>
             <a:r>
-              <a:rPr kumimoji="1" lang="zh-CN" altLang="en-US"/>
+              <a:rPr lang="zh-CN" altLang="en-US"/>
               <a:t>四级</a:t>
             </a:r>
           </a:p>
           <a:p>
             <a:pPr lvl="4"/>
             <a:r>
-              <a:rPr kumimoji="1" lang="zh-CN" altLang="en-US"/>
+              <a:rPr lang="zh-CN" altLang="en-US"/>
               <a:t>五级</a:t>
             </a:r>
+            <a:endParaRPr lang="en-US" dirty="0"/>
           </a:p>
         </p:txBody>
       </p:sp>
       <p:sp>
         <p:nvSpPr>
-          <p:cNvPr id="4" name="日期占位符 3">
-            <a:extLst>
-              <a:ext uri="{FF2B5EF4-FFF2-40B4-BE49-F238E27FC236}">
-                <a16:creationId xmlns:a16="http://schemas.microsoft.com/office/drawing/2014/main" id="{FEB3F99A-0122-44DF-57BE-329873A6C79F}"/>
-              </a:ext>
-            </a:extLst>
-          </p:cNvPr>
+          <p:cNvPr id="4" name="Date Placeholder 3"/>
           <p:cNvSpPr>
             <a:spLocks noGrp="1"/>
           </p:cNvSpPr>
@@ -676,7 +604,7 @@
           <a:p>
             <a:fld id="{ADEA6865-5F8B-9C4A-950D-1D161D0F2BB5}" type="datetimeFigureOut">
               <a:rPr kumimoji="1" lang="zh-CN" altLang="en-US" smtClean="0"/>
-              <a:t>2022/5/20</a:t>
+              <a:t>2022/6/8</a:t>
             </a:fld>
             <a:endParaRPr kumimoji="1" lang="zh-CN" altLang="en-US"/>
           </a:p>
@@ -684,13 +612,7 @@
       </p:sp>
       <p:sp>
         <p:nvSpPr>
-          <p:cNvPr id="5" name="页脚占位符 4">
-            <a:extLst>
-              <a:ext uri="{FF2B5EF4-FFF2-40B4-BE49-F238E27FC236}">
-                <a16:creationId xmlns:a16="http://schemas.microsoft.com/office/drawing/2014/main" id="{64221B9D-DAEE-A2C0-472A-9D4EAE12B467}"/>
-              </a:ext>
-            </a:extLst>
-          </p:cNvPr>
+          <p:cNvPr id="5" name="Footer Placeholder 4"/>
           <p:cNvSpPr>
             <a:spLocks noGrp="1"/>
           </p:cNvSpPr>
@@ -709,13 +631,7 @@
       </p:sp>
       <p:sp>
         <p:nvSpPr>
-          <p:cNvPr id="6" name="灯片编号占位符 5">
-            <a:extLst>
-              <a:ext uri="{FF2B5EF4-FFF2-40B4-BE49-F238E27FC236}">
-                <a16:creationId xmlns:a16="http://schemas.microsoft.com/office/drawing/2014/main" id="{D8D708F2-5C4B-5B09-6C29-9F1E172C3B48}"/>
-              </a:ext>
-            </a:extLst>
-          </p:cNvPr>
+          <p:cNvPr id="6" name="Slide Number Placeholder 5"/>
           <p:cNvSpPr>
             <a:spLocks noGrp="1"/>
           </p:cNvSpPr>
@@ -739,7 +655,7 @@
     </p:spTree>
     <p:extLst>
       <p:ext uri="{BB962C8B-B14F-4D97-AF65-F5344CB8AC3E}">
-        <p14:creationId xmlns:p14="http://schemas.microsoft.com/office/powerpoint/2010/main" val="3398545207"/>
+        <p14:creationId xmlns:p14="http://schemas.microsoft.com/office/powerpoint/2010/main" val="2803936459"/>
       </p:ext>
     </p:extLst>
   </p:cSld>
@@ -768,13 +684,7 @@
       </p:grpSpPr>
       <p:sp>
         <p:nvSpPr>
-          <p:cNvPr id="2" name="标题 1">
-            <a:extLst>
-              <a:ext uri="{FF2B5EF4-FFF2-40B4-BE49-F238E27FC236}">
-                <a16:creationId xmlns:a16="http://schemas.microsoft.com/office/drawing/2014/main" id="{5BAF1883-624E-D240-C82F-FC95D666042D}"/>
-              </a:ext>
-            </a:extLst>
-          </p:cNvPr>
+          <p:cNvPr id="2" name="Title 1"/>
           <p:cNvSpPr>
             <a:spLocks noGrp="1"/>
           </p:cNvSpPr>
@@ -788,21 +698,16 @@
           <a:lstStyle/>
           <a:p>
             <a:r>
-              <a:rPr kumimoji="1" lang="zh-CN" altLang="en-US"/>
+              <a:rPr lang="zh-CN" altLang="en-US"/>
               <a:t>单击此处编辑母版标题样式</a:t>
             </a:r>
+            <a:endParaRPr lang="en-US" dirty="0"/>
           </a:p>
         </p:txBody>
       </p:sp>
       <p:sp>
         <p:nvSpPr>
-          <p:cNvPr id="3" name="内容占位符 2">
-            <a:extLst>
-              <a:ext uri="{FF2B5EF4-FFF2-40B4-BE49-F238E27FC236}">
-                <a16:creationId xmlns:a16="http://schemas.microsoft.com/office/drawing/2014/main" id="{155F4420-F288-77DD-8792-1628E12DBF92}"/>
-              </a:ext>
-            </a:extLst>
-          </p:cNvPr>
+          <p:cNvPr id="3" name="Content Placeholder 2"/>
           <p:cNvSpPr>
             <a:spLocks noGrp="1"/>
           </p:cNvSpPr>
@@ -817,49 +722,44 @@
           <a:p>
             <a:pPr lvl="0"/>
             <a:r>
-              <a:rPr kumimoji="1" lang="zh-CN" altLang="en-US"/>
+              <a:rPr lang="zh-CN" altLang="en-US"/>
               <a:t>单击此处编辑母版文本样式</a:t>
             </a:r>
           </a:p>
           <a:p>
             <a:pPr lvl="1"/>
             <a:r>
-              <a:rPr kumimoji="1" lang="zh-CN" altLang="en-US"/>
+              <a:rPr lang="zh-CN" altLang="en-US"/>
               <a:t>二级</a:t>
             </a:r>
           </a:p>
           <a:p>
             <a:pPr lvl="2"/>
             <a:r>
-              <a:rPr kumimoji="1" lang="zh-CN" altLang="en-US"/>
+              <a:rPr lang="zh-CN" altLang="en-US"/>
               <a:t>三级</a:t>
             </a:r>
           </a:p>
           <a:p>
             <a:pPr lvl="3"/>
             <a:r>
-              <a:rPr kumimoji="1" lang="zh-CN" altLang="en-US"/>
+              <a:rPr lang="zh-CN" altLang="en-US"/>
               <a:t>四级</a:t>
             </a:r>
           </a:p>
           <a:p>
             <a:pPr lvl="4"/>
             <a:r>
-              <a:rPr kumimoji="1" lang="zh-CN" altLang="en-US"/>
+              <a:rPr lang="zh-CN" altLang="en-US"/>
               <a:t>五级</a:t>
             </a:r>
+            <a:endParaRPr lang="en-US" dirty="0"/>
           </a:p>
         </p:txBody>
       </p:sp>
       <p:sp>
         <p:nvSpPr>
-          <p:cNvPr id="4" name="日期占位符 3">
-            <a:extLst>
-              <a:ext uri="{FF2B5EF4-FFF2-40B4-BE49-F238E27FC236}">
-                <a16:creationId xmlns:a16="http://schemas.microsoft.com/office/drawing/2014/main" id="{3CB4E354-BD31-887B-8736-6020131226A9}"/>
-              </a:ext>
-            </a:extLst>
-          </p:cNvPr>
+          <p:cNvPr id="4" name="Date Placeholder 3"/>
           <p:cNvSpPr>
             <a:spLocks noGrp="1"/>
           </p:cNvSpPr>
@@ -874,7 +774,7 @@
           <a:p>
             <a:fld id="{ADEA6865-5F8B-9C4A-950D-1D161D0F2BB5}" type="datetimeFigureOut">
               <a:rPr kumimoji="1" lang="zh-CN" altLang="en-US" smtClean="0"/>
-              <a:t>2022/5/20</a:t>
+              <a:t>2022/6/8</a:t>
             </a:fld>
             <a:endParaRPr kumimoji="1" lang="zh-CN" altLang="en-US"/>
           </a:p>
@@ -882,13 +782,7 @@
       </p:sp>
       <p:sp>
         <p:nvSpPr>
-          <p:cNvPr id="5" name="页脚占位符 4">
-            <a:extLst>
-              <a:ext uri="{FF2B5EF4-FFF2-40B4-BE49-F238E27FC236}">
-                <a16:creationId xmlns:a16="http://schemas.microsoft.com/office/drawing/2014/main" id="{EDB049B9-A6B2-2101-0AC8-18977AE73415}"/>
-              </a:ext>
-            </a:extLst>
-          </p:cNvPr>
+          <p:cNvPr id="5" name="Footer Placeholder 4"/>
           <p:cNvSpPr>
             <a:spLocks noGrp="1"/>
           </p:cNvSpPr>
@@ -907,13 +801,7 @@
       </p:sp>
       <p:sp>
         <p:nvSpPr>
-          <p:cNvPr id="6" name="灯片编号占位符 5">
-            <a:extLst>
-              <a:ext uri="{FF2B5EF4-FFF2-40B4-BE49-F238E27FC236}">
-                <a16:creationId xmlns:a16="http://schemas.microsoft.com/office/drawing/2014/main" id="{099A66FA-6745-6C42-21DB-CA0059C8493A}"/>
-              </a:ext>
-            </a:extLst>
-          </p:cNvPr>
+          <p:cNvPr id="6" name="Slide Number Placeholder 5"/>
           <p:cNvSpPr>
             <a:spLocks noGrp="1"/>
           </p:cNvSpPr>
@@ -937,7 +825,7 @@
     </p:spTree>
     <p:extLst>
       <p:ext uri="{BB962C8B-B14F-4D97-AF65-F5344CB8AC3E}">
-        <p14:creationId xmlns:p14="http://schemas.microsoft.com/office/powerpoint/2010/main" val="1813547252"/>
+        <p14:creationId xmlns:p14="http://schemas.microsoft.com/office/powerpoint/2010/main" val="1521992015"/>
       </p:ext>
     </p:extLst>
   </p:cSld>
@@ -966,13 +854,7 @@
       </p:grpSpPr>
       <p:sp>
         <p:nvSpPr>
-          <p:cNvPr id="2" name="标题 1">
-            <a:extLst>
-              <a:ext uri="{FF2B5EF4-FFF2-40B4-BE49-F238E27FC236}">
-                <a16:creationId xmlns:a16="http://schemas.microsoft.com/office/drawing/2014/main" id="{93873029-8263-1647-5A7A-C4D2A7A78B3A}"/>
-              </a:ext>
-            </a:extLst>
-          </p:cNvPr>
+          <p:cNvPr id="2" name="Title 1"/>
           <p:cNvSpPr>
             <a:spLocks noGrp="1"/>
           </p:cNvSpPr>
@@ -982,34 +864,29 @@
         </p:nvSpPr>
         <p:spPr>
           <a:xfrm>
-            <a:off x="831850" y="1709738"/>
-            <a:ext cx="10515600" cy="2852737"/>
+            <a:off x="831851" y="2692444"/>
+            <a:ext cx="10515600" cy="4492401"/>
           </a:xfrm>
         </p:spPr>
         <p:txBody>
           <a:bodyPr anchor="b"/>
           <a:lstStyle>
             <a:lvl1pPr>
-              <a:defRPr sz="6000"/>
+              <a:defRPr sz="8000"/>
             </a:lvl1pPr>
           </a:lstStyle>
           <a:p>
             <a:r>
-              <a:rPr kumimoji="1" lang="zh-CN" altLang="en-US"/>
+              <a:rPr lang="zh-CN" altLang="en-US"/>
               <a:t>单击此处编辑母版标题样式</a:t>
             </a:r>
+            <a:endParaRPr lang="en-US" dirty="0"/>
           </a:p>
         </p:txBody>
       </p:sp>
       <p:sp>
         <p:nvSpPr>
-          <p:cNvPr id="3" name="文本占位符 2">
-            <a:extLst>
-              <a:ext uri="{FF2B5EF4-FFF2-40B4-BE49-F238E27FC236}">
-                <a16:creationId xmlns:a16="http://schemas.microsoft.com/office/drawing/2014/main" id="{ABDB9020-74A7-BA2C-50B2-1758DF258C2A}"/>
-              </a:ext>
-            </a:extLst>
-          </p:cNvPr>
+          <p:cNvPr id="3" name="Text Placeholder 2"/>
           <p:cNvSpPr>
             <a:spLocks noGrp="1"/>
           </p:cNvSpPr>
@@ -1019,14 +896,32 @@
         </p:nvSpPr>
         <p:spPr>
           <a:xfrm>
-            <a:off x="831850" y="4589463"/>
-            <a:ext cx="10515600" cy="1500187"/>
+            <a:off x="831851" y="7227345"/>
+            <a:ext cx="10515600" cy="2362447"/>
           </a:xfrm>
         </p:spPr>
         <p:txBody>
           <a:bodyPr/>
           <a:lstStyle>
             <a:lvl1pPr marL="0" indent="0">
+              <a:buNone/>
+              <a:defRPr sz="3200">
+                <a:solidFill>
+                  <a:schemeClr val="tx1"/>
+                </a:solidFill>
+              </a:defRPr>
+            </a:lvl1pPr>
+            <a:lvl2pPr marL="609585" indent="0">
+              <a:buNone/>
+              <a:defRPr sz="2667">
+                <a:solidFill>
+                  <a:schemeClr val="tx1">
+                    <a:tint val="75000"/>
+                  </a:schemeClr>
+                </a:solidFill>
+              </a:defRPr>
+            </a:lvl2pPr>
+            <a:lvl3pPr marL="1219170" indent="0">
               <a:buNone/>
               <a:defRPr sz="2400">
                 <a:solidFill>
@@ -1035,30 +930,10 @@
                   </a:schemeClr>
                 </a:solidFill>
               </a:defRPr>
-            </a:lvl1pPr>
-            <a:lvl2pPr marL="457200" indent="0">
+            </a:lvl3pPr>
+            <a:lvl4pPr marL="1828754" indent="0">
               <a:buNone/>
-              <a:defRPr sz="2000">
-                <a:solidFill>
-                  <a:schemeClr val="tx1">
-                    <a:tint val="75000"/>
-                  </a:schemeClr>
-                </a:solidFill>
-              </a:defRPr>
-            </a:lvl2pPr>
-            <a:lvl3pPr marL="914400" indent="0">
-              <a:buNone/>
-              <a:defRPr sz="1800">
-                <a:solidFill>
-                  <a:schemeClr val="tx1">
-                    <a:tint val="75000"/>
-                  </a:schemeClr>
-                </a:solidFill>
-              </a:defRPr>
-            </a:lvl3pPr>
-            <a:lvl4pPr marL="1371600" indent="0">
-              <a:buNone/>
-              <a:defRPr sz="1600">
+              <a:defRPr sz="2133">
                 <a:solidFill>
                   <a:schemeClr val="tx1">
                     <a:tint val="75000"/>
@@ -1066,9 +941,9 @@
                 </a:solidFill>
               </a:defRPr>
             </a:lvl4pPr>
-            <a:lvl5pPr marL="1828800" indent="0">
+            <a:lvl5pPr marL="2438339" indent="0">
               <a:buNone/>
-              <a:defRPr sz="1600">
+              <a:defRPr sz="2133">
                 <a:solidFill>
                   <a:schemeClr val="tx1">
                     <a:tint val="75000"/>
@@ -1076,9 +951,9 @@
                 </a:solidFill>
               </a:defRPr>
             </a:lvl5pPr>
-            <a:lvl6pPr marL="2286000" indent="0">
+            <a:lvl6pPr marL="3047924" indent="0">
               <a:buNone/>
-              <a:defRPr sz="1600">
+              <a:defRPr sz="2133">
                 <a:solidFill>
                   <a:schemeClr val="tx1">
                     <a:tint val="75000"/>
@@ -1086,9 +961,9 @@
                 </a:solidFill>
               </a:defRPr>
             </a:lvl6pPr>
-            <a:lvl7pPr marL="2743200" indent="0">
+            <a:lvl7pPr marL="3657509" indent="0">
               <a:buNone/>
-              <a:defRPr sz="1600">
+              <a:defRPr sz="2133">
                 <a:solidFill>
                   <a:schemeClr val="tx1">
                     <a:tint val="75000"/>
@@ -1096,9 +971,9 @@
                 </a:solidFill>
               </a:defRPr>
             </a:lvl7pPr>
-            <a:lvl8pPr marL="3200400" indent="0">
+            <a:lvl8pPr marL="4267093" indent="0">
               <a:buNone/>
-              <a:defRPr sz="1600">
+              <a:defRPr sz="2133">
                 <a:solidFill>
                   <a:schemeClr val="tx1">
                     <a:tint val="75000"/>
@@ -1106,9 +981,9 @@
                 </a:solidFill>
               </a:defRPr>
             </a:lvl8pPr>
-            <a:lvl9pPr marL="3657600" indent="0">
+            <a:lvl9pPr marL="4876678" indent="0">
               <a:buNone/>
-              <a:defRPr sz="1600">
+              <a:defRPr sz="2133">
                 <a:solidFill>
                   <a:schemeClr val="tx1">
                     <a:tint val="75000"/>
@@ -1120,7 +995,7 @@
           <a:p>
             <a:pPr lvl="0"/>
             <a:r>
-              <a:rPr kumimoji="1" lang="zh-CN" altLang="en-US"/>
+              <a:rPr lang="zh-CN" altLang="en-US"/>
               <a:t>单击此处编辑母版文本样式</a:t>
             </a:r>
           </a:p>
@@ -1128,13 +1003,7 @@
       </p:sp>
       <p:sp>
         <p:nvSpPr>
-          <p:cNvPr id="4" name="日期占位符 3">
-            <a:extLst>
-              <a:ext uri="{FF2B5EF4-FFF2-40B4-BE49-F238E27FC236}">
-                <a16:creationId xmlns:a16="http://schemas.microsoft.com/office/drawing/2014/main" id="{81AAB57A-4C93-1A2F-F863-B7C8D357F358}"/>
-              </a:ext>
-            </a:extLst>
-          </p:cNvPr>
+          <p:cNvPr id="4" name="Date Placeholder 3"/>
           <p:cNvSpPr>
             <a:spLocks noGrp="1"/>
           </p:cNvSpPr>
@@ -1149,7 +1018,7 @@
           <a:p>
             <a:fld id="{ADEA6865-5F8B-9C4A-950D-1D161D0F2BB5}" type="datetimeFigureOut">
               <a:rPr kumimoji="1" lang="zh-CN" altLang="en-US" smtClean="0"/>
-              <a:t>2022/5/20</a:t>
+              <a:t>2022/6/8</a:t>
             </a:fld>
             <a:endParaRPr kumimoji="1" lang="zh-CN" altLang="en-US"/>
           </a:p>
@@ -1157,13 +1026,7 @@
       </p:sp>
       <p:sp>
         <p:nvSpPr>
-          <p:cNvPr id="5" name="页脚占位符 4">
-            <a:extLst>
-              <a:ext uri="{FF2B5EF4-FFF2-40B4-BE49-F238E27FC236}">
-                <a16:creationId xmlns:a16="http://schemas.microsoft.com/office/drawing/2014/main" id="{76344EBA-D0CD-50ED-1D03-38437E0B3512}"/>
-              </a:ext>
-            </a:extLst>
-          </p:cNvPr>
+          <p:cNvPr id="5" name="Footer Placeholder 4"/>
           <p:cNvSpPr>
             <a:spLocks noGrp="1"/>
           </p:cNvSpPr>
@@ -1182,13 +1045,7 @@
       </p:sp>
       <p:sp>
         <p:nvSpPr>
-          <p:cNvPr id="6" name="灯片编号占位符 5">
-            <a:extLst>
-              <a:ext uri="{FF2B5EF4-FFF2-40B4-BE49-F238E27FC236}">
-                <a16:creationId xmlns:a16="http://schemas.microsoft.com/office/drawing/2014/main" id="{9C533F25-6340-FDCB-4E20-03C539D0DF25}"/>
-              </a:ext>
-            </a:extLst>
-          </p:cNvPr>
+          <p:cNvPr id="6" name="Slide Number Placeholder 5"/>
           <p:cNvSpPr>
             <a:spLocks noGrp="1"/>
           </p:cNvSpPr>
@@ -1212,7 +1069,7 @@
     </p:spTree>
     <p:extLst>
       <p:ext uri="{BB962C8B-B14F-4D97-AF65-F5344CB8AC3E}">
-        <p14:creationId xmlns:p14="http://schemas.microsoft.com/office/powerpoint/2010/main" val="2224891933"/>
+        <p14:creationId xmlns:p14="http://schemas.microsoft.com/office/powerpoint/2010/main" val="1243288413"/>
       </p:ext>
     </p:extLst>
   </p:cSld>
@@ -1241,13 +1098,7 @@
       </p:grpSpPr>
       <p:sp>
         <p:nvSpPr>
-          <p:cNvPr id="2" name="标题 1">
-            <a:extLst>
-              <a:ext uri="{FF2B5EF4-FFF2-40B4-BE49-F238E27FC236}">
-                <a16:creationId xmlns:a16="http://schemas.microsoft.com/office/drawing/2014/main" id="{6F05D2A3-4283-34FE-8F31-98542847B0B2}"/>
-              </a:ext>
-            </a:extLst>
-          </p:cNvPr>
+          <p:cNvPr id="2" name="Title 1"/>
           <p:cNvSpPr>
             <a:spLocks noGrp="1"/>
           </p:cNvSpPr>
@@ -1261,21 +1112,16 @@
           <a:lstStyle/>
           <a:p>
             <a:r>
-              <a:rPr kumimoji="1" lang="zh-CN" altLang="en-US"/>
+              <a:rPr lang="zh-CN" altLang="en-US"/>
               <a:t>单击此处编辑母版标题样式</a:t>
             </a:r>
+            <a:endParaRPr lang="en-US" dirty="0"/>
           </a:p>
         </p:txBody>
       </p:sp>
       <p:sp>
         <p:nvSpPr>
-          <p:cNvPr id="3" name="内容占位符 2">
-            <a:extLst>
-              <a:ext uri="{FF2B5EF4-FFF2-40B4-BE49-F238E27FC236}">
-                <a16:creationId xmlns:a16="http://schemas.microsoft.com/office/drawing/2014/main" id="{B7088A11-F52F-4590-A7D3-8F01B77E6F99}"/>
-              </a:ext>
-            </a:extLst>
-          </p:cNvPr>
+          <p:cNvPr id="3" name="Content Placeholder 2"/>
           <p:cNvSpPr>
             <a:spLocks noGrp="1"/>
           </p:cNvSpPr>
@@ -1285,8 +1131,8 @@
         </p:nvSpPr>
         <p:spPr>
           <a:xfrm>
-            <a:off x="838200" y="1825625"/>
-            <a:ext cx="5181600" cy="4351338"/>
+            <a:off x="838200" y="2874937"/>
+            <a:ext cx="5181600" cy="6852350"/>
           </a:xfrm>
         </p:spPr>
         <p:txBody>
@@ -1295,49 +1141,44 @@
           <a:p>
             <a:pPr lvl="0"/>
             <a:r>
-              <a:rPr kumimoji="1" lang="zh-CN" altLang="en-US"/>
+              <a:rPr lang="zh-CN" altLang="en-US"/>
               <a:t>单击此处编辑母版文本样式</a:t>
             </a:r>
           </a:p>
           <a:p>
             <a:pPr lvl="1"/>
             <a:r>
-              <a:rPr kumimoji="1" lang="zh-CN" altLang="en-US"/>
+              <a:rPr lang="zh-CN" altLang="en-US"/>
               <a:t>二级</a:t>
             </a:r>
           </a:p>
           <a:p>
             <a:pPr lvl="2"/>
             <a:r>
-              <a:rPr kumimoji="1" lang="zh-CN" altLang="en-US"/>
+              <a:rPr lang="zh-CN" altLang="en-US"/>
               <a:t>三级</a:t>
             </a:r>
           </a:p>
           <a:p>
             <a:pPr lvl="3"/>
             <a:r>
-              <a:rPr kumimoji="1" lang="zh-CN" altLang="en-US"/>
+              <a:rPr lang="zh-CN" altLang="en-US"/>
               <a:t>四级</a:t>
             </a:r>
           </a:p>
           <a:p>
             <a:pPr lvl="4"/>
             <a:r>
-              <a:rPr kumimoji="1" lang="zh-CN" altLang="en-US"/>
+              <a:rPr lang="zh-CN" altLang="en-US"/>
               <a:t>五级</a:t>
             </a:r>
+            <a:endParaRPr lang="en-US" dirty="0"/>
           </a:p>
         </p:txBody>
       </p:sp>
       <p:sp>
         <p:nvSpPr>
-          <p:cNvPr id="4" name="内容占位符 3">
-            <a:extLst>
-              <a:ext uri="{FF2B5EF4-FFF2-40B4-BE49-F238E27FC236}">
-                <a16:creationId xmlns:a16="http://schemas.microsoft.com/office/drawing/2014/main" id="{EF440D70-122B-88C6-7F0A-CEF34F1217F5}"/>
-              </a:ext>
-            </a:extLst>
-          </p:cNvPr>
+          <p:cNvPr id="4" name="Content Placeholder 3"/>
           <p:cNvSpPr>
             <a:spLocks noGrp="1"/>
           </p:cNvSpPr>
@@ -1347,8 +1188,8 @@
         </p:nvSpPr>
         <p:spPr>
           <a:xfrm>
-            <a:off x="6172200" y="1825625"/>
-            <a:ext cx="5181600" cy="4351338"/>
+            <a:off x="6172200" y="2874937"/>
+            <a:ext cx="5181600" cy="6852350"/>
           </a:xfrm>
         </p:spPr>
         <p:txBody>
@@ -1357,49 +1198,44 @@
           <a:p>
             <a:pPr lvl="0"/>
             <a:r>
-              <a:rPr kumimoji="1" lang="zh-CN" altLang="en-US"/>
+              <a:rPr lang="zh-CN" altLang="en-US"/>
               <a:t>单击此处编辑母版文本样式</a:t>
             </a:r>
           </a:p>
           <a:p>
             <a:pPr lvl="1"/>
             <a:r>
-              <a:rPr kumimoji="1" lang="zh-CN" altLang="en-US"/>
+              <a:rPr lang="zh-CN" altLang="en-US"/>
               <a:t>二级</a:t>
             </a:r>
           </a:p>
           <a:p>
             <a:pPr lvl="2"/>
             <a:r>
-              <a:rPr kumimoji="1" lang="zh-CN" altLang="en-US"/>
+              <a:rPr lang="zh-CN" altLang="en-US"/>
               <a:t>三级</a:t>
             </a:r>
           </a:p>
           <a:p>
             <a:pPr lvl="3"/>
             <a:r>
-              <a:rPr kumimoji="1" lang="zh-CN" altLang="en-US"/>
+              <a:rPr lang="zh-CN" altLang="en-US"/>
               <a:t>四级</a:t>
             </a:r>
           </a:p>
           <a:p>
             <a:pPr lvl="4"/>
             <a:r>
-              <a:rPr kumimoji="1" lang="zh-CN" altLang="en-US"/>
+              <a:rPr lang="zh-CN" altLang="en-US"/>
               <a:t>五级</a:t>
             </a:r>
+            <a:endParaRPr lang="en-US" dirty="0"/>
           </a:p>
         </p:txBody>
       </p:sp>
       <p:sp>
         <p:nvSpPr>
-          <p:cNvPr id="5" name="日期占位符 4">
-            <a:extLst>
-              <a:ext uri="{FF2B5EF4-FFF2-40B4-BE49-F238E27FC236}">
-                <a16:creationId xmlns:a16="http://schemas.microsoft.com/office/drawing/2014/main" id="{7EFFECB7-92D8-DB43-49C3-5D88653C6534}"/>
-              </a:ext>
-            </a:extLst>
-          </p:cNvPr>
+          <p:cNvPr id="5" name="Date Placeholder 4"/>
           <p:cNvSpPr>
             <a:spLocks noGrp="1"/>
           </p:cNvSpPr>
@@ -1414,7 +1250,7 @@
           <a:p>
             <a:fld id="{ADEA6865-5F8B-9C4A-950D-1D161D0F2BB5}" type="datetimeFigureOut">
               <a:rPr kumimoji="1" lang="zh-CN" altLang="en-US" smtClean="0"/>
-              <a:t>2022/5/20</a:t>
+              <a:t>2022/6/8</a:t>
             </a:fld>
             <a:endParaRPr kumimoji="1" lang="zh-CN" altLang="en-US"/>
           </a:p>
@@ -1422,13 +1258,7 @@
       </p:sp>
       <p:sp>
         <p:nvSpPr>
-          <p:cNvPr id="6" name="页脚占位符 5">
-            <a:extLst>
-              <a:ext uri="{FF2B5EF4-FFF2-40B4-BE49-F238E27FC236}">
-                <a16:creationId xmlns:a16="http://schemas.microsoft.com/office/drawing/2014/main" id="{031AB980-7D4D-4F53-9BA8-7F1D54618AE8}"/>
-              </a:ext>
-            </a:extLst>
-          </p:cNvPr>
+          <p:cNvPr id="6" name="Footer Placeholder 5"/>
           <p:cNvSpPr>
             <a:spLocks noGrp="1"/>
           </p:cNvSpPr>
@@ -1447,13 +1277,7 @@
       </p:sp>
       <p:sp>
         <p:nvSpPr>
-          <p:cNvPr id="7" name="灯片编号占位符 6">
-            <a:extLst>
-              <a:ext uri="{FF2B5EF4-FFF2-40B4-BE49-F238E27FC236}">
-                <a16:creationId xmlns:a16="http://schemas.microsoft.com/office/drawing/2014/main" id="{11F625E1-562C-6FFD-FDF7-053B01DCD779}"/>
-              </a:ext>
-            </a:extLst>
-          </p:cNvPr>
+          <p:cNvPr id="7" name="Slide Number Placeholder 6"/>
           <p:cNvSpPr>
             <a:spLocks noGrp="1"/>
           </p:cNvSpPr>
@@ -1477,7 +1301,7 @@
     </p:spTree>
     <p:extLst>
       <p:ext uri="{BB962C8B-B14F-4D97-AF65-F5344CB8AC3E}">
-        <p14:creationId xmlns:p14="http://schemas.microsoft.com/office/powerpoint/2010/main" val="263064255"/>
+        <p14:creationId xmlns:p14="http://schemas.microsoft.com/office/powerpoint/2010/main" val="4190580376"/>
       </p:ext>
     </p:extLst>
   </p:cSld>
@@ -1506,13 +1330,7 @@
       </p:grpSpPr>
       <p:sp>
         <p:nvSpPr>
-          <p:cNvPr id="2" name="标题 1">
-            <a:extLst>
-              <a:ext uri="{FF2B5EF4-FFF2-40B4-BE49-F238E27FC236}">
-                <a16:creationId xmlns:a16="http://schemas.microsoft.com/office/drawing/2014/main" id="{8109DF7C-572F-83C5-6494-9CCB8D37181A}"/>
-              </a:ext>
-            </a:extLst>
-          </p:cNvPr>
+          <p:cNvPr id="2" name="Title 1"/>
           <p:cNvSpPr>
             <a:spLocks noGrp="1"/>
           </p:cNvSpPr>
@@ -1522,8 +1340,8 @@
         </p:nvSpPr>
         <p:spPr>
           <a:xfrm>
-            <a:off x="839788" y="365125"/>
-            <a:ext cx="10515600" cy="1325563"/>
+            <a:off x="839788" y="574990"/>
+            <a:ext cx="10515600" cy="2087455"/>
           </a:xfrm>
         </p:spPr>
         <p:txBody>
@@ -1531,21 +1349,16 @@
           <a:lstStyle/>
           <a:p>
             <a:r>
-              <a:rPr kumimoji="1" lang="zh-CN" altLang="en-US"/>
+              <a:rPr lang="zh-CN" altLang="en-US"/>
               <a:t>单击此处编辑母版标题样式</a:t>
             </a:r>
+            <a:endParaRPr lang="en-US" dirty="0"/>
           </a:p>
         </p:txBody>
       </p:sp>
       <p:sp>
         <p:nvSpPr>
-          <p:cNvPr id="3" name="文本占位符 2">
-            <a:extLst>
-              <a:ext uri="{FF2B5EF4-FFF2-40B4-BE49-F238E27FC236}">
-                <a16:creationId xmlns:a16="http://schemas.microsoft.com/office/drawing/2014/main" id="{DE5E10AB-C06B-4766-DC75-20B108209448}"/>
-              </a:ext>
-            </a:extLst>
-          </p:cNvPr>
+          <p:cNvPr id="3" name="Text Placeholder 2"/>
           <p:cNvSpPr>
             <a:spLocks noGrp="1"/>
           </p:cNvSpPr>
@@ -1555,8 +1368,8 @@
         </p:nvSpPr>
         <p:spPr>
           <a:xfrm>
-            <a:off x="839788" y="1681163"/>
-            <a:ext cx="5157787" cy="823912"/>
+            <a:off x="839789" y="2647443"/>
+            <a:ext cx="5157787" cy="1297471"/>
           </a:xfrm>
         </p:spPr>
         <p:txBody>
@@ -1564,45 +1377,45 @@
           <a:lstStyle>
             <a:lvl1pPr marL="0" indent="0">
               <a:buNone/>
+              <a:defRPr sz="3200" b="1"/>
+            </a:lvl1pPr>
+            <a:lvl2pPr marL="609585" indent="0">
+              <a:buNone/>
+              <a:defRPr sz="2667" b="1"/>
+            </a:lvl2pPr>
+            <a:lvl3pPr marL="1219170" indent="0">
+              <a:buNone/>
               <a:defRPr sz="2400" b="1"/>
-            </a:lvl1pPr>
-            <a:lvl2pPr marL="457200" indent="0">
+            </a:lvl3pPr>
+            <a:lvl4pPr marL="1828754" indent="0">
               <a:buNone/>
-              <a:defRPr sz="2000" b="1"/>
-            </a:lvl2pPr>
-            <a:lvl3pPr marL="914400" indent="0">
+              <a:defRPr sz="2133" b="1"/>
+            </a:lvl4pPr>
+            <a:lvl5pPr marL="2438339" indent="0">
               <a:buNone/>
-              <a:defRPr sz="1800" b="1"/>
-            </a:lvl3pPr>
-            <a:lvl4pPr marL="1371600" indent="0">
+              <a:defRPr sz="2133" b="1"/>
+            </a:lvl5pPr>
+            <a:lvl6pPr marL="3047924" indent="0">
               <a:buNone/>
-              <a:defRPr sz="1600" b="1"/>
-            </a:lvl4pPr>
-            <a:lvl5pPr marL="1828800" indent="0">
+              <a:defRPr sz="2133" b="1"/>
+            </a:lvl6pPr>
+            <a:lvl7pPr marL="3657509" indent="0">
               <a:buNone/>
-              <a:defRPr sz="1600" b="1"/>
-            </a:lvl5pPr>
-            <a:lvl6pPr marL="2286000" indent="0">
+              <a:defRPr sz="2133" b="1"/>
+            </a:lvl7pPr>
+            <a:lvl8pPr marL="4267093" indent="0">
               <a:buNone/>
-              <a:defRPr sz="1600" b="1"/>
-            </a:lvl6pPr>
-            <a:lvl7pPr marL="2743200" indent="0">
+              <a:defRPr sz="2133" b="1"/>
+            </a:lvl8pPr>
+            <a:lvl9pPr marL="4876678" indent="0">
               <a:buNone/>
-              <a:defRPr sz="1600" b="1"/>
-            </a:lvl7pPr>
-            <a:lvl8pPr marL="3200400" indent="0">
-              <a:buNone/>
-              <a:defRPr sz="1600" b="1"/>
-            </a:lvl8pPr>
-            <a:lvl9pPr marL="3657600" indent="0">
-              <a:buNone/>
-              <a:defRPr sz="1600" b="1"/>
+              <a:defRPr sz="2133" b="1"/>
             </a:lvl9pPr>
           </a:lstStyle>
           <a:p>
             <a:pPr lvl="0"/>
             <a:r>
-              <a:rPr kumimoji="1" lang="zh-CN" altLang="en-US"/>
+              <a:rPr lang="zh-CN" altLang="en-US"/>
               <a:t>单击此处编辑母版文本样式</a:t>
             </a:r>
           </a:p>
@@ -1610,13 +1423,7 @@
       </p:sp>
       <p:sp>
         <p:nvSpPr>
-          <p:cNvPr id="4" name="内容占位符 3">
-            <a:extLst>
-              <a:ext uri="{FF2B5EF4-FFF2-40B4-BE49-F238E27FC236}">
-                <a16:creationId xmlns:a16="http://schemas.microsoft.com/office/drawing/2014/main" id="{4343A908-353C-D406-369B-0189567F2CF0}"/>
-              </a:ext>
-            </a:extLst>
-          </p:cNvPr>
+          <p:cNvPr id="4" name="Content Placeholder 3"/>
           <p:cNvSpPr>
             <a:spLocks noGrp="1"/>
           </p:cNvSpPr>
@@ -1626,8 +1433,8 @@
         </p:nvSpPr>
         <p:spPr>
           <a:xfrm>
-            <a:off x="839788" y="2505075"/>
-            <a:ext cx="5157787" cy="3684588"/>
+            <a:off x="839789" y="3944914"/>
+            <a:ext cx="5157787" cy="5802373"/>
           </a:xfrm>
         </p:spPr>
         <p:txBody>
@@ -1636,49 +1443,44 @@
           <a:p>
             <a:pPr lvl="0"/>
             <a:r>
-              <a:rPr kumimoji="1" lang="zh-CN" altLang="en-US"/>
+              <a:rPr lang="zh-CN" altLang="en-US"/>
               <a:t>单击此处编辑母版文本样式</a:t>
             </a:r>
           </a:p>
           <a:p>
             <a:pPr lvl="1"/>
             <a:r>
-              <a:rPr kumimoji="1" lang="zh-CN" altLang="en-US"/>
+              <a:rPr lang="zh-CN" altLang="en-US"/>
               <a:t>二级</a:t>
             </a:r>
           </a:p>
           <a:p>
             <a:pPr lvl="2"/>
             <a:r>
-              <a:rPr kumimoji="1" lang="zh-CN" altLang="en-US"/>
+              <a:rPr lang="zh-CN" altLang="en-US"/>
               <a:t>三级</a:t>
             </a:r>
           </a:p>
           <a:p>
             <a:pPr lvl="3"/>
             <a:r>
-              <a:rPr kumimoji="1" lang="zh-CN" altLang="en-US"/>
+              <a:rPr lang="zh-CN" altLang="en-US"/>
               <a:t>四级</a:t>
             </a:r>
           </a:p>
           <a:p>
             <a:pPr lvl="4"/>
             <a:r>
-              <a:rPr kumimoji="1" lang="zh-CN" altLang="en-US"/>
+              <a:rPr lang="zh-CN" altLang="en-US"/>
               <a:t>五级</a:t>
             </a:r>
+            <a:endParaRPr lang="en-US" dirty="0"/>
           </a:p>
         </p:txBody>
       </p:sp>
       <p:sp>
         <p:nvSpPr>
-          <p:cNvPr id="5" name="文本占位符 4">
-            <a:extLst>
-              <a:ext uri="{FF2B5EF4-FFF2-40B4-BE49-F238E27FC236}">
-                <a16:creationId xmlns:a16="http://schemas.microsoft.com/office/drawing/2014/main" id="{5D311F2E-9AFE-A5EB-322F-244535BE045F}"/>
-              </a:ext>
-            </a:extLst>
-          </p:cNvPr>
+          <p:cNvPr id="5" name="Text Placeholder 4"/>
           <p:cNvSpPr>
             <a:spLocks noGrp="1"/>
           </p:cNvSpPr>
@@ -1688,8 +1490,8 @@
         </p:nvSpPr>
         <p:spPr>
           <a:xfrm>
-            <a:off x="6172200" y="1681163"/>
-            <a:ext cx="5183188" cy="823912"/>
+            <a:off x="6172201" y="2647443"/>
+            <a:ext cx="5183188" cy="1297471"/>
           </a:xfrm>
         </p:spPr>
         <p:txBody>
@@ -1697,45 +1499,45 @@
           <a:lstStyle>
             <a:lvl1pPr marL="0" indent="0">
               <a:buNone/>
+              <a:defRPr sz="3200" b="1"/>
+            </a:lvl1pPr>
+            <a:lvl2pPr marL="609585" indent="0">
+              <a:buNone/>
+              <a:defRPr sz="2667" b="1"/>
+            </a:lvl2pPr>
+            <a:lvl3pPr marL="1219170" indent="0">
+              <a:buNone/>
               <a:defRPr sz="2400" b="1"/>
-            </a:lvl1pPr>
-            <a:lvl2pPr marL="457200" indent="0">
+            </a:lvl3pPr>
+            <a:lvl4pPr marL="1828754" indent="0">
               <a:buNone/>
-              <a:defRPr sz="2000" b="1"/>
-            </a:lvl2pPr>
-            <a:lvl3pPr marL="914400" indent="0">
+              <a:defRPr sz="2133" b="1"/>
+            </a:lvl4pPr>
+            <a:lvl5pPr marL="2438339" indent="0">
               <a:buNone/>
-              <a:defRPr sz="1800" b="1"/>
-            </a:lvl3pPr>
-            <a:lvl4pPr marL="1371600" indent="0">
+              <a:defRPr sz="2133" b="1"/>
+            </a:lvl5pPr>
+            <a:lvl6pPr marL="3047924" indent="0">
               <a:buNone/>
-              <a:defRPr sz="1600" b="1"/>
-            </a:lvl4pPr>
-            <a:lvl5pPr marL="1828800" indent="0">
+              <a:defRPr sz="2133" b="1"/>
+            </a:lvl6pPr>
+            <a:lvl7pPr marL="3657509" indent="0">
               <a:buNone/>
-              <a:defRPr sz="1600" b="1"/>
-            </a:lvl5pPr>
-            <a:lvl6pPr marL="2286000" indent="0">
+              <a:defRPr sz="2133" b="1"/>
+            </a:lvl7pPr>
+            <a:lvl8pPr marL="4267093" indent="0">
               <a:buNone/>
-              <a:defRPr sz="1600" b="1"/>
-            </a:lvl6pPr>
-            <a:lvl7pPr marL="2743200" indent="0">
+              <a:defRPr sz="2133" b="1"/>
+            </a:lvl8pPr>
+            <a:lvl9pPr marL="4876678" indent="0">
               <a:buNone/>
-              <a:defRPr sz="1600" b="1"/>
-            </a:lvl7pPr>
-            <a:lvl8pPr marL="3200400" indent="0">
-              <a:buNone/>
-              <a:defRPr sz="1600" b="1"/>
-            </a:lvl8pPr>
-            <a:lvl9pPr marL="3657600" indent="0">
-              <a:buNone/>
-              <a:defRPr sz="1600" b="1"/>
+              <a:defRPr sz="2133" b="1"/>
             </a:lvl9pPr>
           </a:lstStyle>
           <a:p>
             <a:pPr lvl="0"/>
             <a:r>
-              <a:rPr kumimoji="1" lang="zh-CN" altLang="en-US"/>
+              <a:rPr lang="zh-CN" altLang="en-US"/>
               <a:t>单击此处编辑母版文本样式</a:t>
             </a:r>
           </a:p>
@@ -1743,13 +1545,7 @@
       </p:sp>
       <p:sp>
         <p:nvSpPr>
-          <p:cNvPr id="6" name="内容占位符 5">
-            <a:extLst>
-              <a:ext uri="{FF2B5EF4-FFF2-40B4-BE49-F238E27FC236}">
-                <a16:creationId xmlns:a16="http://schemas.microsoft.com/office/drawing/2014/main" id="{47449987-890E-2C25-A69A-08FE03BF8CED}"/>
-              </a:ext>
-            </a:extLst>
-          </p:cNvPr>
+          <p:cNvPr id="6" name="Content Placeholder 5"/>
           <p:cNvSpPr>
             <a:spLocks noGrp="1"/>
           </p:cNvSpPr>
@@ -1759,8 +1555,8 @@
         </p:nvSpPr>
         <p:spPr>
           <a:xfrm>
-            <a:off x="6172200" y="2505075"/>
-            <a:ext cx="5183188" cy="3684588"/>
+            <a:off x="6172201" y="3944914"/>
+            <a:ext cx="5183188" cy="5802373"/>
           </a:xfrm>
         </p:spPr>
         <p:txBody>
@@ -1769,49 +1565,44 @@
           <a:p>
             <a:pPr lvl="0"/>
             <a:r>
-              <a:rPr kumimoji="1" lang="zh-CN" altLang="en-US"/>
+              <a:rPr lang="zh-CN" altLang="en-US"/>
               <a:t>单击此处编辑母版文本样式</a:t>
             </a:r>
           </a:p>
           <a:p>
             <a:pPr lvl="1"/>
             <a:r>
-              <a:rPr kumimoji="1" lang="zh-CN" altLang="en-US"/>
+              <a:rPr lang="zh-CN" altLang="en-US"/>
               <a:t>二级</a:t>
             </a:r>
           </a:p>
           <a:p>
             <a:pPr lvl="2"/>
             <a:r>
-              <a:rPr kumimoji="1" lang="zh-CN" altLang="en-US"/>
+              <a:rPr lang="zh-CN" altLang="en-US"/>
               <a:t>三级</a:t>
             </a:r>
           </a:p>
           <a:p>
             <a:pPr lvl="3"/>
             <a:r>
-              <a:rPr kumimoji="1" lang="zh-CN" altLang="en-US"/>
+              <a:rPr lang="zh-CN" altLang="en-US"/>
               <a:t>四级</a:t>
             </a:r>
           </a:p>
           <a:p>
             <a:pPr lvl="4"/>
             <a:r>
-              <a:rPr kumimoji="1" lang="zh-CN" altLang="en-US"/>
+              <a:rPr lang="zh-CN" altLang="en-US"/>
               <a:t>五级</a:t>
             </a:r>
+            <a:endParaRPr lang="en-US" dirty="0"/>
           </a:p>
         </p:txBody>
       </p:sp>
       <p:sp>
         <p:nvSpPr>
-          <p:cNvPr id="7" name="日期占位符 6">
-            <a:extLst>
-              <a:ext uri="{FF2B5EF4-FFF2-40B4-BE49-F238E27FC236}">
-                <a16:creationId xmlns:a16="http://schemas.microsoft.com/office/drawing/2014/main" id="{D079E58D-B190-AD29-82EB-11351CB251E5}"/>
-              </a:ext>
-            </a:extLst>
-          </p:cNvPr>
+          <p:cNvPr id="7" name="Date Placeholder 6"/>
           <p:cNvSpPr>
             <a:spLocks noGrp="1"/>
           </p:cNvSpPr>
@@ -1826,7 +1617,7 @@
           <a:p>
             <a:fld id="{ADEA6865-5F8B-9C4A-950D-1D161D0F2BB5}" type="datetimeFigureOut">
               <a:rPr kumimoji="1" lang="zh-CN" altLang="en-US" smtClean="0"/>
-              <a:t>2022/5/20</a:t>
+              <a:t>2022/6/8</a:t>
             </a:fld>
             <a:endParaRPr kumimoji="1" lang="zh-CN" altLang="en-US"/>
           </a:p>
@@ -1834,13 +1625,7 @@
       </p:sp>
       <p:sp>
         <p:nvSpPr>
-          <p:cNvPr id="8" name="页脚占位符 7">
-            <a:extLst>
-              <a:ext uri="{FF2B5EF4-FFF2-40B4-BE49-F238E27FC236}">
-                <a16:creationId xmlns:a16="http://schemas.microsoft.com/office/drawing/2014/main" id="{5A815046-31A3-E813-7CF7-5627B2E4A734}"/>
-              </a:ext>
-            </a:extLst>
-          </p:cNvPr>
+          <p:cNvPr id="8" name="Footer Placeholder 7"/>
           <p:cNvSpPr>
             <a:spLocks noGrp="1"/>
           </p:cNvSpPr>
@@ -1859,13 +1644,7 @@
       </p:sp>
       <p:sp>
         <p:nvSpPr>
-          <p:cNvPr id="9" name="灯片编号占位符 8">
-            <a:extLst>
-              <a:ext uri="{FF2B5EF4-FFF2-40B4-BE49-F238E27FC236}">
-                <a16:creationId xmlns:a16="http://schemas.microsoft.com/office/drawing/2014/main" id="{1F74771E-823C-DECF-9044-5B69C5230CCA}"/>
-              </a:ext>
-            </a:extLst>
-          </p:cNvPr>
+          <p:cNvPr id="9" name="Slide Number Placeholder 8"/>
           <p:cNvSpPr>
             <a:spLocks noGrp="1"/>
           </p:cNvSpPr>
@@ -1889,7 +1668,7 @@
     </p:spTree>
     <p:extLst>
       <p:ext uri="{BB962C8B-B14F-4D97-AF65-F5344CB8AC3E}">
-        <p14:creationId xmlns:p14="http://schemas.microsoft.com/office/powerpoint/2010/main" val="2585353843"/>
+        <p14:creationId xmlns:p14="http://schemas.microsoft.com/office/powerpoint/2010/main" val="1863792678"/>
       </p:ext>
     </p:extLst>
   </p:cSld>
@@ -1918,13 +1697,7 @@
       </p:grpSpPr>
       <p:sp>
         <p:nvSpPr>
-          <p:cNvPr id="2" name="标题 1">
-            <a:extLst>
-              <a:ext uri="{FF2B5EF4-FFF2-40B4-BE49-F238E27FC236}">
-                <a16:creationId xmlns:a16="http://schemas.microsoft.com/office/drawing/2014/main" id="{3BC7386B-A46F-7685-D938-958A32012DE3}"/>
-              </a:ext>
-            </a:extLst>
-          </p:cNvPr>
+          <p:cNvPr id="2" name="Title 1"/>
           <p:cNvSpPr>
             <a:spLocks noGrp="1"/>
           </p:cNvSpPr>
@@ -1938,21 +1711,16 @@
           <a:lstStyle/>
           <a:p>
             <a:r>
-              <a:rPr kumimoji="1" lang="zh-CN" altLang="en-US"/>
+              <a:rPr lang="zh-CN" altLang="en-US"/>
               <a:t>单击此处编辑母版标题样式</a:t>
             </a:r>
+            <a:endParaRPr lang="en-US" dirty="0"/>
           </a:p>
         </p:txBody>
       </p:sp>
       <p:sp>
         <p:nvSpPr>
-          <p:cNvPr id="3" name="日期占位符 2">
-            <a:extLst>
-              <a:ext uri="{FF2B5EF4-FFF2-40B4-BE49-F238E27FC236}">
-                <a16:creationId xmlns:a16="http://schemas.microsoft.com/office/drawing/2014/main" id="{2B14F064-8A79-FC15-7DC2-A3646BCCF984}"/>
-              </a:ext>
-            </a:extLst>
-          </p:cNvPr>
+          <p:cNvPr id="3" name="Date Placeholder 2"/>
           <p:cNvSpPr>
             <a:spLocks noGrp="1"/>
           </p:cNvSpPr>
@@ -1967,7 +1735,7 @@
           <a:p>
             <a:fld id="{ADEA6865-5F8B-9C4A-950D-1D161D0F2BB5}" type="datetimeFigureOut">
               <a:rPr kumimoji="1" lang="zh-CN" altLang="en-US" smtClean="0"/>
-              <a:t>2022/5/20</a:t>
+              <a:t>2022/6/8</a:t>
             </a:fld>
             <a:endParaRPr kumimoji="1" lang="zh-CN" altLang="en-US"/>
           </a:p>
@@ -1975,13 +1743,7 @@
       </p:sp>
       <p:sp>
         <p:nvSpPr>
-          <p:cNvPr id="4" name="页脚占位符 3">
-            <a:extLst>
-              <a:ext uri="{FF2B5EF4-FFF2-40B4-BE49-F238E27FC236}">
-                <a16:creationId xmlns:a16="http://schemas.microsoft.com/office/drawing/2014/main" id="{13E69A6C-8D91-6A73-5539-FBEE44ED749D}"/>
-              </a:ext>
-            </a:extLst>
-          </p:cNvPr>
+          <p:cNvPr id="4" name="Footer Placeholder 3"/>
           <p:cNvSpPr>
             <a:spLocks noGrp="1"/>
           </p:cNvSpPr>
@@ -2000,13 +1762,7 @@
       </p:sp>
       <p:sp>
         <p:nvSpPr>
-          <p:cNvPr id="5" name="灯片编号占位符 4">
-            <a:extLst>
-              <a:ext uri="{FF2B5EF4-FFF2-40B4-BE49-F238E27FC236}">
-                <a16:creationId xmlns:a16="http://schemas.microsoft.com/office/drawing/2014/main" id="{95C04459-ECEE-76CD-5F2E-125D1104B0D5}"/>
-              </a:ext>
-            </a:extLst>
-          </p:cNvPr>
+          <p:cNvPr id="5" name="Slide Number Placeholder 4"/>
           <p:cNvSpPr>
             <a:spLocks noGrp="1"/>
           </p:cNvSpPr>
@@ -2030,7 +1786,7 @@
     </p:spTree>
     <p:extLst>
       <p:ext uri="{BB962C8B-B14F-4D97-AF65-F5344CB8AC3E}">
-        <p14:creationId xmlns:p14="http://schemas.microsoft.com/office/powerpoint/2010/main" val="750914731"/>
+        <p14:creationId xmlns:p14="http://schemas.microsoft.com/office/powerpoint/2010/main" val="3775748318"/>
       </p:ext>
     </p:extLst>
   </p:cSld>
@@ -2059,13 +1815,7 @@
       </p:grpSpPr>
       <p:sp>
         <p:nvSpPr>
-          <p:cNvPr id="2" name="日期占位符 1">
-            <a:extLst>
-              <a:ext uri="{FF2B5EF4-FFF2-40B4-BE49-F238E27FC236}">
-                <a16:creationId xmlns:a16="http://schemas.microsoft.com/office/drawing/2014/main" id="{089B2EE3-231B-3D8D-2CBC-FC6685970E7F}"/>
-              </a:ext>
-            </a:extLst>
-          </p:cNvPr>
+          <p:cNvPr id="2" name="Date Placeholder 1"/>
           <p:cNvSpPr>
             <a:spLocks noGrp="1"/>
           </p:cNvSpPr>
@@ -2080,7 +1830,7 @@
           <a:p>
             <a:fld id="{ADEA6865-5F8B-9C4A-950D-1D161D0F2BB5}" type="datetimeFigureOut">
               <a:rPr kumimoji="1" lang="zh-CN" altLang="en-US" smtClean="0"/>
-              <a:t>2022/5/20</a:t>
+              <a:t>2022/6/8</a:t>
             </a:fld>
             <a:endParaRPr kumimoji="1" lang="zh-CN" altLang="en-US"/>
           </a:p>
@@ -2088,13 +1838,7 @@
       </p:sp>
       <p:sp>
         <p:nvSpPr>
-          <p:cNvPr id="3" name="页脚占位符 2">
-            <a:extLst>
-              <a:ext uri="{FF2B5EF4-FFF2-40B4-BE49-F238E27FC236}">
-                <a16:creationId xmlns:a16="http://schemas.microsoft.com/office/drawing/2014/main" id="{10AD0144-5BD9-E1B3-571B-55F010657941}"/>
-              </a:ext>
-            </a:extLst>
-          </p:cNvPr>
+          <p:cNvPr id="3" name="Footer Placeholder 2"/>
           <p:cNvSpPr>
             <a:spLocks noGrp="1"/>
           </p:cNvSpPr>
@@ -2113,13 +1857,7 @@
       </p:sp>
       <p:sp>
         <p:nvSpPr>
-          <p:cNvPr id="4" name="灯片编号占位符 3">
-            <a:extLst>
-              <a:ext uri="{FF2B5EF4-FFF2-40B4-BE49-F238E27FC236}">
-                <a16:creationId xmlns:a16="http://schemas.microsoft.com/office/drawing/2014/main" id="{AA2C8C30-5125-B6D1-91C5-A65085D8D057}"/>
-              </a:ext>
-            </a:extLst>
-          </p:cNvPr>
+          <p:cNvPr id="4" name="Slide Number Placeholder 3"/>
           <p:cNvSpPr>
             <a:spLocks noGrp="1"/>
           </p:cNvSpPr>
@@ -2143,7 +1881,7 @@
     </p:spTree>
     <p:extLst>
       <p:ext uri="{BB962C8B-B14F-4D97-AF65-F5344CB8AC3E}">
-        <p14:creationId xmlns:p14="http://schemas.microsoft.com/office/powerpoint/2010/main" val="4154427057"/>
+        <p14:creationId xmlns:p14="http://schemas.microsoft.com/office/powerpoint/2010/main" val="1330652164"/>
       </p:ext>
     </p:extLst>
   </p:cSld>
@@ -2172,13 +1910,7 @@
       </p:grpSpPr>
       <p:sp>
         <p:nvSpPr>
-          <p:cNvPr id="2" name="标题 1">
-            <a:extLst>
-              <a:ext uri="{FF2B5EF4-FFF2-40B4-BE49-F238E27FC236}">
-                <a16:creationId xmlns:a16="http://schemas.microsoft.com/office/drawing/2014/main" id="{46DD094D-0AF7-9638-3F40-B3BE443073BB}"/>
-              </a:ext>
-            </a:extLst>
-          </p:cNvPr>
+          <p:cNvPr id="2" name="Title 1"/>
           <p:cNvSpPr>
             <a:spLocks noGrp="1"/>
           </p:cNvSpPr>
@@ -2188,34 +1920,29 @@
         </p:nvSpPr>
         <p:spPr>
           <a:xfrm>
-            <a:off x="839788" y="457200"/>
-            <a:ext cx="3932237" cy="1600200"/>
+            <a:off x="839788" y="719984"/>
+            <a:ext cx="3932237" cy="2519945"/>
           </a:xfrm>
         </p:spPr>
         <p:txBody>
           <a:bodyPr anchor="b"/>
           <a:lstStyle>
             <a:lvl1pPr>
-              <a:defRPr sz="3200"/>
+              <a:defRPr sz="4267"/>
             </a:lvl1pPr>
           </a:lstStyle>
           <a:p>
             <a:r>
-              <a:rPr kumimoji="1" lang="zh-CN" altLang="en-US"/>
+              <a:rPr lang="zh-CN" altLang="en-US"/>
               <a:t>单击此处编辑母版标题样式</a:t>
             </a:r>
+            <a:endParaRPr lang="en-US" dirty="0"/>
           </a:p>
         </p:txBody>
       </p:sp>
       <p:sp>
         <p:nvSpPr>
-          <p:cNvPr id="3" name="内容占位符 2">
-            <a:extLst>
-              <a:ext uri="{FF2B5EF4-FFF2-40B4-BE49-F238E27FC236}">
-                <a16:creationId xmlns:a16="http://schemas.microsoft.com/office/drawing/2014/main" id="{321E9F5E-2593-D674-6632-B04D7FF40F44}"/>
-              </a:ext>
-            </a:extLst>
-          </p:cNvPr>
+          <p:cNvPr id="3" name="Content Placeholder 2"/>
           <p:cNvSpPr>
             <a:spLocks noGrp="1"/>
           </p:cNvSpPr>
@@ -2225,87 +1952,82 @@
         </p:nvSpPr>
         <p:spPr>
           <a:xfrm>
-            <a:off x="5183188" y="987425"/>
-            <a:ext cx="6172200" cy="4873625"/>
+            <a:off x="5183188" y="1554968"/>
+            <a:ext cx="6172200" cy="7674832"/>
           </a:xfrm>
         </p:spPr>
         <p:txBody>
           <a:bodyPr/>
           <a:lstStyle>
             <a:lvl1pPr>
-              <a:defRPr sz="3200"/>
+              <a:defRPr sz="4267"/>
             </a:lvl1pPr>
             <a:lvl2pPr>
-              <a:defRPr sz="2800"/>
+              <a:defRPr sz="3733"/>
             </a:lvl2pPr>
             <a:lvl3pPr>
-              <a:defRPr sz="2400"/>
+              <a:defRPr sz="3200"/>
             </a:lvl3pPr>
             <a:lvl4pPr>
-              <a:defRPr sz="2000"/>
+              <a:defRPr sz="2667"/>
             </a:lvl4pPr>
             <a:lvl5pPr>
-              <a:defRPr sz="2000"/>
+              <a:defRPr sz="2667"/>
             </a:lvl5pPr>
             <a:lvl6pPr>
-              <a:defRPr sz="2000"/>
+              <a:defRPr sz="2667"/>
             </a:lvl6pPr>
             <a:lvl7pPr>
-              <a:defRPr sz="2000"/>
+              <a:defRPr sz="2667"/>
             </a:lvl7pPr>
             <a:lvl8pPr>
-              <a:defRPr sz="2000"/>
+              <a:defRPr sz="2667"/>
             </a:lvl8pPr>
             <a:lvl9pPr>
-              <a:defRPr sz="2000"/>
+              <a:defRPr sz="2667"/>
             </a:lvl9pPr>
           </a:lstStyle>
           <a:p>
             <a:pPr lvl="0"/>
             <a:r>
-              <a:rPr kumimoji="1" lang="zh-CN" altLang="en-US"/>
+              <a:rPr lang="zh-CN" altLang="en-US"/>
               <a:t>单击此处编辑母版文本样式</a:t>
             </a:r>
           </a:p>
           <a:p>
             <a:pPr lvl="1"/>
             <a:r>
-              <a:rPr kumimoji="1" lang="zh-CN" altLang="en-US"/>
+              <a:rPr lang="zh-CN" altLang="en-US"/>
               <a:t>二级</a:t>
             </a:r>
           </a:p>
           <a:p>
             <a:pPr lvl="2"/>
             <a:r>
-              <a:rPr kumimoji="1" lang="zh-CN" altLang="en-US"/>
+              <a:rPr lang="zh-CN" altLang="en-US"/>
               <a:t>三级</a:t>
             </a:r>
           </a:p>
           <a:p>
             <a:pPr lvl="3"/>
             <a:r>
-              <a:rPr kumimoji="1" lang="zh-CN" altLang="en-US"/>
+              <a:rPr lang="zh-CN" altLang="en-US"/>
               <a:t>四级</a:t>
             </a:r>
           </a:p>
           <a:p>
             <a:pPr lvl="4"/>
             <a:r>
-              <a:rPr kumimoji="1" lang="zh-CN" altLang="en-US"/>
+              <a:rPr lang="zh-CN" altLang="en-US"/>
               <a:t>五级</a:t>
             </a:r>
+            <a:endParaRPr lang="en-US" dirty="0"/>
           </a:p>
         </p:txBody>
       </p:sp>
       <p:sp>
         <p:nvSpPr>
-          <p:cNvPr id="4" name="文本占位符 3">
-            <a:extLst>
-              <a:ext uri="{FF2B5EF4-FFF2-40B4-BE49-F238E27FC236}">
-                <a16:creationId xmlns:a16="http://schemas.microsoft.com/office/drawing/2014/main" id="{C6F6F369-538F-5570-DB1F-71578D521072}"/>
-              </a:ext>
-            </a:extLst>
-          </p:cNvPr>
+          <p:cNvPr id="4" name="Text Placeholder 3"/>
           <p:cNvSpPr>
             <a:spLocks noGrp="1"/>
           </p:cNvSpPr>
@@ -2315,8 +2037,8 @@
         </p:nvSpPr>
         <p:spPr>
           <a:xfrm>
-            <a:off x="839788" y="2057400"/>
-            <a:ext cx="3932237" cy="3811588"/>
+            <a:off x="839788" y="3239929"/>
+            <a:ext cx="3932237" cy="6002369"/>
           </a:xfrm>
         </p:spPr>
         <p:txBody>
@@ -2324,45 +2046,45 @@
           <a:lstStyle>
             <a:lvl1pPr marL="0" indent="0">
               <a:buNone/>
+              <a:defRPr sz="2133"/>
+            </a:lvl1pPr>
+            <a:lvl2pPr marL="609585" indent="0">
+              <a:buNone/>
+              <a:defRPr sz="1867"/>
+            </a:lvl2pPr>
+            <a:lvl3pPr marL="1219170" indent="0">
+              <a:buNone/>
               <a:defRPr sz="1600"/>
-            </a:lvl1pPr>
-            <a:lvl2pPr marL="457200" indent="0">
+            </a:lvl3pPr>
+            <a:lvl4pPr marL="1828754" indent="0">
               <a:buNone/>
-              <a:defRPr sz="1400"/>
-            </a:lvl2pPr>
-            <a:lvl3pPr marL="914400" indent="0">
+              <a:defRPr sz="1333"/>
+            </a:lvl4pPr>
+            <a:lvl5pPr marL="2438339" indent="0">
               <a:buNone/>
-              <a:defRPr sz="1200"/>
-            </a:lvl3pPr>
-            <a:lvl4pPr marL="1371600" indent="0">
+              <a:defRPr sz="1333"/>
+            </a:lvl5pPr>
+            <a:lvl6pPr marL="3047924" indent="0">
               <a:buNone/>
-              <a:defRPr sz="1000"/>
-            </a:lvl4pPr>
-            <a:lvl5pPr marL="1828800" indent="0">
+              <a:defRPr sz="1333"/>
+            </a:lvl6pPr>
+            <a:lvl7pPr marL="3657509" indent="0">
               <a:buNone/>
-              <a:defRPr sz="1000"/>
-            </a:lvl5pPr>
-            <a:lvl6pPr marL="2286000" indent="0">
+              <a:defRPr sz="1333"/>
+            </a:lvl7pPr>
+            <a:lvl8pPr marL="4267093" indent="0">
               <a:buNone/>
-              <a:defRPr sz="1000"/>
-            </a:lvl6pPr>
-            <a:lvl7pPr marL="2743200" indent="0">
+              <a:defRPr sz="1333"/>
+            </a:lvl8pPr>
+            <a:lvl9pPr marL="4876678" indent="0">
               <a:buNone/>
-              <a:defRPr sz="1000"/>
-            </a:lvl7pPr>
-            <a:lvl8pPr marL="3200400" indent="0">
-              <a:buNone/>
-              <a:defRPr sz="1000"/>
-            </a:lvl8pPr>
-            <a:lvl9pPr marL="3657600" indent="0">
-              <a:buNone/>
-              <a:defRPr sz="1000"/>
+              <a:defRPr sz="1333"/>
             </a:lvl9pPr>
           </a:lstStyle>
           <a:p>
             <a:pPr lvl="0"/>
             <a:r>
-              <a:rPr kumimoji="1" lang="zh-CN" altLang="en-US"/>
+              <a:rPr lang="zh-CN" altLang="en-US"/>
               <a:t>单击此处编辑母版文本样式</a:t>
             </a:r>
           </a:p>
@@ -2370,13 +2092,7 @@
       </p:sp>
       <p:sp>
         <p:nvSpPr>
-          <p:cNvPr id="5" name="日期占位符 4">
-            <a:extLst>
-              <a:ext uri="{FF2B5EF4-FFF2-40B4-BE49-F238E27FC236}">
-                <a16:creationId xmlns:a16="http://schemas.microsoft.com/office/drawing/2014/main" id="{3D67E6AF-1AF7-147F-488F-9E06BCF2688C}"/>
-              </a:ext>
-            </a:extLst>
-          </p:cNvPr>
+          <p:cNvPr id="5" name="Date Placeholder 4"/>
           <p:cNvSpPr>
             <a:spLocks noGrp="1"/>
           </p:cNvSpPr>
@@ -2391,7 +2107,7 @@
           <a:p>
             <a:fld id="{ADEA6865-5F8B-9C4A-950D-1D161D0F2BB5}" type="datetimeFigureOut">
               <a:rPr kumimoji="1" lang="zh-CN" altLang="en-US" smtClean="0"/>
-              <a:t>2022/5/20</a:t>
+              <a:t>2022/6/8</a:t>
             </a:fld>
             <a:endParaRPr kumimoji="1" lang="zh-CN" altLang="en-US"/>
           </a:p>
@@ -2399,13 +2115,7 @@
       </p:sp>
       <p:sp>
         <p:nvSpPr>
-          <p:cNvPr id="6" name="页脚占位符 5">
-            <a:extLst>
-              <a:ext uri="{FF2B5EF4-FFF2-40B4-BE49-F238E27FC236}">
-                <a16:creationId xmlns:a16="http://schemas.microsoft.com/office/drawing/2014/main" id="{32809AFC-BD28-5693-7BD1-BCF74EE6D368}"/>
-              </a:ext>
-            </a:extLst>
-          </p:cNvPr>
+          <p:cNvPr id="6" name="Footer Placeholder 5"/>
           <p:cNvSpPr>
             <a:spLocks noGrp="1"/>
           </p:cNvSpPr>
@@ -2424,13 +2134,7 @@
       </p:sp>
       <p:sp>
         <p:nvSpPr>
-          <p:cNvPr id="7" name="灯片编号占位符 6">
-            <a:extLst>
-              <a:ext uri="{FF2B5EF4-FFF2-40B4-BE49-F238E27FC236}">
-                <a16:creationId xmlns:a16="http://schemas.microsoft.com/office/drawing/2014/main" id="{59364775-14C0-BC03-F58B-EBE14F4BF4A7}"/>
-              </a:ext>
-            </a:extLst>
-          </p:cNvPr>
+          <p:cNvPr id="7" name="Slide Number Placeholder 6"/>
           <p:cNvSpPr>
             <a:spLocks noGrp="1"/>
           </p:cNvSpPr>
@@ -2454,7 +2158,7 @@
     </p:spTree>
     <p:extLst>
       <p:ext uri="{BB962C8B-B14F-4D97-AF65-F5344CB8AC3E}">
-        <p14:creationId xmlns:p14="http://schemas.microsoft.com/office/powerpoint/2010/main" val="758304201"/>
+        <p14:creationId xmlns:p14="http://schemas.microsoft.com/office/powerpoint/2010/main" val="3625588034"/>
       </p:ext>
     </p:extLst>
   </p:cSld>
@@ -2483,13 +2187,7 @@
       </p:grpSpPr>
       <p:sp>
         <p:nvSpPr>
-          <p:cNvPr id="2" name="标题 1">
-            <a:extLst>
-              <a:ext uri="{FF2B5EF4-FFF2-40B4-BE49-F238E27FC236}">
-                <a16:creationId xmlns:a16="http://schemas.microsoft.com/office/drawing/2014/main" id="{96245FF6-86D9-28E8-E68E-6BE19D42D2BF}"/>
-              </a:ext>
-            </a:extLst>
-          </p:cNvPr>
+          <p:cNvPr id="2" name="Title 1"/>
           <p:cNvSpPr>
             <a:spLocks noGrp="1"/>
           </p:cNvSpPr>
@@ -2499,36 +2197,31 @@
         </p:nvSpPr>
         <p:spPr>
           <a:xfrm>
-            <a:off x="839788" y="457200"/>
-            <a:ext cx="3932237" cy="1600200"/>
+            <a:off x="839788" y="719984"/>
+            <a:ext cx="3932237" cy="2519945"/>
           </a:xfrm>
         </p:spPr>
         <p:txBody>
           <a:bodyPr anchor="b"/>
           <a:lstStyle>
             <a:lvl1pPr>
-              <a:defRPr sz="3200"/>
+              <a:defRPr sz="4267"/>
             </a:lvl1pPr>
           </a:lstStyle>
           <a:p>
             <a:r>
-              <a:rPr kumimoji="1" lang="zh-CN" altLang="en-US"/>
+              <a:rPr lang="zh-CN" altLang="en-US"/>
               <a:t>单击此处编辑母版标题样式</a:t>
             </a:r>
+            <a:endParaRPr lang="en-US" dirty="0"/>
           </a:p>
         </p:txBody>
       </p:sp>
       <p:sp>
         <p:nvSpPr>
-          <p:cNvPr id="3" name="图片占位符 2">
-            <a:extLst>
-              <a:ext uri="{FF2B5EF4-FFF2-40B4-BE49-F238E27FC236}">
-                <a16:creationId xmlns:a16="http://schemas.microsoft.com/office/drawing/2014/main" id="{915CE6FC-097A-D6E5-D6D9-267EE2377F4B}"/>
-              </a:ext>
-            </a:extLst>
-          </p:cNvPr>
+          <p:cNvPr id="3" name="Picture Placeholder 2"/>
           <p:cNvSpPr>
-            <a:spLocks noGrp="1"/>
+            <a:spLocks noGrp="1" noChangeAspect="1"/>
           </p:cNvSpPr>
           <p:nvPr>
             <p:ph type="pic" idx="1"/>
@@ -2536,64 +2229,62 @@
         </p:nvSpPr>
         <p:spPr>
           <a:xfrm>
-            <a:off x="5183188" y="987425"/>
-            <a:ext cx="6172200" cy="4873625"/>
+            <a:off x="5183188" y="1554968"/>
+            <a:ext cx="6172200" cy="7674832"/>
           </a:xfrm>
         </p:spPr>
         <p:txBody>
-          <a:bodyPr/>
+          <a:bodyPr anchor="t"/>
           <a:lstStyle>
             <a:lvl1pPr marL="0" indent="0">
               <a:buNone/>
+              <a:defRPr sz="4267"/>
+            </a:lvl1pPr>
+            <a:lvl2pPr marL="609585" indent="0">
+              <a:buNone/>
+              <a:defRPr sz="3733"/>
+            </a:lvl2pPr>
+            <a:lvl3pPr marL="1219170" indent="0">
+              <a:buNone/>
               <a:defRPr sz="3200"/>
-            </a:lvl1pPr>
-            <a:lvl2pPr marL="457200" indent="0">
+            </a:lvl3pPr>
+            <a:lvl4pPr marL="1828754" indent="0">
               <a:buNone/>
-              <a:defRPr sz="2800"/>
-            </a:lvl2pPr>
-            <a:lvl3pPr marL="914400" indent="0">
+              <a:defRPr sz="2667"/>
+            </a:lvl4pPr>
+            <a:lvl5pPr marL="2438339" indent="0">
               <a:buNone/>
-              <a:defRPr sz="2400"/>
-            </a:lvl3pPr>
-            <a:lvl4pPr marL="1371600" indent="0">
+              <a:defRPr sz="2667"/>
+            </a:lvl5pPr>
+            <a:lvl6pPr marL="3047924" indent="0">
               <a:buNone/>
-              <a:defRPr sz="2000"/>
-            </a:lvl4pPr>
-            <a:lvl5pPr marL="1828800" indent="0">
+              <a:defRPr sz="2667"/>
+            </a:lvl6pPr>
+            <a:lvl7pPr marL="3657509" indent="0">
               <a:buNone/>
-              <a:defRPr sz="2000"/>
-            </a:lvl5pPr>
-            <a:lvl6pPr marL="2286000" indent="0">
+              <a:defRPr sz="2667"/>
+            </a:lvl7pPr>
+            <a:lvl8pPr marL="4267093" indent="0">
               <a:buNone/>
-              <a:defRPr sz="2000"/>
-            </a:lvl6pPr>
-            <a:lvl7pPr marL="2743200" indent="0">
+              <a:defRPr sz="2667"/>
+            </a:lvl8pPr>
+            <a:lvl9pPr marL="4876678" indent="0">
               <a:buNone/>
-              <a:defRPr sz="2000"/>
-            </a:lvl7pPr>
-            <a:lvl8pPr marL="3200400" indent="0">
-              <a:buNone/>
-              <a:defRPr sz="2000"/>
-            </a:lvl8pPr>
-            <a:lvl9pPr marL="3657600" indent="0">
-              <a:buNone/>
-              <a:defRPr sz="2000"/>
+              <a:defRPr sz="2667"/>
             </a:lvl9pPr>
           </a:lstStyle>
           <a:p>
-            <a:endParaRPr kumimoji="1" lang="zh-CN" altLang="en-US"/>
+            <a:r>
+              <a:rPr lang="zh-CN" altLang="en-US"/>
+              <a:t>单击图标添加图片</a:t>
+            </a:r>
+            <a:endParaRPr lang="en-US" dirty="0"/>
           </a:p>
         </p:txBody>
       </p:sp>
       <p:sp>
         <p:nvSpPr>
-          <p:cNvPr id="4" name="文本占位符 3">
-            <a:extLst>
-              <a:ext uri="{FF2B5EF4-FFF2-40B4-BE49-F238E27FC236}">
-                <a16:creationId xmlns:a16="http://schemas.microsoft.com/office/drawing/2014/main" id="{B3BF8C9E-6687-FEF3-A251-8DBED1225D72}"/>
-              </a:ext>
-            </a:extLst>
-          </p:cNvPr>
+          <p:cNvPr id="4" name="Text Placeholder 3"/>
           <p:cNvSpPr>
             <a:spLocks noGrp="1"/>
           </p:cNvSpPr>
@@ -2603,8 +2294,8 @@
         </p:nvSpPr>
         <p:spPr>
           <a:xfrm>
-            <a:off x="839788" y="2057400"/>
-            <a:ext cx="3932237" cy="3811588"/>
+            <a:off x="839788" y="3239929"/>
+            <a:ext cx="3932237" cy="6002369"/>
           </a:xfrm>
         </p:spPr>
         <p:txBody>
@@ -2612,45 +2303,45 @@
           <a:lstStyle>
             <a:lvl1pPr marL="0" indent="0">
               <a:buNone/>
+              <a:defRPr sz="2133"/>
+            </a:lvl1pPr>
+            <a:lvl2pPr marL="609585" indent="0">
+              <a:buNone/>
+              <a:defRPr sz="1867"/>
+            </a:lvl2pPr>
+            <a:lvl3pPr marL="1219170" indent="0">
+              <a:buNone/>
               <a:defRPr sz="1600"/>
-            </a:lvl1pPr>
-            <a:lvl2pPr marL="457200" indent="0">
+            </a:lvl3pPr>
+            <a:lvl4pPr marL="1828754" indent="0">
               <a:buNone/>
-              <a:defRPr sz="1400"/>
-            </a:lvl2pPr>
-            <a:lvl3pPr marL="914400" indent="0">
+              <a:defRPr sz="1333"/>
+            </a:lvl4pPr>
+            <a:lvl5pPr marL="2438339" indent="0">
               <a:buNone/>
-              <a:defRPr sz="1200"/>
-            </a:lvl3pPr>
-            <a:lvl4pPr marL="1371600" indent="0">
+              <a:defRPr sz="1333"/>
+            </a:lvl5pPr>
+            <a:lvl6pPr marL="3047924" indent="0">
               <a:buNone/>
-              <a:defRPr sz="1000"/>
-            </a:lvl4pPr>
-            <a:lvl5pPr marL="1828800" indent="0">
+              <a:defRPr sz="1333"/>
+            </a:lvl6pPr>
+            <a:lvl7pPr marL="3657509" indent="0">
               <a:buNone/>
-              <a:defRPr sz="1000"/>
-            </a:lvl5pPr>
-            <a:lvl6pPr marL="2286000" indent="0">
+              <a:defRPr sz="1333"/>
+            </a:lvl7pPr>
+            <a:lvl8pPr marL="4267093" indent="0">
               <a:buNone/>
-              <a:defRPr sz="1000"/>
-            </a:lvl6pPr>
-            <a:lvl7pPr marL="2743200" indent="0">
+              <a:defRPr sz="1333"/>
+            </a:lvl8pPr>
+            <a:lvl9pPr marL="4876678" indent="0">
               <a:buNone/>
-              <a:defRPr sz="1000"/>
-            </a:lvl7pPr>
-            <a:lvl8pPr marL="3200400" indent="0">
-              <a:buNone/>
-              <a:defRPr sz="1000"/>
-            </a:lvl8pPr>
-            <a:lvl9pPr marL="3657600" indent="0">
-              <a:buNone/>
-              <a:defRPr sz="1000"/>
+              <a:defRPr sz="1333"/>
             </a:lvl9pPr>
           </a:lstStyle>
           <a:p>
             <a:pPr lvl="0"/>
             <a:r>
-              <a:rPr kumimoji="1" lang="zh-CN" altLang="en-US"/>
+              <a:rPr lang="zh-CN" altLang="en-US"/>
               <a:t>单击此处编辑母版文本样式</a:t>
             </a:r>
           </a:p>
@@ -2658,13 +2349,7 @@
       </p:sp>
       <p:sp>
         <p:nvSpPr>
-          <p:cNvPr id="5" name="日期占位符 4">
-            <a:extLst>
-              <a:ext uri="{FF2B5EF4-FFF2-40B4-BE49-F238E27FC236}">
-                <a16:creationId xmlns:a16="http://schemas.microsoft.com/office/drawing/2014/main" id="{43628064-512F-9B7D-1D74-F70B0F480F01}"/>
-              </a:ext>
-            </a:extLst>
-          </p:cNvPr>
+          <p:cNvPr id="5" name="Date Placeholder 4"/>
           <p:cNvSpPr>
             <a:spLocks noGrp="1"/>
           </p:cNvSpPr>
@@ -2679,7 +2364,7 @@
           <a:p>
             <a:fld id="{ADEA6865-5F8B-9C4A-950D-1D161D0F2BB5}" type="datetimeFigureOut">
               <a:rPr kumimoji="1" lang="zh-CN" altLang="en-US" smtClean="0"/>
-              <a:t>2022/5/20</a:t>
+              <a:t>2022/6/8</a:t>
             </a:fld>
             <a:endParaRPr kumimoji="1" lang="zh-CN" altLang="en-US"/>
           </a:p>
@@ -2687,13 +2372,7 @@
       </p:sp>
       <p:sp>
         <p:nvSpPr>
-          <p:cNvPr id="6" name="页脚占位符 5">
-            <a:extLst>
-              <a:ext uri="{FF2B5EF4-FFF2-40B4-BE49-F238E27FC236}">
-                <a16:creationId xmlns:a16="http://schemas.microsoft.com/office/drawing/2014/main" id="{91E07B8F-266D-C109-E6A6-77A0EB5407D7}"/>
-              </a:ext>
-            </a:extLst>
-          </p:cNvPr>
+          <p:cNvPr id="6" name="Footer Placeholder 5"/>
           <p:cNvSpPr>
             <a:spLocks noGrp="1"/>
           </p:cNvSpPr>
@@ -2712,13 +2391,7 @@
       </p:sp>
       <p:sp>
         <p:nvSpPr>
-          <p:cNvPr id="7" name="灯片编号占位符 6">
-            <a:extLst>
-              <a:ext uri="{FF2B5EF4-FFF2-40B4-BE49-F238E27FC236}">
-                <a16:creationId xmlns:a16="http://schemas.microsoft.com/office/drawing/2014/main" id="{F61FEDF4-0C44-A444-9C99-EDCBEA2870C8}"/>
-              </a:ext>
-            </a:extLst>
-          </p:cNvPr>
+          <p:cNvPr id="7" name="Slide Number Placeholder 6"/>
           <p:cNvSpPr>
             <a:spLocks noGrp="1"/>
           </p:cNvSpPr>
@@ -2742,7 +2415,7 @@
     </p:spTree>
     <p:extLst>
       <p:ext uri="{BB962C8B-B14F-4D97-AF65-F5344CB8AC3E}">
-        <p14:creationId xmlns:p14="http://schemas.microsoft.com/office/powerpoint/2010/main" val="3146530542"/>
+        <p14:creationId xmlns:p14="http://schemas.microsoft.com/office/powerpoint/2010/main" val="4078266784"/>
       </p:ext>
     </p:extLst>
   </p:cSld>
@@ -2776,13 +2449,7 @@
       </p:grpSpPr>
       <p:sp>
         <p:nvSpPr>
-          <p:cNvPr id="2" name="标题占位符 1">
-            <a:extLst>
-              <a:ext uri="{FF2B5EF4-FFF2-40B4-BE49-F238E27FC236}">
-                <a16:creationId xmlns:a16="http://schemas.microsoft.com/office/drawing/2014/main" id="{59BCBDCE-B001-D715-3FCE-A28DDCC3B47B}"/>
-              </a:ext>
-            </a:extLst>
-          </p:cNvPr>
+          <p:cNvPr id="2" name="Title Placeholder 1"/>
           <p:cNvSpPr>
             <a:spLocks noGrp="1"/>
           </p:cNvSpPr>
@@ -2792,8 +2459,8 @@
         </p:nvSpPr>
         <p:spPr>
           <a:xfrm>
-            <a:off x="838200" y="365125"/>
-            <a:ext cx="10515600" cy="1325563"/>
+            <a:off x="838200" y="574990"/>
+            <a:ext cx="10515600" cy="2087455"/>
           </a:xfrm>
           <a:prstGeom prst="rect">
             <a:avLst/>
@@ -2806,21 +2473,16 @@
           <a:lstStyle/>
           <a:p>
             <a:r>
-              <a:rPr kumimoji="1" lang="zh-CN" altLang="en-US"/>
+              <a:rPr lang="zh-CN" altLang="en-US"/>
               <a:t>单击此处编辑母版标题样式</a:t>
             </a:r>
+            <a:endParaRPr lang="en-US" dirty="0"/>
           </a:p>
         </p:txBody>
       </p:sp>
       <p:sp>
         <p:nvSpPr>
-          <p:cNvPr id="3" name="文本占位符 2">
-            <a:extLst>
-              <a:ext uri="{FF2B5EF4-FFF2-40B4-BE49-F238E27FC236}">
-                <a16:creationId xmlns:a16="http://schemas.microsoft.com/office/drawing/2014/main" id="{BF107A62-AA95-5018-EB08-7F7A9C0AA8E1}"/>
-              </a:ext>
-            </a:extLst>
-          </p:cNvPr>
+          <p:cNvPr id="3" name="Text Placeholder 2"/>
           <p:cNvSpPr>
             <a:spLocks noGrp="1"/>
           </p:cNvSpPr>
@@ -2830,8 +2492,8 @@
         </p:nvSpPr>
         <p:spPr>
           <a:xfrm>
-            <a:off x="838200" y="1825625"/>
-            <a:ext cx="10515600" cy="4351338"/>
+            <a:off x="838200" y="2874937"/>
+            <a:ext cx="10515600" cy="6852350"/>
           </a:xfrm>
           <a:prstGeom prst="rect">
             <a:avLst/>
@@ -2845,49 +2507,44 @@
           <a:p>
             <a:pPr lvl="0"/>
             <a:r>
-              <a:rPr kumimoji="1" lang="zh-CN" altLang="en-US"/>
+              <a:rPr lang="zh-CN" altLang="en-US"/>
               <a:t>单击此处编辑母版文本样式</a:t>
             </a:r>
           </a:p>
           <a:p>
             <a:pPr lvl="1"/>
             <a:r>
-              <a:rPr kumimoji="1" lang="zh-CN" altLang="en-US"/>
+              <a:rPr lang="zh-CN" altLang="en-US"/>
               <a:t>二级</a:t>
             </a:r>
           </a:p>
           <a:p>
             <a:pPr lvl="2"/>
             <a:r>
-              <a:rPr kumimoji="1" lang="zh-CN" altLang="en-US"/>
+              <a:rPr lang="zh-CN" altLang="en-US"/>
               <a:t>三级</a:t>
             </a:r>
           </a:p>
           <a:p>
             <a:pPr lvl="3"/>
             <a:r>
-              <a:rPr kumimoji="1" lang="zh-CN" altLang="en-US"/>
+              <a:rPr lang="zh-CN" altLang="en-US"/>
               <a:t>四级</a:t>
             </a:r>
           </a:p>
           <a:p>
             <a:pPr lvl="4"/>
             <a:r>
-              <a:rPr kumimoji="1" lang="zh-CN" altLang="en-US"/>
+              <a:rPr lang="zh-CN" altLang="en-US"/>
               <a:t>五级</a:t>
             </a:r>
+            <a:endParaRPr lang="en-US" dirty="0"/>
           </a:p>
         </p:txBody>
       </p:sp>
       <p:sp>
         <p:nvSpPr>
-          <p:cNvPr id="4" name="日期占位符 3">
-            <a:extLst>
-              <a:ext uri="{FF2B5EF4-FFF2-40B4-BE49-F238E27FC236}">
-                <a16:creationId xmlns:a16="http://schemas.microsoft.com/office/drawing/2014/main" id="{00485207-506E-EC8B-E764-78843367C7A0}"/>
-              </a:ext>
-            </a:extLst>
-          </p:cNvPr>
+          <p:cNvPr id="4" name="Date Placeholder 3"/>
           <p:cNvSpPr>
             <a:spLocks noGrp="1"/>
           </p:cNvSpPr>
@@ -2897,8 +2554,8 @@
         </p:nvSpPr>
         <p:spPr>
           <a:xfrm>
-            <a:off x="838200" y="6356350"/>
-            <a:ext cx="2743200" cy="365125"/>
+            <a:off x="838200" y="10009783"/>
+            <a:ext cx="2743200" cy="574987"/>
           </a:xfrm>
           <a:prstGeom prst="rect">
             <a:avLst/>
@@ -2908,7 +2565,7 @@
           <a:bodyPr vert="horz" lIns="91440" tIns="45720" rIns="91440" bIns="45720" rtlCol="0" anchor="ctr"/>
           <a:lstStyle>
             <a:lvl1pPr algn="l">
-              <a:defRPr sz="1200">
+              <a:defRPr sz="1600">
                 <a:solidFill>
                   <a:schemeClr val="tx1">
                     <a:tint val="75000"/>
@@ -2920,7 +2577,7 @@
           <a:p>
             <a:fld id="{ADEA6865-5F8B-9C4A-950D-1D161D0F2BB5}" type="datetimeFigureOut">
               <a:rPr kumimoji="1" lang="zh-CN" altLang="en-US" smtClean="0"/>
-              <a:t>2022/5/20</a:t>
+              <a:t>2022/6/8</a:t>
             </a:fld>
             <a:endParaRPr kumimoji="1" lang="zh-CN" altLang="en-US"/>
           </a:p>
@@ -2928,13 +2585,7 @@
       </p:sp>
       <p:sp>
         <p:nvSpPr>
-          <p:cNvPr id="5" name="页脚占位符 4">
-            <a:extLst>
-              <a:ext uri="{FF2B5EF4-FFF2-40B4-BE49-F238E27FC236}">
-                <a16:creationId xmlns:a16="http://schemas.microsoft.com/office/drawing/2014/main" id="{9522AF93-5910-D207-3348-364A877D753A}"/>
-              </a:ext>
-            </a:extLst>
-          </p:cNvPr>
+          <p:cNvPr id="5" name="Footer Placeholder 4"/>
           <p:cNvSpPr>
             <a:spLocks noGrp="1"/>
           </p:cNvSpPr>
@@ -2944,8 +2595,8 @@
         </p:nvSpPr>
         <p:spPr>
           <a:xfrm>
-            <a:off x="4038600" y="6356350"/>
-            <a:ext cx="4114800" cy="365125"/>
+            <a:off x="4038600" y="10009783"/>
+            <a:ext cx="4114800" cy="574987"/>
           </a:xfrm>
           <a:prstGeom prst="rect">
             <a:avLst/>
@@ -2955,7 +2606,7 @@
           <a:bodyPr vert="horz" lIns="91440" tIns="45720" rIns="91440" bIns="45720" rtlCol="0" anchor="ctr"/>
           <a:lstStyle>
             <a:lvl1pPr algn="ctr">
-              <a:defRPr sz="1200">
+              <a:defRPr sz="1600">
                 <a:solidFill>
                   <a:schemeClr val="tx1">
                     <a:tint val="75000"/>
@@ -2971,13 +2622,7 @@
       </p:sp>
       <p:sp>
         <p:nvSpPr>
-          <p:cNvPr id="6" name="灯片编号占位符 5">
-            <a:extLst>
-              <a:ext uri="{FF2B5EF4-FFF2-40B4-BE49-F238E27FC236}">
-                <a16:creationId xmlns:a16="http://schemas.microsoft.com/office/drawing/2014/main" id="{21FA9DEC-FC16-8F79-849E-70BA32ADE588}"/>
-              </a:ext>
-            </a:extLst>
-          </p:cNvPr>
+          <p:cNvPr id="6" name="Slide Number Placeholder 5"/>
           <p:cNvSpPr>
             <a:spLocks noGrp="1"/>
           </p:cNvSpPr>
@@ -2987,8 +2632,8 @@
         </p:nvSpPr>
         <p:spPr>
           <a:xfrm>
-            <a:off x="8610600" y="6356350"/>
-            <a:ext cx="2743200" cy="365125"/>
+            <a:off x="8610600" y="10009783"/>
+            <a:ext cx="2743200" cy="574987"/>
           </a:xfrm>
           <a:prstGeom prst="rect">
             <a:avLst/>
@@ -2998,7 +2643,7 @@
           <a:bodyPr vert="horz" lIns="91440" tIns="45720" rIns="91440" bIns="45720" rtlCol="0" anchor="ctr"/>
           <a:lstStyle>
             <a:lvl1pPr algn="r">
-              <a:defRPr sz="1200">
+              <a:defRPr sz="1600">
                 <a:solidFill>
                   <a:schemeClr val="tx1">
                     <a:tint val="75000"/>
@@ -3019,27 +2664,27 @@
     </p:spTree>
     <p:extLst>
       <p:ext uri="{BB962C8B-B14F-4D97-AF65-F5344CB8AC3E}">
-        <p14:creationId xmlns:p14="http://schemas.microsoft.com/office/powerpoint/2010/main" val="2730953768"/>
+        <p14:creationId xmlns:p14="http://schemas.microsoft.com/office/powerpoint/2010/main" val="1763384782"/>
       </p:ext>
     </p:extLst>
   </p:cSld>
   <p:clrMap bg1="lt1" tx1="dk1" bg2="lt2" tx2="dk2" accent1="accent1" accent2="accent2" accent3="accent3" accent4="accent4" accent5="accent5" accent6="accent6" hlink="hlink" folHlink="folHlink"/>
   <p:sldLayoutIdLst>
-    <p:sldLayoutId id="2147483649" r:id="rId1"/>
-    <p:sldLayoutId id="2147483650" r:id="rId2"/>
-    <p:sldLayoutId id="2147483651" r:id="rId3"/>
-    <p:sldLayoutId id="2147483652" r:id="rId4"/>
-    <p:sldLayoutId id="2147483653" r:id="rId5"/>
-    <p:sldLayoutId id="2147483654" r:id="rId6"/>
-    <p:sldLayoutId id="2147483655" r:id="rId7"/>
-    <p:sldLayoutId id="2147483656" r:id="rId8"/>
-    <p:sldLayoutId id="2147483657" r:id="rId9"/>
-    <p:sldLayoutId id="2147483658" r:id="rId10"/>
-    <p:sldLayoutId id="2147483659" r:id="rId11"/>
+    <p:sldLayoutId id="2147483661" r:id="rId1"/>
+    <p:sldLayoutId id="2147483662" r:id="rId2"/>
+    <p:sldLayoutId id="2147483663" r:id="rId3"/>
+    <p:sldLayoutId id="2147483664" r:id="rId4"/>
+    <p:sldLayoutId id="2147483665" r:id="rId5"/>
+    <p:sldLayoutId id="2147483666" r:id="rId6"/>
+    <p:sldLayoutId id="2147483667" r:id="rId7"/>
+    <p:sldLayoutId id="2147483668" r:id="rId8"/>
+    <p:sldLayoutId id="2147483669" r:id="rId9"/>
+    <p:sldLayoutId id="2147483670" r:id="rId10"/>
+    <p:sldLayoutId id="2147483671" r:id="rId11"/>
   </p:sldLayoutIdLst>
   <p:txStyles>
     <p:titleStyle>
-      <a:lvl1pPr algn="l" defTabSz="914400" rtl="0" eaLnBrk="1" latinLnBrk="0" hangingPunct="1">
+      <a:lvl1pPr algn="l" defTabSz="1219170" rtl="0" eaLnBrk="1" latinLnBrk="0" hangingPunct="1">
         <a:lnSpc>
           <a:spcPct val="90000"/>
         </a:lnSpc>
@@ -3047,7 +2692,7 @@
           <a:spcPct val="0"/>
         </a:spcBef>
         <a:buNone/>
-        <a:defRPr sz="4400" kern="1200">
+        <a:defRPr sz="5867" kern="1200">
           <a:solidFill>
             <a:schemeClr val="tx1"/>
           </a:solidFill>
@@ -3058,16 +2703,16 @@
       </a:lvl1pPr>
     </p:titleStyle>
     <p:bodyStyle>
-      <a:lvl1pPr marL="228600" indent="-228600" algn="l" defTabSz="914400" rtl="0" eaLnBrk="1" latinLnBrk="0" hangingPunct="1">
+      <a:lvl1pPr marL="304792" indent="-304792" algn="l" defTabSz="1219170" rtl="0" eaLnBrk="1" latinLnBrk="0" hangingPunct="1">
         <a:lnSpc>
           <a:spcPct val="90000"/>
         </a:lnSpc>
         <a:spcBef>
-          <a:spcPts val="1000"/>
+          <a:spcPts val="1333"/>
         </a:spcBef>
         <a:buFont typeface="Arial" panose="020B0604020202020204" pitchFamily="34" charset="0"/>
         <a:buChar char="•"/>
-        <a:defRPr sz="2800" kern="1200">
+        <a:defRPr sz="3733" kern="1200">
           <a:solidFill>
             <a:schemeClr val="tx1"/>
           </a:solidFill>
@@ -3076,12 +2721,48 @@
           <a:cs typeface="+mn-cs"/>
         </a:defRPr>
       </a:lvl1pPr>
-      <a:lvl2pPr marL="685800" indent="-228600" algn="l" defTabSz="914400" rtl="0" eaLnBrk="1" latinLnBrk="0" hangingPunct="1">
+      <a:lvl2pPr marL="914377" indent="-304792" algn="l" defTabSz="1219170" rtl="0" eaLnBrk="1" latinLnBrk="0" hangingPunct="1">
         <a:lnSpc>
           <a:spcPct val="90000"/>
         </a:lnSpc>
         <a:spcBef>
-          <a:spcPts val="500"/>
+          <a:spcPts val="667"/>
+        </a:spcBef>
+        <a:buFont typeface="Arial" panose="020B0604020202020204" pitchFamily="34" charset="0"/>
+        <a:buChar char="•"/>
+        <a:defRPr sz="3200" kern="1200">
+          <a:solidFill>
+            <a:schemeClr val="tx1"/>
+          </a:solidFill>
+          <a:latin typeface="+mn-lt"/>
+          <a:ea typeface="+mn-ea"/>
+          <a:cs typeface="+mn-cs"/>
+        </a:defRPr>
+      </a:lvl2pPr>
+      <a:lvl3pPr marL="1523962" indent="-304792" algn="l" defTabSz="1219170" rtl="0" eaLnBrk="1" latinLnBrk="0" hangingPunct="1">
+        <a:lnSpc>
+          <a:spcPct val="90000"/>
+        </a:lnSpc>
+        <a:spcBef>
+          <a:spcPts val="667"/>
+        </a:spcBef>
+        <a:buFont typeface="Arial" panose="020B0604020202020204" pitchFamily="34" charset="0"/>
+        <a:buChar char="•"/>
+        <a:defRPr sz="2667" kern="1200">
+          <a:solidFill>
+            <a:schemeClr val="tx1"/>
+          </a:solidFill>
+          <a:latin typeface="+mn-lt"/>
+          <a:ea typeface="+mn-ea"/>
+          <a:cs typeface="+mn-cs"/>
+        </a:defRPr>
+      </a:lvl3pPr>
+      <a:lvl4pPr marL="2133547" indent="-304792" algn="l" defTabSz="1219170" rtl="0" eaLnBrk="1" latinLnBrk="0" hangingPunct="1">
+        <a:lnSpc>
+          <a:spcPct val="90000"/>
+        </a:lnSpc>
+        <a:spcBef>
+          <a:spcPts val="667"/>
         </a:spcBef>
         <a:buFont typeface="Arial" panose="020B0604020202020204" pitchFamily="34" charset="0"/>
         <a:buChar char="•"/>
@@ -3093,53 +2774,17 @@
           <a:ea typeface="+mn-ea"/>
           <a:cs typeface="+mn-cs"/>
         </a:defRPr>
-      </a:lvl2pPr>
-      <a:lvl3pPr marL="1143000" indent="-228600" algn="l" defTabSz="914400" rtl="0" eaLnBrk="1" latinLnBrk="0" hangingPunct="1">
+      </a:lvl4pPr>
+      <a:lvl5pPr marL="2743131" indent="-304792" algn="l" defTabSz="1219170" rtl="0" eaLnBrk="1" latinLnBrk="0" hangingPunct="1">
         <a:lnSpc>
           <a:spcPct val="90000"/>
         </a:lnSpc>
         <a:spcBef>
-          <a:spcPts val="500"/>
+          <a:spcPts val="667"/>
         </a:spcBef>
         <a:buFont typeface="Arial" panose="020B0604020202020204" pitchFamily="34" charset="0"/>
         <a:buChar char="•"/>
-        <a:defRPr sz="2000" kern="1200">
-          <a:solidFill>
-            <a:schemeClr val="tx1"/>
-          </a:solidFill>
-          <a:latin typeface="+mn-lt"/>
-          <a:ea typeface="+mn-ea"/>
-          <a:cs typeface="+mn-cs"/>
-        </a:defRPr>
-      </a:lvl3pPr>
-      <a:lvl4pPr marL="1600200" indent="-228600" algn="l" defTabSz="914400" rtl="0" eaLnBrk="1" latinLnBrk="0" hangingPunct="1">
-        <a:lnSpc>
-          <a:spcPct val="90000"/>
-        </a:lnSpc>
-        <a:spcBef>
-          <a:spcPts val="500"/>
-        </a:spcBef>
-        <a:buFont typeface="Arial" panose="020B0604020202020204" pitchFamily="34" charset="0"/>
-        <a:buChar char="•"/>
-        <a:defRPr sz="1800" kern="1200">
-          <a:solidFill>
-            <a:schemeClr val="tx1"/>
-          </a:solidFill>
-          <a:latin typeface="+mn-lt"/>
-          <a:ea typeface="+mn-ea"/>
-          <a:cs typeface="+mn-cs"/>
-        </a:defRPr>
-      </a:lvl4pPr>
-      <a:lvl5pPr marL="2057400" indent="-228600" algn="l" defTabSz="914400" rtl="0" eaLnBrk="1" latinLnBrk="0" hangingPunct="1">
-        <a:lnSpc>
-          <a:spcPct val="90000"/>
-        </a:lnSpc>
-        <a:spcBef>
-          <a:spcPts val="500"/>
-        </a:spcBef>
-        <a:buFont typeface="Arial" panose="020B0604020202020204" pitchFamily="34" charset="0"/>
-        <a:buChar char="•"/>
-        <a:defRPr sz="1800" kern="1200">
+        <a:defRPr sz="2400" kern="1200">
           <a:solidFill>
             <a:schemeClr val="tx1"/>
           </a:solidFill>
@@ -3148,16 +2793,16 @@
           <a:cs typeface="+mn-cs"/>
         </a:defRPr>
       </a:lvl5pPr>
-      <a:lvl6pPr marL="2514600" indent="-228600" algn="l" defTabSz="914400" rtl="0" eaLnBrk="1" latinLnBrk="0" hangingPunct="1">
+      <a:lvl6pPr marL="3352716" indent="-304792" algn="l" defTabSz="1219170" rtl="0" eaLnBrk="1" latinLnBrk="0" hangingPunct="1">
         <a:lnSpc>
           <a:spcPct val="90000"/>
         </a:lnSpc>
         <a:spcBef>
-          <a:spcPts val="500"/>
+          <a:spcPts val="667"/>
         </a:spcBef>
         <a:buFont typeface="Arial" panose="020B0604020202020204" pitchFamily="34" charset="0"/>
         <a:buChar char="•"/>
-        <a:defRPr sz="1800" kern="1200">
+        <a:defRPr sz="2400" kern="1200">
           <a:solidFill>
             <a:schemeClr val="tx1"/>
           </a:solidFill>
@@ -3166,16 +2811,16 @@
           <a:cs typeface="+mn-cs"/>
         </a:defRPr>
       </a:lvl6pPr>
-      <a:lvl7pPr marL="2971800" indent="-228600" algn="l" defTabSz="914400" rtl="0" eaLnBrk="1" latinLnBrk="0" hangingPunct="1">
+      <a:lvl7pPr marL="3962301" indent="-304792" algn="l" defTabSz="1219170" rtl="0" eaLnBrk="1" latinLnBrk="0" hangingPunct="1">
         <a:lnSpc>
           <a:spcPct val="90000"/>
         </a:lnSpc>
         <a:spcBef>
-          <a:spcPts val="500"/>
+          <a:spcPts val="667"/>
         </a:spcBef>
         <a:buFont typeface="Arial" panose="020B0604020202020204" pitchFamily="34" charset="0"/>
         <a:buChar char="•"/>
-        <a:defRPr sz="1800" kern="1200">
+        <a:defRPr sz="2400" kern="1200">
           <a:solidFill>
             <a:schemeClr val="tx1"/>
           </a:solidFill>
@@ -3184,16 +2829,16 @@
           <a:cs typeface="+mn-cs"/>
         </a:defRPr>
       </a:lvl7pPr>
-      <a:lvl8pPr marL="3429000" indent="-228600" algn="l" defTabSz="914400" rtl="0" eaLnBrk="1" latinLnBrk="0" hangingPunct="1">
+      <a:lvl8pPr marL="4571886" indent="-304792" algn="l" defTabSz="1219170" rtl="0" eaLnBrk="1" latinLnBrk="0" hangingPunct="1">
         <a:lnSpc>
           <a:spcPct val="90000"/>
         </a:lnSpc>
         <a:spcBef>
-          <a:spcPts val="500"/>
+          <a:spcPts val="667"/>
         </a:spcBef>
         <a:buFont typeface="Arial" panose="020B0604020202020204" pitchFamily="34" charset="0"/>
         <a:buChar char="•"/>
-        <a:defRPr sz="1800" kern="1200">
+        <a:defRPr sz="2400" kern="1200">
           <a:solidFill>
             <a:schemeClr val="tx1"/>
           </a:solidFill>
@@ -3202,16 +2847,16 @@
           <a:cs typeface="+mn-cs"/>
         </a:defRPr>
       </a:lvl8pPr>
-      <a:lvl9pPr marL="3886200" indent="-228600" algn="l" defTabSz="914400" rtl="0" eaLnBrk="1" latinLnBrk="0" hangingPunct="1">
+      <a:lvl9pPr marL="5181470" indent="-304792" algn="l" defTabSz="1219170" rtl="0" eaLnBrk="1" latinLnBrk="0" hangingPunct="1">
         <a:lnSpc>
           <a:spcPct val="90000"/>
         </a:lnSpc>
         <a:spcBef>
-          <a:spcPts val="500"/>
+          <a:spcPts val="667"/>
         </a:spcBef>
         <a:buFont typeface="Arial" panose="020B0604020202020204" pitchFamily="34" charset="0"/>
         <a:buChar char="•"/>
-        <a:defRPr sz="1800" kern="1200">
+        <a:defRPr sz="2400" kern="1200">
           <a:solidFill>
             <a:schemeClr val="tx1"/>
           </a:solidFill>
@@ -3223,10 +2868,10 @@
     </p:bodyStyle>
     <p:otherStyle>
       <a:defPPr>
-        <a:defRPr lang="zh-CN"/>
+        <a:defRPr lang="en-US"/>
       </a:defPPr>
-      <a:lvl1pPr marL="0" algn="l" defTabSz="914400" rtl="0" eaLnBrk="1" latinLnBrk="0" hangingPunct="1">
-        <a:defRPr sz="1800" kern="1200">
+      <a:lvl1pPr marL="0" algn="l" defTabSz="1219170" rtl="0" eaLnBrk="1" latinLnBrk="0" hangingPunct="1">
+        <a:defRPr sz="2400" kern="1200">
           <a:solidFill>
             <a:schemeClr val="tx1"/>
           </a:solidFill>
@@ -3235,8 +2880,8 @@
           <a:cs typeface="+mn-cs"/>
         </a:defRPr>
       </a:lvl1pPr>
-      <a:lvl2pPr marL="457200" algn="l" defTabSz="914400" rtl="0" eaLnBrk="1" latinLnBrk="0" hangingPunct="1">
-        <a:defRPr sz="1800" kern="1200">
+      <a:lvl2pPr marL="609585" algn="l" defTabSz="1219170" rtl="0" eaLnBrk="1" latinLnBrk="0" hangingPunct="1">
+        <a:defRPr sz="2400" kern="1200">
           <a:solidFill>
             <a:schemeClr val="tx1"/>
           </a:solidFill>
@@ -3245,8 +2890,8 @@
           <a:cs typeface="+mn-cs"/>
         </a:defRPr>
       </a:lvl2pPr>
-      <a:lvl3pPr marL="914400" algn="l" defTabSz="914400" rtl="0" eaLnBrk="1" latinLnBrk="0" hangingPunct="1">
-        <a:defRPr sz="1800" kern="1200">
+      <a:lvl3pPr marL="1219170" algn="l" defTabSz="1219170" rtl="0" eaLnBrk="1" latinLnBrk="0" hangingPunct="1">
+        <a:defRPr sz="2400" kern="1200">
           <a:solidFill>
             <a:schemeClr val="tx1"/>
           </a:solidFill>
@@ -3255,8 +2900,8 @@
           <a:cs typeface="+mn-cs"/>
         </a:defRPr>
       </a:lvl3pPr>
-      <a:lvl4pPr marL="1371600" algn="l" defTabSz="914400" rtl="0" eaLnBrk="1" latinLnBrk="0" hangingPunct="1">
-        <a:defRPr sz="1800" kern="1200">
+      <a:lvl4pPr marL="1828754" algn="l" defTabSz="1219170" rtl="0" eaLnBrk="1" latinLnBrk="0" hangingPunct="1">
+        <a:defRPr sz="2400" kern="1200">
           <a:solidFill>
             <a:schemeClr val="tx1"/>
           </a:solidFill>
@@ -3265,8 +2910,8 @@
           <a:cs typeface="+mn-cs"/>
         </a:defRPr>
       </a:lvl4pPr>
-      <a:lvl5pPr marL="1828800" algn="l" defTabSz="914400" rtl="0" eaLnBrk="1" latinLnBrk="0" hangingPunct="1">
-        <a:defRPr sz="1800" kern="1200">
+      <a:lvl5pPr marL="2438339" algn="l" defTabSz="1219170" rtl="0" eaLnBrk="1" latinLnBrk="0" hangingPunct="1">
+        <a:defRPr sz="2400" kern="1200">
           <a:solidFill>
             <a:schemeClr val="tx1"/>
           </a:solidFill>
@@ -3275,8 +2920,8 @@
           <a:cs typeface="+mn-cs"/>
         </a:defRPr>
       </a:lvl5pPr>
-      <a:lvl6pPr marL="2286000" algn="l" defTabSz="914400" rtl="0" eaLnBrk="1" latinLnBrk="0" hangingPunct="1">
-        <a:defRPr sz="1800" kern="1200">
+      <a:lvl6pPr marL="3047924" algn="l" defTabSz="1219170" rtl="0" eaLnBrk="1" latinLnBrk="0" hangingPunct="1">
+        <a:defRPr sz="2400" kern="1200">
           <a:solidFill>
             <a:schemeClr val="tx1"/>
           </a:solidFill>
@@ -3285,8 +2930,8 @@
           <a:cs typeface="+mn-cs"/>
         </a:defRPr>
       </a:lvl6pPr>
-      <a:lvl7pPr marL="2743200" algn="l" defTabSz="914400" rtl="0" eaLnBrk="1" latinLnBrk="0" hangingPunct="1">
-        <a:defRPr sz="1800" kern="1200">
+      <a:lvl7pPr marL="3657509" algn="l" defTabSz="1219170" rtl="0" eaLnBrk="1" latinLnBrk="0" hangingPunct="1">
+        <a:defRPr sz="2400" kern="1200">
           <a:solidFill>
             <a:schemeClr val="tx1"/>
           </a:solidFill>
@@ -3295,8 +2940,8 @@
           <a:cs typeface="+mn-cs"/>
         </a:defRPr>
       </a:lvl7pPr>
-      <a:lvl8pPr marL="3200400" algn="l" defTabSz="914400" rtl="0" eaLnBrk="1" latinLnBrk="0" hangingPunct="1">
-        <a:defRPr sz="1800" kern="1200">
+      <a:lvl8pPr marL="4267093" algn="l" defTabSz="1219170" rtl="0" eaLnBrk="1" latinLnBrk="0" hangingPunct="1">
+        <a:defRPr sz="2400" kern="1200">
           <a:solidFill>
             <a:schemeClr val="tx1"/>
           </a:solidFill>
@@ -3305,8 +2950,8 @@
           <a:cs typeface="+mn-cs"/>
         </a:defRPr>
       </a:lvl8pPr>
-      <a:lvl9pPr marL="3657600" algn="l" defTabSz="914400" rtl="0" eaLnBrk="1" latinLnBrk="0" hangingPunct="1">
-        <a:defRPr sz="1800" kern="1200">
+      <a:lvl9pPr marL="4876678" algn="l" defTabSz="1219170" rtl="0" eaLnBrk="1" latinLnBrk="0" hangingPunct="1">
+        <a:defRPr sz="2400" kern="1200">
           <a:solidFill>
             <a:schemeClr val="tx1"/>
           </a:solidFill>
@@ -3351,7 +2996,7 @@
         </p:nvSpPr>
         <p:spPr>
           <a:xfrm>
-            <a:off x="3344467" y="2135070"/>
+            <a:off x="2778013" y="2184485"/>
             <a:ext cx="1128408" cy="340468"/>
           </a:xfrm>
           <a:prstGeom prst="roundRect">
@@ -3416,7 +3061,7 @@
         </p:nvSpPr>
         <p:spPr>
           <a:xfrm>
-            <a:off x="3344467" y="2753896"/>
+            <a:off x="2778013" y="2803593"/>
             <a:ext cx="1128408" cy="340468"/>
           </a:xfrm>
           <a:prstGeom prst="roundRect">
@@ -3481,7 +3126,7 @@
         </p:nvSpPr>
         <p:spPr>
           <a:xfrm>
-            <a:off x="3344467" y="3413597"/>
+            <a:off x="2778013" y="4041809"/>
             <a:ext cx="1128408" cy="340468"/>
           </a:xfrm>
           <a:prstGeom prst="roundRect">
@@ -3546,7 +3191,7 @@
         </p:nvSpPr>
         <p:spPr>
           <a:xfrm>
-            <a:off x="3344467" y="4042097"/>
+            <a:off x="2778013" y="4660917"/>
             <a:ext cx="1128408" cy="340468"/>
           </a:xfrm>
           <a:prstGeom prst="roundRect">
@@ -3611,7 +3256,7 @@
         </p:nvSpPr>
         <p:spPr>
           <a:xfrm>
-            <a:off x="3344467" y="4637733"/>
+            <a:off x="2778013" y="5280025"/>
             <a:ext cx="1128408" cy="340468"/>
           </a:xfrm>
           <a:prstGeom prst="roundRect">
@@ -3676,7 +3321,7 @@
         </p:nvSpPr>
         <p:spPr>
           <a:xfrm>
-            <a:off x="3344467" y="5229200"/>
+            <a:off x="2778013" y="5899133"/>
             <a:ext cx="1128408" cy="340468"/>
           </a:xfrm>
           <a:prstGeom prst="roundRect">
@@ -3741,7 +3386,7 @@
         </p:nvGrpSpPr>
         <p:grpSpPr>
           <a:xfrm>
-            <a:off x="1467028" y="1534042"/>
+            <a:off x="900575" y="1583457"/>
             <a:ext cx="524503" cy="500260"/>
             <a:chOff x="241936" y="701927"/>
             <a:chExt cx="524503" cy="500260"/>
@@ -3843,7 +3488,7 @@
         </p:nvGrpSpPr>
         <p:grpSpPr>
           <a:xfrm>
-            <a:off x="2173673" y="1534042"/>
+            <a:off x="1607220" y="1583458"/>
             <a:ext cx="495649" cy="493245"/>
             <a:chOff x="615190" y="701927"/>
             <a:chExt cx="495649" cy="493245"/>
@@ -3952,7 +3597,7 @@
         </p:nvGrpSpPr>
         <p:grpSpPr>
           <a:xfrm>
-            <a:off x="1388878" y="2052023"/>
+            <a:off x="822425" y="2101439"/>
             <a:ext cx="697627" cy="493245"/>
             <a:chOff x="1061603" y="701927"/>
             <a:chExt cx="697627" cy="493245"/>
@@ -4061,7 +3706,7 @@
         </p:nvGrpSpPr>
         <p:grpSpPr>
           <a:xfrm>
-            <a:off x="2029404" y="2052023"/>
+            <a:off x="1462951" y="2101439"/>
             <a:ext cx="784189" cy="493245"/>
             <a:chOff x="1788412" y="701927"/>
             <a:chExt cx="784189" cy="493245"/>
@@ -4163,7 +3808,7 @@
         </p:nvGrpSpPr>
         <p:grpSpPr>
           <a:xfrm>
-            <a:off x="1730888" y="5812022"/>
+            <a:off x="1164434" y="6481956"/>
             <a:ext cx="425116" cy="554565"/>
             <a:chOff x="223549" y="4788025"/>
             <a:chExt cx="425116" cy="554565"/>
@@ -4266,7 +3911,7 @@
         </p:nvGrpSpPr>
         <p:grpSpPr>
           <a:xfrm>
-            <a:off x="1185408" y="5255284"/>
+            <a:off x="618954" y="5925218"/>
             <a:ext cx="470000" cy="527055"/>
             <a:chOff x="846420" y="4791547"/>
             <a:chExt cx="470000" cy="527055"/>
@@ -4369,7 +4014,7 @@
         </p:nvGrpSpPr>
         <p:grpSpPr>
           <a:xfrm>
-            <a:off x="1734895" y="5284728"/>
+            <a:off x="1168441" y="5954662"/>
             <a:ext cx="417102" cy="503385"/>
             <a:chOff x="1339808" y="4839205"/>
             <a:chExt cx="417102" cy="503385"/>
@@ -4472,7 +4117,7 @@
         </p:nvGrpSpPr>
         <p:grpSpPr>
           <a:xfrm>
-            <a:off x="2174289" y="5205826"/>
+            <a:off x="1607835" y="5875760"/>
             <a:ext cx="587020" cy="583015"/>
             <a:chOff x="1803825" y="4693696"/>
             <a:chExt cx="587020" cy="583015"/>
@@ -4575,7 +4220,7 @@
         </p:nvGrpSpPr>
         <p:grpSpPr>
           <a:xfrm>
-            <a:off x="1082816" y="5846033"/>
+            <a:off x="516363" y="6515967"/>
             <a:ext cx="675185" cy="518677"/>
             <a:chOff x="2226015" y="4790679"/>
             <a:chExt cx="675185" cy="518677"/>
@@ -4678,7 +4323,7 @@
         </p:nvGrpSpPr>
         <p:grpSpPr>
           <a:xfrm>
-            <a:off x="2157458" y="5805264"/>
+            <a:off x="1591005" y="6475198"/>
             <a:ext cx="620683" cy="565709"/>
             <a:chOff x="4116932" y="5255034"/>
             <a:chExt cx="620683" cy="565709"/>
@@ -4781,7 +4426,7 @@
         </p:nvGrpSpPr>
         <p:grpSpPr>
           <a:xfrm>
-            <a:off x="2147224" y="2728621"/>
+            <a:off x="1580770" y="2778036"/>
             <a:ext cx="545342" cy="522398"/>
             <a:chOff x="1162963" y="1674063"/>
             <a:chExt cx="545342" cy="522398"/>
@@ -4931,7 +4576,7 @@
         </p:nvGrpSpPr>
         <p:grpSpPr>
           <a:xfrm>
-            <a:off x="2058332" y="3325399"/>
+            <a:off x="1491878" y="3995332"/>
             <a:ext cx="724878" cy="572682"/>
             <a:chOff x="1147446" y="2324148"/>
             <a:chExt cx="724878" cy="572682"/>
@@ -5058,7 +4703,7 @@
         </p:nvGrpSpPr>
         <p:grpSpPr>
           <a:xfrm>
-            <a:off x="2026198" y="3970089"/>
+            <a:off x="1459745" y="4640022"/>
             <a:ext cx="787395" cy="551362"/>
             <a:chOff x="1487713" y="3030733"/>
             <a:chExt cx="787395" cy="551362"/>
@@ -5185,7 +4830,7 @@
         </p:nvGrpSpPr>
         <p:grpSpPr>
           <a:xfrm>
-            <a:off x="1151344" y="4568896"/>
+            <a:off x="584891" y="5238829"/>
             <a:ext cx="380959" cy="577208"/>
             <a:chOff x="983973" y="3960891"/>
             <a:chExt cx="380959" cy="577208"/>
@@ -5288,7 +4933,7 @@
         </p:nvGrpSpPr>
         <p:grpSpPr>
           <a:xfrm>
-            <a:off x="1645766" y="4519058"/>
+            <a:off x="1079312" y="5188992"/>
             <a:ext cx="526106" cy="612953"/>
             <a:chOff x="1479129" y="3817424"/>
             <a:chExt cx="526106" cy="612953"/>
@@ -5406,7 +5051,7 @@
         </p:nvGrpSpPr>
         <p:grpSpPr>
           <a:xfrm>
-            <a:off x="2232786" y="4540003"/>
+            <a:off x="1666333" y="5209937"/>
             <a:ext cx="433493" cy="592555"/>
             <a:chOff x="2065415" y="3858155"/>
             <a:chExt cx="433493" cy="592555"/>
@@ -5527,7 +5172,7 @@
         </p:nvCxnSpPr>
         <p:spPr>
           <a:xfrm>
-            <a:off x="1119192" y="2601937"/>
+            <a:off x="552738" y="2651352"/>
             <a:ext cx="3348000" cy="0"/>
           </a:xfrm>
           <a:prstGeom prst="line">
@@ -5573,7 +5218,7 @@
         </p:nvCxnSpPr>
         <p:spPr>
           <a:xfrm>
-            <a:off x="1119192" y="3255107"/>
+            <a:off x="552738" y="3279512"/>
             <a:ext cx="3348000" cy="0"/>
           </a:xfrm>
           <a:prstGeom prst="line">
@@ -5619,7 +5264,7 @@
         </p:nvCxnSpPr>
         <p:spPr>
           <a:xfrm>
-            <a:off x="1119192" y="3898081"/>
+            <a:off x="552738" y="4535832"/>
             <a:ext cx="3348000" cy="0"/>
           </a:xfrm>
           <a:prstGeom prst="line">
@@ -5665,7 +5310,7 @@
         </p:nvCxnSpPr>
         <p:spPr>
           <a:xfrm>
-            <a:off x="1119192" y="4518810"/>
+            <a:off x="552738" y="5163992"/>
             <a:ext cx="3348000" cy="0"/>
           </a:xfrm>
           <a:prstGeom prst="line">
@@ -5711,7 +5356,7 @@
         </p:nvCxnSpPr>
         <p:spPr>
           <a:xfrm>
-            <a:off x="1119192" y="5122217"/>
+            <a:off x="552738" y="5792150"/>
             <a:ext cx="3348000" cy="0"/>
           </a:xfrm>
           <a:prstGeom prst="line">
@@ -5757,7 +5402,7 @@
         </p:nvCxnSpPr>
         <p:spPr>
           <a:xfrm flipH="1">
-            <a:off x="2813593" y="2241897"/>
+            <a:off x="2247140" y="2291312"/>
             <a:ext cx="357455" cy="0"/>
           </a:xfrm>
           <a:prstGeom prst="straightConnector1">
@@ -5798,7 +5443,7 @@
         </p:nvCxnSpPr>
         <p:spPr>
           <a:xfrm flipH="1">
-            <a:off x="2813593" y="2889969"/>
+            <a:off x="2247140" y="2939384"/>
             <a:ext cx="357455" cy="0"/>
           </a:xfrm>
           <a:prstGeom prst="straightConnector1">
@@ -5839,7 +5484,7 @@
         </p:nvCxnSpPr>
         <p:spPr>
           <a:xfrm flipH="1">
-            <a:off x="2813593" y="3610049"/>
+            <a:off x="2247140" y="4279982"/>
             <a:ext cx="357455" cy="0"/>
           </a:xfrm>
           <a:prstGeom prst="straightConnector1">
@@ -5880,7 +5525,7 @@
         </p:nvCxnSpPr>
         <p:spPr>
           <a:xfrm flipH="1">
-            <a:off x="2813593" y="4186113"/>
+            <a:off x="2247140" y="4856046"/>
             <a:ext cx="357455" cy="0"/>
           </a:xfrm>
           <a:prstGeom prst="straightConnector1">
@@ -5921,7 +5566,7 @@
         </p:nvCxnSpPr>
         <p:spPr>
           <a:xfrm flipH="1">
-            <a:off x="2813593" y="4834185"/>
+            <a:off x="2247140" y="5504118"/>
             <a:ext cx="357455" cy="0"/>
           </a:xfrm>
           <a:prstGeom prst="straightConnector1">
@@ -5962,7 +5607,7 @@
         </p:nvCxnSpPr>
         <p:spPr>
           <a:xfrm flipH="1">
-            <a:off x="2813593" y="5410249"/>
+            <a:off x="2247140" y="6080182"/>
             <a:ext cx="357455" cy="0"/>
           </a:xfrm>
           <a:prstGeom prst="straightConnector1">
@@ -6001,7 +5646,7 @@
         </p:nvSpPr>
         <p:spPr>
           <a:xfrm>
-            <a:off x="2842600" y="647595"/>
+            <a:off x="2284574" y="329360"/>
             <a:ext cx="1754391" cy="646331"/>
           </a:xfrm>
           <a:prstGeom prst="rect">
@@ -6050,7 +5695,7 @@
         </p:nvSpPr>
         <p:spPr>
           <a:xfrm>
-            <a:off x="6456040" y="647595"/>
+            <a:off x="6352144" y="291920"/>
             <a:ext cx="3182281" cy="646331"/>
           </a:xfrm>
           <a:prstGeom prst="rect">
@@ -6099,7 +5744,7 @@
         </p:nvGrpSpPr>
         <p:grpSpPr>
           <a:xfrm>
-            <a:off x="8683634" y="2381191"/>
+            <a:off x="8631869" y="3125860"/>
             <a:ext cx="470000" cy="679715"/>
             <a:chOff x="9372487" y="1367754"/>
             <a:chExt cx="470000" cy="679715"/>
@@ -6202,7 +5847,7 @@
         </p:nvGrpSpPr>
         <p:grpSpPr>
           <a:xfrm>
-            <a:off x="9418998" y="2384318"/>
+            <a:off x="9356535" y="3128986"/>
             <a:ext cx="583814" cy="676588"/>
             <a:chOff x="10160020" y="1361565"/>
             <a:chExt cx="583814" cy="676588"/>
@@ -6311,7 +5956,7 @@
         </p:nvGrpSpPr>
         <p:grpSpPr>
           <a:xfrm>
-            <a:off x="10125817" y="2339414"/>
+            <a:off x="10068687" y="3084082"/>
             <a:ext cx="676788" cy="721492"/>
             <a:chOff x="9372487" y="2082656"/>
             <a:chExt cx="676788" cy="721492"/>
@@ -6414,7 +6059,7 @@
         </p:nvGrpSpPr>
         <p:grpSpPr>
           <a:xfrm>
-            <a:off x="9333729" y="1496779"/>
+            <a:off x="9312453" y="2251597"/>
             <a:ext cx="671979" cy="736261"/>
             <a:chOff x="10076827" y="2062616"/>
             <a:chExt cx="671979" cy="736261"/>
@@ -6540,10 +6185,10 @@
         </p:nvGrpSpPr>
         <p:grpSpPr>
           <a:xfrm>
-            <a:off x="9473839" y="3220912"/>
-            <a:ext cx="474133" cy="664335"/>
-            <a:chOff x="10230401" y="3715563"/>
-            <a:chExt cx="474133" cy="664335"/>
+            <a:off x="9374425" y="3915743"/>
+            <a:ext cx="548034" cy="714173"/>
+            <a:chOff x="10230401" y="3665725"/>
+            <a:chExt cx="548034" cy="714173"/>
           </a:xfrm>
         </p:grpSpPr>
         <p:pic>
@@ -6568,8 +6213,8 @@
           </p:blipFill>
           <p:spPr>
             <a:xfrm>
-              <a:off x="10230401" y="3715563"/>
-              <a:ext cx="474133" cy="474133"/>
+              <a:off x="10230401" y="3665725"/>
+              <a:ext cx="548034" cy="548034"/>
             </a:xfrm>
             <a:prstGeom prst="rect">
               <a:avLst/>
@@ -6643,7 +6288,7 @@
         </p:nvGrpSpPr>
         <p:grpSpPr>
           <a:xfrm>
-            <a:off x="8469633" y="3220979"/>
+            <a:off x="8417868" y="3965647"/>
             <a:ext cx="898003" cy="664268"/>
             <a:chOff x="9935576" y="4496187"/>
             <a:chExt cx="898003" cy="664268"/>
@@ -6770,7 +6415,7 @@
         </p:nvGrpSpPr>
         <p:grpSpPr>
           <a:xfrm>
-            <a:off x="10141046" y="3188072"/>
+            <a:off x="10083916" y="3932741"/>
             <a:ext cx="646331" cy="697175"/>
             <a:chOff x="9317095" y="5490246"/>
             <a:chExt cx="646331" cy="697175"/>
@@ -6873,7 +6518,7 @@
         </p:nvGrpSpPr>
         <p:grpSpPr>
           <a:xfrm>
-            <a:off x="8683634" y="1487860"/>
+            <a:off x="8631869" y="2232528"/>
             <a:ext cx="470001" cy="755330"/>
             <a:chOff x="8715440" y="3658513"/>
             <a:chExt cx="470001" cy="755330"/>
@@ -6976,7 +6621,7 @@
         </p:nvSpPr>
         <p:spPr>
           <a:xfrm>
-            <a:off x="6558970" y="2316145"/>
+            <a:off x="6692819" y="2726227"/>
             <a:ext cx="1128408" cy="340468"/>
           </a:xfrm>
           <a:prstGeom prst="roundRect">
@@ -7041,7 +6686,7 @@
         </p:nvSpPr>
         <p:spPr>
           <a:xfrm>
-            <a:off x="6558970" y="2901055"/>
+            <a:off x="6692819" y="3311137"/>
             <a:ext cx="1128408" cy="340468"/>
           </a:xfrm>
           <a:prstGeom prst="roundRect">
@@ -7106,7 +6751,7 @@
         </p:nvSpPr>
         <p:spPr>
           <a:xfrm>
-            <a:off x="6558970" y="3520580"/>
+            <a:off x="6692819" y="3930662"/>
             <a:ext cx="1128408" cy="340468"/>
           </a:xfrm>
           <a:prstGeom prst="roundRect">
@@ -7171,10 +6816,10 @@
         </p:nvGrpSpPr>
         <p:grpSpPr>
           <a:xfrm>
-            <a:off x="10158440" y="1484784"/>
-            <a:ext cx="555546" cy="767184"/>
-            <a:chOff x="9854490" y="1725846"/>
-            <a:chExt cx="555546" cy="767184"/>
+            <a:off x="9400872" y="1440577"/>
+            <a:ext cx="495140" cy="718944"/>
+            <a:chOff x="9854490" y="1774086"/>
+            <a:chExt cx="495140" cy="718944"/>
           </a:xfrm>
         </p:grpSpPr>
         <p:pic>
@@ -7199,8 +6844,8 @@
           </p:blipFill>
           <p:spPr>
             <a:xfrm>
-              <a:off x="9854490" y="1725846"/>
-              <a:ext cx="555546" cy="555546"/>
+              <a:off x="9854490" y="1774086"/>
+              <a:ext cx="495140" cy="507305"/>
             </a:xfrm>
             <a:prstGeom prst="rect">
               <a:avLst/>
@@ -7221,7 +6866,7 @@
           </p:nvSpPr>
           <p:spPr>
             <a:xfrm>
-              <a:off x="9914896" y="2246809"/>
+              <a:off x="9884693" y="2246809"/>
               <a:ext cx="434734" cy="246221"/>
             </a:xfrm>
             <a:prstGeom prst="rect">
@@ -7269,13 +6914,15 @@
               </a:ext>
             </a:extLst>
           </p:cNvPr>
-          <p:cNvCxnSpPr/>
+          <p:cNvCxnSpPr>
+            <a:cxnSpLocks/>
+          </p:cNvCxnSpPr>
           <p:nvPr/>
         </p:nvCxnSpPr>
         <p:spPr>
           <a:xfrm>
-            <a:off x="7880971" y="2449868"/>
-            <a:ext cx="504056" cy="0"/>
+            <a:off x="7983583" y="2862485"/>
+            <a:ext cx="360000" cy="0"/>
           </a:xfrm>
           <a:prstGeom prst="straightConnector1">
             <a:avLst/>
@@ -7308,13 +6955,15 @@
               </a:ext>
             </a:extLst>
           </p:cNvPr>
-          <p:cNvCxnSpPr/>
+          <p:cNvCxnSpPr>
+            <a:cxnSpLocks/>
+          </p:cNvCxnSpPr>
           <p:nvPr/>
         </p:nvCxnSpPr>
         <p:spPr>
           <a:xfrm>
-            <a:off x="7890285" y="3071289"/>
-            <a:ext cx="504056" cy="0"/>
+            <a:off x="7992897" y="3483906"/>
+            <a:ext cx="360000" cy="0"/>
           </a:xfrm>
           <a:prstGeom prst="straightConnector1">
             <a:avLst/>
@@ -7347,13 +6996,15 @@
               </a:ext>
             </a:extLst>
           </p:cNvPr>
-          <p:cNvCxnSpPr/>
+          <p:cNvCxnSpPr>
+            <a:cxnSpLocks/>
+          </p:cNvCxnSpPr>
           <p:nvPr/>
         </p:nvCxnSpPr>
         <p:spPr>
           <a:xfrm>
-            <a:off x="7880971" y="3681643"/>
-            <a:ext cx="504056" cy="0"/>
+            <a:off x="7983583" y="4094260"/>
+            <a:ext cx="360000" cy="0"/>
           </a:xfrm>
           <a:prstGeom prst="straightConnector1">
             <a:avLst/>
@@ -7391,8 +7042,8 @@
         </p:nvSpPr>
         <p:spPr>
           <a:xfrm>
-            <a:off x="4998690" y="2826243"/>
-            <a:ext cx="1019896" cy="627835"/>
+            <a:off x="4628316" y="3147142"/>
+            <a:ext cx="1331242" cy="812579"/>
           </a:xfrm>
           <a:prstGeom prst="rightArrow">
             <a:avLst/>
@@ -7402,7 +7053,7 @@
           </a:solidFill>
           <a:ln>
             <a:solidFill>
-              <a:srgbClr val="2342BF"/>
+              <a:schemeClr val="bg1"/>
             </a:solidFill>
           </a:ln>
         </p:spPr>
@@ -7427,7 +7078,10 @@
           <a:lstStyle/>
           <a:p>
             <a:pPr algn="ctr"/>
-            <a:endParaRPr kumimoji="1" lang="zh-CN" altLang="en-US"/>
+            <a:endParaRPr kumimoji="1" lang="zh-CN" altLang="en-US" sz="1600" b="1" dirty="0">
+              <a:latin typeface="Open Sans" panose="020B0606030504020204" pitchFamily="34" charset="0"/>
+              <a:cs typeface="Open Sans" panose="020B0606030504020204" pitchFamily="34" charset="0"/>
+            </a:endParaRPr>
           </a:p>
         </p:txBody>
       </p:sp>
@@ -7445,10 +7099,10 @@
         </p:nvGrpSpPr>
         <p:grpSpPr>
           <a:xfrm>
-            <a:off x="8668246" y="3956036"/>
-            <a:ext cx="490840" cy="617447"/>
+            <a:off x="8621449" y="4700705"/>
+            <a:ext cx="490840" cy="639831"/>
             <a:chOff x="8624518" y="4844946"/>
-            <a:chExt cx="490840" cy="617447"/>
+            <a:chExt cx="490840" cy="639831"/>
           </a:xfrm>
         </p:grpSpPr>
         <p:pic>
@@ -7502,7 +7156,7 @@
           <p:spPr>
             <a:xfrm>
               <a:off x="8624518" y="5238556"/>
-              <a:ext cx="490840" cy="223837"/>
+              <a:ext cx="490840" cy="246221"/>
             </a:xfrm>
             <a:prstGeom prst="rect">
               <a:avLst/>
@@ -7554,10 +7208,10 @@
         </p:nvGrpSpPr>
         <p:grpSpPr>
           <a:xfrm>
-            <a:off x="9424816" y="3901137"/>
-            <a:ext cx="540533" cy="672256"/>
+            <a:off x="9378176" y="4645805"/>
+            <a:ext cx="540533" cy="694640"/>
             <a:chOff x="9412218" y="4790137"/>
-            <a:chExt cx="540533" cy="672256"/>
+            <a:chExt cx="540533" cy="694640"/>
           </a:xfrm>
         </p:grpSpPr>
         <p:pic>
@@ -7622,7 +7276,7 @@
           <p:spPr>
             <a:xfrm>
               <a:off x="9412218" y="5238556"/>
-              <a:ext cx="540533" cy="223837"/>
+              <a:ext cx="540533" cy="246221"/>
             </a:xfrm>
             <a:prstGeom prst="rect">
               <a:avLst/>
@@ -7674,10 +7328,10 @@
         </p:nvGrpSpPr>
         <p:grpSpPr>
           <a:xfrm>
-            <a:off x="10184042" y="3980438"/>
-            <a:ext cx="619080" cy="592955"/>
+            <a:off x="10097541" y="4725107"/>
+            <a:ext cx="619080" cy="615339"/>
             <a:chOff x="10171444" y="4869438"/>
-            <a:chExt cx="619080" cy="592955"/>
+            <a:chExt cx="619080" cy="615339"/>
           </a:xfrm>
         </p:grpSpPr>
         <p:pic>
@@ -7724,7 +7378,7 @@
           <p:spPr>
             <a:xfrm>
               <a:off x="10171444" y="5238556"/>
-              <a:ext cx="619080" cy="223837"/>
+              <a:ext cx="619080" cy="246221"/>
             </a:xfrm>
             <a:prstGeom prst="rect">
               <a:avLst/>
@@ -7764,60 +7418,6 @@
       </p:grpSp>
       <p:sp>
         <p:nvSpPr>
-          <p:cNvPr id="127" name="右箭头 126">
-            <a:extLst>
-              <a:ext uri="{FF2B5EF4-FFF2-40B4-BE49-F238E27FC236}">
-                <a16:creationId xmlns:a16="http://schemas.microsoft.com/office/drawing/2014/main" id="{19E1D767-BAD7-F201-EA8A-A6FB05F08DE0}"/>
-              </a:ext>
-            </a:extLst>
-          </p:cNvPr>
-          <p:cNvSpPr/>
-          <p:nvPr/>
-        </p:nvSpPr>
-        <p:spPr>
-          <a:xfrm>
-            <a:off x="4941093" y="4653136"/>
-            <a:ext cx="1019896" cy="627835"/>
-          </a:xfrm>
-          <a:prstGeom prst="rightArrow">
-            <a:avLst/>
-          </a:prstGeom>
-          <a:solidFill>
-            <a:srgbClr val="2342BF"/>
-          </a:solidFill>
-          <a:ln>
-            <a:solidFill>
-              <a:srgbClr val="2342BF"/>
-            </a:solidFill>
-          </a:ln>
-        </p:spPr>
-        <p:style>
-          <a:lnRef idx="2">
-            <a:schemeClr val="accent1">
-              <a:shade val="50000"/>
-            </a:schemeClr>
-          </a:lnRef>
-          <a:fillRef idx="1">
-            <a:schemeClr val="accent1"/>
-          </a:fillRef>
-          <a:effectRef idx="0">
-            <a:schemeClr val="accent1"/>
-          </a:effectRef>
-          <a:fontRef idx="minor">
-            <a:schemeClr val="lt1"/>
-          </a:fontRef>
-        </p:style>
-        <p:txBody>
-          <a:bodyPr rtlCol="0" anchor="ctr"/>
-          <a:lstStyle/>
-          <a:p>
-            <a:pPr algn="ctr"/>
-            <a:endParaRPr kumimoji="1" lang="zh-CN" altLang="en-US"/>
-          </a:p>
-        </p:txBody>
-      </p:sp>
-      <p:sp>
-        <p:nvSpPr>
           <p:cNvPr id="128" name="圆角矩形 127">
             <a:extLst>
               <a:ext uri="{FF2B5EF4-FFF2-40B4-BE49-F238E27FC236}">
@@ -7830,7 +7430,7 @@
         </p:nvSpPr>
         <p:spPr>
           <a:xfrm>
-            <a:off x="6558970" y="4869160"/>
+            <a:off x="6764895" y="5969059"/>
             <a:ext cx="1128408" cy="340468"/>
           </a:xfrm>
           <a:prstGeom prst="roundRect">
@@ -7895,7 +7495,7 @@
         </p:nvGrpSpPr>
         <p:grpSpPr>
           <a:xfrm>
-            <a:off x="8582501" y="4741739"/>
+            <a:off x="8472264" y="5828623"/>
             <a:ext cx="825867" cy="677862"/>
             <a:chOff x="1125642" y="682053"/>
             <a:chExt cx="569547" cy="467478"/>
@@ -8000,13 +7600,15 @@
               </a:ext>
             </a:extLst>
           </p:cNvPr>
-          <p:cNvCxnSpPr/>
+          <p:cNvCxnSpPr>
+            <a:cxnSpLocks/>
+          </p:cNvCxnSpPr>
           <p:nvPr/>
         </p:nvCxnSpPr>
         <p:spPr>
           <a:xfrm>
-            <a:off x="7935014" y="5054785"/>
-            <a:ext cx="504056" cy="0"/>
+            <a:off x="8017679" y="6151306"/>
+            <a:ext cx="360000" cy="0"/>
           </a:xfrm>
           <a:prstGeom prst="straightConnector1">
             <a:avLst/>
@@ -8046,13 +7648,13 @@
         </p:nvCxnSpPr>
         <p:spPr>
           <a:xfrm>
-            <a:off x="6558970" y="4637733"/>
+            <a:off x="6435812" y="5556776"/>
             <a:ext cx="4433574" cy="0"/>
           </a:xfrm>
           <a:prstGeom prst="line">
             <a:avLst/>
           </a:prstGeom>
-          <a:ln w="9525">
+          <a:ln w="12700">
             <a:solidFill>
               <a:schemeClr val="bg2">
                 <a:lumMod val="90000"/>
@@ -8090,7 +7692,7 @@
         </p:nvGrpSpPr>
         <p:grpSpPr>
           <a:xfrm>
-            <a:off x="10200456" y="4708868"/>
+            <a:off x="10108501" y="5795753"/>
             <a:ext cx="601448" cy="710733"/>
             <a:chOff x="9441498" y="4704429"/>
             <a:chExt cx="601448" cy="710733"/>
@@ -8196,7 +7798,7 @@
         </p:nvCxnSpPr>
         <p:spPr>
           <a:xfrm>
-            <a:off x="9470179" y="4995318"/>
+            <a:off x="9336360" y="6082202"/>
             <a:ext cx="586261" cy="0"/>
           </a:xfrm>
           <a:prstGeom prst="straightConnector1">
@@ -8221,6 +7823,734 @@
           </a:fontRef>
         </p:style>
       </p:cxnSp>
+      <p:sp>
+        <p:nvSpPr>
+          <p:cNvPr id="136" name="圆角矩形 135">
+            <a:extLst>
+              <a:ext uri="{FF2B5EF4-FFF2-40B4-BE49-F238E27FC236}">
+                <a16:creationId xmlns:a16="http://schemas.microsoft.com/office/drawing/2014/main" id="{39FAC72E-6D2C-FDB3-FC80-EF3ACAD26458}"/>
+              </a:ext>
+            </a:extLst>
+          </p:cNvPr>
+          <p:cNvSpPr/>
+          <p:nvPr/>
+        </p:nvSpPr>
+        <p:spPr>
+          <a:xfrm>
+            <a:off x="2778013" y="3422701"/>
+            <a:ext cx="1128408" cy="340468"/>
+          </a:xfrm>
+          <a:prstGeom prst="roundRect">
+            <a:avLst/>
+          </a:prstGeom>
+          <a:solidFill>
+            <a:srgbClr val="2342BF"/>
+          </a:solidFill>
+          <a:ln>
+            <a:solidFill>
+              <a:srgbClr val="2342BF"/>
+            </a:solidFill>
+          </a:ln>
+        </p:spPr>
+        <p:style>
+          <a:lnRef idx="2">
+            <a:schemeClr val="accent1">
+              <a:shade val="50000"/>
+            </a:schemeClr>
+          </a:lnRef>
+          <a:fillRef idx="1">
+            <a:schemeClr val="accent1"/>
+          </a:fillRef>
+          <a:effectRef idx="0">
+            <a:schemeClr val="accent1"/>
+          </a:effectRef>
+          <a:fontRef idx="minor">
+            <a:schemeClr val="lt1"/>
+          </a:fontRef>
+        </p:style>
+        <p:txBody>
+          <a:bodyPr rtlCol="0" anchor="ctr"/>
+          <a:lstStyle/>
+          <a:p>
+            <a:pPr algn="ctr"/>
+            <a:r>
+              <a:rPr kumimoji="1" lang="en-US" altLang="zh-CN" b="1" dirty="0">
+                <a:latin typeface="Open Sans" panose="020B0606030504020204" pitchFamily="34" charset="0"/>
+                <a:ea typeface="Open Sans" panose="020B0606030504020204" pitchFamily="34" charset="0"/>
+                <a:cs typeface="Open Sans" panose="020B0606030504020204" pitchFamily="34" charset="0"/>
+              </a:rPr>
+              <a:t>TLS</a:t>
+            </a:r>
+            <a:endParaRPr kumimoji="1" lang="zh-CN" altLang="en-US" b="1" dirty="0">
+              <a:latin typeface="Open Sans" panose="020B0606030504020204" pitchFamily="34" charset="0"/>
+              <a:cs typeface="Open Sans" panose="020B0606030504020204" pitchFamily="34" charset="0"/>
+            </a:endParaRPr>
+          </a:p>
+        </p:txBody>
+      </p:sp>
+      <p:cxnSp>
+        <p:nvCxnSpPr>
+          <p:cNvPr id="137" name="直线箭头连接符 136">
+            <a:extLst>
+              <a:ext uri="{FF2B5EF4-FFF2-40B4-BE49-F238E27FC236}">
+                <a16:creationId xmlns:a16="http://schemas.microsoft.com/office/drawing/2014/main" id="{83562DEC-3592-197F-5F6B-96B7FD166D03}"/>
+              </a:ext>
+            </a:extLst>
+          </p:cNvPr>
+          <p:cNvCxnSpPr>
+            <a:cxnSpLocks/>
+          </p:cNvCxnSpPr>
+          <p:nvPr/>
+        </p:nvCxnSpPr>
+        <p:spPr>
+          <a:xfrm flipH="1">
+            <a:off x="2280849" y="3631644"/>
+            <a:ext cx="357455" cy="0"/>
+          </a:xfrm>
+          <a:prstGeom prst="straightConnector1">
+            <a:avLst/>
+          </a:prstGeom>
+          <a:ln>
+            <a:tailEnd type="triangle"/>
+          </a:ln>
+        </p:spPr>
+        <p:style>
+          <a:lnRef idx="1">
+            <a:schemeClr val="accent1"/>
+          </a:lnRef>
+          <a:fillRef idx="0">
+            <a:schemeClr val="accent1"/>
+          </a:fillRef>
+          <a:effectRef idx="0">
+            <a:schemeClr val="accent1"/>
+          </a:effectRef>
+          <a:fontRef idx="minor">
+            <a:schemeClr val="tx1"/>
+          </a:fontRef>
+        </p:style>
+      </p:cxnSp>
+      <p:pic>
+        <p:nvPicPr>
+          <p:cNvPr id="1026" name="Picture 2" descr="SSL Toolkit — Powerful On Every Platform | Medium">
+            <a:extLst>
+              <a:ext uri="{FF2B5EF4-FFF2-40B4-BE49-F238E27FC236}">
+                <a16:creationId xmlns:a16="http://schemas.microsoft.com/office/drawing/2014/main" id="{B5B48984-91FE-8398-1C5D-891104A332A5}"/>
+              </a:ext>
+            </a:extLst>
+          </p:cNvPr>
+          <p:cNvPicPr>
+            <a:picLocks noChangeAspect="1" noChangeArrowheads="1"/>
+          </p:cNvPicPr>
+          <p:nvPr/>
+        </p:nvPicPr>
+        <p:blipFill>
+          <a:blip r:embed="rId37">
+            <a:extLst>
+              <a:ext uri="{28A0092B-C50C-407E-A947-70E740481C1C}">
+                <a14:useLocalDpi xmlns:a14="http://schemas.microsoft.com/office/drawing/2010/main" val="0"/>
+              </a:ext>
+            </a:extLst>
+          </a:blip>
+          <a:srcRect/>
+          <a:stretch>
+            <a:fillRect/>
+          </a:stretch>
+        </p:blipFill>
+        <p:spPr bwMode="auto">
+          <a:xfrm>
+            <a:off x="1549795" y="3344825"/>
+            <a:ext cx="595811" cy="595811"/>
+          </a:xfrm>
+          <a:prstGeom prst="rect">
+            <a:avLst/>
+          </a:prstGeom>
+          <a:noFill/>
+          <a:extLst>
+            <a:ext uri="{909E8E84-426E-40DD-AFC4-6F175D3DCCD1}">
+              <a14:hiddenFill xmlns:a14="http://schemas.microsoft.com/office/drawing/2010/main">
+                <a:solidFill>
+                  <a:srgbClr val="FFFFFF"/>
+                </a:solidFill>
+              </a14:hiddenFill>
+            </a:ext>
+          </a:extLst>
+        </p:spPr>
+      </p:pic>
+      <p:cxnSp>
+        <p:nvCxnSpPr>
+          <p:cNvPr id="139" name="直线连接符 138">
+            <a:extLst>
+              <a:ext uri="{FF2B5EF4-FFF2-40B4-BE49-F238E27FC236}">
+                <a16:creationId xmlns:a16="http://schemas.microsoft.com/office/drawing/2014/main" id="{BF246A40-B404-6549-4EC8-B8C38A5F7A11}"/>
+              </a:ext>
+            </a:extLst>
+          </p:cNvPr>
+          <p:cNvCxnSpPr>
+            <a:cxnSpLocks/>
+          </p:cNvCxnSpPr>
+          <p:nvPr/>
+        </p:nvCxnSpPr>
+        <p:spPr>
+          <a:xfrm>
+            <a:off x="552738" y="3907672"/>
+            <a:ext cx="3348000" cy="0"/>
+          </a:xfrm>
+          <a:prstGeom prst="line">
+            <a:avLst/>
+          </a:prstGeom>
+          <a:ln w="9525">
+            <a:solidFill>
+              <a:schemeClr val="bg2">
+                <a:lumMod val="90000"/>
+              </a:schemeClr>
+            </a:solidFill>
+            <a:prstDash val="dash"/>
+          </a:ln>
+        </p:spPr>
+        <p:style>
+          <a:lnRef idx="1">
+            <a:schemeClr val="accent1"/>
+          </a:lnRef>
+          <a:fillRef idx="0">
+            <a:schemeClr val="accent1"/>
+          </a:fillRef>
+          <a:effectRef idx="0">
+            <a:schemeClr val="accent1"/>
+          </a:effectRef>
+          <a:fontRef idx="minor">
+            <a:schemeClr val="tx1"/>
+          </a:fontRef>
+        </p:style>
+      </p:cxnSp>
+      <p:grpSp>
+        <p:nvGrpSpPr>
+          <p:cNvPr id="140" name="组合 139">
+            <a:extLst>
+              <a:ext uri="{FF2B5EF4-FFF2-40B4-BE49-F238E27FC236}">
+                <a16:creationId xmlns:a16="http://schemas.microsoft.com/office/drawing/2014/main" id="{41CB010A-C93A-326D-870D-7B2736FFE586}"/>
+              </a:ext>
+            </a:extLst>
+          </p:cNvPr>
+          <p:cNvGrpSpPr/>
+          <p:nvPr/>
+        </p:nvGrpSpPr>
+        <p:grpSpPr>
+          <a:xfrm>
+            <a:off x="8435501" y="1440578"/>
+            <a:ext cx="862737" cy="718943"/>
+            <a:chOff x="1147446" y="2208664"/>
+            <a:chExt cx="862737" cy="718943"/>
+          </a:xfrm>
+        </p:grpSpPr>
+        <p:pic>
+          <p:nvPicPr>
+            <p:cNvPr id="141" name="图片 140">
+              <a:extLst>
+                <a:ext uri="{FF2B5EF4-FFF2-40B4-BE49-F238E27FC236}">
+                  <a16:creationId xmlns:a16="http://schemas.microsoft.com/office/drawing/2014/main" id="{353311BF-C1D3-7693-C183-0881E63ED5FD}"/>
+                </a:ext>
+              </a:extLst>
+            </p:cNvPr>
+            <p:cNvPicPr>
+              <a:picLocks noChangeAspect="1"/>
+            </p:cNvPicPr>
+            <p:nvPr/>
+          </p:nvPicPr>
+          <p:blipFill>
+            <a:blip r:embed="rId15"/>
+            <a:stretch>
+              <a:fillRect/>
+            </a:stretch>
+          </p:blipFill>
+          <p:spPr>
+            <a:xfrm>
+              <a:off x="1353267" y="2208664"/>
+              <a:ext cx="451095" cy="515537"/>
+            </a:xfrm>
+            <a:prstGeom prst="rect">
+              <a:avLst/>
+            </a:prstGeom>
+          </p:spPr>
+        </p:pic>
+        <p:sp>
+          <p:nvSpPr>
+            <p:cNvPr id="142" name="文本框 141">
+              <a:extLst>
+                <a:ext uri="{FF2B5EF4-FFF2-40B4-BE49-F238E27FC236}">
+                  <a16:creationId xmlns:a16="http://schemas.microsoft.com/office/drawing/2014/main" id="{1E1FF3DB-C6AA-AD37-4948-722769DD97B6}"/>
+                </a:ext>
+              </a:extLst>
+            </p:cNvPr>
+            <p:cNvSpPr txBox="1"/>
+            <p:nvPr/>
+          </p:nvSpPr>
+          <p:spPr>
+            <a:xfrm>
+              <a:off x="1147446" y="2681386"/>
+              <a:ext cx="862737" cy="246221"/>
+            </a:xfrm>
+            <a:prstGeom prst="rect">
+              <a:avLst/>
+            </a:prstGeom>
+            <a:noFill/>
+          </p:spPr>
+          <p:txBody>
+            <a:bodyPr wrap="none" rtlCol="0">
+              <a:spAutoFit/>
+            </a:bodyPr>
+            <a:lstStyle/>
+            <a:p>
+              <a:r>
+                <a:rPr kumimoji="1" lang="en-US" altLang="zh-CN" sz="1000" dirty="0">
+                  <a:solidFill>
+                    <a:schemeClr val="tx1">
+                      <a:lumMod val="65000"/>
+                      <a:lumOff val="35000"/>
+                    </a:schemeClr>
+                  </a:solidFill>
+                  <a:latin typeface="Francois One" panose="02000503040000020004" pitchFamily="2" charset="0"/>
+                </a:rPr>
+                <a:t>Shell</a:t>
+              </a:r>
+              <a:r>
+                <a:rPr kumimoji="1" lang="zh-CN" altLang="en-US" sz="1000" dirty="0">
+                  <a:solidFill>
+                    <a:schemeClr val="tx1">
+                      <a:lumMod val="65000"/>
+                      <a:lumOff val="35000"/>
+                    </a:schemeClr>
+                  </a:solidFill>
+                  <a:latin typeface="Francois One" panose="02000503040000020004" pitchFamily="2" charset="0"/>
+                </a:rPr>
+                <a:t> </a:t>
+              </a:r>
+              <a:r>
+                <a:rPr kumimoji="1" lang="en-US" altLang="zh-CN" sz="1000" dirty="0">
+                  <a:solidFill>
+                    <a:schemeClr val="tx1">
+                      <a:lumMod val="65000"/>
+                      <a:lumOff val="35000"/>
+                    </a:schemeClr>
+                  </a:solidFill>
+                  <a:latin typeface="Francois One" panose="02000503040000020004" pitchFamily="2" charset="0"/>
+                </a:rPr>
+                <a:t>Scripts</a:t>
+              </a:r>
+              <a:endParaRPr kumimoji="1" lang="zh-CN" altLang="en-US" sz="1000" dirty="0">
+                <a:solidFill>
+                  <a:schemeClr val="tx1">
+                    <a:lumMod val="65000"/>
+                    <a:lumOff val="35000"/>
+                  </a:schemeClr>
+                </a:solidFill>
+                <a:latin typeface="Francois One" panose="02000503040000020004" pitchFamily="2" charset="0"/>
+              </a:endParaRPr>
+            </a:p>
+          </p:txBody>
+        </p:sp>
+      </p:grpSp>
+      <p:grpSp>
+        <p:nvGrpSpPr>
+          <p:cNvPr id="83" name="组合 82">
+            <a:extLst>
+              <a:ext uri="{FF2B5EF4-FFF2-40B4-BE49-F238E27FC236}">
+                <a16:creationId xmlns:a16="http://schemas.microsoft.com/office/drawing/2014/main" id="{CB09AEB6-5E7B-B73C-45E6-1DF5EB3135CF}"/>
+              </a:ext>
+            </a:extLst>
+          </p:cNvPr>
+          <p:cNvGrpSpPr/>
+          <p:nvPr/>
+        </p:nvGrpSpPr>
+        <p:grpSpPr>
+          <a:xfrm>
+            <a:off x="10147234" y="2254072"/>
+            <a:ext cx="519694" cy="733786"/>
+            <a:chOff x="9316832" y="1557623"/>
+            <a:chExt cx="519694" cy="733786"/>
+          </a:xfrm>
+        </p:grpSpPr>
+        <p:pic>
+          <p:nvPicPr>
+            <p:cNvPr id="76" name="图片 75">
+              <a:extLst>
+                <a:ext uri="{FF2B5EF4-FFF2-40B4-BE49-F238E27FC236}">
+                  <a16:creationId xmlns:a16="http://schemas.microsoft.com/office/drawing/2014/main" id="{E5F091F6-C237-1B69-7C10-DE03FA8706FB}"/>
+                </a:ext>
+              </a:extLst>
+            </p:cNvPr>
+            <p:cNvPicPr>
+              <a:picLocks noChangeAspect="1"/>
+            </p:cNvPicPr>
+            <p:nvPr/>
+          </p:nvPicPr>
+          <p:blipFill>
+            <a:blip r:embed="rId38"/>
+            <a:stretch>
+              <a:fillRect/>
+            </a:stretch>
+          </p:blipFill>
+          <p:spPr>
+            <a:xfrm>
+              <a:off x="9316832" y="1557623"/>
+              <a:ext cx="519694" cy="483349"/>
+            </a:xfrm>
+            <a:prstGeom prst="rect">
+              <a:avLst/>
+            </a:prstGeom>
+          </p:spPr>
+        </p:pic>
+        <p:sp>
+          <p:nvSpPr>
+            <p:cNvPr id="143" name="文本框 142">
+              <a:extLst>
+                <a:ext uri="{FF2B5EF4-FFF2-40B4-BE49-F238E27FC236}">
+                  <a16:creationId xmlns:a16="http://schemas.microsoft.com/office/drawing/2014/main" id="{97ABEF91-F178-A2CF-5B81-4212E69D4638}"/>
+                </a:ext>
+              </a:extLst>
+            </p:cNvPr>
+            <p:cNvSpPr txBox="1"/>
+            <p:nvPr/>
+          </p:nvSpPr>
+          <p:spPr>
+            <a:xfrm>
+              <a:off x="9316832" y="2045188"/>
+              <a:ext cx="519694" cy="246221"/>
+            </a:xfrm>
+            <a:prstGeom prst="rect">
+              <a:avLst/>
+            </a:prstGeom>
+            <a:noFill/>
+          </p:spPr>
+          <p:txBody>
+            <a:bodyPr wrap="none" rtlCol="0">
+              <a:spAutoFit/>
+            </a:bodyPr>
+            <a:lstStyle/>
+            <a:p>
+              <a:r>
+                <a:rPr kumimoji="1" lang="en-US" altLang="zh-CN" sz="1000" dirty="0">
+                  <a:solidFill>
+                    <a:schemeClr val="tx1">
+                      <a:lumMod val="65000"/>
+                      <a:lumOff val="35000"/>
+                    </a:schemeClr>
+                  </a:solidFill>
+                  <a:latin typeface="Francois One" panose="02000503040000020004" pitchFamily="2" charset="0"/>
+                </a:rPr>
+                <a:t>Teams</a:t>
+              </a:r>
+              <a:endParaRPr kumimoji="1" lang="zh-CN" altLang="en-US" sz="1000" dirty="0">
+                <a:solidFill>
+                  <a:schemeClr val="tx1">
+                    <a:lumMod val="65000"/>
+                    <a:lumOff val="35000"/>
+                  </a:schemeClr>
+                </a:solidFill>
+                <a:latin typeface="Francois One" panose="02000503040000020004" pitchFamily="2" charset="0"/>
+              </a:endParaRPr>
+            </a:p>
+          </p:txBody>
+        </p:sp>
+      </p:grpSp>
+      <p:grpSp>
+        <p:nvGrpSpPr>
+          <p:cNvPr id="84" name="组合 83">
+            <a:extLst>
+              <a:ext uri="{FF2B5EF4-FFF2-40B4-BE49-F238E27FC236}">
+                <a16:creationId xmlns:a16="http://schemas.microsoft.com/office/drawing/2014/main" id="{7166348A-DC82-B521-F5C3-F623EEA3E5EF}"/>
+              </a:ext>
+            </a:extLst>
+          </p:cNvPr>
+          <p:cNvGrpSpPr/>
+          <p:nvPr/>
+        </p:nvGrpSpPr>
+        <p:grpSpPr>
+          <a:xfrm>
+            <a:off x="10140822" y="1471086"/>
+            <a:ext cx="532518" cy="688435"/>
+            <a:chOff x="10122129" y="1583142"/>
+            <a:chExt cx="532518" cy="688435"/>
+          </a:xfrm>
+        </p:grpSpPr>
+        <p:pic>
+          <p:nvPicPr>
+            <p:cNvPr id="1030" name="Picture 6" descr="List of Data Sources | Fluentd">
+              <a:extLst>
+                <a:ext uri="{FF2B5EF4-FFF2-40B4-BE49-F238E27FC236}">
+                  <a16:creationId xmlns:a16="http://schemas.microsoft.com/office/drawing/2014/main" id="{5FC81D9D-0CC4-DF49-BBB9-883F7E2D84E1}"/>
+                </a:ext>
+              </a:extLst>
+            </p:cNvPr>
+            <p:cNvPicPr>
+              <a:picLocks noChangeAspect="1" noChangeArrowheads="1"/>
+            </p:cNvPicPr>
+            <p:nvPr/>
+          </p:nvPicPr>
+          <p:blipFill>
+            <a:blip r:embed="rId39">
+              <a:extLst>
+                <a:ext uri="{28A0092B-C50C-407E-A947-70E740481C1C}">
+                  <a14:useLocalDpi xmlns:a14="http://schemas.microsoft.com/office/drawing/2010/main" val="0"/>
+                </a:ext>
+              </a:extLst>
+            </a:blip>
+            <a:srcRect/>
+            <a:stretch>
+              <a:fillRect/>
+            </a:stretch>
+          </p:blipFill>
+          <p:spPr bwMode="auto">
+            <a:xfrm>
+              <a:off x="10195775" y="1583142"/>
+              <a:ext cx="385226" cy="432000"/>
+            </a:xfrm>
+            <a:prstGeom prst="rect">
+              <a:avLst/>
+            </a:prstGeom>
+            <a:noFill/>
+            <a:extLst>
+              <a:ext uri="{909E8E84-426E-40DD-AFC4-6F175D3DCCD1}">
+                <a14:hiddenFill xmlns:a14="http://schemas.microsoft.com/office/drawing/2010/main">
+                  <a:solidFill>
+                    <a:srgbClr val="FFFFFF"/>
+                  </a:solidFill>
+                </a14:hiddenFill>
+              </a:ext>
+            </a:extLst>
+          </p:spPr>
+        </p:pic>
+        <p:sp>
+          <p:nvSpPr>
+            <p:cNvPr id="144" name="文本框 143">
+              <a:extLst>
+                <a:ext uri="{FF2B5EF4-FFF2-40B4-BE49-F238E27FC236}">
+                  <a16:creationId xmlns:a16="http://schemas.microsoft.com/office/drawing/2014/main" id="{B35E44E7-CA02-762E-C8BD-FA4B63333D1A}"/>
+                </a:ext>
+              </a:extLst>
+            </p:cNvPr>
+            <p:cNvSpPr txBox="1"/>
+            <p:nvPr/>
+          </p:nvSpPr>
+          <p:spPr>
+            <a:xfrm>
+              <a:off x="10122129" y="2025356"/>
+              <a:ext cx="532518" cy="246221"/>
+            </a:xfrm>
+            <a:prstGeom prst="rect">
+              <a:avLst/>
+            </a:prstGeom>
+            <a:noFill/>
+          </p:spPr>
+          <p:txBody>
+            <a:bodyPr wrap="none" rtlCol="0">
+              <a:spAutoFit/>
+            </a:bodyPr>
+            <a:lstStyle/>
+            <a:p>
+              <a:r>
+                <a:rPr kumimoji="1" lang="en-US" altLang="zh-CN" sz="1000" dirty="0">
+                  <a:solidFill>
+                    <a:schemeClr val="tx1">
+                      <a:lumMod val="65000"/>
+                      <a:lumOff val="35000"/>
+                    </a:schemeClr>
+                  </a:solidFill>
+                  <a:latin typeface="Francois One" panose="02000503040000020004" pitchFamily="2" charset="0"/>
+                </a:rPr>
+                <a:t>Syslog</a:t>
+              </a:r>
+              <a:endParaRPr kumimoji="1" lang="zh-CN" altLang="en-US" sz="1000" dirty="0">
+                <a:solidFill>
+                  <a:schemeClr val="tx1">
+                    <a:lumMod val="65000"/>
+                    <a:lumOff val="35000"/>
+                  </a:schemeClr>
+                </a:solidFill>
+                <a:latin typeface="Francois One" panose="02000503040000020004" pitchFamily="2" charset="0"/>
+              </a:endParaRPr>
+            </a:p>
+          </p:txBody>
+        </p:sp>
+      </p:grpSp>
+      <p:sp>
+        <p:nvSpPr>
+          <p:cNvPr id="148" name="右箭头 147">
+            <a:extLst>
+              <a:ext uri="{FF2B5EF4-FFF2-40B4-BE49-F238E27FC236}">
+                <a16:creationId xmlns:a16="http://schemas.microsoft.com/office/drawing/2014/main" id="{778E085E-ABE0-57BD-055A-215FEC5E4933}"/>
+              </a:ext>
+            </a:extLst>
+          </p:cNvPr>
+          <p:cNvSpPr/>
+          <p:nvPr/>
+        </p:nvSpPr>
+        <p:spPr>
+          <a:xfrm>
+            <a:off x="4624279" y="5624005"/>
+            <a:ext cx="1331242" cy="812580"/>
+          </a:xfrm>
+          <a:prstGeom prst="rightArrow">
+            <a:avLst/>
+          </a:prstGeom>
+          <a:solidFill>
+            <a:srgbClr val="2342BF"/>
+          </a:solidFill>
+          <a:ln>
+            <a:solidFill>
+              <a:srgbClr val="2342BF"/>
+            </a:solidFill>
+          </a:ln>
+        </p:spPr>
+        <p:style>
+          <a:lnRef idx="2">
+            <a:schemeClr val="accent1">
+              <a:shade val="50000"/>
+            </a:schemeClr>
+          </a:lnRef>
+          <a:fillRef idx="1">
+            <a:schemeClr val="accent1"/>
+          </a:fillRef>
+          <a:effectRef idx="0">
+            <a:schemeClr val="accent1"/>
+          </a:effectRef>
+          <a:fontRef idx="minor">
+            <a:schemeClr val="lt1"/>
+          </a:fontRef>
+        </p:style>
+        <p:txBody>
+          <a:bodyPr rtlCol="0" anchor="ctr"/>
+          <a:lstStyle/>
+          <a:p>
+            <a:pPr algn="ctr"/>
+            <a:endParaRPr kumimoji="1" lang="zh-CN" altLang="en-US" sz="1600" b="1" dirty="0">
+              <a:latin typeface="Open Sans" panose="020B0606030504020204" pitchFamily="34" charset="0"/>
+              <a:cs typeface="Open Sans" panose="020B0606030504020204" pitchFamily="34" charset="0"/>
+            </a:endParaRPr>
+          </a:p>
+        </p:txBody>
+      </p:sp>
+      <p:sp>
+        <p:nvSpPr>
+          <p:cNvPr id="149" name="右箭头 148">
+            <a:extLst>
+              <a:ext uri="{FF2B5EF4-FFF2-40B4-BE49-F238E27FC236}">
+                <a16:creationId xmlns:a16="http://schemas.microsoft.com/office/drawing/2014/main" id="{8328AF68-3D74-AA65-57C8-B51579A6F413}"/>
+              </a:ext>
+            </a:extLst>
+          </p:cNvPr>
+          <p:cNvSpPr/>
+          <p:nvPr/>
+        </p:nvSpPr>
+        <p:spPr>
+          <a:xfrm>
+            <a:off x="4692750" y="3265400"/>
+            <a:ext cx="1331242" cy="812579"/>
+          </a:xfrm>
+          <a:prstGeom prst="rightArrow">
+            <a:avLst/>
+          </a:prstGeom>
+          <a:solidFill>
+            <a:srgbClr val="2342BF"/>
+          </a:solidFill>
+          <a:ln>
+            <a:solidFill>
+              <a:schemeClr val="bg1"/>
+            </a:solidFill>
+          </a:ln>
+        </p:spPr>
+        <p:style>
+          <a:lnRef idx="2">
+            <a:schemeClr val="accent1">
+              <a:shade val="50000"/>
+            </a:schemeClr>
+          </a:lnRef>
+          <a:fillRef idx="1">
+            <a:schemeClr val="accent1"/>
+          </a:fillRef>
+          <a:effectRef idx="0">
+            <a:schemeClr val="accent1"/>
+          </a:effectRef>
+          <a:fontRef idx="minor">
+            <a:schemeClr val="lt1"/>
+          </a:fontRef>
+        </p:style>
+        <p:txBody>
+          <a:bodyPr rtlCol="0" anchor="ctr"/>
+          <a:lstStyle/>
+          <a:p>
+            <a:pPr algn="ctr"/>
+            <a:endParaRPr kumimoji="1" lang="zh-CN" altLang="en-US" sz="1600" b="1" dirty="0">
+              <a:latin typeface="Open Sans" panose="020B0606030504020204" pitchFamily="34" charset="0"/>
+              <a:cs typeface="Open Sans" panose="020B0606030504020204" pitchFamily="34" charset="0"/>
+            </a:endParaRPr>
+          </a:p>
+        </p:txBody>
+      </p:sp>
+      <p:sp>
+        <p:nvSpPr>
+          <p:cNvPr id="150" name="右箭头 149">
+            <a:extLst>
+              <a:ext uri="{FF2B5EF4-FFF2-40B4-BE49-F238E27FC236}">
+                <a16:creationId xmlns:a16="http://schemas.microsoft.com/office/drawing/2014/main" id="{212A5595-2EA3-34C0-AA3D-CDBCA11C6837}"/>
+              </a:ext>
+            </a:extLst>
+          </p:cNvPr>
+          <p:cNvSpPr/>
+          <p:nvPr/>
+        </p:nvSpPr>
+        <p:spPr>
+          <a:xfrm>
+            <a:off x="4764758" y="3383657"/>
+            <a:ext cx="1331242" cy="812579"/>
+          </a:xfrm>
+          <a:prstGeom prst="rightArrow">
+            <a:avLst/>
+          </a:prstGeom>
+          <a:solidFill>
+            <a:srgbClr val="2342BF"/>
+          </a:solidFill>
+          <a:ln>
+            <a:solidFill>
+              <a:schemeClr val="bg1"/>
+            </a:solidFill>
+          </a:ln>
+        </p:spPr>
+        <p:style>
+          <a:lnRef idx="2">
+            <a:schemeClr val="accent1">
+              <a:shade val="50000"/>
+            </a:schemeClr>
+          </a:lnRef>
+          <a:fillRef idx="1">
+            <a:schemeClr val="accent1"/>
+          </a:fillRef>
+          <a:effectRef idx="0">
+            <a:schemeClr val="accent1"/>
+          </a:effectRef>
+          <a:fontRef idx="minor">
+            <a:schemeClr val="lt1"/>
+          </a:fontRef>
+        </p:style>
+        <p:txBody>
+          <a:bodyPr rtlCol="0" anchor="ctr"/>
+          <a:lstStyle/>
+          <a:p>
+            <a:pPr algn="ctr"/>
+            <a:r>
+              <a:rPr kumimoji="1" lang="en-US" altLang="zh-CN" sz="1600" b="1" dirty="0">
+                <a:latin typeface="Open Sans" panose="020B0606030504020204" pitchFamily="34" charset="0"/>
+                <a:ea typeface="Open Sans" panose="020B0606030504020204" pitchFamily="34" charset="0"/>
+                <a:cs typeface="Open Sans" panose="020B0606030504020204" pitchFamily="34" charset="0"/>
+              </a:rPr>
+              <a:t>Channels</a:t>
+            </a:r>
+            <a:endParaRPr kumimoji="1" lang="zh-CN" altLang="en-US" sz="1600" b="1" dirty="0">
+              <a:latin typeface="Open Sans" panose="020B0606030504020204" pitchFamily="34" charset="0"/>
+              <a:cs typeface="Open Sans" panose="020B0606030504020204" pitchFamily="34" charset="0"/>
+            </a:endParaRPr>
+          </a:p>
+        </p:txBody>
+      </p:sp>
     </p:spTree>
     <p:extLst>
       <p:ext uri="{BB962C8B-B14F-4D97-AF65-F5344CB8AC3E}">
@@ -8237,7 +8567,7 @@
 <file path=ppt/theme/theme1.xml><?xml version="1.0" encoding="utf-8"?>
 <a:theme xmlns:a="http://schemas.openxmlformats.org/drawingml/2006/main" name="Office 主题​​">
   <a:themeElements>
-    <a:clrScheme name="Office">
+    <a:clrScheme name="Office 主题​​">
       <a:dk1>
         <a:sysClr val="windowText" lastClr="000000"/>
       </a:dk1>
@@ -8275,9 +8605,9 @@
         <a:srgbClr val="954F72"/>
       </a:folHlink>
     </a:clrScheme>
-    <a:fontScheme name="Office">
+    <a:fontScheme name="Office 主题​​">
       <a:majorFont>
-        <a:latin typeface="等线 Light" panose="020F0302020204030204"/>
+        <a:latin typeface="Calibri Light" panose="020F0302020204030204"/>
         <a:ea typeface=""/>
         <a:cs typeface=""/>
         <a:font script="Jpan" typeface="游ゴシック Light"/>
@@ -8310,26 +8640,9 @@
         <a:font script="Viet" typeface="Times New Roman"/>
         <a:font script="Uigh" typeface="Microsoft Uighur"/>
         <a:font script="Geor" typeface="Sylfaen"/>
-        <a:font script="Armn" typeface="Arial"/>
-        <a:font script="Bugi" typeface="Leelawadee UI"/>
-        <a:font script="Bopo" typeface="Microsoft JhengHei"/>
-        <a:font script="Java" typeface="Javanese Text"/>
-        <a:font script="Lisu" typeface="Segoe UI"/>
-        <a:font script="Mymr" typeface="Myanmar Text"/>
-        <a:font script="Nkoo" typeface="Ebrima"/>
-        <a:font script="Olck" typeface="Nirmala UI"/>
-        <a:font script="Osma" typeface="Ebrima"/>
-        <a:font script="Phag" typeface="Phagspa"/>
-        <a:font script="Syrn" typeface="Estrangelo Edessa"/>
-        <a:font script="Syrj" typeface="Estrangelo Edessa"/>
-        <a:font script="Syre" typeface="Estrangelo Edessa"/>
-        <a:font script="Sora" typeface="Nirmala UI"/>
-        <a:font script="Tale" typeface="Microsoft Tai Le"/>
-        <a:font script="Talu" typeface="Microsoft New Tai Lue"/>
-        <a:font script="Tfng" typeface="Ebrima"/>
       </a:majorFont>
       <a:minorFont>
-        <a:latin typeface="等线" panose="020F0502020204030204"/>
+        <a:latin typeface="Calibri" panose="020F0502020204030204"/>
         <a:ea typeface=""/>
         <a:cs typeface=""/>
         <a:font script="Jpan" typeface="游ゴシック"/>
@@ -8362,26 +8675,9 @@
         <a:font script="Viet" typeface="Arial"/>
         <a:font script="Uigh" typeface="Microsoft Uighur"/>
         <a:font script="Geor" typeface="Sylfaen"/>
-        <a:font script="Armn" typeface="Arial"/>
-        <a:font script="Bugi" typeface="Leelawadee UI"/>
-        <a:font script="Bopo" typeface="Microsoft JhengHei"/>
-        <a:font script="Java" typeface="Javanese Text"/>
-        <a:font script="Lisu" typeface="Segoe UI"/>
-        <a:font script="Mymr" typeface="Myanmar Text"/>
-        <a:font script="Nkoo" typeface="Ebrima"/>
-        <a:font script="Olck" typeface="Nirmala UI"/>
-        <a:font script="Osma" typeface="Ebrima"/>
-        <a:font script="Phag" typeface="Phagspa"/>
-        <a:font script="Syrn" typeface="Estrangelo Edessa"/>
-        <a:font script="Syrj" typeface="Estrangelo Edessa"/>
-        <a:font script="Syre" typeface="Estrangelo Edessa"/>
-        <a:font script="Sora" typeface="Nirmala UI"/>
-        <a:font script="Tale" typeface="Microsoft Tai Le"/>
-        <a:font script="Talu" typeface="Microsoft New Tai Lue"/>
-        <a:font script="Tfng" typeface="Ebrima"/>
       </a:minorFont>
     </a:fontScheme>
-    <a:fmtScheme name="Office">
+    <a:fmtScheme name="Office 主题​​">
       <a:fillStyleLst>
         <a:solidFill>
           <a:schemeClr val="phClr"/>

</xml_diff>

<commit_message>
update the overview.png and README.md (#132)
</commit_message>
<xml_diff>
--- a/docs/diagrams.pptx
+++ b/docs/diagrams.pptx
@@ -2,18 +2,18 @@
 <file path=ppt/presentation.xml><?xml version="1.0" encoding="utf-8"?>
 <p:presentation xmlns:a="http://schemas.openxmlformats.org/drawingml/2006/main" xmlns:r="http://schemas.openxmlformats.org/officeDocument/2006/relationships" xmlns:p="http://schemas.openxmlformats.org/presentationml/2006/main" saveSubsetFonts="1" autoCompressPictures="0">
   <p:sldMasterIdLst>
-    <p:sldMasterId id="2147483648" r:id="rId1"/>
+    <p:sldMasterId id="2147483660" r:id="rId1"/>
   </p:sldMasterIdLst>
   <p:sldIdLst>
     <p:sldId id="256" r:id="rId2"/>
   </p:sldIdLst>
-  <p:sldSz cx="12192000" cy="6858000"/>
+  <p:sldSz cx="12192000" cy="10799763"/>
   <p:notesSz cx="6858000" cy="9144000"/>
   <p:defaultTextStyle>
     <a:defPPr>
-      <a:defRPr lang="zh-CN"/>
+      <a:defRPr lang="en-US"/>
     </a:defPPr>
-    <a:lvl1pPr marL="0" algn="l" defTabSz="914400" rtl="0" eaLnBrk="1" latinLnBrk="0" hangingPunct="1">
+    <a:lvl1pPr marL="0" algn="l" defTabSz="457200" rtl="0" eaLnBrk="1" latinLnBrk="0" hangingPunct="1">
       <a:defRPr sz="1800" kern="1200">
         <a:solidFill>
           <a:schemeClr val="tx1"/>
@@ -23,7 +23,7 @@
         <a:cs typeface="+mn-cs"/>
       </a:defRPr>
     </a:lvl1pPr>
-    <a:lvl2pPr marL="457200" algn="l" defTabSz="914400" rtl="0" eaLnBrk="1" latinLnBrk="0" hangingPunct="1">
+    <a:lvl2pPr marL="457200" algn="l" defTabSz="457200" rtl="0" eaLnBrk="1" latinLnBrk="0" hangingPunct="1">
       <a:defRPr sz="1800" kern="1200">
         <a:solidFill>
           <a:schemeClr val="tx1"/>
@@ -33,7 +33,7 @@
         <a:cs typeface="+mn-cs"/>
       </a:defRPr>
     </a:lvl2pPr>
-    <a:lvl3pPr marL="914400" algn="l" defTabSz="914400" rtl="0" eaLnBrk="1" latinLnBrk="0" hangingPunct="1">
+    <a:lvl3pPr marL="914400" algn="l" defTabSz="457200" rtl="0" eaLnBrk="1" latinLnBrk="0" hangingPunct="1">
       <a:defRPr sz="1800" kern="1200">
         <a:solidFill>
           <a:schemeClr val="tx1"/>
@@ -43,7 +43,7 @@
         <a:cs typeface="+mn-cs"/>
       </a:defRPr>
     </a:lvl3pPr>
-    <a:lvl4pPr marL="1371600" algn="l" defTabSz="914400" rtl="0" eaLnBrk="1" latinLnBrk="0" hangingPunct="1">
+    <a:lvl4pPr marL="1371600" algn="l" defTabSz="457200" rtl="0" eaLnBrk="1" latinLnBrk="0" hangingPunct="1">
       <a:defRPr sz="1800" kern="1200">
         <a:solidFill>
           <a:schemeClr val="tx1"/>
@@ -53,7 +53,7 @@
         <a:cs typeface="+mn-cs"/>
       </a:defRPr>
     </a:lvl4pPr>
-    <a:lvl5pPr marL="1828800" algn="l" defTabSz="914400" rtl="0" eaLnBrk="1" latinLnBrk="0" hangingPunct="1">
+    <a:lvl5pPr marL="1828800" algn="l" defTabSz="457200" rtl="0" eaLnBrk="1" latinLnBrk="0" hangingPunct="1">
       <a:defRPr sz="1800" kern="1200">
         <a:solidFill>
           <a:schemeClr val="tx1"/>
@@ -63,7 +63,7 @@
         <a:cs typeface="+mn-cs"/>
       </a:defRPr>
     </a:lvl5pPr>
-    <a:lvl6pPr marL="2286000" algn="l" defTabSz="914400" rtl="0" eaLnBrk="1" latinLnBrk="0" hangingPunct="1">
+    <a:lvl6pPr marL="2286000" algn="l" defTabSz="457200" rtl="0" eaLnBrk="1" latinLnBrk="0" hangingPunct="1">
       <a:defRPr sz="1800" kern="1200">
         <a:solidFill>
           <a:schemeClr val="tx1"/>
@@ -73,7 +73,7 @@
         <a:cs typeface="+mn-cs"/>
       </a:defRPr>
     </a:lvl6pPr>
-    <a:lvl7pPr marL="2743200" algn="l" defTabSz="914400" rtl="0" eaLnBrk="1" latinLnBrk="0" hangingPunct="1">
+    <a:lvl7pPr marL="2743200" algn="l" defTabSz="457200" rtl="0" eaLnBrk="1" latinLnBrk="0" hangingPunct="1">
       <a:defRPr sz="1800" kern="1200">
         <a:solidFill>
           <a:schemeClr val="tx1"/>
@@ -83,7 +83,7 @@
         <a:cs typeface="+mn-cs"/>
       </a:defRPr>
     </a:lvl7pPr>
-    <a:lvl8pPr marL="3200400" algn="l" defTabSz="914400" rtl="0" eaLnBrk="1" latinLnBrk="0" hangingPunct="1">
+    <a:lvl8pPr marL="3200400" algn="l" defTabSz="457200" rtl="0" eaLnBrk="1" latinLnBrk="0" hangingPunct="1">
       <a:defRPr sz="1800" kern="1200">
         <a:solidFill>
           <a:schemeClr val="tx1"/>
@@ -93,7 +93,7 @@
         <a:cs typeface="+mn-cs"/>
       </a:defRPr>
     </a:lvl8pPr>
-    <a:lvl9pPr marL="3657600" algn="l" defTabSz="914400" rtl="0" eaLnBrk="1" latinLnBrk="0" hangingPunct="1">
+    <a:lvl9pPr marL="3657600" algn="l" defTabSz="457200" rtl="0" eaLnBrk="1" latinLnBrk="0" hangingPunct="1">
       <a:defRPr sz="1800" kern="1200">
         <a:solidFill>
           <a:schemeClr val="tx1"/>
@@ -107,7 +107,7 @@
   <p:extLst>
     <p:ext uri="{EFAFB233-063F-42B5-8137-9DF3F51BA10A}">
       <p15:sldGuideLst xmlns:p15="http://schemas.microsoft.com/office/powerpoint/2012/main">
-        <p15:guide id="1" orient="horz" pos="1888" userDrawn="1">
+        <p15:guide id="1" orient="horz" pos="2973" userDrawn="1">
           <p15:clr>
             <a:srgbClr val="A4A3A4"/>
           </p15:clr>
@@ -142,13 +142,7 @@
       </p:grpSpPr>
       <p:sp>
         <p:nvSpPr>
-          <p:cNvPr id="2" name="标题 1">
-            <a:extLst>
-              <a:ext uri="{FF2B5EF4-FFF2-40B4-BE49-F238E27FC236}">
-                <a16:creationId xmlns:a16="http://schemas.microsoft.com/office/drawing/2014/main" id="{B0F67E69-0D92-8DBE-7A87-6F39D31B49D2}"/>
-              </a:ext>
-            </a:extLst>
-          </p:cNvPr>
+          <p:cNvPr id="2" name="Title 1"/>
           <p:cNvSpPr>
             <a:spLocks noGrp="1"/>
           </p:cNvSpPr>
@@ -158,34 +152,29 @@
         </p:nvSpPr>
         <p:spPr>
           <a:xfrm>
-            <a:off x="1524000" y="1122363"/>
-            <a:ext cx="9144000" cy="2387600"/>
+            <a:off x="914400" y="1767462"/>
+            <a:ext cx="10363200" cy="3759917"/>
           </a:xfrm>
         </p:spPr>
         <p:txBody>
           <a:bodyPr anchor="b"/>
           <a:lstStyle>
             <a:lvl1pPr algn="ctr">
-              <a:defRPr sz="6000"/>
+              <a:defRPr sz="8000"/>
             </a:lvl1pPr>
           </a:lstStyle>
           <a:p>
             <a:r>
-              <a:rPr kumimoji="1" lang="zh-CN" altLang="en-US"/>
+              <a:rPr lang="zh-CN" altLang="en-US"/>
               <a:t>单击此处编辑母版标题样式</a:t>
             </a:r>
+            <a:endParaRPr lang="en-US" dirty="0"/>
           </a:p>
         </p:txBody>
       </p:sp>
       <p:sp>
         <p:nvSpPr>
-          <p:cNvPr id="3" name="副标题 2">
-            <a:extLst>
-              <a:ext uri="{FF2B5EF4-FFF2-40B4-BE49-F238E27FC236}">
-                <a16:creationId xmlns:a16="http://schemas.microsoft.com/office/drawing/2014/main" id="{05E33B14-FC86-682A-5DDD-68BC5EE6792F}"/>
-              </a:ext>
-            </a:extLst>
-          </p:cNvPr>
+          <p:cNvPr id="3" name="Subtitle 2"/>
           <p:cNvSpPr>
             <a:spLocks noGrp="1"/>
           </p:cNvSpPr>
@@ -195,8 +184,8 @@
         </p:nvSpPr>
         <p:spPr>
           <a:xfrm>
-            <a:off x="1524000" y="3602038"/>
-            <a:ext cx="9144000" cy="1655762"/>
+            <a:off x="1524000" y="5672376"/>
+            <a:ext cx="9144000" cy="2607442"/>
           </a:xfrm>
         </p:spPr>
         <p:txBody>
@@ -204,58 +193,53 @@
           <a:lstStyle>
             <a:lvl1pPr marL="0" indent="0" algn="ctr">
               <a:buNone/>
+              <a:defRPr sz="3200"/>
+            </a:lvl1pPr>
+            <a:lvl2pPr marL="609585" indent="0" algn="ctr">
+              <a:buNone/>
+              <a:defRPr sz="2667"/>
+            </a:lvl2pPr>
+            <a:lvl3pPr marL="1219170" indent="0" algn="ctr">
+              <a:buNone/>
               <a:defRPr sz="2400"/>
-            </a:lvl1pPr>
-            <a:lvl2pPr marL="457200" indent="0" algn="ctr">
+            </a:lvl3pPr>
+            <a:lvl4pPr marL="1828754" indent="0" algn="ctr">
               <a:buNone/>
-              <a:defRPr sz="2000"/>
-            </a:lvl2pPr>
-            <a:lvl3pPr marL="914400" indent="0" algn="ctr">
+              <a:defRPr sz="2133"/>
+            </a:lvl4pPr>
+            <a:lvl5pPr marL="2438339" indent="0" algn="ctr">
               <a:buNone/>
-              <a:defRPr sz="1800"/>
-            </a:lvl3pPr>
-            <a:lvl4pPr marL="1371600" indent="0" algn="ctr">
+              <a:defRPr sz="2133"/>
+            </a:lvl5pPr>
+            <a:lvl6pPr marL="3047924" indent="0" algn="ctr">
               <a:buNone/>
-              <a:defRPr sz="1600"/>
-            </a:lvl4pPr>
-            <a:lvl5pPr marL="1828800" indent="0" algn="ctr">
+              <a:defRPr sz="2133"/>
+            </a:lvl6pPr>
+            <a:lvl7pPr marL="3657509" indent="0" algn="ctr">
               <a:buNone/>
-              <a:defRPr sz="1600"/>
-            </a:lvl5pPr>
-            <a:lvl6pPr marL="2286000" indent="0" algn="ctr">
+              <a:defRPr sz="2133"/>
+            </a:lvl7pPr>
+            <a:lvl8pPr marL="4267093" indent="0" algn="ctr">
               <a:buNone/>
-              <a:defRPr sz="1600"/>
-            </a:lvl6pPr>
-            <a:lvl7pPr marL="2743200" indent="0" algn="ctr">
+              <a:defRPr sz="2133"/>
+            </a:lvl8pPr>
+            <a:lvl9pPr marL="4876678" indent="0" algn="ctr">
               <a:buNone/>
-              <a:defRPr sz="1600"/>
-            </a:lvl7pPr>
-            <a:lvl8pPr marL="3200400" indent="0" algn="ctr">
-              <a:buNone/>
-              <a:defRPr sz="1600"/>
-            </a:lvl8pPr>
-            <a:lvl9pPr marL="3657600" indent="0" algn="ctr">
-              <a:buNone/>
-              <a:defRPr sz="1600"/>
+              <a:defRPr sz="2133"/>
             </a:lvl9pPr>
           </a:lstStyle>
           <a:p>
             <a:r>
-              <a:rPr kumimoji="1" lang="zh-CN" altLang="en-US"/>
+              <a:rPr lang="zh-CN" altLang="en-US"/>
               <a:t>单击此处编辑母版副标题样式</a:t>
             </a:r>
+            <a:endParaRPr lang="en-US" dirty="0"/>
           </a:p>
         </p:txBody>
       </p:sp>
       <p:sp>
         <p:nvSpPr>
-          <p:cNvPr id="4" name="日期占位符 3">
-            <a:extLst>
-              <a:ext uri="{FF2B5EF4-FFF2-40B4-BE49-F238E27FC236}">
-                <a16:creationId xmlns:a16="http://schemas.microsoft.com/office/drawing/2014/main" id="{E8F1B470-62ED-B51A-2B81-756AB15D480A}"/>
-              </a:ext>
-            </a:extLst>
-          </p:cNvPr>
+          <p:cNvPr id="4" name="Date Placeholder 3"/>
           <p:cNvSpPr>
             <a:spLocks noGrp="1"/>
           </p:cNvSpPr>
@@ -270,7 +254,7 @@
           <a:p>
             <a:fld id="{ADEA6865-5F8B-9C4A-950D-1D161D0F2BB5}" type="datetimeFigureOut">
               <a:rPr kumimoji="1" lang="zh-CN" altLang="en-US" smtClean="0"/>
-              <a:t>2022/5/20</a:t>
+              <a:t>2022/6/8</a:t>
             </a:fld>
             <a:endParaRPr kumimoji="1" lang="zh-CN" altLang="en-US"/>
           </a:p>
@@ -278,13 +262,7 @@
       </p:sp>
       <p:sp>
         <p:nvSpPr>
-          <p:cNvPr id="5" name="页脚占位符 4">
-            <a:extLst>
-              <a:ext uri="{FF2B5EF4-FFF2-40B4-BE49-F238E27FC236}">
-                <a16:creationId xmlns:a16="http://schemas.microsoft.com/office/drawing/2014/main" id="{FC5A697C-6B09-44AE-8AAE-B4A3C7FAA499}"/>
-              </a:ext>
-            </a:extLst>
-          </p:cNvPr>
+          <p:cNvPr id="5" name="Footer Placeholder 4"/>
           <p:cNvSpPr>
             <a:spLocks noGrp="1"/>
           </p:cNvSpPr>
@@ -303,13 +281,7 @@
       </p:sp>
       <p:sp>
         <p:nvSpPr>
-          <p:cNvPr id="6" name="灯片编号占位符 5">
-            <a:extLst>
-              <a:ext uri="{FF2B5EF4-FFF2-40B4-BE49-F238E27FC236}">
-                <a16:creationId xmlns:a16="http://schemas.microsoft.com/office/drawing/2014/main" id="{6F582A0C-43EC-AD7D-AA2D-06FA6C9F05FB}"/>
-              </a:ext>
-            </a:extLst>
-          </p:cNvPr>
+          <p:cNvPr id="6" name="Slide Number Placeholder 5"/>
           <p:cNvSpPr>
             <a:spLocks noGrp="1"/>
           </p:cNvSpPr>
@@ -333,7 +305,7 @@
     </p:spTree>
     <p:extLst>
       <p:ext uri="{BB962C8B-B14F-4D97-AF65-F5344CB8AC3E}">
-        <p14:creationId xmlns:p14="http://schemas.microsoft.com/office/powerpoint/2010/main" val="1258341022"/>
+        <p14:creationId xmlns:p14="http://schemas.microsoft.com/office/powerpoint/2010/main" val="3951476254"/>
       </p:ext>
     </p:extLst>
   </p:cSld>
@@ -362,13 +334,7 @@
       </p:grpSpPr>
       <p:sp>
         <p:nvSpPr>
-          <p:cNvPr id="2" name="标题 1">
-            <a:extLst>
-              <a:ext uri="{FF2B5EF4-FFF2-40B4-BE49-F238E27FC236}">
-                <a16:creationId xmlns:a16="http://schemas.microsoft.com/office/drawing/2014/main" id="{202DFC00-9D68-D07E-B524-FEA0A40E2D79}"/>
-              </a:ext>
-            </a:extLst>
-          </p:cNvPr>
+          <p:cNvPr id="2" name="Title 1"/>
           <p:cNvSpPr>
             <a:spLocks noGrp="1"/>
           </p:cNvSpPr>
@@ -382,21 +348,16 @@
           <a:lstStyle/>
           <a:p>
             <a:r>
-              <a:rPr kumimoji="1" lang="zh-CN" altLang="en-US"/>
+              <a:rPr lang="zh-CN" altLang="en-US"/>
               <a:t>单击此处编辑母版标题样式</a:t>
             </a:r>
+            <a:endParaRPr lang="en-US" dirty="0"/>
           </a:p>
         </p:txBody>
       </p:sp>
       <p:sp>
         <p:nvSpPr>
-          <p:cNvPr id="3" name="竖排文字占位符 2">
-            <a:extLst>
-              <a:ext uri="{FF2B5EF4-FFF2-40B4-BE49-F238E27FC236}">
-                <a16:creationId xmlns:a16="http://schemas.microsoft.com/office/drawing/2014/main" id="{BCA13691-64BE-8845-3865-DE9664C3C8E5}"/>
-              </a:ext>
-            </a:extLst>
-          </p:cNvPr>
+          <p:cNvPr id="3" name="Vertical Text Placeholder 2"/>
           <p:cNvSpPr>
             <a:spLocks noGrp="1"/>
           </p:cNvSpPr>
@@ -411,49 +372,44 @@
           <a:p>
             <a:pPr lvl="0"/>
             <a:r>
-              <a:rPr kumimoji="1" lang="zh-CN" altLang="en-US"/>
+              <a:rPr lang="zh-CN" altLang="en-US"/>
               <a:t>单击此处编辑母版文本样式</a:t>
             </a:r>
           </a:p>
           <a:p>
             <a:pPr lvl="1"/>
             <a:r>
-              <a:rPr kumimoji="1" lang="zh-CN" altLang="en-US"/>
+              <a:rPr lang="zh-CN" altLang="en-US"/>
               <a:t>二级</a:t>
             </a:r>
           </a:p>
           <a:p>
             <a:pPr lvl="2"/>
             <a:r>
-              <a:rPr kumimoji="1" lang="zh-CN" altLang="en-US"/>
+              <a:rPr lang="zh-CN" altLang="en-US"/>
               <a:t>三级</a:t>
             </a:r>
           </a:p>
           <a:p>
             <a:pPr lvl="3"/>
             <a:r>
-              <a:rPr kumimoji="1" lang="zh-CN" altLang="en-US"/>
+              <a:rPr lang="zh-CN" altLang="en-US"/>
               <a:t>四级</a:t>
             </a:r>
           </a:p>
           <a:p>
             <a:pPr lvl="4"/>
             <a:r>
-              <a:rPr kumimoji="1" lang="zh-CN" altLang="en-US"/>
+              <a:rPr lang="zh-CN" altLang="en-US"/>
               <a:t>五级</a:t>
             </a:r>
+            <a:endParaRPr lang="en-US" dirty="0"/>
           </a:p>
         </p:txBody>
       </p:sp>
       <p:sp>
         <p:nvSpPr>
-          <p:cNvPr id="4" name="日期占位符 3">
-            <a:extLst>
-              <a:ext uri="{FF2B5EF4-FFF2-40B4-BE49-F238E27FC236}">
-                <a16:creationId xmlns:a16="http://schemas.microsoft.com/office/drawing/2014/main" id="{89AC1F24-BC6F-DCB7-31FE-CB99BECE7AC3}"/>
-              </a:ext>
-            </a:extLst>
-          </p:cNvPr>
+          <p:cNvPr id="4" name="Date Placeholder 3"/>
           <p:cNvSpPr>
             <a:spLocks noGrp="1"/>
           </p:cNvSpPr>
@@ -468,7 +424,7 @@
           <a:p>
             <a:fld id="{ADEA6865-5F8B-9C4A-950D-1D161D0F2BB5}" type="datetimeFigureOut">
               <a:rPr kumimoji="1" lang="zh-CN" altLang="en-US" smtClean="0"/>
-              <a:t>2022/5/20</a:t>
+              <a:t>2022/6/8</a:t>
             </a:fld>
             <a:endParaRPr kumimoji="1" lang="zh-CN" altLang="en-US"/>
           </a:p>
@@ -476,13 +432,7 @@
       </p:sp>
       <p:sp>
         <p:nvSpPr>
-          <p:cNvPr id="5" name="页脚占位符 4">
-            <a:extLst>
-              <a:ext uri="{FF2B5EF4-FFF2-40B4-BE49-F238E27FC236}">
-                <a16:creationId xmlns:a16="http://schemas.microsoft.com/office/drawing/2014/main" id="{2AA4A291-5811-9881-12D0-14E61D19A37B}"/>
-              </a:ext>
-            </a:extLst>
-          </p:cNvPr>
+          <p:cNvPr id="5" name="Footer Placeholder 4"/>
           <p:cNvSpPr>
             <a:spLocks noGrp="1"/>
           </p:cNvSpPr>
@@ -501,13 +451,7 @@
       </p:sp>
       <p:sp>
         <p:nvSpPr>
-          <p:cNvPr id="6" name="灯片编号占位符 5">
-            <a:extLst>
-              <a:ext uri="{FF2B5EF4-FFF2-40B4-BE49-F238E27FC236}">
-                <a16:creationId xmlns:a16="http://schemas.microsoft.com/office/drawing/2014/main" id="{2086FD03-5650-E699-C9D9-FF3CFA43FD1D}"/>
-              </a:ext>
-            </a:extLst>
-          </p:cNvPr>
+          <p:cNvPr id="6" name="Slide Number Placeholder 5"/>
           <p:cNvSpPr>
             <a:spLocks noGrp="1"/>
           </p:cNvSpPr>
@@ -531,7 +475,7 @@
     </p:spTree>
     <p:extLst>
       <p:ext uri="{BB962C8B-B14F-4D97-AF65-F5344CB8AC3E}">
-        <p14:creationId xmlns:p14="http://schemas.microsoft.com/office/powerpoint/2010/main" val="4056843560"/>
+        <p14:creationId xmlns:p14="http://schemas.microsoft.com/office/powerpoint/2010/main" val="1579169042"/>
       </p:ext>
     </p:extLst>
   </p:cSld>
@@ -560,13 +504,7 @@
       </p:grpSpPr>
       <p:sp>
         <p:nvSpPr>
-          <p:cNvPr id="2" name="竖排标题 1">
-            <a:extLst>
-              <a:ext uri="{FF2B5EF4-FFF2-40B4-BE49-F238E27FC236}">
-                <a16:creationId xmlns:a16="http://schemas.microsoft.com/office/drawing/2014/main" id="{90C1F934-C762-A5D8-4D19-2E215005B281}"/>
-              </a:ext>
-            </a:extLst>
-          </p:cNvPr>
+          <p:cNvPr id="2" name="Vertical Title 1"/>
           <p:cNvSpPr>
             <a:spLocks noGrp="1"/>
           </p:cNvSpPr>
@@ -576,8 +514,8 @@
         </p:nvSpPr>
         <p:spPr>
           <a:xfrm>
-            <a:off x="8724900" y="365125"/>
-            <a:ext cx="2628900" cy="5811838"/>
+            <a:off x="8724901" y="574987"/>
+            <a:ext cx="2628900" cy="9152300"/>
           </a:xfrm>
         </p:spPr>
         <p:txBody>
@@ -585,21 +523,16 @@
           <a:lstStyle/>
           <a:p>
             <a:r>
-              <a:rPr kumimoji="1" lang="zh-CN" altLang="en-US"/>
+              <a:rPr lang="zh-CN" altLang="en-US"/>
               <a:t>单击此处编辑母版标题样式</a:t>
             </a:r>
+            <a:endParaRPr lang="en-US" dirty="0"/>
           </a:p>
         </p:txBody>
       </p:sp>
       <p:sp>
         <p:nvSpPr>
-          <p:cNvPr id="3" name="竖排文字占位符 2">
-            <a:extLst>
-              <a:ext uri="{FF2B5EF4-FFF2-40B4-BE49-F238E27FC236}">
-                <a16:creationId xmlns:a16="http://schemas.microsoft.com/office/drawing/2014/main" id="{472E4F1E-467C-3E81-9109-DF321C9F03F0}"/>
-              </a:ext>
-            </a:extLst>
-          </p:cNvPr>
+          <p:cNvPr id="3" name="Vertical Text Placeholder 2"/>
           <p:cNvSpPr>
             <a:spLocks noGrp="1"/>
           </p:cNvSpPr>
@@ -609,8 +542,8 @@
         </p:nvSpPr>
         <p:spPr>
           <a:xfrm>
-            <a:off x="838200" y="365125"/>
-            <a:ext cx="7734300" cy="5811838"/>
+            <a:off x="838201" y="574987"/>
+            <a:ext cx="7734300" cy="9152300"/>
           </a:xfrm>
         </p:spPr>
         <p:txBody>
@@ -619,49 +552,44 @@
           <a:p>
             <a:pPr lvl="0"/>
             <a:r>
-              <a:rPr kumimoji="1" lang="zh-CN" altLang="en-US"/>
+              <a:rPr lang="zh-CN" altLang="en-US"/>
               <a:t>单击此处编辑母版文本样式</a:t>
             </a:r>
           </a:p>
           <a:p>
             <a:pPr lvl="1"/>
             <a:r>
-              <a:rPr kumimoji="1" lang="zh-CN" altLang="en-US"/>
+              <a:rPr lang="zh-CN" altLang="en-US"/>
               <a:t>二级</a:t>
             </a:r>
           </a:p>
           <a:p>
             <a:pPr lvl="2"/>
             <a:r>
-              <a:rPr kumimoji="1" lang="zh-CN" altLang="en-US"/>
+              <a:rPr lang="zh-CN" altLang="en-US"/>
               <a:t>三级</a:t>
             </a:r>
           </a:p>
           <a:p>
             <a:pPr lvl="3"/>
             <a:r>
-              <a:rPr kumimoji="1" lang="zh-CN" altLang="en-US"/>
+              <a:rPr lang="zh-CN" altLang="en-US"/>
               <a:t>四级</a:t>
             </a:r>
           </a:p>
           <a:p>
             <a:pPr lvl="4"/>
             <a:r>
-              <a:rPr kumimoji="1" lang="zh-CN" altLang="en-US"/>
+              <a:rPr lang="zh-CN" altLang="en-US"/>
               <a:t>五级</a:t>
             </a:r>
+            <a:endParaRPr lang="en-US" dirty="0"/>
           </a:p>
         </p:txBody>
       </p:sp>
       <p:sp>
         <p:nvSpPr>
-          <p:cNvPr id="4" name="日期占位符 3">
-            <a:extLst>
-              <a:ext uri="{FF2B5EF4-FFF2-40B4-BE49-F238E27FC236}">
-                <a16:creationId xmlns:a16="http://schemas.microsoft.com/office/drawing/2014/main" id="{FEB3F99A-0122-44DF-57BE-329873A6C79F}"/>
-              </a:ext>
-            </a:extLst>
-          </p:cNvPr>
+          <p:cNvPr id="4" name="Date Placeholder 3"/>
           <p:cNvSpPr>
             <a:spLocks noGrp="1"/>
           </p:cNvSpPr>
@@ -676,7 +604,7 @@
           <a:p>
             <a:fld id="{ADEA6865-5F8B-9C4A-950D-1D161D0F2BB5}" type="datetimeFigureOut">
               <a:rPr kumimoji="1" lang="zh-CN" altLang="en-US" smtClean="0"/>
-              <a:t>2022/5/20</a:t>
+              <a:t>2022/6/8</a:t>
             </a:fld>
             <a:endParaRPr kumimoji="1" lang="zh-CN" altLang="en-US"/>
           </a:p>
@@ -684,13 +612,7 @@
       </p:sp>
       <p:sp>
         <p:nvSpPr>
-          <p:cNvPr id="5" name="页脚占位符 4">
-            <a:extLst>
-              <a:ext uri="{FF2B5EF4-FFF2-40B4-BE49-F238E27FC236}">
-                <a16:creationId xmlns:a16="http://schemas.microsoft.com/office/drawing/2014/main" id="{64221B9D-DAEE-A2C0-472A-9D4EAE12B467}"/>
-              </a:ext>
-            </a:extLst>
-          </p:cNvPr>
+          <p:cNvPr id="5" name="Footer Placeholder 4"/>
           <p:cNvSpPr>
             <a:spLocks noGrp="1"/>
           </p:cNvSpPr>
@@ -709,13 +631,7 @@
       </p:sp>
       <p:sp>
         <p:nvSpPr>
-          <p:cNvPr id="6" name="灯片编号占位符 5">
-            <a:extLst>
-              <a:ext uri="{FF2B5EF4-FFF2-40B4-BE49-F238E27FC236}">
-                <a16:creationId xmlns:a16="http://schemas.microsoft.com/office/drawing/2014/main" id="{D8D708F2-5C4B-5B09-6C29-9F1E172C3B48}"/>
-              </a:ext>
-            </a:extLst>
-          </p:cNvPr>
+          <p:cNvPr id="6" name="Slide Number Placeholder 5"/>
           <p:cNvSpPr>
             <a:spLocks noGrp="1"/>
           </p:cNvSpPr>
@@ -739,7 +655,7 @@
     </p:spTree>
     <p:extLst>
       <p:ext uri="{BB962C8B-B14F-4D97-AF65-F5344CB8AC3E}">
-        <p14:creationId xmlns:p14="http://schemas.microsoft.com/office/powerpoint/2010/main" val="3398545207"/>
+        <p14:creationId xmlns:p14="http://schemas.microsoft.com/office/powerpoint/2010/main" val="2803936459"/>
       </p:ext>
     </p:extLst>
   </p:cSld>
@@ -768,13 +684,7 @@
       </p:grpSpPr>
       <p:sp>
         <p:nvSpPr>
-          <p:cNvPr id="2" name="标题 1">
-            <a:extLst>
-              <a:ext uri="{FF2B5EF4-FFF2-40B4-BE49-F238E27FC236}">
-                <a16:creationId xmlns:a16="http://schemas.microsoft.com/office/drawing/2014/main" id="{5BAF1883-624E-D240-C82F-FC95D666042D}"/>
-              </a:ext>
-            </a:extLst>
-          </p:cNvPr>
+          <p:cNvPr id="2" name="Title 1"/>
           <p:cNvSpPr>
             <a:spLocks noGrp="1"/>
           </p:cNvSpPr>
@@ -788,21 +698,16 @@
           <a:lstStyle/>
           <a:p>
             <a:r>
-              <a:rPr kumimoji="1" lang="zh-CN" altLang="en-US"/>
+              <a:rPr lang="zh-CN" altLang="en-US"/>
               <a:t>单击此处编辑母版标题样式</a:t>
             </a:r>
+            <a:endParaRPr lang="en-US" dirty="0"/>
           </a:p>
         </p:txBody>
       </p:sp>
       <p:sp>
         <p:nvSpPr>
-          <p:cNvPr id="3" name="内容占位符 2">
-            <a:extLst>
-              <a:ext uri="{FF2B5EF4-FFF2-40B4-BE49-F238E27FC236}">
-                <a16:creationId xmlns:a16="http://schemas.microsoft.com/office/drawing/2014/main" id="{155F4420-F288-77DD-8792-1628E12DBF92}"/>
-              </a:ext>
-            </a:extLst>
-          </p:cNvPr>
+          <p:cNvPr id="3" name="Content Placeholder 2"/>
           <p:cNvSpPr>
             <a:spLocks noGrp="1"/>
           </p:cNvSpPr>
@@ -817,49 +722,44 @@
           <a:p>
             <a:pPr lvl="0"/>
             <a:r>
-              <a:rPr kumimoji="1" lang="zh-CN" altLang="en-US"/>
+              <a:rPr lang="zh-CN" altLang="en-US"/>
               <a:t>单击此处编辑母版文本样式</a:t>
             </a:r>
           </a:p>
           <a:p>
             <a:pPr lvl="1"/>
             <a:r>
-              <a:rPr kumimoji="1" lang="zh-CN" altLang="en-US"/>
+              <a:rPr lang="zh-CN" altLang="en-US"/>
               <a:t>二级</a:t>
             </a:r>
           </a:p>
           <a:p>
             <a:pPr lvl="2"/>
             <a:r>
-              <a:rPr kumimoji="1" lang="zh-CN" altLang="en-US"/>
+              <a:rPr lang="zh-CN" altLang="en-US"/>
               <a:t>三级</a:t>
             </a:r>
           </a:p>
           <a:p>
             <a:pPr lvl="3"/>
             <a:r>
-              <a:rPr kumimoji="1" lang="zh-CN" altLang="en-US"/>
+              <a:rPr lang="zh-CN" altLang="en-US"/>
               <a:t>四级</a:t>
             </a:r>
           </a:p>
           <a:p>
             <a:pPr lvl="4"/>
             <a:r>
-              <a:rPr kumimoji="1" lang="zh-CN" altLang="en-US"/>
+              <a:rPr lang="zh-CN" altLang="en-US"/>
               <a:t>五级</a:t>
             </a:r>
+            <a:endParaRPr lang="en-US" dirty="0"/>
           </a:p>
         </p:txBody>
       </p:sp>
       <p:sp>
         <p:nvSpPr>
-          <p:cNvPr id="4" name="日期占位符 3">
-            <a:extLst>
-              <a:ext uri="{FF2B5EF4-FFF2-40B4-BE49-F238E27FC236}">
-                <a16:creationId xmlns:a16="http://schemas.microsoft.com/office/drawing/2014/main" id="{3CB4E354-BD31-887B-8736-6020131226A9}"/>
-              </a:ext>
-            </a:extLst>
-          </p:cNvPr>
+          <p:cNvPr id="4" name="Date Placeholder 3"/>
           <p:cNvSpPr>
             <a:spLocks noGrp="1"/>
           </p:cNvSpPr>
@@ -874,7 +774,7 @@
           <a:p>
             <a:fld id="{ADEA6865-5F8B-9C4A-950D-1D161D0F2BB5}" type="datetimeFigureOut">
               <a:rPr kumimoji="1" lang="zh-CN" altLang="en-US" smtClean="0"/>
-              <a:t>2022/5/20</a:t>
+              <a:t>2022/6/8</a:t>
             </a:fld>
             <a:endParaRPr kumimoji="1" lang="zh-CN" altLang="en-US"/>
           </a:p>
@@ -882,13 +782,7 @@
       </p:sp>
       <p:sp>
         <p:nvSpPr>
-          <p:cNvPr id="5" name="页脚占位符 4">
-            <a:extLst>
-              <a:ext uri="{FF2B5EF4-FFF2-40B4-BE49-F238E27FC236}">
-                <a16:creationId xmlns:a16="http://schemas.microsoft.com/office/drawing/2014/main" id="{EDB049B9-A6B2-2101-0AC8-18977AE73415}"/>
-              </a:ext>
-            </a:extLst>
-          </p:cNvPr>
+          <p:cNvPr id="5" name="Footer Placeholder 4"/>
           <p:cNvSpPr>
             <a:spLocks noGrp="1"/>
           </p:cNvSpPr>
@@ -907,13 +801,7 @@
       </p:sp>
       <p:sp>
         <p:nvSpPr>
-          <p:cNvPr id="6" name="灯片编号占位符 5">
-            <a:extLst>
-              <a:ext uri="{FF2B5EF4-FFF2-40B4-BE49-F238E27FC236}">
-                <a16:creationId xmlns:a16="http://schemas.microsoft.com/office/drawing/2014/main" id="{099A66FA-6745-6C42-21DB-CA0059C8493A}"/>
-              </a:ext>
-            </a:extLst>
-          </p:cNvPr>
+          <p:cNvPr id="6" name="Slide Number Placeholder 5"/>
           <p:cNvSpPr>
             <a:spLocks noGrp="1"/>
           </p:cNvSpPr>
@@ -937,7 +825,7 @@
     </p:spTree>
     <p:extLst>
       <p:ext uri="{BB962C8B-B14F-4D97-AF65-F5344CB8AC3E}">
-        <p14:creationId xmlns:p14="http://schemas.microsoft.com/office/powerpoint/2010/main" val="1813547252"/>
+        <p14:creationId xmlns:p14="http://schemas.microsoft.com/office/powerpoint/2010/main" val="1521992015"/>
       </p:ext>
     </p:extLst>
   </p:cSld>
@@ -966,13 +854,7 @@
       </p:grpSpPr>
       <p:sp>
         <p:nvSpPr>
-          <p:cNvPr id="2" name="标题 1">
-            <a:extLst>
-              <a:ext uri="{FF2B5EF4-FFF2-40B4-BE49-F238E27FC236}">
-                <a16:creationId xmlns:a16="http://schemas.microsoft.com/office/drawing/2014/main" id="{93873029-8263-1647-5A7A-C4D2A7A78B3A}"/>
-              </a:ext>
-            </a:extLst>
-          </p:cNvPr>
+          <p:cNvPr id="2" name="Title 1"/>
           <p:cNvSpPr>
             <a:spLocks noGrp="1"/>
           </p:cNvSpPr>
@@ -982,34 +864,29 @@
         </p:nvSpPr>
         <p:spPr>
           <a:xfrm>
-            <a:off x="831850" y="1709738"/>
-            <a:ext cx="10515600" cy="2852737"/>
+            <a:off x="831851" y="2692444"/>
+            <a:ext cx="10515600" cy="4492401"/>
           </a:xfrm>
         </p:spPr>
         <p:txBody>
           <a:bodyPr anchor="b"/>
           <a:lstStyle>
             <a:lvl1pPr>
-              <a:defRPr sz="6000"/>
+              <a:defRPr sz="8000"/>
             </a:lvl1pPr>
           </a:lstStyle>
           <a:p>
             <a:r>
-              <a:rPr kumimoji="1" lang="zh-CN" altLang="en-US"/>
+              <a:rPr lang="zh-CN" altLang="en-US"/>
               <a:t>单击此处编辑母版标题样式</a:t>
             </a:r>
+            <a:endParaRPr lang="en-US" dirty="0"/>
           </a:p>
         </p:txBody>
       </p:sp>
       <p:sp>
         <p:nvSpPr>
-          <p:cNvPr id="3" name="文本占位符 2">
-            <a:extLst>
-              <a:ext uri="{FF2B5EF4-FFF2-40B4-BE49-F238E27FC236}">
-                <a16:creationId xmlns:a16="http://schemas.microsoft.com/office/drawing/2014/main" id="{ABDB9020-74A7-BA2C-50B2-1758DF258C2A}"/>
-              </a:ext>
-            </a:extLst>
-          </p:cNvPr>
+          <p:cNvPr id="3" name="Text Placeholder 2"/>
           <p:cNvSpPr>
             <a:spLocks noGrp="1"/>
           </p:cNvSpPr>
@@ -1019,14 +896,32 @@
         </p:nvSpPr>
         <p:spPr>
           <a:xfrm>
-            <a:off x="831850" y="4589463"/>
-            <a:ext cx="10515600" cy="1500187"/>
+            <a:off x="831851" y="7227345"/>
+            <a:ext cx="10515600" cy="2362447"/>
           </a:xfrm>
         </p:spPr>
         <p:txBody>
           <a:bodyPr/>
           <a:lstStyle>
             <a:lvl1pPr marL="0" indent="0">
+              <a:buNone/>
+              <a:defRPr sz="3200">
+                <a:solidFill>
+                  <a:schemeClr val="tx1"/>
+                </a:solidFill>
+              </a:defRPr>
+            </a:lvl1pPr>
+            <a:lvl2pPr marL="609585" indent="0">
+              <a:buNone/>
+              <a:defRPr sz="2667">
+                <a:solidFill>
+                  <a:schemeClr val="tx1">
+                    <a:tint val="75000"/>
+                  </a:schemeClr>
+                </a:solidFill>
+              </a:defRPr>
+            </a:lvl2pPr>
+            <a:lvl3pPr marL="1219170" indent="0">
               <a:buNone/>
               <a:defRPr sz="2400">
                 <a:solidFill>
@@ -1035,30 +930,10 @@
                   </a:schemeClr>
                 </a:solidFill>
               </a:defRPr>
-            </a:lvl1pPr>
-            <a:lvl2pPr marL="457200" indent="0">
+            </a:lvl3pPr>
+            <a:lvl4pPr marL="1828754" indent="0">
               <a:buNone/>
-              <a:defRPr sz="2000">
-                <a:solidFill>
-                  <a:schemeClr val="tx1">
-                    <a:tint val="75000"/>
-                  </a:schemeClr>
-                </a:solidFill>
-              </a:defRPr>
-            </a:lvl2pPr>
-            <a:lvl3pPr marL="914400" indent="0">
-              <a:buNone/>
-              <a:defRPr sz="1800">
-                <a:solidFill>
-                  <a:schemeClr val="tx1">
-                    <a:tint val="75000"/>
-                  </a:schemeClr>
-                </a:solidFill>
-              </a:defRPr>
-            </a:lvl3pPr>
-            <a:lvl4pPr marL="1371600" indent="0">
-              <a:buNone/>
-              <a:defRPr sz="1600">
+              <a:defRPr sz="2133">
                 <a:solidFill>
                   <a:schemeClr val="tx1">
                     <a:tint val="75000"/>
@@ -1066,9 +941,9 @@
                 </a:solidFill>
               </a:defRPr>
             </a:lvl4pPr>
-            <a:lvl5pPr marL="1828800" indent="0">
+            <a:lvl5pPr marL="2438339" indent="0">
               <a:buNone/>
-              <a:defRPr sz="1600">
+              <a:defRPr sz="2133">
                 <a:solidFill>
                   <a:schemeClr val="tx1">
                     <a:tint val="75000"/>
@@ -1076,9 +951,9 @@
                 </a:solidFill>
               </a:defRPr>
             </a:lvl5pPr>
-            <a:lvl6pPr marL="2286000" indent="0">
+            <a:lvl6pPr marL="3047924" indent="0">
               <a:buNone/>
-              <a:defRPr sz="1600">
+              <a:defRPr sz="2133">
                 <a:solidFill>
                   <a:schemeClr val="tx1">
                     <a:tint val="75000"/>
@@ -1086,9 +961,9 @@
                 </a:solidFill>
               </a:defRPr>
             </a:lvl6pPr>
-            <a:lvl7pPr marL="2743200" indent="0">
+            <a:lvl7pPr marL="3657509" indent="0">
               <a:buNone/>
-              <a:defRPr sz="1600">
+              <a:defRPr sz="2133">
                 <a:solidFill>
                   <a:schemeClr val="tx1">
                     <a:tint val="75000"/>
@@ -1096,9 +971,9 @@
                 </a:solidFill>
               </a:defRPr>
             </a:lvl7pPr>
-            <a:lvl8pPr marL="3200400" indent="0">
+            <a:lvl8pPr marL="4267093" indent="0">
               <a:buNone/>
-              <a:defRPr sz="1600">
+              <a:defRPr sz="2133">
                 <a:solidFill>
                   <a:schemeClr val="tx1">
                     <a:tint val="75000"/>
@@ -1106,9 +981,9 @@
                 </a:solidFill>
               </a:defRPr>
             </a:lvl8pPr>
-            <a:lvl9pPr marL="3657600" indent="0">
+            <a:lvl9pPr marL="4876678" indent="0">
               <a:buNone/>
-              <a:defRPr sz="1600">
+              <a:defRPr sz="2133">
                 <a:solidFill>
                   <a:schemeClr val="tx1">
                     <a:tint val="75000"/>
@@ -1120,7 +995,7 @@
           <a:p>
             <a:pPr lvl="0"/>
             <a:r>
-              <a:rPr kumimoji="1" lang="zh-CN" altLang="en-US"/>
+              <a:rPr lang="zh-CN" altLang="en-US"/>
               <a:t>单击此处编辑母版文本样式</a:t>
             </a:r>
           </a:p>
@@ -1128,13 +1003,7 @@
       </p:sp>
       <p:sp>
         <p:nvSpPr>
-          <p:cNvPr id="4" name="日期占位符 3">
-            <a:extLst>
-              <a:ext uri="{FF2B5EF4-FFF2-40B4-BE49-F238E27FC236}">
-                <a16:creationId xmlns:a16="http://schemas.microsoft.com/office/drawing/2014/main" id="{81AAB57A-4C93-1A2F-F863-B7C8D357F358}"/>
-              </a:ext>
-            </a:extLst>
-          </p:cNvPr>
+          <p:cNvPr id="4" name="Date Placeholder 3"/>
           <p:cNvSpPr>
             <a:spLocks noGrp="1"/>
           </p:cNvSpPr>
@@ -1149,7 +1018,7 @@
           <a:p>
             <a:fld id="{ADEA6865-5F8B-9C4A-950D-1D161D0F2BB5}" type="datetimeFigureOut">
               <a:rPr kumimoji="1" lang="zh-CN" altLang="en-US" smtClean="0"/>
-              <a:t>2022/5/20</a:t>
+              <a:t>2022/6/8</a:t>
             </a:fld>
             <a:endParaRPr kumimoji="1" lang="zh-CN" altLang="en-US"/>
           </a:p>
@@ -1157,13 +1026,7 @@
       </p:sp>
       <p:sp>
         <p:nvSpPr>
-          <p:cNvPr id="5" name="页脚占位符 4">
-            <a:extLst>
-              <a:ext uri="{FF2B5EF4-FFF2-40B4-BE49-F238E27FC236}">
-                <a16:creationId xmlns:a16="http://schemas.microsoft.com/office/drawing/2014/main" id="{76344EBA-D0CD-50ED-1D03-38437E0B3512}"/>
-              </a:ext>
-            </a:extLst>
-          </p:cNvPr>
+          <p:cNvPr id="5" name="Footer Placeholder 4"/>
           <p:cNvSpPr>
             <a:spLocks noGrp="1"/>
           </p:cNvSpPr>
@@ -1182,13 +1045,7 @@
       </p:sp>
       <p:sp>
         <p:nvSpPr>
-          <p:cNvPr id="6" name="灯片编号占位符 5">
-            <a:extLst>
-              <a:ext uri="{FF2B5EF4-FFF2-40B4-BE49-F238E27FC236}">
-                <a16:creationId xmlns:a16="http://schemas.microsoft.com/office/drawing/2014/main" id="{9C533F25-6340-FDCB-4E20-03C539D0DF25}"/>
-              </a:ext>
-            </a:extLst>
-          </p:cNvPr>
+          <p:cNvPr id="6" name="Slide Number Placeholder 5"/>
           <p:cNvSpPr>
             <a:spLocks noGrp="1"/>
           </p:cNvSpPr>
@@ -1212,7 +1069,7 @@
     </p:spTree>
     <p:extLst>
       <p:ext uri="{BB962C8B-B14F-4D97-AF65-F5344CB8AC3E}">
-        <p14:creationId xmlns:p14="http://schemas.microsoft.com/office/powerpoint/2010/main" val="2224891933"/>
+        <p14:creationId xmlns:p14="http://schemas.microsoft.com/office/powerpoint/2010/main" val="1243288413"/>
       </p:ext>
     </p:extLst>
   </p:cSld>
@@ -1241,13 +1098,7 @@
       </p:grpSpPr>
       <p:sp>
         <p:nvSpPr>
-          <p:cNvPr id="2" name="标题 1">
-            <a:extLst>
-              <a:ext uri="{FF2B5EF4-FFF2-40B4-BE49-F238E27FC236}">
-                <a16:creationId xmlns:a16="http://schemas.microsoft.com/office/drawing/2014/main" id="{6F05D2A3-4283-34FE-8F31-98542847B0B2}"/>
-              </a:ext>
-            </a:extLst>
-          </p:cNvPr>
+          <p:cNvPr id="2" name="Title 1"/>
           <p:cNvSpPr>
             <a:spLocks noGrp="1"/>
           </p:cNvSpPr>
@@ -1261,21 +1112,16 @@
           <a:lstStyle/>
           <a:p>
             <a:r>
-              <a:rPr kumimoji="1" lang="zh-CN" altLang="en-US"/>
+              <a:rPr lang="zh-CN" altLang="en-US"/>
               <a:t>单击此处编辑母版标题样式</a:t>
             </a:r>
+            <a:endParaRPr lang="en-US" dirty="0"/>
           </a:p>
         </p:txBody>
       </p:sp>
       <p:sp>
         <p:nvSpPr>
-          <p:cNvPr id="3" name="内容占位符 2">
-            <a:extLst>
-              <a:ext uri="{FF2B5EF4-FFF2-40B4-BE49-F238E27FC236}">
-                <a16:creationId xmlns:a16="http://schemas.microsoft.com/office/drawing/2014/main" id="{B7088A11-F52F-4590-A7D3-8F01B77E6F99}"/>
-              </a:ext>
-            </a:extLst>
-          </p:cNvPr>
+          <p:cNvPr id="3" name="Content Placeholder 2"/>
           <p:cNvSpPr>
             <a:spLocks noGrp="1"/>
           </p:cNvSpPr>
@@ -1285,8 +1131,8 @@
         </p:nvSpPr>
         <p:spPr>
           <a:xfrm>
-            <a:off x="838200" y="1825625"/>
-            <a:ext cx="5181600" cy="4351338"/>
+            <a:off x="838200" y="2874937"/>
+            <a:ext cx="5181600" cy="6852350"/>
           </a:xfrm>
         </p:spPr>
         <p:txBody>
@@ -1295,49 +1141,44 @@
           <a:p>
             <a:pPr lvl="0"/>
             <a:r>
-              <a:rPr kumimoji="1" lang="zh-CN" altLang="en-US"/>
+              <a:rPr lang="zh-CN" altLang="en-US"/>
               <a:t>单击此处编辑母版文本样式</a:t>
             </a:r>
           </a:p>
           <a:p>
             <a:pPr lvl="1"/>
             <a:r>
-              <a:rPr kumimoji="1" lang="zh-CN" altLang="en-US"/>
+              <a:rPr lang="zh-CN" altLang="en-US"/>
               <a:t>二级</a:t>
             </a:r>
           </a:p>
           <a:p>
             <a:pPr lvl="2"/>
             <a:r>
-              <a:rPr kumimoji="1" lang="zh-CN" altLang="en-US"/>
+              <a:rPr lang="zh-CN" altLang="en-US"/>
               <a:t>三级</a:t>
             </a:r>
           </a:p>
           <a:p>
             <a:pPr lvl="3"/>
             <a:r>
-              <a:rPr kumimoji="1" lang="zh-CN" altLang="en-US"/>
+              <a:rPr lang="zh-CN" altLang="en-US"/>
               <a:t>四级</a:t>
             </a:r>
           </a:p>
           <a:p>
             <a:pPr lvl="4"/>
             <a:r>
-              <a:rPr kumimoji="1" lang="zh-CN" altLang="en-US"/>
+              <a:rPr lang="zh-CN" altLang="en-US"/>
               <a:t>五级</a:t>
             </a:r>
+            <a:endParaRPr lang="en-US" dirty="0"/>
           </a:p>
         </p:txBody>
       </p:sp>
       <p:sp>
         <p:nvSpPr>
-          <p:cNvPr id="4" name="内容占位符 3">
-            <a:extLst>
-              <a:ext uri="{FF2B5EF4-FFF2-40B4-BE49-F238E27FC236}">
-                <a16:creationId xmlns:a16="http://schemas.microsoft.com/office/drawing/2014/main" id="{EF440D70-122B-88C6-7F0A-CEF34F1217F5}"/>
-              </a:ext>
-            </a:extLst>
-          </p:cNvPr>
+          <p:cNvPr id="4" name="Content Placeholder 3"/>
           <p:cNvSpPr>
             <a:spLocks noGrp="1"/>
           </p:cNvSpPr>
@@ -1347,8 +1188,8 @@
         </p:nvSpPr>
         <p:spPr>
           <a:xfrm>
-            <a:off x="6172200" y="1825625"/>
-            <a:ext cx="5181600" cy="4351338"/>
+            <a:off x="6172200" y="2874937"/>
+            <a:ext cx="5181600" cy="6852350"/>
           </a:xfrm>
         </p:spPr>
         <p:txBody>
@@ -1357,49 +1198,44 @@
           <a:p>
             <a:pPr lvl="0"/>
             <a:r>
-              <a:rPr kumimoji="1" lang="zh-CN" altLang="en-US"/>
+              <a:rPr lang="zh-CN" altLang="en-US"/>
               <a:t>单击此处编辑母版文本样式</a:t>
             </a:r>
           </a:p>
           <a:p>
             <a:pPr lvl="1"/>
             <a:r>
-              <a:rPr kumimoji="1" lang="zh-CN" altLang="en-US"/>
+              <a:rPr lang="zh-CN" altLang="en-US"/>
               <a:t>二级</a:t>
             </a:r>
           </a:p>
           <a:p>
             <a:pPr lvl="2"/>
             <a:r>
-              <a:rPr kumimoji="1" lang="zh-CN" altLang="en-US"/>
+              <a:rPr lang="zh-CN" altLang="en-US"/>
               <a:t>三级</a:t>
             </a:r>
           </a:p>
           <a:p>
             <a:pPr lvl="3"/>
             <a:r>
-              <a:rPr kumimoji="1" lang="zh-CN" altLang="en-US"/>
+              <a:rPr lang="zh-CN" altLang="en-US"/>
               <a:t>四级</a:t>
             </a:r>
           </a:p>
           <a:p>
             <a:pPr lvl="4"/>
             <a:r>
-              <a:rPr kumimoji="1" lang="zh-CN" altLang="en-US"/>
+              <a:rPr lang="zh-CN" altLang="en-US"/>
               <a:t>五级</a:t>
             </a:r>
+            <a:endParaRPr lang="en-US" dirty="0"/>
           </a:p>
         </p:txBody>
       </p:sp>
       <p:sp>
         <p:nvSpPr>
-          <p:cNvPr id="5" name="日期占位符 4">
-            <a:extLst>
-              <a:ext uri="{FF2B5EF4-FFF2-40B4-BE49-F238E27FC236}">
-                <a16:creationId xmlns:a16="http://schemas.microsoft.com/office/drawing/2014/main" id="{7EFFECB7-92D8-DB43-49C3-5D88653C6534}"/>
-              </a:ext>
-            </a:extLst>
-          </p:cNvPr>
+          <p:cNvPr id="5" name="Date Placeholder 4"/>
           <p:cNvSpPr>
             <a:spLocks noGrp="1"/>
           </p:cNvSpPr>
@@ -1414,7 +1250,7 @@
           <a:p>
             <a:fld id="{ADEA6865-5F8B-9C4A-950D-1D161D0F2BB5}" type="datetimeFigureOut">
               <a:rPr kumimoji="1" lang="zh-CN" altLang="en-US" smtClean="0"/>
-              <a:t>2022/5/20</a:t>
+              <a:t>2022/6/8</a:t>
             </a:fld>
             <a:endParaRPr kumimoji="1" lang="zh-CN" altLang="en-US"/>
           </a:p>
@@ -1422,13 +1258,7 @@
       </p:sp>
       <p:sp>
         <p:nvSpPr>
-          <p:cNvPr id="6" name="页脚占位符 5">
-            <a:extLst>
-              <a:ext uri="{FF2B5EF4-FFF2-40B4-BE49-F238E27FC236}">
-                <a16:creationId xmlns:a16="http://schemas.microsoft.com/office/drawing/2014/main" id="{031AB980-7D4D-4F53-9BA8-7F1D54618AE8}"/>
-              </a:ext>
-            </a:extLst>
-          </p:cNvPr>
+          <p:cNvPr id="6" name="Footer Placeholder 5"/>
           <p:cNvSpPr>
             <a:spLocks noGrp="1"/>
           </p:cNvSpPr>
@@ -1447,13 +1277,7 @@
       </p:sp>
       <p:sp>
         <p:nvSpPr>
-          <p:cNvPr id="7" name="灯片编号占位符 6">
-            <a:extLst>
-              <a:ext uri="{FF2B5EF4-FFF2-40B4-BE49-F238E27FC236}">
-                <a16:creationId xmlns:a16="http://schemas.microsoft.com/office/drawing/2014/main" id="{11F625E1-562C-6FFD-FDF7-053B01DCD779}"/>
-              </a:ext>
-            </a:extLst>
-          </p:cNvPr>
+          <p:cNvPr id="7" name="Slide Number Placeholder 6"/>
           <p:cNvSpPr>
             <a:spLocks noGrp="1"/>
           </p:cNvSpPr>
@@ -1477,7 +1301,7 @@
     </p:spTree>
     <p:extLst>
       <p:ext uri="{BB962C8B-B14F-4D97-AF65-F5344CB8AC3E}">
-        <p14:creationId xmlns:p14="http://schemas.microsoft.com/office/powerpoint/2010/main" val="263064255"/>
+        <p14:creationId xmlns:p14="http://schemas.microsoft.com/office/powerpoint/2010/main" val="4190580376"/>
       </p:ext>
     </p:extLst>
   </p:cSld>
@@ -1506,13 +1330,7 @@
       </p:grpSpPr>
       <p:sp>
         <p:nvSpPr>
-          <p:cNvPr id="2" name="标题 1">
-            <a:extLst>
-              <a:ext uri="{FF2B5EF4-FFF2-40B4-BE49-F238E27FC236}">
-                <a16:creationId xmlns:a16="http://schemas.microsoft.com/office/drawing/2014/main" id="{8109DF7C-572F-83C5-6494-9CCB8D37181A}"/>
-              </a:ext>
-            </a:extLst>
-          </p:cNvPr>
+          <p:cNvPr id="2" name="Title 1"/>
           <p:cNvSpPr>
             <a:spLocks noGrp="1"/>
           </p:cNvSpPr>
@@ -1522,8 +1340,8 @@
         </p:nvSpPr>
         <p:spPr>
           <a:xfrm>
-            <a:off x="839788" y="365125"/>
-            <a:ext cx="10515600" cy="1325563"/>
+            <a:off x="839788" y="574990"/>
+            <a:ext cx="10515600" cy="2087455"/>
           </a:xfrm>
         </p:spPr>
         <p:txBody>
@@ -1531,21 +1349,16 @@
           <a:lstStyle/>
           <a:p>
             <a:r>
-              <a:rPr kumimoji="1" lang="zh-CN" altLang="en-US"/>
+              <a:rPr lang="zh-CN" altLang="en-US"/>
               <a:t>单击此处编辑母版标题样式</a:t>
             </a:r>
+            <a:endParaRPr lang="en-US" dirty="0"/>
           </a:p>
         </p:txBody>
       </p:sp>
       <p:sp>
         <p:nvSpPr>
-          <p:cNvPr id="3" name="文本占位符 2">
-            <a:extLst>
-              <a:ext uri="{FF2B5EF4-FFF2-40B4-BE49-F238E27FC236}">
-                <a16:creationId xmlns:a16="http://schemas.microsoft.com/office/drawing/2014/main" id="{DE5E10AB-C06B-4766-DC75-20B108209448}"/>
-              </a:ext>
-            </a:extLst>
-          </p:cNvPr>
+          <p:cNvPr id="3" name="Text Placeholder 2"/>
           <p:cNvSpPr>
             <a:spLocks noGrp="1"/>
           </p:cNvSpPr>
@@ -1555,8 +1368,8 @@
         </p:nvSpPr>
         <p:spPr>
           <a:xfrm>
-            <a:off x="839788" y="1681163"/>
-            <a:ext cx="5157787" cy="823912"/>
+            <a:off x="839789" y="2647443"/>
+            <a:ext cx="5157787" cy="1297471"/>
           </a:xfrm>
         </p:spPr>
         <p:txBody>
@@ -1564,45 +1377,45 @@
           <a:lstStyle>
             <a:lvl1pPr marL="0" indent="0">
               <a:buNone/>
+              <a:defRPr sz="3200" b="1"/>
+            </a:lvl1pPr>
+            <a:lvl2pPr marL="609585" indent="0">
+              <a:buNone/>
+              <a:defRPr sz="2667" b="1"/>
+            </a:lvl2pPr>
+            <a:lvl3pPr marL="1219170" indent="0">
+              <a:buNone/>
               <a:defRPr sz="2400" b="1"/>
-            </a:lvl1pPr>
-            <a:lvl2pPr marL="457200" indent="0">
+            </a:lvl3pPr>
+            <a:lvl4pPr marL="1828754" indent="0">
               <a:buNone/>
-              <a:defRPr sz="2000" b="1"/>
-            </a:lvl2pPr>
-            <a:lvl3pPr marL="914400" indent="0">
+              <a:defRPr sz="2133" b="1"/>
+            </a:lvl4pPr>
+            <a:lvl5pPr marL="2438339" indent="0">
               <a:buNone/>
-              <a:defRPr sz="1800" b="1"/>
-            </a:lvl3pPr>
-            <a:lvl4pPr marL="1371600" indent="0">
+              <a:defRPr sz="2133" b="1"/>
+            </a:lvl5pPr>
+            <a:lvl6pPr marL="3047924" indent="0">
               <a:buNone/>
-              <a:defRPr sz="1600" b="1"/>
-            </a:lvl4pPr>
-            <a:lvl5pPr marL="1828800" indent="0">
+              <a:defRPr sz="2133" b="1"/>
+            </a:lvl6pPr>
+            <a:lvl7pPr marL="3657509" indent="0">
               <a:buNone/>
-              <a:defRPr sz="1600" b="1"/>
-            </a:lvl5pPr>
-            <a:lvl6pPr marL="2286000" indent="0">
+              <a:defRPr sz="2133" b="1"/>
+            </a:lvl7pPr>
+            <a:lvl8pPr marL="4267093" indent="0">
               <a:buNone/>
-              <a:defRPr sz="1600" b="1"/>
-            </a:lvl6pPr>
-            <a:lvl7pPr marL="2743200" indent="0">
+              <a:defRPr sz="2133" b="1"/>
+            </a:lvl8pPr>
+            <a:lvl9pPr marL="4876678" indent="0">
               <a:buNone/>
-              <a:defRPr sz="1600" b="1"/>
-            </a:lvl7pPr>
-            <a:lvl8pPr marL="3200400" indent="0">
-              <a:buNone/>
-              <a:defRPr sz="1600" b="1"/>
-            </a:lvl8pPr>
-            <a:lvl9pPr marL="3657600" indent="0">
-              <a:buNone/>
-              <a:defRPr sz="1600" b="1"/>
+              <a:defRPr sz="2133" b="1"/>
             </a:lvl9pPr>
           </a:lstStyle>
           <a:p>
             <a:pPr lvl="0"/>
             <a:r>
-              <a:rPr kumimoji="1" lang="zh-CN" altLang="en-US"/>
+              <a:rPr lang="zh-CN" altLang="en-US"/>
               <a:t>单击此处编辑母版文本样式</a:t>
             </a:r>
           </a:p>
@@ -1610,13 +1423,7 @@
       </p:sp>
       <p:sp>
         <p:nvSpPr>
-          <p:cNvPr id="4" name="内容占位符 3">
-            <a:extLst>
-              <a:ext uri="{FF2B5EF4-FFF2-40B4-BE49-F238E27FC236}">
-                <a16:creationId xmlns:a16="http://schemas.microsoft.com/office/drawing/2014/main" id="{4343A908-353C-D406-369B-0189567F2CF0}"/>
-              </a:ext>
-            </a:extLst>
-          </p:cNvPr>
+          <p:cNvPr id="4" name="Content Placeholder 3"/>
           <p:cNvSpPr>
             <a:spLocks noGrp="1"/>
           </p:cNvSpPr>
@@ -1626,8 +1433,8 @@
         </p:nvSpPr>
         <p:spPr>
           <a:xfrm>
-            <a:off x="839788" y="2505075"/>
-            <a:ext cx="5157787" cy="3684588"/>
+            <a:off x="839789" y="3944914"/>
+            <a:ext cx="5157787" cy="5802373"/>
           </a:xfrm>
         </p:spPr>
         <p:txBody>
@@ -1636,49 +1443,44 @@
           <a:p>
             <a:pPr lvl="0"/>
             <a:r>
-              <a:rPr kumimoji="1" lang="zh-CN" altLang="en-US"/>
+              <a:rPr lang="zh-CN" altLang="en-US"/>
               <a:t>单击此处编辑母版文本样式</a:t>
             </a:r>
           </a:p>
           <a:p>
             <a:pPr lvl="1"/>
             <a:r>
-              <a:rPr kumimoji="1" lang="zh-CN" altLang="en-US"/>
+              <a:rPr lang="zh-CN" altLang="en-US"/>
               <a:t>二级</a:t>
             </a:r>
           </a:p>
           <a:p>
             <a:pPr lvl="2"/>
             <a:r>
-              <a:rPr kumimoji="1" lang="zh-CN" altLang="en-US"/>
+              <a:rPr lang="zh-CN" altLang="en-US"/>
               <a:t>三级</a:t>
             </a:r>
           </a:p>
           <a:p>
             <a:pPr lvl="3"/>
             <a:r>
-              <a:rPr kumimoji="1" lang="zh-CN" altLang="en-US"/>
+              <a:rPr lang="zh-CN" altLang="en-US"/>
               <a:t>四级</a:t>
             </a:r>
           </a:p>
           <a:p>
             <a:pPr lvl="4"/>
             <a:r>
-              <a:rPr kumimoji="1" lang="zh-CN" altLang="en-US"/>
+              <a:rPr lang="zh-CN" altLang="en-US"/>
               <a:t>五级</a:t>
             </a:r>
+            <a:endParaRPr lang="en-US" dirty="0"/>
           </a:p>
         </p:txBody>
       </p:sp>
       <p:sp>
         <p:nvSpPr>
-          <p:cNvPr id="5" name="文本占位符 4">
-            <a:extLst>
-              <a:ext uri="{FF2B5EF4-FFF2-40B4-BE49-F238E27FC236}">
-                <a16:creationId xmlns:a16="http://schemas.microsoft.com/office/drawing/2014/main" id="{5D311F2E-9AFE-A5EB-322F-244535BE045F}"/>
-              </a:ext>
-            </a:extLst>
-          </p:cNvPr>
+          <p:cNvPr id="5" name="Text Placeholder 4"/>
           <p:cNvSpPr>
             <a:spLocks noGrp="1"/>
           </p:cNvSpPr>
@@ -1688,8 +1490,8 @@
         </p:nvSpPr>
         <p:spPr>
           <a:xfrm>
-            <a:off x="6172200" y="1681163"/>
-            <a:ext cx="5183188" cy="823912"/>
+            <a:off x="6172201" y="2647443"/>
+            <a:ext cx="5183188" cy="1297471"/>
           </a:xfrm>
         </p:spPr>
         <p:txBody>
@@ -1697,45 +1499,45 @@
           <a:lstStyle>
             <a:lvl1pPr marL="0" indent="0">
               <a:buNone/>
+              <a:defRPr sz="3200" b="1"/>
+            </a:lvl1pPr>
+            <a:lvl2pPr marL="609585" indent="0">
+              <a:buNone/>
+              <a:defRPr sz="2667" b="1"/>
+            </a:lvl2pPr>
+            <a:lvl3pPr marL="1219170" indent="0">
+              <a:buNone/>
               <a:defRPr sz="2400" b="1"/>
-            </a:lvl1pPr>
-            <a:lvl2pPr marL="457200" indent="0">
+            </a:lvl3pPr>
+            <a:lvl4pPr marL="1828754" indent="0">
               <a:buNone/>
-              <a:defRPr sz="2000" b="1"/>
-            </a:lvl2pPr>
-            <a:lvl3pPr marL="914400" indent="0">
+              <a:defRPr sz="2133" b="1"/>
+            </a:lvl4pPr>
+            <a:lvl5pPr marL="2438339" indent="0">
               <a:buNone/>
-              <a:defRPr sz="1800" b="1"/>
-            </a:lvl3pPr>
-            <a:lvl4pPr marL="1371600" indent="0">
+              <a:defRPr sz="2133" b="1"/>
+            </a:lvl5pPr>
+            <a:lvl6pPr marL="3047924" indent="0">
               <a:buNone/>
-              <a:defRPr sz="1600" b="1"/>
-            </a:lvl4pPr>
-            <a:lvl5pPr marL="1828800" indent="0">
+              <a:defRPr sz="2133" b="1"/>
+            </a:lvl6pPr>
+            <a:lvl7pPr marL="3657509" indent="0">
               <a:buNone/>
-              <a:defRPr sz="1600" b="1"/>
-            </a:lvl5pPr>
-            <a:lvl6pPr marL="2286000" indent="0">
+              <a:defRPr sz="2133" b="1"/>
+            </a:lvl7pPr>
+            <a:lvl8pPr marL="4267093" indent="0">
               <a:buNone/>
-              <a:defRPr sz="1600" b="1"/>
-            </a:lvl6pPr>
-            <a:lvl7pPr marL="2743200" indent="0">
+              <a:defRPr sz="2133" b="1"/>
+            </a:lvl8pPr>
+            <a:lvl9pPr marL="4876678" indent="0">
               <a:buNone/>
-              <a:defRPr sz="1600" b="1"/>
-            </a:lvl7pPr>
-            <a:lvl8pPr marL="3200400" indent="0">
-              <a:buNone/>
-              <a:defRPr sz="1600" b="1"/>
-            </a:lvl8pPr>
-            <a:lvl9pPr marL="3657600" indent="0">
-              <a:buNone/>
-              <a:defRPr sz="1600" b="1"/>
+              <a:defRPr sz="2133" b="1"/>
             </a:lvl9pPr>
           </a:lstStyle>
           <a:p>
             <a:pPr lvl="0"/>
             <a:r>
-              <a:rPr kumimoji="1" lang="zh-CN" altLang="en-US"/>
+              <a:rPr lang="zh-CN" altLang="en-US"/>
               <a:t>单击此处编辑母版文本样式</a:t>
             </a:r>
           </a:p>
@@ -1743,13 +1545,7 @@
       </p:sp>
       <p:sp>
         <p:nvSpPr>
-          <p:cNvPr id="6" name="内容占位符 5">
-            <a:extLst>
-              <a:ext uri="{FF2B5EF4-FFF2-40B4-BE49-F238E27FC236}">
-                <a16:creationId xmlns:a16="http://schemas.microsoft.com/office/drawing/2014/main" id="{47449987-890E-2C25-A69A-08FE03BF8CED}"/>
-              </a:ext>
-            </a:extLst>
-          </p:cNvPr>
+          <p:cNvPr id="6" name="Content Placeholder 5"/>
           <p:cNvSpPr>
             <a:spLocks noGrp="1"/>
           </p:cNvSpPr>
@@ -1759,8 +1555,8 @@
         </p:nvSpPr>
         <p:spPr>
           <a:xfrm>
-            <a:off x="6172200" y="2505075"/>
-            <a:ext cx="5183188" cy="3684588"/>
+            <a:off x="6172201" y="3944914"/>
+            <a:ext cx="5183188" cy="5802373"/>
           </a:xfrm>
         </p:spPr>
         <p:txBody>
@@ -1769,49 +1565,44 @@
           <a:p>
             <a:pPr lvl="0"/>
             <a:r>
-              <a:rPr kumimoji="1" lang="zh-CN" altLang="en-US"/>
+              <a:rPr lang="zh-CN" altLang="en-US"/>
               <a:t>单击此处编辑母版文本样式</a:t>
             </a:r>
           </a:p>
           <a:p>
             <a:pPr lvl="1"/>
             <a:r>
-              <a:rPr kumimoji="1" lang="zh-CN" altLang="en-US"/>
+              <a:rPr lang="zh-CN" altLang="en-US"/>
               <a:t>二级</a:t>
             </a:r>
           </a:p>
           <a:p>
             <a:pPr lvl="2"/>
             <a:r>
-              <a:rPr kumimoji="1" lang="zh-CN" altLang="en-US"/>
+              <a:rPr lang="zh-CN" altLang="en-US"/>
               <a:t>三级</a:t>
             </a:r>
           </a:p>
           <a:p>
             <a:pPr lvl="3"/>
             <a:r>
-              <a:rPr kumimoji="1" lang="zh-CN" altLang="en-US"/>
+              <a:rPr lang="zh-CN" altLang="en-US"/>
               <a:t>四级</a:t>
             </a:r>
           </a:p>
           <a:p>
             <a:pPr lvl="4"/>
             <a:r>
-              <a:rPr kumimoji="1" lang="zh-CN" altLang="en-US"/>
+              <a:rPr lang="zh-CN" altLang="en-US"/>
               <a:t>五级</a:t>
             </a:r>
+            <a:endParaRPr lang="en-US" dirty="0"/>
           </a:p>
         </p:txBody>
       </p:sp>
       <p:sp>
         <p:nvSpPr>
-          <p:cNvPr id="7" name="日期占位符 6">
-            <a:extLst>
-              <a:ext uri="{FF2B5EF4-FFF2-40B4-BE49-F238E27FC236}">
-                <a16:creationId xmlns:a16="http://schemas.microsoft.com/office/drawing/2014/main" id="{D079E58D-B190-AD29-82EB-11351CB251E5}"/>
-              </a:ext>
-            </a:extLst>
-          </p:cNvPr>
+          <p:cNvPr id="7" name="Date Placeholder 6"/>
           <p:cNvSpPr>
             <a:spLocks noGrp="1"/>
           </p:cNvSpPr>
@@ -1826,7 +1617,7 @@
           <a:p>
             <a:fld id="{ADEA6865-5F8B-9C4A-950D-1D161D0F2BB5}" type="datetimeFigureOut">
               <a:rPr kumimoji="1" lang="zh-CN" altLang="en-US" smtClean="0"/>
-              <a:t>2022/5/20</a:t>
+              <a:t>2022/6/8</a:t>
             </a:fld>
             <a:endParaRPr kumimoji="1" lang="zh-CN" altLang="en-US"/>
           </a:p>
@@ -1834,13 +1625,7 @@
       </p:sp>
       <p:sp>
         <p:nvSpPr>
-          <p:cNvPr id="8" name="页脚占位符 7">
-            <a:extLst>
-              <a:ext uri="{FF2B5EF4-FFF2-40B4-BE49-F238E27FC236}">
-                <a16:creationId xmlns:a16="http://schemas.microsoft.com/office/drawing/2014/main" id="{5A815046-31A3-E813-7CF7-5627B2E4A734}"/>
-              </a:ext>
-            </a:extLst>
-          </p:cNvPr>
+          <p:cNvPr id="8" name="Footer Placeholder 7"/>
           <p:cNvSpPr>
             <a:spLocks noGrp="1"/>
           </p:cNvSpPr>
@@ -1859,13 +1644,7 @@
       </p:sp>
       <p:sp>
         <p:nvSpPr>
-          <p:cNvPr id="9" name="灯片编号占位符 8">
-            <a:extLst>
-              <a:ext uri="{FF2B5EF4-FFF2-40B4-BE49-F238E27FC236}">
-                <a16:creationId xmlns:a16="http://schemas.microsoft.com/office/drawing/2014/main" id="{1F74771E-823C-DECF-9044-5B69C5230CCA}"/>
-              </a:ext>
-            </a:extLst>
-          </p:cNvPr>
+          <p:cNvPr id="9" name="Slide Number Placeholder 8"/>
           <p:cNvSpPr>
             <a:spLocks noGrp="1"/>
           </p:cNvSpPr>
@@ -1889,7 +1668,7 @@
     </p:spTree>
     <p:extLst>
       <p:ext uri="{BB962C8B-B14F-4D97-AF65-F5344CB8AC3E}">
-        <p14:creationId xmlns:p14="http://schemas.microsoft.com/office/powerpoint/2010/main" val="2585353843"/>
+        <p14:creationId xmlns:p14="http://schemas.microsoft.com/office/powerpoint/2010/main" val="1863792678"/>
       </p:ext>
     </p:extLst>
   </p:cSld>
@@ -1918,13 +1697,7 @@
       </p:grpSpPr>
       <p:sp>
         <p:nvSpPr>
-          <p:cNvPr id="2" name="标题 1">
-            <a:extLst>
-              <a:ext uri="{FF2B5EF4-FFF2-40B4-BE49-F238E27FC236}">
-                <a16:creationId xmlns:a16="http://schemas.microsoft.com/office/drawing/2014/main" id="{3BC7386B-A46F-7685-D938-958A32012DE3}"/>
-              </a:ext>
-            </a:extLst>
-          </p:cNvPr>
+          <p:cNvPr id="2" name="Title 1"/>
           <p:cNvSpPr>
             <a:spLocks noGrp="1"/>
           </p:cNvSpPr>
@@ -1938,21 +1711,16 @@
           <a:lstStyle/>
           <a:p>
             <a:r>
-              <a:rPr kumimoji="1" lang="zh-CN" altLang="en-US"/>
+              <a:rPr lang="zh-CN" altLang="en-US"/>
               <a:t>单击此处编辑母版标题样式</a:t>
             </a:r>
+            <a:endParaRPr lang="en-US" dirty="0"/>
           </a:p>
         </p:txBody>
       </p:sp>
       <p:sp>
         <p:nvSpPr>
-          <p:cNvPr id="3" name="日期占位符 2">
-            <a:extLst>
-              <a:ext uri="{FF2B5EF4-FFF2-40B4-BE49-F238E27FC236}">
-                <a16:creationId xmlns:a16="http://schemas.microsoft.com/office/drawing/2014/main" id="{2B14F064-8A79-FC15-7DC2-A3646BCCF984}"/>
-              </a:ext>
-            </a:extLst>
-          </p:cNvPr>
+          <p:cNvPr id="3" name="Date Placeholder 2"/>
           <p:cNvSpPr>
             <a:spLocks noGrp="1"/>
           </p:cNvSpPr>
@@ -1967,7 +1735,7 @@
           <a:p>
             <a:fld id="{ADEA6865-5F8B-9C4A-950D-1D161D0F2BB5}" type="datetimeFigureOut">
               <a:rPr kumimoji="1" lang="zh-CN" altLang="en-US" smtClean="0"/>
-              <a:t>2022/5/20</a:t>
+              <a:t>2022/6/8</a:t>
             </a:fld>
             <a:endParaRPr kumimoji="1" lang="zh-CN" altLang="en-US"/>
           </a:p>
@@ -1975,13 +1743,7 @@
       </p:sp>
       <p:sp>
         <p:nvSpPr>
-          <p:cNvPr id="4" name="页脚占位符 3">
-            <a:extLst>
-              <a:ext uri="{FF2B5EF4-FFF2-40B4-BE49-F238E27FC236}">
-                <a16:creationId xmlns:a16="http://schemas.microsoft.com/office/drawing/2014/main" id="{13E69A6C-8D91-6A73-5539-FBEE44ED749D}"/>
-              </a:ext>
-            </a:extLst>
-          </p:cNvPr>
+          <p:cNvPr id="4" name="Footer Placeholder 3"/>
           <p:cNvSpPr>
             <a:spLocks noGrp="1"/>
           </p:cNvSpPr>
@@ -2000,13 +1762,7 @@
       </p:sp>
       <p:sp>
         <p:nvSpPr>
-          <p:cNvPr id="5" name="灯片编号占位符 4">
-            <a:extLst>
-              <a:ext uri="{FF2B5EF4-FFF2-40B4-BE49-F238E27FC236}">
-                <a16:creationId xmlns:a16="http://schemas.microsoft.com/office/drawing/2014/main" id="{95C04459-ECEE-76CD-5F2E-125D1104B0D5}"/>
-              </a:ext>
-            </a:extLst>
-          </p:cNvPr>
+          <p:cNvPr id="5" name="Slide Number Placeholder 4"/>
           <p:cNvSpPr>
             <a:spLocks noGrp="1"/>
           </p:cNvSpPr>
@@ -2030,7 +1786,7 @@
     </p:spTree>
     <p:extLst>
       <p:ext uri="{BB962C8B-B14F-4D97-AF65-F5344CB8AC3E}">
-        <p14:creationId xmlns:p14="http://schemas.microsoft.com/office/powerpoint/2010/main" val="750914731"/>
+        <p14:creationId xmlns:p14="http://schemas.microsoft.com/office/powerpoint/2010/main" val="3775748318"/>
       </p:ext>
     </p:extLst>
   </p:cSld>
@@ -2059,13 +1815,7 @@
       </p:grpSpPr>
       <p:sp>
         <p:nvSpPr>
-          <p:cNvPr id="2" name="日期占位符 1">
-            <a:extLst>
-              <a:ext uri="{FF2B5EF4-FFF2-40B4-BE49-F238E27FC236}">
-                <a16:creationId xmlns:a16="http://schemas.microsoft.com/office/drawing/2014/main" id="{089B2EE3-231B-3D8D-2CBC-FC6685970E7F}"/>
-              </a:ext>
-            </a:extLst>
-          </p:cNvPr>
+          <p:cNvPr id="2" name="Date Placeholder 1"/>
           <p:cNvSpPr>
             <a:spLocks noGrp="1"/>
           </p:cNvSpPr>
@@ -2080,7 +1830,7 @@
           <a:p>
             <a:fld id="{ADEA6865-5F8B-9C4A-950D-1D161D0F2BB5}" type="datetimeFigureOut">
               <a:rPr kumimoji="1" lang="zh-CN" altLang="en-US" smtClean="0"/>
-              <a:t>2022/5/20</a:t>
+              <a:t>2022/6/8</a:t>
             </a:fld>
             <a:endParaRPr kumimoji="1" lang="zh-CN" altLang="en-US"/>
           </a:p>
@@ -2088,13 +1838,7 @@
       </p:sp>
       <p:sp>
         <p:nvSpPr>
-          <p:cNvPr id="3" name="页脚占位符 2">
-            <a:extLst>
-              <a:ext uri="{FF2B5EF4-FFF2-40B4-BE49-F238E27FC236}">
-                <a16:creationId xmlns:a16="http://schemas.microsoft.com/office/drawing/2014/main" id="{10AD0144-5BD9-E1B3-571B-55F010657941}"/>
-              </a:ext>
-            </a:extLst>
-          </p:cNvPr>
+          <p:cNvPr id="3" name="Footer Placeholder 2"/>
           <p:cNvSpPr>
             <a:spLocks noGrp="1"/>
           </p:cNvSpPr>
@@ -2113,13 +1857,7 @@
       </p:sp>
       <p:sp>
         <p:nvSpPr>
-          <p:cNvPr id="4" name="灯片编号占位符 3">
-            <a:extLst>
-              <a:ext uri="{FF2B5EF4-FFF2-40B4-BE49-F238E27FC236}">
-                <a16:creationId xmlns:a16="http://schemas.microsoft.com/office/drawing/2014/main" id="{AA2C8C30-5125-B6D1-91C5-A65085D8D057}"/>
-              </a:ext>
-            </a:extLst>
-          </p:cNvPr>
+          <p:cNvPr id="4" name="Slide Number Placeholder 3"/>
           <p:cNvSpPr>
             <a:spLocks noGrp="1"/>
           </p:cNvSpPr>
@@ -2143,7 +1881,7 @@
     </p:spTree>
     <p:extLst>
       <p:ext uri="{BB962C8B-B14F-4D97-AF65-F5344CB8AC3E}">
-        <p14:creationId xmlns:p14="http://schemas.microsoft.com/office/powerpoint/2010/main" val="4154427057"/>
+        <p14:creationId xmlns:p14="http://schemas.microsoft.com/office/powerpoint/2010/main" val="1330652164"/>
       </p:ext>
     </p:extLst>
   </p:cSld>
@@ -2172,13 +1910,7 @@
       </p:grpSpPr>
       <p:sp>
         <p:nvSpPr>
-          <p:cNvPr id="2" name="标题 1">
-            <a:extLst>
-              <a:ext uri="{FF2B5EF4-FFF2-40B4-BE49-F238E27FC236}">
-                <a16:creationId xmlns:a16="http://schemas.microsoft.com/office/drawing/2014/main" id="{46DD094D-0AF7-9638-3F40-B3BE443073BB}"/>
-              </a:ext>
-            </a:extLst>
-          </p:cNvPr>
+          <p:cNvPr id="2" name="Title 1"/>
           <p:cNvSpPr>
             <a:spLocks noGrp="1"/>
           </p:cNvSpPr>
@@ -2188,34 +1920,29 @@
         </p:nvSpPr>
         <p:spPr>
           <a:xfrm>
-            <a:off x="839788" y="457200"/>
-            <a:ext cx="3932237" cy="1600200"/>
+            <a:off x="839788" y="719984"/>
+            <a:ext cx="3932237" cy="2519945"/>
           </a:xfrm>
         </p:spPr>
         <p:txBody>
           <a:bodyPr anchor="b"/>
           <a:lstStyle>
             <a:lvl1pPr>
-              <a:defRPr sz="3200"/>
+              <a:defRPr sz="4267"/>
             </a:lvl1pPr>
           </a:lstStyle>
           <a:p>
             <a:r>
-              <a:rPr kumimoji="1" lang="zh-CN" altLang="en-US"/>
+              <a:rPr lang="zh-CN" altLang="en-US"/>
               <a:t>单击此处编辑母版标题样式</a:t>
             </a:r>
+            <a:endParaRPr lang="en-US" dirty="0"/>
           </a:p>
         </p:txBody>
       </p:sp>
       <p:sp>
         <p:nvSpPr>
-          <p:cNvPr id="3" name="内容占位符 2">
-            <a:extLst>
-              <a:ext uri="{FF2B5EF4-FFF2-40B4-BE49-F238E27FC236}">
-                <a16:creationId xmlns:a16="http://schemas.microsoft.com/office/drawing/2014/main" id="{321E9F5E-2593-D674-6632-B04D7FF40F44}"/>
-              </a:ext>
-            </a:extLst>
-          </p:cNvPr>
+          <p:cNvPr id="3" name="Content Placeholder 2"/>
           <p:cNvSpPr>
             <a:spLocks noGrp="1"/>
           </p:cNvSpPr>
@@ -2225,87 +1952,82 @@
         </p:nvSpPr>
         <p:spPr>
           <a:xfrm>
-            <a:off x="5183188" y="987425"/>
-            <a:ext cx="6172200" cy="4873625"/>
+            <a:off x="5183188" y="1554968"/>
+            <a:ext cx="6172200" cy="7674832"/>
           </a:xfrm>
         </p:spPr>
         <p:txBody>
           <a:bodyPr/>
           <a:lstStyle>
             <a:lvl1pPr>
-              <a:defRPr sz="3200"/>
+              <a:defRPr sz="4267"/>
             </a:lvl1pPr>
             <a:lvl2pPr>
-              <a:defRPr sz="2800"/>
+              <a:defRPr sz="3733"/>
             </a:lvl2pPr>
             <a:lvl3pPr>
-              <a:defRPr sz="2400"/>
+              <a:defRPr sz="3200"/>
             </a:lvl3pPr>
             <a:lvl4pPr>
-              <a:defRPr sz="2000"/>
+              <a:defRPr sz="2667"/>
             </a:lvl4pPr>
             <a:lvl5pPr>
-              <a:defRPr sz="2000"/>
+              <a:defRPr sz="2667"/>
             </a:lvl5pPr>
             <a:lvl6pPr>
-              <a:defRPr sz="2000"/>
+              <a:defRPr sz="2667"/>
             </a:lvl6pPr>
             <a:lvl7pPr>
-              <a:defRPr sz="2000"/>
+              <a:defRPr sz="2667"/>
             </a:lvl7pPr>
             <a:lvl8pPr>
-              <a:defRPr sz="2000"/>
+              <a:defRPr sz="2667"/>
             </a:lvl8pPr>
             <a:lvl9pPr>
-              <a:defRPr sz="2000"/>
+              <a:defRPr sz="2667"/>
             </a:lvl9pPr>
           </a:lstStyle>
           <a:p>
             <a:pPr lvl="0"/>
             <a:r>
-              <a:rPr kumimoji="1" lang="zh-CN" altLang="en-US"/>
+              <a:rPr lang="zh-CN" altLang="en-US"/>
               <a:t>单击此处编辑母版文本样式</a:t>
             </a:r>
           </a:p>
           <a:p>
             <a:pPr lvl="1"/>
             <a:r>
-              <a:rPr kumimoji="1" lang="zh-CN" altLang="en-US"/>
+              <a:rPr lang="zh-CN" altLang="en-US"/>
               <a:t>二级</a:t>
             </a:r>
           </a:p>
           <a:p>
             <a:pPr lvl="2"/>
             <a:r>
-              <a:rPr kumimoji="1" lang="zh-CN" altLang="en-US"/>
+              <a:rPr lang="zh-CN" altLang="en-US"/>
               <a:t>三级</a:t>
             </a:r>
           </a:p>
           <a:p>
             <a:pPr lvl="3"/>
             <a:r>
-              <a:rPr kumimoji="1" lang="zh-CN" altLang="en-US"/>
+              <a:rPr lang="zh-CN" altLang="en-US"/>
               <a:t>四级</a:t>
             </a:r>
           </a:p>
           <a:p>
             <a:pPr lvl="4"/>
             <a:r>
-              <a:rPr kumimoji="1" lang="zh-CN" altLang="en-US"/>
+              <a:rPr lang="zh-CN" altLang="en-US"/>
               <a:t>五级</a:t>
             </a:r>
+            <a:endParaRPr lang="en-US" dirty="0"/>
           </a:p>
         </p:txBody>
       </p:sp>
       <p:sp>
         <p:nvSpPr>
-          <p:cNvPr id="4" name="文本占位符 3">
-            <a:extLst>
-              <a:ext uri="{FF2B5EF4-FFF2-40B4-BE49-F238E27FC236}">
-                <a16:creationId xmlns:a16="http://schemas.microsoft.com/office/drawing/2014/main" id="{C6F6F369-538F-5570-DB1F-71578D521072}"/>
-              </a:ext>
-            </a:extLst>
-          </p:cNvPr>
+          <p:cNvPr id="4" name="Text Placeholder 3"/>
           <p:cNvSpPr>
             <a:spLocks noGrp="1"/>
           </p:cNvSpPr>
@@ -2315,8 +2037,8 @@
         </p:nvSpPr>
         <p:spPr>
           <a:xfrm>
-            <a:off x="839788" y="2057400"/>
-            <a:ext cx="3932237" cy="3811588"/>
+            <a:off x="839788" y="3239929"/>
+            <a:ext cx="3932237" cy="6002369"/>
           </a:xfrm>
         </p:spPr>
         <p:txBody>
@@ -2324,45 +2046,45 @@
           <a:lstStyle>
             <a:lvl1pPr marL="0" indent="0">
               <a:buNone/>
+              <a:defRPr sz="2133"/>
+            </a:lvl1pPr>
+            <a:lvl2pPr marL="609585" indent="0">
+              <a:buNone/>
+              <a:defRPr sz="1867"/>
+            </a:lvl2pPr>
+            <a:lvl3pPr marL="1219170" indent="0">
+              <a:buNone/>
               <a:defRPr sz="1600"/>
-            </a:lvl1pPr>
-            <a:lvl2pPr marL="457200" indent="0">
+            </a:lvl3pPr>
+            <a:lvl4pPr marL="1828754" indent="0">
               <a:buNone/>
-              <a:defRPr sz="1400"/>
-            </a:lvl2pPr>
-            <a:lvl3pPr marL="914400" indent="0">
+              <a:defRPr sz="1333"/>
+            </a:lvl4pPr>
+            <a:lvl5pPr marL="2438339" indent="0">
               <a:buNone/>
-              <a:defRPr sz="1200"/>
-            </a:lvl3pPr>
-            <a:lvl4pPr marL="1371600" indent="0">
+              <a:defRPr sz="1333"/>
+            </a:lvl5pPr>
+            <a:lvl6pPr marL="3047924" indent="0">
               <a:buNone/>
-              <a:defRPr sz="1000"/>
-            </a:lvl4pPr>
-            <a:lvl5pPr marL="1828800" indent="0">
+              <a:defRPr sz="1333"/>
+            </a:lvl6pPr>
+            <a:lvl7pPr marL="3657509" indent="0">
               <a:buNone/>
-              <a:defRPr sz="1000"/>
-            </a:lvl5pPr>
-            <a:lvl6pPr marL="2286000" indent="0">
+              <a:defRPr sz="1333"/>
+            </a:lvl7pPr>
+            <a:lvl8pPr marL="4267093" indent="0">
               <a:buNone/>
-              <a:defRPr sz="1000"/>
-            </a:lvl6pPr>
-            <a:lvl7pPr marL="2743200" indent="0">
+              <a:defRPr sz="1333"/>
+            </a:lvl8pPr>
+            <a:lvl9pPr marL="4876678" indent="0">
               <a:buNone/>
-              <a:defRPr sz="1000"/>
-            </a:lvl7pPr>
-            <a:lvl8pPr marL="3200400" indent="0">
-              <a:buNone/>
-              <a:defRPr sz="1000"/>
-            </a:lvl8pPr>
-            <a:lvl9pPr marL="3657600" indent="0">
-              <a:buNone/>
-              <a:defRPr sz="1000"/>
+              <a:defRPr sz="1333"/>
             </a:lvl9pPr>
           </a:lstStyle>
           <a:p>
             <a:pPr lvl="0"/>
             <a:r>
-              <a:rPr kumimoji="1" lang="zh-CN" altLang="en-US"/>
+              <a:rPr lang="zh-CN" altLang="en-US"/>
               <a:t>单击此处编辑母版文本样式</a:t>
             </a:r>
           </a:p>
@@ -2370,13 +2092,7 @@
       </p:sp>
       <p:sp>
         <p:nvSpPr>
-          <p:cNvPr id="5" name="日期占位符 4">
-            <a:extLst>
-              <a:ext uri="{FF2B5EF4-FFF2-40B4-BE49-F238E27FC236}">
-                <a16:creationId xmlns:a16="http://schemas.microsoft.com/office/drawing/2014/main" id="{3D67E6AF-1AF7-147F-488F-9E06BCF2688C}"/>
-              </a:ext>
-            </a:extLst>
-          </p:cNvPr>
+          <p:cNvPr id="5" name="Date Placeholder 4"/>
           <p:cNvSpPr>
             <a:spLocks noGrp="1"/>
           </p:cNvSpPr>
@@ -2391,7 +2107,7 @@
           <a:p>
             <a:fld id="{ADEA6865-5F8B-9C4A-950D-1D161D0F2BB5}" type="datetimeFigureOut">
               <a:rPr kumimoji="1" lang="zh-CN" altLang="en-US" smtClean="0"/>
-              <a:t>2022/5/20</a:t>
+              <a:t>2022/6/8</a:t>
             </a:fld>
             <a:endParaRPr kumimoji="1" lang="zh-CN" altLang="en-US"/>
           </a:p>
@@ -2399,13 +2115,7 @@
       </p:sp>
       <p:sp>
         <p:nvSpPr>
-          <p:cNvPr id="6" name="页脚占位符 5">
-            <a:extLst>
-              <a:ext uri="{FF2B5EF4-FFF2-40B4-BE49-F238E27FC236}">
-                <a16:creationId xmlns:a16="http://schemas.microsoft.com/office/drawing/2014/main" id="{32809AFC-BD28-5693-7BD1-BCF74EE6D368}"/>
-              </a:ext>
-            </a:extLst>
-          </p:cNvPr>
+          <p:cNvPr id="6" name="Footer Placeholder 5"/>
           <p:cNvSpPr>
             <a:spLocks noGrp="1"/>
           </p:cNvSpPr>
@@ -2424,13 +2134,7 @@
       </p:sp>
       <p:sp>
         <p:nvSpPr>
-          <p:cNvPr id="7" name="灯片编号占位符 6">
-            <a:extLst>
-              <a:ext uri="{FF2B5EF4-FFF2-40B4-BE49-F238E27FC236}">
-                <a16:creationId xmlns:a16="http://schemas.microsoft.com/office/drawing/2014/main" id="{59364775-14C0-BC03-F58B-EBE14F4BF4A7}"/>
-              </a:ext>
-            </a:extLst>
-          </p:cNvPr>
+          <p:cNvPr id="7" name="Slide Number Placeholder 6"/>
           <p:cNvSpPr>
             <a:spLocks noGrp="1"/>
           </p:cNvSpPr>
@@ -2454,7 +2158,7 @@
     </p:spTree>
     <p:extLst>
       <p:ext uri="{BB962C8B-B14F-4D97-AF65-F5344CB8AC3E}">
-        <p14:creationId xmlns:p14="http://schemas.microsoft.com/office/powerpoint/2010/main" val="758304201"/>
+        <p14:creationId xmlns:p14="http://schemas.microsoft.com/office/powerpoint/2010/main" val="3625588034"/>
       </p:ext>
     </p:extLst>
   </p:cSld>
@@ -2483,13 +2187,7 @@
       </p:grpSpPr>
       <p:sp>
         <p:nvSpPr>
-          <p:cNvPr id="2" name="标题 1">
-            <a:extLst>
-              <a:ext uri="{FF2B5EF4-FFF2-40B4-BE49-F238E27FC236}">
-                <a16:creationId xmlns:a16="http://schemas.microsoft.com/office/drawing/2014/main" id="{96245FF6-86D9-28E8-E68E-6BE19D42D2BF}"/>
-              </a:ext>
-            </a:extLst>
-          </p:cNvPr>
+          <p:cNvPr id="2" name="Title 1"/>
           <p:cNvSpPr>
             <a:spLocks noGrp="1"/>
           </p:cNvSpPr>
@@ -2499,36 +2197,31 @@
         </p:nvSpPr>
         <p:spPr>
           <a:xfrm>
-            <a:off x="839788" y="457200"/>
-            <a:ext cx="3932237" cy="1600200"/>
+            <a:off x="839788" y="719984"/>
+            <a:ext cx="3932237" cy="2519945"/>
           </a:xfrm>
         </p:spPr>
         <p:txBody>
           <a:bodyPr anchor="b"/>
           <a:lstStyle>
             <a:lvl1pPr>
-              <a:defRPr sz="3200"/>
+              <a:defRPr sz="4267"/>
             </a:lvl1pPr>
           </a:lstStyle>
           <a:p>
             <a:r>
-              <a:rPr kumimoji="1" lang="zh-CN" altLang="en-US"/>
+              <a:rPr lang="zh-CN" altLang="en-US"/>
               <a:t>单击此处编辑母版标题样式</a:t>
             </a:r>
+            <a:endParaRPr lang="en-US" dirty="0"/>
           </a:p>
         </p:txBody>
       </p:sp>
       <p:sp>
         <p:nvSpPr>
-          <p:cNvPr id="3" name="图片占位符 2">
-            <a:extLst>
-              <a:ext uri="{FF2B5EF4-FFF2-40B4-BE49-F238E27FC236}">
-                <a16:creationId xmlns:a16="http://schemas.microsoft.com/office/drawing/2014/main" id="{915CE6FC-097A-D6E5-D6D9-267EE2377F4B}"/>
-              </a:ext>
-            </a:extLst>
-          </p:cNvPr>
+          <p:cNvPr id="3" name="Picture Placeholder 2"/>
           <p:cNvSpPr>
-            <a:spLocks noGrp="1"/>
+            <a:spLocks noGrp="1" noChangeAspect="1"/>
           </p:cNvSpPr>
           <p:nvPr>
             <p:ph type="pic" idx="1"/>
@@ -2536,64 +2229,62 @@
         </p:nvSpPr>
         <p:spPr>
           <a:xfrm>
-            <a:off x="5183188" y="987425"/>
-            <a:ext cx="6172200" cy="4873625"/>
+            <a:off x="5183188" y="1554968"/>
+            <a:ext cx="6172200" cy="7674832"/>
           </a:xfrm>
         </p:spPr>
         <p:txBody>
-          <a:bodyPr/>
+          <a:bodyPr anchor="t"/>
           <a:lstStyle>
             <a:lvl1pPr marL="0" indent="0">
               <a:buNone/>
+              <a:defRPr sz="4267"/>
+            </a:lvl1pPr>
+            <a:lvl2pPr marL="609585" indent="0">
+              <a:buNone/>
+              <a:defRPr sz="3733"/>
+            </a:lvl2pPr>
+            <a:lvl3pPr marL="1219170" indent="0">
+              <a:buNone/>
               <a:defRPr sz="3200"/>
-            </a:lvl1pPr>
-            <a:lvl2pPr marL="457200" indent="0">
+            </a:lvl3pPr>
+            <a:lvl4pPr marL="1828754" indent="0">
               <a:buNone/>
-              <a:defRPr sz="2800"/>
-            </a:lvl2pPr>
-            <a:lvl3pPr marL="914400" indent="0">
+              <a:defRPr sz="2667"/>
+            </a:lvl4pPr>
+            <a:lvl5pPr marL="2438339" indent="0">
               <a:buNone/>
-              <a:defRPr sz="2400"/>
-            </a:lvl3pPr>
-            <a:lvl4pPr marL="1371600" indent="0">
+              <a:defRPr sz="2667"/>
+            </a:lvl5pPr>
+            <a:lvl6pPr marL="3047924" indent="0">
               <a:buNone/>
-              <a:defRPr sz="2000"/>
-            </a:lvl4pPr>
-            <a:lvl5pPr marL="1828800" indent="0">
+              <a:defRPr sz="2667"/>
+            </a:lvl6pPr>
+            <a:lvl7pPr marL="3657509" indent="0">
               <a:buNone/>
-              <a:defRPr sz="2000"/>
-            </a:lvl5pPr>
-            <a:lvl6pPr marL="2286000" indent="0">
+              <a:defRPr sz="2667"/>
+            </a:lvl7pPr>
+            <a:lvl8pPr marL="4267093" indent="0">
               <a:buNone/>
-              <a:defRPr sz="2000"/>
-            </a:lvl6pPr>
-            <a:lvl7pPr marL="2743200" indent="0">
+              <a:defRPr sz="2667"/>
+            </a:lvl8pPr>
+            <a:lvl9pPr marL="4876678" indent="0">
               <a:buNone/>
-              <a:defRPr sz="2000"/>
-            </a:lvl7pPr>
-            <a:lvl8pPr marL="3200400" indent="0">
-              <a:buNone/>
-              <a:defRPr sz="2000"/>
-            </a:lvl8pPr>
-            <a:lvl9pPr marL="3657600" indent="0">
-              <a:buNone/>
-              <a:defRPr sz="2000"/>
+              <a:defRPr sz="2667"/>
             </a:lvl9pPr>
           </a:lstStyle>
           <a:p>
-            <a:endParaRPr kumimoji="1" lang="zh-CN" altLang="en-US"/>
+            <a:r>
+              <a:rPr lang="zh-CN" altLang="en-US"/>
+              <a:t>单击图标添加图片</a:t>
+            </a:r>
+            <a:endParaRPr lang="en-US" dirty="0"/>
           </a:p>
         </p:txBody>
       </p:sp>
       <p:sp>
         <p:nvSpPr>
-          <p:cNvPr id="4" name="文本占位符 3">
-            <a:extLst>
-              <a:ext uri="{FF2B5EF4-FFF2-40B4-BE49-F238E27FC236}">
-                <a16:creationId xmlns:a16="http://schemas.microsoft.com/office/drawing/2014/main" id="{B3BF8C9E-6687-FEF3-A251-8DBED1225D72}"/>
-              </a:ext>
-            </a:extLst>
-          </p:cNvPr>
+          <p:cNvPr id="4" name="Text Placeholder 3"/>
           <p:cNvSpPr>
             <a:spLocks noGrp="1"/>
           </p:cNvSpPr>
@@ -2603,8 +2294,8 @@
         </p:nvSpPr>
         <p:spPr>
           <a:xfrm>
-            <a:off x="839788" y="2057400"/>
-            <a:ext cx="3932237" cy="3811588"/>
+            <a:off x="839788" y="3239929"/>
+            <a:ext cx="3932237" cy="6002369"/>
           </a:xfrm>
         </p:spPr>
         <p:txBody>
@@ -2612,45 +2303,45 @@
           <a:lstStyle>
             <a:lvl1pPr marL="0" indent="0">
               <a:buNone/>
+              <a:defRPr sz="2133"/>
+            </a:lvl1pPr>
+            <a:lvl2pPr marL="609585" indent="0">
+              <a:buNone/>
+              <a:defRPr sz="1867"/>
+            </a:lvl2pPr>
+            <a:lvl3pPr marL="1219170" indent="0">
+              <a:buNone/>
               <a:defRPr sz="1600"/>
-            </a:lvl1pPr>
-            <a:lvl2pPr marL="457200" indent="0">
+            </a:lvl3pPr>
+            <a:lvl4pPr marL="1828754" indent="0">
               <a:buNone/>
-              <a:defRPr sz="1400"/>
-            </a:lvl2pPr>
-            <a:lvl3pPr marL="914400" indent="0">
+              <a:defRPr sz="1333"/>
+            </a:lvl4pPr>
+            <a:lvl5pPr marL="2438339" indent="0">
               <a:buNone/>
-              <a:defRPr sz="1200"/>
-            </a:lvl3pPr>
-            <a:lvl4pPr marL="1371600" indent="0">
+              <a:defRPr sz="1333"/>
+            </a:lvl5pPr>
+            <a:lvl6pPr marL="3047924" indent="0">
               <a:buNone/>
-              <a:defRPr sz="1000"/>
-            </a:lvl4pPr>
-            <a:lvl5pPr marL="1828800" indent="0">
+              <a:defRPr sz="1333"/>
+            </a:lvl6pPr>
+            <a:lvl7pPr marL="3657509" indent="0">
               <a:buNone/>
-              <a:defRPr sz="1000"/>
-            </a:lvl5pPr>
-            <a:lvl6pPr marL="2286000" indent="0">
+              <a:defRPr sz="1333"/>
+            </a:lvl7pPr>
+            <a:lvl8pPr marL="4267093" indent="0">
               <a:buNone/>
-              <a:defRPr sz="1000"/>
-            </a:lvl6pPr>
-            <a:lvl7pPr marL="2743200" indent="0">
+              <a:defRPr sz="1333"/>
+            </a:lvl8pPr>
+            <a:lvl9pPr marL="4876678" indent="0">
               <a:buNone/>
-              <a:defRPr sz="1000"/>
-            </a:lvl7pPr>
-            <a:lvl8pPr marL="3200400" indent="0">
-              <a:buNone/>
-              <a:defRPr sz="1000"/>
-            </a:lvl8pPr>
-            <a:lvl9pPr marL="3657600" indent="0">
-              <a:buNone/>
-              <a:defRPr sz="1000"/>
+              <a:defRPr sz="1333"/>
             </a:lvl9pPr>
           </a:lstStyle>
           <a:p>
             <a:pPr lvl="0"/>
             <a:r>
-              <a:rPr kumimoji="1" lang="zh-CN" altLang="en-US"/>
+              <a:rPr lang="zh-CN" altLang="en-US"/>
               <a:t>单击此处编辑母版文本样式</a:t>
             </a:r>
           </a:p>
@@ -2658,13 +2349,7 @@
       </p:sp>
       <p:sp>
         <p:nvSpPr>
-          <p:cNvPr id="5" name="日期占位符 4">
-            <a:extLst>
-              <a:ext uri="{FF2B5EF4-FFF2-40B4-BE49-F238E27FC236}">
-                <a16:creationId xmlns:a16="http://schemas.microsoft.com/office/drawing/2014/main" id="{43628064-512F-9B7D-1D74-F70B0F480F01}"/>
-              </a:ext>
-            </a:extLst>
-          </p:cNvPr>
+          <p:cNvPr id="5" name="Date Placeholder 4"/>
           <p:cNvSpPr>
             <a:spLocks noGrp="1"/>
           </p:cNvSpPr>
@@ -2679,7 +2364,7 @@
           <a:p>
             <a:fld id="{ADEA6865-5F8B-9C4A-950D-1D161D0F2BB5}" type="datetimeFigureOut">
               <a:rPr kumimoji="1" lang="zh-CN" altLang="en-US" smtClean="0"/>
-              <a:t>2022/5/20</a:t>
+              <a:t>2022/6/8</a:t>
             </a:fld>
             <a:endParaRPr kumimoji="1" lang="zh-CN" altLang="en-US"/>
           </a:p>
@@ -2687,13 +2372,7 @@
       </p:sp>
       <p:sp>
         <p:nvSpPr>
-          <p:cNvPr id="6" name="页脚占位符 5">
-            <a:extLst>
-              <a:ext uri="{FF2B5EF4-FFF2-40B4-BE49-F238E27FC236}">
-                <a16:creationId xmlns:a16="http://schemas.microsoft.com/office/drawing/2014/main" id="{91E07B8F-266D-C109-E6A6-77A0EB5407D7}"/>
-              </a:ext>
-            </a:extLst>
-          </p:cNvPr>
+          <p:cNvPr id="6" name="Footer Placeholder 5"/>
           <p:cNvSpPr>
             <a:spLocks noGrp="1"/>
           </p:cNvSpPr>
@@ -2712,13 +2391,7 @@
       </p:sp>
       <p:sp>
         <p:nvSpPr>
-          <p:cNvPr id="7" name="灯片编号占位符 6">
-            <a:extLst>
-              <a:ext uri="{FF2B5EF4-FFF2-40B4-BE49-F238E27FC236}">
-                <a16:creationId xmlns:a16="http://schemas.microsoft.com/office/drawing/2014/main" id="{F61FEDF4-0C44-A444-9C99-EDCBEA2870C8}"/>
-              </a:ext>
-            </a:extLst>
-          </p:cNvPr>
+          <p:cNvPr id="7" name="Slide Number Placeholder 6"/>
           <p:cNvSpPr>
             <a:spLocks noGrp="1"/>
           </p:cNvSpPr>
@@ -2742,7 +2415,7 @@
     </p:spTree>
     <p:extLst>
       <p:ext uri="{BB962C8B-B14F-4D97-AF65-F5344CB8AC3E}">
-        <p14:creationId xmlns:p14="http://schemas.microsoft.com/office/powerpoint/2010/main" val="3146530542"/>
+        <p14:creationId xmlns:p14="http://schemas.microsoft.com/office/powerpoint/2010/main" val="4078266784"/>
       </p:ext>
     </p:extLst>
   </p:cSld>
@@ -2776,13 +2449,7 @@
       </p:grpSpPr>
       <p:sp>
         <p:nvSpPr>
-          <p:cNvPr id="2" name="标题占位符 1">
-            <a:extLst>
-              <a:ext uri="{FF2B5EF4-FFF2-40B4-BE49-F238E27FC236}">
-                <a16:creationId xmlns:a16="http://schemas.microsoft.com/office/drawing/2014/main" id="{59BCBDCE-B001-D715-3FCE-A28DDCC3B47B}"/>
-              </a:ext>
-            </a:extLst>
-          </p:cNvPr>
+          <p:cNvPr id="2" name="Title Placeholder 1"/>
           <p:cNvSpPr>
             <a:spLocks noGrp="1"/>
           </p:cNvSpPr>
@@ -2792,8 +2459,8 @@
         </p:nvSpPr>
         <p:spPr>
           <a:xfrm>
-            <a:off x="838200" y="365125"/>
-            <a:ext cx="10515600" cy="1325563"/>
+            <a:off x="838200" y="574990"/>
+            <a:ext cx="10515600" cy="2087455"/>
           </a:xfrm>
           <a:prstGeom prst="rect">
             <a:avLst/>
@@ -2806,21 +2473,16 @@
           <a:lstStyle/>
           <a:p>
             <a:r>
-              <a:rPr kumimoji="1" lang="zh-CN" altLang="en-US"/>
+              <a:rPr lang="zh-CN" altLang="en-US"/>
               <a:t>单击此处编辑母版标题样式</a:t>
             </a:r>
+            <a:endParaRPr lang="en-US" dirty="0"/>
           </a:p>
         </p:txBody>
       </p:sp>
       <p:sp>
         <p:nvSpPr>
-          <p:cNvPr id="3" name="文本占位符 2">
-            <a:extLst>
-              <a:ext uri="{FF2B5EF4-FFF2-40B4-BE49-F238E27FC236}">
-                <a16:creationId xmlns:a16="http://schemas.microsoft.com/office/drawing/2014/main" id="{BF107A62-AA95-5018-EB08-7F7A9C0AA8E1}"/>
-              </a:ext>
-            </a:extLst>
-          </p:cNvPr>
+          <p:cNvPr id="3" name="Text Placeholder 2"/>
           <p:cNvSpPr>
             <a:spLocks noGrp="1"/>
           </p:cNvSpPr>
@@ -2830,8 +2492,8 @@
         </p:nvSpPr>
         <p:spPr>
           <a:xfrm>
-            <a:off x="838200" y="1825625"/>
-            <a:ext cx="10515600" cy="4351338"/>
+            <a:off x="838200" y="2874937"/>
+            <a:ext cx="10515600" cy="6852350"/>
           </a:xfrm>
           <a:prstGeom prst="rect">
             <a:avLst/>
@@ -2845,49 +2507,44 @@
           <a:p>
             <a:pPr lvl="0"/>
             <a:r>
-              <a:rPr kumimoji="1" lang="zh-CN" altLang="en-US"/>
+              <a:rPr lang="zh-CN" altLang="en-US"/>
               <a:t>单击此处编辑母版文本样式</a:t>
             </a:r>
           </a:p>
           <a:p>
             <a:pPr lvl="1"/>
             <a:r>
-              <a:rPr kumimoji="1" lang="zh-CN" altLang="en-US"/>
+              <a:rPr lang="zh-CN" altLang="en-US"/>
               <a:t>二级</a:t>
             </a:r>
           </a:p>
           <a:p>
             <a:pPr lvl="2"/>
             <a:r>
-              <a:rPr kumimoji="1" lang="zh-CN" altLang="en-US"/>
+              <a:rPr lang="zh-CN" altLang="en-US"/>
               <a:t>三级</a:t>
             </a:r>
           </a:p>
           <a:p>
             <a:pPr lvl="3"/>
             <a:r>
-              <a:rPr kumimoji="1" lang="zh-CN" altLang="en-US"/>
+              <a:rPr lang="zh-CN" altLang="en-US"/>
               <a:t>四级</a:t>
             </a:r>
           </a:p>
           <a:p>
             <a:pPr lvl="4"/>
             <a:r>
-              <a:rPr kumimoji="1" lang="zh-CN" altLang="en-US"/>
+              <a:rPr lang="zh-CN" altLang="en-US"/>
               <a:t>五级</a:t>
             </a:r>
+            <a:endParaRPr lang="en-US" dirty="0"/>
           </a:p>
         </p:txBody>
       </p:sp>
       <p:sp>
         <p:nvSpPr>
-          <p:cNvPr id="4" name="日期占位符 3">
-            <a:extLst>
-              <a:ext uri="{FF2B5EF4-FFF2-40B4-BE49-F238E27FC236}">
-                <a16:creationId xmlns:a16="http://schemas.microsoft.com/office/drawing/2014/main" id="{00485207-506E-EC8B-E764-78843367C7A0}"/>
-              </a:ext>
-            </a:extLst>
-          </p:cNvPr>
+          <p:cNvPr id="4" name="Date Placeholder 3"/>
           <p:cNvSpPr>
             <a:spLocks noGrp="1"/>
           </p:cNvSpPr>
@@ -2897,8 +2554,8 @@
         </p:nvSpPr>
         <p:spPr>
           <a:xfrm>
-            <a:off x="838200" y="6356350"/>
-            <a:ext cx="2743200" cy="365125"/>
+            <a:off x="838200" y="10009783"/>
+            <a:ext cx="2743200" cy="574987"/>
           </a:xfrm>
           <a:prstGeom prst="rect">
             <a:avLst/>
@@ -2908,7 +2565,7 @@
           <a:bodyPr vert="horz" lIns="91440" tIns="45720" rIns="91440" bIns="45720" rtlCol="0" anchor="ctr"/>
           <a:lstStyle>
             <a:lvl1pPr algn="l">
-              <a:defRPr sz="1200">
+              <a:defRPr sz="1600">
                 <a:solidFill>
                   <a:schemeClr val="tx1">
                     <a:tint val="75000"/>
@@ -2920,7 +2577,7 @@
           <a:p>
             <a:fld id="{ADEA6865-5F8B-9C4A-950D-1D161D0F2BB5}" type="datetimeFigureOut">
               <a:rPr kumimoji="1" lang="zh-CN" altLang="en-US" smtClean="0"/>
-              <a:t>2022/5/20</a:t>
+              <a:t>2022/6/8</a:t>
             </a:fld>
             <a:endParaRPr kumimoji="1" lang="zh-CN" altLang="en-US"/>
           </a:p>
@@ -2928,13 +2585,7 @@
       </p:sp>
       <p:sp>
         <p:nvSpPr>
-          <p:cNvPr id="5" name="页脚占位符 4">
-            <a:extLst>
-              <a:ext uri="{FF2B5EF4-FFF2-40B4-BE49-F238E27FC236}">
-                <a16:creationId xmlns:a16="http://schemas.microsoft.com/office/drawing/2014/main" id="{9522AF93-5910-D207-3348-364A877D753A}"/>
-              </a:ext>
-            </a:extLst>
-          </p:cNvPr>
+          <p:cNvPr id="5" name="Footer Placeholder 4"/>
           <p:cNvSpPr>
             <a:spLocks noGrp="1"/>
           </p:cNvSpPr>
@@ -2944,8 +2595,8 @@
         </p:nvSpPr>
         <p:spPr>
           <a:xfrm>
-            <a:off x="4038600" y="6356350"/>
-            <a:ext cx="4114800" cy="365125"/>
+            <a:off x="4038600" y="10009783"/>
+            <a:ext cx="4114800" cy="574987"/>
           </a:xfrm>
           <a:prstGeom prst="rect">
             <a:avLst/>
@@ -2955,7 +2606,7 @@
           <a:bodyPr vert="horz" lIns="91440" tIns="45720" rIns="91440" bIns="45720" rtlCol="0" anchor="ctr"/>
           <a:lstStyle>
             <a:lvl1pPr algn="ctr">
-              <a:defRPr sz="1200">
+              <a:defRPr sz="1600">
                 <a:solidFill>
                   <a:schemeClr val="tx1">
                     <a:tint val="75000"/>
@@ -2971,13 +2622,7 @@
       </p:sp>
       <p:sp>
         <p:nvSpPr>
-          <p:cNvPr id="6" name="灯片编号占位符 5">
-            <a:extLst>
-              <a:ext uri="{FF2B5EF4-FFF2-40B4-BE49-F238E27FC236}">
-                <a16:creationId xmlns:a16="http://schemas.microsoft.com/office/drawing/2014/main" id="{21FA9DEC-FC16-8F79-849E-70BA32ADE588}"/>
-              </a:ext>
-            </a:extLst>
-          </p:cNvPr>
+          <p:cNvPr id="6" name="Slide Number Placeholder 5"/>
           <p:cNvSpPr>
             <a:spLocks noGrp="1"/>
           </p:cNvSpPr>
@@ -2987,8 +2632,8 @@
         </p:nvSpPr>
         <p:spPr>
           <a:xfrm>
-            <a:off x="8610600" y="6356350"/>
-            <a:ext cx="2743200" cy="365125"/>
+            <a:off x="8610600" y="10009783"/>
+            <a:ext cx="2743200" cy="574987"/>
           </a:xfrm>
           <a:prstGeom prst="rect">
             <a:avLst/>
@@ -2998,7 +2643,7 @@
           <a:bodyPr vert="horz" lIns="91440" tIns="45720" rIns="91440" bIns="45720" rtlCol="0" anchor="ctr"/>
           <a:lstStyle>
             <a:lvl1pPr algn="r">
-              <a:defRPr sz="1200">
+              <a:defRPr sz="1600">
                 <a:solidFill>
                   <a:schemeClr val="tx1">
                     <a:tint val="75000"/>
@@ -3019,27 +2664,27 @@
     </p:spTree>
     <p:extLst>
       <p:ext uri="{BB962C8B-B14F-4D97-AF65-F5344CB8AC3E}">
-        <p14:creationId xmlns:p14="http://schemas.microsoft.com/office/powerpoint/2010/main" val="2730953768"/>
+        <p14:creationId xmlns:p14="http://schemas.microsoft.com/office/powerpoint/2010/main" val="1763384782"/>
       </p:ext>
     </p:extLst>
   </p:cSld>
   <p:clrMap bg1="lt1" tx1="dk1" bg2="lt2" tx2="dk2" accent1="accent1" accent2="accent2" accent3="accent3" accent4="accent4" accent5="accent5" accent6="accent6" hlink="hlink" folHlink="folHlink"/>
   <p:sldLayoutIdLst>
-    <p:sldLayoutId id="2147483649" r:id="rId1"/>
-    <p:sldLayoutId id="2147483650" r:id="rId2"/>
-    <p:sldLayoutId id="2147483651" r:id="rId3"/>
-    <p:sldLayoutId id="2147483652" r:id="rId4"/>
-    <p:sldLayoutId id="2147483653" r:id="rId5"/>
-    <p:sldLayoutId id="2147483654" r:id="rId6"/>
-    <p:sldLayoutId id="2147483655" r:id="rId7"/>
-    <p:sldLayoutId id="2147483656" r:id="rId8"/>
-    <p:sldLayoutId id="2147483657" r:id="rId9"/>
-    <p:sldLayoutId id="2147483658" r:id="rId10"/>
-    <p:sldLayoutId id="2147483659" r:id="rId11"/>
+    <p:sldLayoutId id="2147483661" r:id="rId1"/>
+    <p:sldLayoutId id="2147483662" r:id="rId2"/>
+    <p:sldLayoutId id="2147483663" r:id="rId3"/>
+    <p:sldLayoutId id="2147483664" r:id="rId4"/>
+    <p:sldLayoutId id="2147483665" r:id="rId5"/>
+    <p:sldLayoutId id="2147483666" r:id="rId6"/>
+    <p:sldLayoutId id="2147483667" r:id="rId7"/>
+    <p:sldLayoutId id="2147483668" r:id="rId8"/>
+    <p:sldLayoutId id="2147483669" r:id="rId9"/>
+    <p:sldLayoutId id="2147483670" r:id="rId10"/>
+    <p:sldLayoutId id="2147483671" r:id="rId11"/>
   </p:sldLayoutIdLst>
   <p:txStyles>
     <p:titleStyle>
-      <a:lvl1pPr algn="l" defTabSz="914400" rtl="0" eaLnBrk="1" latinLnBrk="0" hangingPunct="1">
+      <a:lvl1pPr algn="l" defTabSz="1219170" rtl="0" eaLnBrk="1" latinLnBrk="0" hangingPunct="1">
         <a:lnSpc>
           <a:spcPct val="90000"/>
         </a:lnSpc>
@@ -3047,7 +2692,7 @@
           <a:spcPct val="0"/>
         </a:spcBef>
         <a:buNone/>
-        <a:defRPr sz="4400" kern="1200">
+        <a:defRPr sz="5867" kern="1200">
           <a:solidFill>
             <a:schemeClr val="tx1"/>
           </a:solidFill>
@@ -3058,16 +2703,16 @@
       </a:lvl1pPr>
     </p:titleStyle>
     <p:bodyStyle>
-      <a:lvl1pPr marL="228600" indent="-228600" algn="l" defTabSz="914400" rtl="0" eaLnBrk="1" latinLnBrk="0" hangingPunct="1">
+      <a:lvl1pPr marL="304792" indent="-304792" algn="l" defTabSz="1219170" rtl="0" eaLnBrk="1" latinLnBrk="0" hangingPunct="1">
         <a:lnSpc>
           <a:spcPct val="90000"/>
         </a:lnSpc>
         <a:spcBef>
-          <a:spcPts val="1000"/>
+          <a:spcPts val="1333"/>
         </a:spcBef>
         <a:buFont typeface="Arial" panose="020B0604020202020204" pitchFamily="34" charset="0"/>
         <a:buChar char="•"/>
-        <a:defRPr sz="2800" kern="1200">
+        <a:defRPr sz="3733" kern="1200">
           <a:solidFill>
             <a:schemeClr val="tx1"/>
           </a:solidFill>
@@ -3076,12 +2721,48 @@
           <a:cs typeface="+mn-cs"/>
         </a:defRPr>
       </a:lvl1pPr>
-      <a:lvl2pPr marL="685800" indent="-228600" algn="l" defTabSz="914400" rtl="0" eaLnBrk="1" latinLnBrk="0" hangingPunct="1">
+      <a:lvl2pPr marL="914377" indent="-304792" algn="l" defTabSz="1219170" rtl="0" eaLnBrk="1" latinLnBrk="0" hangingPunct="1">
         <a:lnSpc>
           <a:spcPct val="90000"/>
         </a:lnSpc>
         <a:spcBef>
-          <a:spcPts val="500"/>
+          <a:spcPts val="667"/>
+        </a:spcBef>
+        <a:buFont typeface="Arial" panose="020B0604020202020204" pitchFamily="34" charset="0"/>
+        <a:buChar char="•"/>
+        <a:defRPr sz="3200" kern="1200">
+          <a:solidFill>
+            <a:schemeClr val="tx1"/>
+          </a:solidFill>
+          <a:latin typeface="+mn-lt"/>
+          <a:ea typeface="+mn-ea"/>
+          <a:cs typeface="+mn-cs"/>
+        </a:defRPr>
+      </a:lvl2pPr>
+      <a:lvl3pPr marL="1523962" indent="-304792" algn="l" defTabSz="1219170" rtl="0" eaLnBrk="1" latinLnBrk="0" hangingPunct="1">
+        <a:lnSpc>
+          <a:spcPct val="90000"/>
+        </a:lnSpc>
+        <a:spcBef>
+          <a:spcPts val="667"/>
+        </a:spcBef>
+        <a:buFont typeface="Arial" panose="020B0604020202020204" pitchFamily="34" charset="0"/>
+        <a:buChar char="•"/>
+        <a:defRPr sz="2667" kern="1200">
+          <a:solidFill>
+            <a:schemeClr val="tx1"/>
+          </a:solidFill>
+          <a:latin typeface="+mn-lt"/>
+          <a:ea typeface="+mn-ea"/>
+          <a:cs typeface="+mn-cs"/>
+        </a:defRPr>
+      </a:lvl3pPr>
+      <a:lvl4pPr marL="2133547" indent="-304792" algn="l" defTabSz="1219170" rtl="0" eaLnBrk="1" latinLnBrk="0" hangingPunct="1">
+        <a:lnSpc>
+          <a:spcPct val="90000"/>
+        </a:lnSpc>
+        <a:spcBef>
+          <a:spcPts val="667"/>
         </a:spcBef>
         <a:buFont typeface="Arial" panose="020B0604020202020204" pitchFamily="34" charset="0"/>
         <a:buChar char="•"/>
@@ -3093,53 +2774,17 @@
           <a:ea typeface="+mn-ea"/>
           <a:cs typeface="+mn-cs"/>
         </a:defRPr>
-      </a:lvl2pPr>
-      <a:lvl3pPr marL="1143000" indent="-228600" algn="l" defTabSz="914400" rtl="0" eaLnBrk="1" latinLnBrk="0" hangingPunct="1">
+      </a:lvl4pPr>
+      <a:lvl5pPr marL="2743131" indent="-304792" algn="l" defTabSz="1219170" rtl="0" eaLnBrk="1" latinLnBrk="0" hangingPunct="1">
         <a:lnSpc>
           <a:spcPct val="90000"/>
         </a:lnSpc>
         <a:spcBef>
-          <a:spcPts val="500"/>
+          <a:spcPts val="667"/>
         </a:spcBef>
         <a:buFont typeface="Arial" panose="020B0604020202020204" pitchFamily="34" charset="0"/>
         <a:buChar char="•"/>
-        <a:defRPr sz="2000" kern="1200">
-          <a:solidFill>
-            <a:schemeClr val="tx1"/>
-          </a:solidFill>
-          <a:latin typeface="+mn-lt"/>
-          <a:ea typeface="+mn-ea"/>
-          <a:cs typeface="+mn-cs"/>
-        </a:defRPr>
-      </a:lvl3pPr>
-      <a:lvl4pPr marL="1600200" indent="-228600" algn="l" defTabSz="914400" rtl="0" eaLnBrk="1" latinLnBrk="0" hangingPunct="1">
-        <a:lnSpc>
-          <a:spcPct val="90000"/>
-        </a:lnSpc>
-        <a:spcBef>
-          <a:spcPts val="500"/>
-        </a:spcBef>
-        <a:buFont typeface="Arial" panose="020B0604020202020204" pitchFamily="34" charset="0"/>
-        <a:buChar char="•"/>
-        <a:defRPr sz="1800" kern="1200">
-          <a:solidFill>
-            <a:schemeClr val="tx1"/>
-          </a:solidFill>
-          <a:latin typeface="+mn-lt"/>
-          <a:ea typeface="+mn-ea"/>
-          <a:cs typeface="+mn-cs"/>
-        </a:defRPr>
-      </a:lvl4pPr>
-      <a:lvl5pPr marL="2057400" indent="-228600" algn="l" defTabSz="914400" rtl="0" eaLnBrk="1" latinLnBrk="0" hangingPunct="1">
-        <a:lnSpc>
-          <a:spcPct val="90000"/>
-        </a:lnSpc>
-        <a:spcBef>
-          <a:spcPts val="500"/>
-        </a:spcBef>
-        <a:buFont typeface="Arial" panose="020B0604020202020204" pitchFamily="34" charset="0"/>
-        <a:buChar char="•"/>
-        <a:defRPr sz="1800" kern="1200">
+        <a:defRPr sz="2400" kern="1200">
           <a:solidFill>
             <a:schemeClr val="tx1"/>
           </a:solidFill>
@@ -3148,16 +2793,16 @@
           <a:cs typeface="+mn-cs"/>
         </a:defRPr>
       </a:lvl5pPr>
-      <a:lvl6pPr marL="2514600" indent="-228600" algn="l" defTabSz="914400" rtl="0" eaLnBrk="1" latinLnBrk="0" hangingPunct="1">
+      <a:lvl6pPr marL="3352716" indent="-304792" algn="l" defTabSz="1219170" rtl="0" eaLnBrk="1" latinLnBrk="0" hangingPunct="1">
         <a:lnSpc>
           <a:spcPct val="90000"/>
         </a:lnSpc>
         <a:spcBef>
-          <a:spcPts val="500"/>
+          <a:spcPts val="667"/>
         </a:spcBef>
         <a:buFont typeface="Arial" panose="020B0604020202020204" pitchFamily="34" charset="0"/>
         <a:buChar char="•"/>
-        <a:defRPr sz="1800" kern="1200">
+        <a:defRPr sz="2400" kern="1200">
           <a:solidFill>
             <a:schemeClr val="tx1"/>
           </a:solidFill>
@@ -3166,16 +2811,16 @@
           <a:cs typeface="+mn-cs"/>
         </a:defRPr>
       </a:lvl6pPr>
-      <a:lvl7pPr marL="2971800" indent="-228600" algn="l" defTabSz="914400" rtl="0" eaLnBrk="1" latinLnBrk="0" hangingPunct="1">
+      <a:lvl7pPr marL="3962301" indent="-304792" algn="l" defTabSz="1219170" rtl="0" eaLnBrk="1" latinLnBrk="0" hangingPunct="1">
         <a:lnSpc>
           <a:spcPct val="90000"/>
         </a:lnSpc>
         <a:spcBef>
-          <a:spcPts val="500"/>
+          <a:spcPts val="667"/>
         </a:spcBef>
         <a:buFont typeface="Arial" panose="020B0604020202020204" pitchFamily="34" charset="0"/>
         <a:buChar char="•"/>
-        <a:defRPr sz="1800" kern="1200">
+        <a:defRPr sz="2400" kern="1200">
           <a:solidFill>
             <a:schemeClr val="tx1"/>
           </a:solidFill>
@@ -3184,16 +2829,16 @@
           <a:cs typeface="+mn-cs"/>
         </a:defRPr>
       </a:lvl7pPr>
-      <a:lvl8pPr marL="3429000" indent="-228600" algn="l" defTabSz="914400" rtl="0" eaLnBrk="1" latinLnBrk="0" hangingPunct="1">
+      <a:lvl8pPr marL="4571886" indent="-304792" algn="l" defTabSz="1219170" rtl="0" eaLnBrk="1" latinLnBrk="0" hangingPunct="1">
         <a:lnSpc>
           <a:spcPct val="90000"/>
         </a:lnSpc>
         <a:spcBef>
-          <a:spcPts val="500"/>
+          <a:spcPts val="667"/>
         </a:spcBef>
         <a:buFont typeface="Arial" panose="020B0604020202020204" pitchFamily="34" charset="0"/>
         <a:buChar char="•"/>
-        <a:defRPr sz="1800" kern="1200">
+        <a:defRPr sz="2400" kern="1200">
           <a:solidFill>
             <a:schemeClr val="tx1"/>
           </a:solidFill>
@@ -3202,16 +2847,16 @@
           <a:cs typeface="+mn-cs"/>
         </a:defRPr>
       </a:lvl8pPr>
-      <a:lvl9pPr marL="3886200" indent="-228600" algn="l" defTabSz="914400" rtl="0" eaLnBrk="1" latinLnBrk="0" hangingPunct="1">
+      <a:lvl9pPr marL="5181470" indent="-304792" algn="l" defTabSz="1219170" rtl="0" eaLnBrk="1" latinLnBrk="0" hangingPunct="1">
         <a:lnSpc>
           <a:spcPct val="90000"/>
         </a:lnSpc>
         <a:spcBef>
-          <a:spcPts val="500"/>
+          <a:spcPts val="667"/>
         </a:spcBef>
         <a:buFont typeface="Arial" panose="020B0604020202020204" pitchFamily="34" charset="0"/>
         <a:buChar char="•"/>
-        <a:defRPr sz="1800" kern="1200">
+        <a:defRPr sz="2400" kern="1200">
           <a:solidFill>
             <a:schemeClr val="tx1"/>
           </a:solidFill>
@@ -3223,10 +2868,10 @@
     </p:bodyStyle>
     <p:otherStyle>
       <a:defPPr>
-        <a:defRPr lang="zh-CN"/>
+        <a:defRPr lang="en-US"/>
       </a:defPPr>
-      <a:lvl1pPr marL="0" algn="l" defTabSz="914400" rtl="0" eaLnBrk="1" latinLnBrk="0" hangingPunct="1">
-        <a:defRPr sz="1800" kern="1200">
+      <a:lvl1pPr marL="0" algn="l" defTabSz="1219170" rtl="0" eaLnBrk="1" latinLnBrk="0" hangingPunct="1">
+        <a:defRPr sz="2400" kern="1200">
           <a:solidFill>
             <a:schemeClr val="tx1"/>
           </a:solidFill>
@@ -3235,8 +2880,8 @@
           <a:cs typeface="+mn-cs"/>
         </a:defRPr>
       </a:lvl1pPr>
-      <a:lvl2pPr marL="457200" algn="l" defTabSz="914400" rtl="0" eaLnBrk="1" latinLnBrk="0" hangingPunct="1">
-        <a:defRPr sz="1800" kern="1200">
+      <a:lvl2pPr marL="609585" algn="l" defTabSz="1219170" rtl="0" eaLnBrk="1" latinLnBrk="0" hangingPunct="1">
+        <a:defRPr sz="2400" kern="1200">
           <a:solidFill>
             <a:schemeClr val="tx1"/>
           </a:solidFill>
@@ -3245,8 +2890,8 @@
           <a:cs typeface="+mn-cs"/>
         </a:defRPr>
       </a:lvl2pPr>
-      <a:lvl3pPr marL="914400" algn="l" defTabSz="914400" rtl="0" eaLnBrk="1" latinLnBrk="0" hangingPunct="1">
-        <a:defRPr sz="1800" kern="1200">
+      <a:lvl3pPr marL="1219170" algn="l" defTabSz="1219170" rtl="0" eaLnBrk="1" latinLnBrk="0" hangingPunct="1">
+        <a:defRPr sz="2400" kern="1200">
           <a:solidFill>
             <a:schemeClr val="tx1"/>
           </a:solidFill>
@@ -3255,8 +2900,8 @@
           <a:cs typeface="+mn-cs"/>
         </a:defRPr>
       </a:lvl3pPr>
-      <a:lvl4pPr marL="1371600" algn="l" defTabSz="914400" rtl="0" eaLnBrk="1" latinLnBrk="0" hangingPunct="1">
-        <a:defRPr sz="1800" kern="1200">
+      <a:lvl4pPr marL="1828754" algn="l" defTabSz="1219170" rtl="0" eaLnBrk="1" latinLnBrk="0" hangingPunct="1">
+        <a:defRPr sz="2400" kern="1200">
           <a:solidFill>
             <a:schemeClr val="tx1"/>
           </a:solidFill>
@@ -3265,8 +2910,8 @@
           <a:cs typeface="+mn-cs"/>
         </a:defRPr>
       </a:lvl4pPr>
-      <a:lvl5pPr marL="1828800" algn="l" defTabSz="914400" rtl="0" eaLnBrk="1" latinLnBrk="0" hangingPunct="1">
-        <a:defRPr sz="1800" kern="1200">
+      <a:lvl5pPr marL="2438339" algn="l" defTabSz="1219170" rtl="0" eaLnBrk="1" latinLnBrk="0" hangingPunct="1">
+        <a:defRPr sz="2400" kern="1200">
           <a:solidFill>
             <a:schemeClr val="tx1"/>
           </a:solidFill>
@@ -3275,8 +2920,8 @@
           <a:cs typeface="+mn-cs"/>
         </a:defRPr>
       </a:lvl5pPr>
-      <a:lvl6pPr marL="2286000" algn="l" defTabSz="914400" rtl="0" eaLnBrk="1" latinLnBrk="0" hangingPunct="1">
-        <a:defRPr sz="1800" kern="1200">
+      <a:lvl6pPr marL="3047924" algn="l" defTabSz="1219170" rtl="0" eaLnBrk="1" latinLnBrk="0" hangingPunct="1">
+        <a:defRPr sz="2400" kern="1200">
           <a:solidFill>
             <a:schemeClr val="tx1"/>
           </a:solidFill>
@@ -3285,8 +2930,8 @@
           <a:cs typeface="+mn-cs"/>
         </a:defRPr>
       </a:lvl6pPr>
-      <a:lvl7pPr marL="2743200" algn="l" defTabSz="914400" rtl="0" eaLnBrk="1" latinLnBrk="0" hangingPunct="1">
-        <a:defRPr sz="1800" kern="1200">
+      <a:lvl7pPr marL="3657509" algn="l" defTabSz="1219170" rtl="0" eaLnBrk="1" latinLnBrk="0" hangingPunct="1">
+        <a:defRPr sz="2400" kern="1200">
           <a:solidFill>
             <a:schemeClr val="tx1"/>
           </a:solidFill>
@@ -3295,8 +2940,8 @@
           <a:cs typeface="+mn-cs"/>
         </a:defRPr>
       </a:lvl7pPr>
-      <a:lvl8pPr marL="3200400" algn="l" defTabSz="914400" rtl="0" eaLnBrk="1" latinLnBrk="0" hangingPunct="1">
-        <a:defRPr sz="1800" kern="1200">
+      <a:lvl8pPr marL="4267093" algn="l" defTabSz="1219170" rtl="0" eaLnBrk="1" latinLnBrk="0" hangingPunct="1">
+        <a:defRPr sz="2400" kern="1200">
           <a:solidFill>
             <a:schemeClr val="tx1"/>
           </a:solidFill>
@@ -3305,8 +2950,8 @@
           <a:cs typeface="+mn-cs"/>
         </a:defRPr>
       </a:lvl8pPr>
-      <a:lvl9pPr marL="3657600" algn="l" defTabSz="914400" rtl="0" eaLnBrk="1" latinLnBrk="0" hangingPunct="1">
-        <a:defRPr sz="1800" kern="1200">
+      <a:lvl9pPr marL="4876678" algn="l" defTabSz="1219170" rtl="0" eaLnBrk="1" latinLnBrk="0" hangingPunct="1">
+        <a:defRPr sz="2400" kern="1200">
           <a:solidFill>
             <a:schemeClr val="tx1"/>
           </a:solidFill>
@@ -3351,7 +2996,7 @@
         </p:nvSpPr>
         <p:spPr>
           <a:xfrm>
-            <a:off x="3344467" y="2135070"/>
+            <a:off x="2778013" y="2184485"/>
             <a:ext cx="1128408" cy="340468"/>
           </a:xfrm>
           <a:prstGeom prst="roundRect">
@@ -3416,7 +3061,7 @@
         </p:nvSpPr>
         <p:spPr>
           <a:xfrm>
-            <a:off x="3344467" y="2753896"/>
+            <a:off x="2778013" y="2803593"/>
             <a:ext cx="1128408" cy="340468"/>
           </a:xfrm>
           <a:prstGeom prst="roundRect">
@@ -3481,7 +3126,7 @@
         </p:nvSpPr>
         <p:spPr>
           <a:xfrm>
-            <a:off x="3344467" y="3413597"/>
+            <a:off x="2778013" y="4041809"/>
             <a:ext cx="1128408" cy="340468"/>
           </a:xfrm>
           <a:prstGeom prst="roundRect">
@@ -3546,7 +3191,7 @@
         </p:nvSpPr>
         <p:spPr>
           <a:xfrm>
-            <a:off x="3344467" y="4042097"/>
+            <a:off x="2778013" y="4660917"/>
             <a:ext cx="1128408" cy="340468"/>
           </a:xfrm>
           <a:prstGeom prst="roundRect">
@@ -3611,7 +3256,7 @@
         </p:nvSpPr>
         <p:spPr>
           <a:xfrm>
-            <a:off x="3344467" y="4637733"/>
+            <a:off x="2778013" y="5280025"/>
             <a:ext cx="1128408" cy="340468"/>
           </a:xfrm>
           <a:prstGeom prst="roundRect">
@@ -3676,7 +3321,7 @@
         </p:nvSpPr>
         <p:spPr>
           <a:xfrm>
-            <a:off x="3344467" y="5229200"/>
+            <a:off x="2778013" y="5899133"/>
             <a:ext cx="1128408" cy="340468"/>
           </a:xfrm>
           <a:prstGeom prst="roundRect">
@@ -3741,7 +3386,7 @@
         </p:nvGrpSpPr>
         <p:grpSpPr>
           <a:xfrm>
-            <a:off x="1467028" y="1534042"/>
+            <a:off x="900575" y="1583457"/>
             <a:ext cx="524503" cy="500260"/>
             <a:chOff x="241936" y="701927"/>
             <a:chExt cx="524503" cy="500260"/>
@@ -3843,7 +3488,7 @@
         </p:nvGrpSpPr>
         <p:grpSpPr>
           <a:xfrm>
-            <a:off x="2173673" y="1534042"/>
+            <a:off x="1607220" y="1583458"/>
             <a:ext cx="495649" cy="493245"/>
             <a:chOff x="615190" y="701927"/>
             <a:chExt cx="495649" cy="493245"/>
@@ -3952,7 +3597,7 @@
         </p:nvGrpSpPr>
         <p:grpSpPr>
           <a:xfrm>
-            <a:off x="1388878" y="2052023"/>
+            <a:off x="822425" y="2101439"/>
             <a:ext cx="697627" cy="493245"/>
             <a:chOff x="1061603" y="701927"/>
             <a:chExt cx="697627" cy="493245"/>
@@ -4061,7 +3706,7 @@
         </p:nvGrpSpPr>
         <p:grpSpPr>
           <a:xfrm>
-            <a:off x="2029404" y="2052023"/>
+            <a:off x="1462951" y="2101439"/>
             <a:ext cx="784189" cy="493245"/>
             <a:chOff x="1788412" y="701927"/>
             <a:chExt cx="784189" cy="493245"/>
@@ -4163,7 +3808,7 @@
         </p:nvGrpSpPr>
         <p:grpSpPr>
           <a:xfrm>
-            <a:off x="1730888" y="5812022"/>
+            <a:off x="1164434" y="6481956"/>
             <a:ext cx="425116" cy="554565"/>
             <a:chOff x="223549" y="4788025"/>
             <a:chExt cx="425116" cy="554565"/>
@@ -4266,7 +3911,7 @@
         </p:nvGrpSpPr>
         <p:grpSpPr>
           <a:xfrm>
-            <a:off x="1185408" y="5255284"/>
+            <a:off x="618954" y="5925218"/>
             <a:ext cx="470000" cy="527055"/>
             <a:chOff x="846420" y="4791547"/>
             <a:chExt cx="470000" cy="527055"/>
@@ -4369,7 +4014,7 @@
         </p:nvGrpSpPr>
         <p:grpSpPr>
           <a:xfrm>
-            <a:off x="1734895" y="5284728"/>
+            <a:off x="1168441" y="5954662"/>
             <a:ext cx="417102" cy="503385"/>
             <a:chOff x="1339808" y="4839205"/>
             <a:chExt cx="417102" cy="503385"/>
@@ -4472,7 +4117,7 @@
         </p:nvGrpSpPr>
         <p:grpSpPr>
           <a:xfrm>
-            <a:off x="2174289" y="5205826"/>
+            <a:off x="1607835" y="5875760"/>
             <a:ext cx="587020" cy="583015"/>
             <a:chOff x="1803825" y="4693696"/>
             <a:chExt cx="587020" cy="583015"/>
@@ -4575,7 +4220,7 @@
         </p:nvGrpSpPr>
         <p:grpSpPr>
           <a:xfrm>
-            <a:off x="1082816" y="5846033"/>
+            <a:off x="516363" y="6515967"/>
             <a:ext cx="675185" cy="518677"/>
             <a:chOff x="2226015" y="4790679"/>
             <a:chExt cx="675185" cy="518677"/>
@@ -4678,7 +4323,7 @@
         </p:nvGrpSpPr>
         <p:grpSpPr>
           <a:xfrm>
-            <a:off x="2157458" y="5805264"/>
+            <a:off x="1591005" y="6475198"/>
             <a:ext cx="620683" cy="565709"/>
             <a:chOff x="4116932" y="5255034"/>
             <a:chExt cx="620683" cy="565709"/>
@@ -4781,7 +4426,7 @@
         </p:nvGrpSpPr>
         <p:grpSpPr>
           <a:xfrm>
-            <a:off x="2147224" y="2728621"/>
+            <a:off x="1580770" y="2778036"/>
             <a:ext cx="545342" cy="522398"/>
             <a:chOff x="1162963" y="1674063"/>
             <a:chExt cx="545342" cy="522398"/>
@@ -4931,7 +4576,7 @@
         </p:nvGrpSpPr>
         <p:grpSpPr>
           <a:xfrm>
-            <a:off x="2058332" y="3325399"/>
+            <a:off x="1491878" y="3995332"/>
             <a:ext cx="724878" cy="572682"/>
             <a:chOff x="1147446" y="2324148"/>
             <a:chExt cx="724878" cy="572682"/>
@@ -5058,7 +4703,7 @@
         </p:nvGrpSpPr>
         <p:grpSpPr>
           <a:xfrm>
-            <a:off x="2026198" y="3970089"/>
+            <a:off x="1459745" y="4640022"/>
             <a:ext cx="787395" cy="551362"/>
             <a:chOff x="1487713" y="3030733"/>
             <a:chExt cx="787395" cy="551362"/>
@@ -5185,7 +4830,7 @@
         </p:nvGrpSpPr>
         <p:grpSpPr>
           <a:xfrm>
-            <a:off x="1151344" y="4568896"/>
+            <a:off x="584891" y="5238829"/>
             <a:ext cx="380959" cy="577208"/>
             <a:chOff x="983973" y="3960891"/>
             <a:chExt cx="380959" cy="577208"/>
@@ -5288,7 +4933,7 @@
         </p:nvGrpSpPr>
         <p:grpSpPr>
           <a:xfrm>
-            <a:off x="1645766" y="4519058"/>
+            <a:off x="1079312" y="5188992"/>
             <a:ext cx="526106" cy="612953"/>
             <a:chOff x="1479129" y="3817424"/>
             <a:chExt cx="526106" cy="612953"/>
@@ -5406,7 +5051,7 @@
         </p:nvGrpSpPr>
         <p:grpSpPr>
           <a:xfrm>
-            <a:off x="2232786" y="4540003"/>
+            <a:off x="1666333" y="5209937"/>
             <a:ext cx="433493" cy="592555"/>
             <a:chOff x="2065415" y="3858155"/>
             <a:chExt cx="433493" cy="592555"/>
@@ -5527,7 +5172,7 @@
         </p:nvCxnSpPr>
         <p:spPr>
           <a:xfrm>
-            <a:off x="1119192" y="2601937"/>
+            <a:off x="552738" y="2651352"/>
             <a:ext cx="3348000" cy="0"/>
           </a:xfrm>
           <a:prstGeom prst="line">
@@ -5573,7 +5218,7 @@
         </p:nvCxnSpPr>
         <p:spPr>
           <a:xfrm>
-            <a:off x="1119192" y="3255107"/>
+            <a:off x="552738" y="3279512"/>
             <a:ext cx="3348000" cy="0"/>
           </a:xfrm>
           <a:prstGeom prst="line">
@@ -5619,7 +5264,7 @@
         </p:nvCxnSpPr>
         <p:spPr>
           <a:xfrm>
-            <a:off x="1119192" y="3898081"/>
+            <a:off x="552738" y="4535832"/>
             <a:ext cx="3348000" cy="0"/>
           </a:xfrm>
           <a:prstGeom prst="line">
@@ -5665,7 +5310,7 @@
         </p:nvCxnSpPr>
         <p:spPr>
           <a:xfrm>
-            <a:off x="1119192" y="4518810"/>
+            <a:off x="552738" y="5163992"/>
             <a:ext cx="3348000" cy="0"/>
           </a:xfrm>
           <a:prstGeom prst="line">
@@ -5711,7 +5356,7 @@
         </p:nvCxnSpPr>
         <p:spPr>
           <a:xfrm>
-            <a:off x="1119192" y="5122217"/>
+            <a:off x="552738" y="5792150"/>
             <a:ext cx="3348000" cy="0"/>
           </a:xfrm>
           <a:prstGeom prst="line">
@@ -5757,7 +5402,7 @@
         </p:nvCxnSpPr>
         <p:spPr>
           <a:xfrm flipH="1">
-            <a:off x="2813593" y="2241897"/>
+            <a:off x="2247140" y="2291312"/>
             <a:ext cx="357455" cy="0"/>
           </a:xfrm>
           <a:prstGeom prst="straightConnector1">
@@ -5798,7 +5443,7 @@
         </p:nvCxnSpPr>
         <p:spPr>
           <a:xfrm flipH="1">
-            <a:off x="2813593" y="2889969"/>
+            <a:off x="2247140" y="2939384"/>
             <a:ext cx="357455" cy="0"/>
           </a:xfrm>
           <a:prstGeom prst="straightConnector1">
@@ -5839,7 +5484,7 @@
         </p:nvCxnSpPr>
         <p:spPr>
           <a:xfrm flipH="1">
-            <a:off x="2813593" y="3610049"/>
+            <a:off x="2247140" y="4279982"/>
             <a:ext cx="357455" cy="0"/>
           </a:xfrm>
           <a:prstGeom prst="straightConnector1">
@@ -5880,7 +5525,7 @@
         </p:nvCxnSpPr>
         <p:spPr>
           <a:xfrm flipH="1">
-            <a:off x="2813593" y="4186113"/>
+            <a:off x="2247140" y="4856046"/>
             <a:ext cx="357455" cy="0"/>
           </a:xfrm>
           <a:prstGeom prst="straightConnector1">
@@ -5921,7 +5566,7 @@
         </p:nvCxnSpPr>
         <p:spPr>
           <a:xfrm flipH="1">
-            <a:off x="2813593" y="4834185"/>
+            <a:off x="2247140" y="5504118"/>
             <a:ext cx="357455" cy="0"/>
           </a:xfrm>
           <a:prstGeom prst="straightConnector1">
@@ -5962,7 +5607,7 @@
         </p:nvCxnSpPr>
         <p:spPr>
           <a:xfrm flipH="1">
-            <a:off x="2813593" y="5410249"/>
+            <a:off x="2247140" y="6080182"/>
             <a:ext cx="357455" cy="0"/>
           </a:xfrm>
           <a:prstGeom prst="straightConnector1">
@@ -6001,7 +5646,7 @@
         </p:nvSpPr>
         <p:spPr>
           <a:xfrm>
-            <a:off x="2842600" y="647595"/>
+            <a:off x="2284574" y="329360"/>
             <a:ext cx="1754391" cy="646331"/>
           </a:xfrm>
           <a:prstGeom prst="rect">
@@ -6050,7 +5695,7 @@
         </p:nvSpPr>
         <p:spPr>
           <a:xfrm>
-            <a:off x="6456040" y="647595"/>
+            <a:off x="6352144" y="291920"/>
             <a:ext cx="3182281" cy="646331"/>
           </a:xfrm>
           <a:prstGeom prst="rect">
@@ -6099,7 +5744,7 @@
         </p:nvGrpSpPr>
         <p:grpSpPr>
           <a:xfrm>
-            <a:off x="8683634" y="2381191"/>
+            <a:off x="8631869" y="3125860"/>
             <a:ext cx="470000" cy="679715"/>
             <a:chOff x="9372487" y="1367754"/>
             <a:chExt cx="470000" cy="679715"/>
@@ -6202,7 +5847,7 @@
         </p:nvGrpSpPr>
         <p:grpSpPr>
           <a:xfrm>
-            <a:off x="9418998" y="2384318"/>
+            <a:off x="9356535" y="3128986"/>
             <a:ext cx="583814" cy="676588"/>
             <a:chOff x="10160020" y="1361565"/>
             <a:chExt cx="583814" cy="676588"/>
@@ -6311,7 +5956,7 @@
         </p:nvGrpSpPr>
         <p:grpSpPr>
           <a:xfrm>
-            <a:off x="10125817" y="2339414"/>
+            <a:off x="10068687" y="3084082"/>
             <a:ext cx="676788" cy="721492"/>
             <a:chOff x="9372487" y="2082656"/>
             <a:chExt cx="676788" cy="721492"/>
@@ -6414,7 +6059,7 @@
         </p:nvGrpSpPr>
         <p:grpSpPr>
           <a:xfrm>
-            <a:off x="9333729" y="1496779"/>
+            <a:off x="9312453" y="2251597"/>
             <a:ext cx="671979" cy="736261"/>
             <a:chOff x="10076827" y="2062616"/>
             <a:chExt cx="671979" cy="736261"/>
@@ -6540,10 +6185,10 @@
         </p:nvGrpSpPr>
         <p:grpSpPr>
           <a:xfrm>
-            <a:off x="9473839" y="3220912"/>
-            <a:ext cx="474133" cy="664335"/>
-            <a:chOff x="10230401" y="3715563"/>
-            <a:chExt cx="474133" cy="664335"/>
+            <a:off x="9374425" y="3915743"/>
+            <a:ext cx="548034" cy="714173"/>
+            <a:chOff x="10230401" y="3665725"/>
+            <a:chExt cx="548034" cy="714173"/>
           </a:xfrm>
         </p:grpSpPr>
         <p:pic>
@@ -6568,8 +6213,8 @@
           </p:blipFill>
           <p:spPr>
             <a:xfrm>
-              <a:off x="10230401" y="3715563"/>
-              <a:ext cx="474133" cy="474133"/>
+              <a:off x="10230401" y="3665725"/>
+              <a:ext cx="548034" cy="548034"/>
             </a:xfrm>
             <a:prstGeom prst="rect">
               <a:avLst/>
@@ -6643,7 +6288,7 @@
         </p:nvGrpSpPr>
         <p:grpSpPr>
           <a:xfrm>
-            <a:off x="8469633" y="3220979"/>
+            <a:off x="8417868" y="3965647"/>
             <a:ext cx="898003" cy="664268"/>
             <a:chOff x="9935576" y="4496187"/>
             <a:chExt cx="898003" cy="664268"/>
@@ -6770,7 +6415,7 @@
         </p:nvGrpSpPr>
         <p:grpSpPr>
           <a:xfrm>
-            <a:off x="10141046" y="3188072"/>
+            <a:off x="10083916" y="3932741"/>
             <a:ext cx="646331" cy="697175"/>
             <a:chOff x="9317095" y="5490246"/>
             <a:chExt cx="646331" cy="697175"/>
@@ -6873,7 +6518,7 @@
         </p:nvGrpSpPr>
         <p:grpSpPr>
           <a:xfrm>
-            <a:off x="8683634" y="1487860"/>
+            <a:off x="8631869" y="2232528"/>
             <a:ext cx="470001" cy="755330"/>
             <a:chOff x="8715440" y="3658513"/>
             <a:chExt cx="470001" cy="755330"/>
@@ -6976,7 +6621,7 @@
         </p:nvSpPr>
         <p:spPr>
           <a:xfrm>
-            <a:off x="6558970" y="2316145"/>
+            <a:off x="6692819" y="2726227"/>
             <a:ext cx="1128408" cy="340468"/>
           </a:xfrm>
           <a:prstGeom prst="roundRect">
@@ -7041,7 +6686,7 @@
         </p:nvSpPr>
         <p:spPr>
           <a:xfrm>
-            <a:off x="6558970" y="2901055"/>
+            <a:off x="6692819" y="3311137"/>
             <a:ext cx="1128408" cy="340468"/>
           </a:xfrm>
           <a:prstGeom prst="roundRect">
@@ -7106,7 +6751,7 @@
         </p:nvSpPr>
         <p:spPr>
           <a:xfrm>
-            <a:off x="6558970" y="3520580"/>
+            <a:off x="6692819" y="3930662"/>
             <a:ext cx="1128408" cy="340468"/>
           </a:xfrm>
           <a:prstGeom prst="roundRect">
@@ -7171,10 +6816,10 @@
         </p:nvGrpSpPr>
         <p:grpSpPr>
           <a:xfrm>
-            <a:off x="10158440" y="1484784"/>
-            <a:ext cx="555546" cy="767184"/>
-            <a:chOff x="9854490" y="1725846"/>
-            <a:chExt cx="555546" cy="767184"/>
+            <a:off x="9400872" y="1440577"/>
+            <a:ext cx="495140" cy="718944"/>
+            <a:chOff x="9854490" y="1774086"/>
+            <a:chExt cx="495140" cy="718944"/>
           </a:xfrm>
         </p:grpSpPr>
         <p:pic>
@@ -7199,8 +6844,8 @@
           </p:blipFill>
           <p:spPr>
             <a:xfrm>
-              <a:off x="9854490" y="1725846"/>
-              <a:ext cx="555546" cy="555546"/>
+              <a:off x="9854490" y="1774086"/>
+              <a:ext cx="495140" cy="507305"/>
             </a:xfrm>
             <a:prstGeom prst="rect">
               <a:avLst/>
@@ -7221,7 +6866,7 @@
           </p:nvSpPr>
           <p:spPr>
             <a:xfrm>
-              <a:off x="9914896" y="2246809"/>
+              <a:off x="9884693" y="2246809"/>
               <a:ext cx="434734" cy="246221"/>
             </a:xfrm>
             <a:prstGeom prst="rect">
@@ -7269,13 +6914,15 @@
               </a:ext>
             </a:extLst>
           </p:cNvPr>
-          <p:cNvCxnSpPr/>
+          <p:cNvCxnSpPr>
+            <a:cxnSpLocks/>
+          </p:cNvCxnSpPr>
           <p:nvPr/>
         </p:nvCxnSpPr>
         <p:spPr>
           <a:xfrm>
-            <a:off x="7880971" y="2449868"/>
-            <a:ext cx="504056" cy="0"/>
+            <a:off x="7983583" y="2862485"/>
+            <a:ext cx="360000" cy="0"/>
           </a:xfrm>
           <a:prstGeom prst="straightConnector1">
             <a:avLst/>
@@ -7308,13 +6955,15 @@
               </a:ext>
             </a:extLst>
           </p:cNvPr>
-          <p:cNvCxnSpPr/>
+          <p:cNvCxnSpPr>
+            <a:cxnSpLocks/>
+          </p:cNvCxnSpPr>
           <p:nvPr/>
         </p:nvCxnSpPr>
         <p:spPr>
           <a:xfrm>
-            <a:off x="7890285" y="3071289"/>
-            <a:ext cx="504056" cy="0"/>
+            <a:off x="7992897" y="3483906"/>
+            <a:ext cx="360000" cy="0"/>
           </a:xfrm>
           <a:prstGeom prst="straightConnector1">
             <a:avLst/>
@@ -7347,13 +6996,15 @@
               </a:ext>
             </a:extLst>
           </p:cNvPr>
-          <p:cNvCxnSpPr/>
+          <p:cNvCxnSpPr>
+            <a:cxnSpLocks/>
+          </p:cNvCxnSpPr>
           <p:nvPr/>
         </p:nvCxnSpPr>
         <p:spPr>
           <a:xfrm>
-            <a:off x="7880971" y="3681643"/>
-            <a:ext cx="504056" cy="0"/>
+            <a:off x="7983583" y="4094260"/>
+            <a:ext cx="360000" cy="0"/>
           </a:xfrm>
           <a:prstGeom prst="straightConnector1">
             <a:avLst/>
@@ -7391,8 +7042,8 @@
         </p:nvSpPr>
         <p:spPr>
           <a:xfrm>
-            <a:off x="4998690" y="2826243"/>
-            <a:ext cx="1019896" cy="627835"/>
+            <a:off x="4628316" y="3147142"/>
+            <a:ext cx="1331242" cy="812579"/>
           </a:xfrm>
           <a:prstGeom prst="rightArrow">
             <a:avLst/>
@@ -7402,7 +7053,7 @@
           </a:solidFill>
           <a:ln>
             <a:solidFill>
-              <a:srgbClr val="2342BF"/>
+              <a:schemeClr val="bg1"/>
             </a:solidFill>
           </a:ln>
         </p:spPr>
@@ -7427,7 +7078,10 @@
           <a:lstStyle/>
           <a:p>
             <a:pPr algn="ctr"/>
-            <a:endParaRPr kumimoji="1" lang="zh-CN" altLang="en-US"/>
+            <a:endParaRPr kumimoji="1" lang="zh-CN" altLang="en-US" sz="1600" b="1" dirty="0">
+              <a:latin typeface="Open Sans" panose="020B0606030504020204" pitchFamily="34" charset="0"/>
+              <a:cs typeface="Open Sans" panose="020B0606030504020204" pitchFamily="34" charset="0"/>
+            </a:endParaRPr>
           </a:p>
         </p:txBody>
       </p:sp>
@@ -7445,10 +7099,10 @@
         </p:nvGrpSpPr>
         <p:grpSpPr>
           <a:xfrm>
-            <a:off x="8668246" y="3956036"/>
-            <a:ext cx="490840" cy="617447"/>
+            <a:off x="8621449" y="4700705"/>
+            <a:ext cx="490840" cy="639831"/>
             <a:chOff x="8624518" y="4844946"/>
-            <a:chExt cx="490840" cy="617447"/>
+            <a:chExt cx="490840" cy="639831"/>
           </a:xfrm>
         </p:grpSpPr>
         <p:pic>
@@ -7502,7 +7156,7 @@
           <p:spPr>
             <a:xfrm>
               <a:off x="8624518" y="5238556"/>
-              <a:ext cx="490840" cy="223837"/>
+              <a:ext cx="490840" cy="246221"/>
             </a:xfrm>
             <a:prstGeom prst="rect">
               <a:avLst/>
@@ -7554,10 +7208,10 @@
         </p:nvGrpSpPr>
         <p:grpSpPr>
           <a:xfrm>
-            <a:off x="9424816" y="3901137"/>
-            <a:ext cx="540533" cy="672256"/>
+            <a:off x="9378176" y="4645805"/>
+            <a:ext cx="540533" cy="694640"/>
             <a:chOff x="9412218" y="4790137"/>
-            <a:chExt cx="540533" cy="672256"/>
+            <a:chExt cx="540533" cy="694640"/>
           </a:xfrm>
         </p:grpSpPr>
         <p:pic>
@@ -7622,7 +7276,7 @@
           <p:spPr>
             <a:xfrm>
               <a:off x="9412218" y="5238556"/>
-              <a:ext cx="540533" cy="223837"/>
+              <a:ext cx="540533" cy="246221"/>
             </a:xfrm>
             <a:prstGeom prst="rect">
               <a:avLst/>
@@ -7674,10 +7328,10 @@
         </p:nvGrpSpPr>
         <p:grpSpPr>
           <a:xfrm>
-            <a:off x="10184042" y="3980438"/>
-            <a:ext cx="619080" cy="592955"/>
+            <a:off x="10097541" y="4725107"/>
+            <a:ext cx="619080" cy="615339"/>
             <a:chOff x="10171444" y="4869438"/>
-            <a:chExt cx="619080" cy="592955"/>
+            <a:chExt cx="619080" cy="615339"/>
           </a:xfrm>
         </p:grpSpPr>
         <p:pic>
@@ -7724,7 +7378,7 @@
           <p:spPr>
             <a:xfrm>
               <a:off x="10171444" y="5238556"/>
-              <a:ext cx="619080" cy="223837"/>
+              <a:ext cx="619080" cy="246221"/>
             </a:xfrm>
             <a:prstGeom prst="rect">
               <a:avLst/>
@@ -7764,60 +7418,6 @@
       </p:grpSp>
       <p:sp>
         <p:nvSpPr>
-          <p:cNvPr id="127" name="右箭头 126">
-            <a:extLst>
-              <a:ext uri="{FF2B5EF4-FFF2-40B4-BE49-F238E27FC236}">
-                <a16:creationId xmlns:a16="http://schemas.microsoft.com/office/drawing/2014/main" id="{19E1D767-BAD7-F201-EA8A-A6FB05F08DE0}"/>
-              </a:ext>
-            </a:extLst>
-          </p:cNvPr>
-          <p:cNvSpPr/>
-          <p:nvPr/>
-        </p:nvSpPr>
-        <p:spPr>
-          <a:xfrm>
-            <a:off x="4941093" y="4653136"/>
-            <a:ext cx="1019896" cy="627835"/>
-          </a:xfrm>
-          <a:prstGeom prst="rightArrow">
-            <a:avLst/>
-          </a:prstGeom>
-          <a:solidFill>
-            <a:srgbClr val="2342BF"/>
-          </a:solidFill>
-          <a:ln>
-            <a:solidFill>
-              <a:srgbClr val="2342BF"/>
-            </a:solidFill>
-          </a:ln>
-        </p:spPr>
-        <p:style>
-          <a:lnRef idx="2">
-            <a:schemeClr val="accent1">
-              <a:shade val="50000"/>
-            </a:schemeClr>
-          </a:lnRef>
-          <a:fillRef idx="1">
-            <a:schemeClr val="accent1"/>
-          </a:fillRef>
-          <a:effectRef idx="0">
-            <a:schemeClr val="accent1"/>
-          </a:effectRef>
-          <a:fontRef idx="minor">
-            <a:schemeClr val="lt1"/>
-          </a:fontRef>
-        </p:style>
-        <p:txBody>
-          <a:bodyPr rtlCol="0" anchor="ctr"/>
-          <a:lstStyle/>
-          <a:p>
-            <a:pPr algn="ctr"/>
-            <a:endParaRPr kumimoji="1" lang="zh-CN" altLang="en-US"/>
-          </a:p>
-        </p:txBody>
-      </p:sp>
-      <p:sp>
-        <p:nvSpPr>
           <p:cNvPr id="128" name="圆角矩形 127">
             <a:extLst>
               <a:ext uri="{FF2B5EF4-FFF2-40B4-BE49-F238E27FC236}">
@@ -7830,7 +7430,7 @@
         </p:nvSpPr>
         <p:spPr>
           <a:xfrm>
-            <a:off x="6558970" y="4869160"/>
+            <a:off x="6764895" y="5969059"/>
             <a:ext cx="1128408" cy="340468"/>
           </a:xfrm>
           <a:prstGeom prst="roundRect">
@@ -7895,7 +7495,7 @@
         </p:nvGrpSpPr>
         <p:grpSpPr>
           <a:xfrm>
-            <a:off x="8582501" y="4741739"/>
+            <a:off x="8472264" y="5828623"/>
             <a:ext cx="825867" cy="677862"/>
             <a:chOff x="1125642" y="682053"/>
             <a:chExt cx="569547" cy="467478"/>
@@ -8000,13 +7600,15 @@
               </a:ext>
             </a:extLst>
           </p:cNvPr>
-          <p:cNvCxnSpPr/>
+          <p:cNvCxnSpPr>
+            <a:cxnSpLocks/>
+          </p:cNvCxnSpPr>
           <p:nvPr/>
         </p:nvCxnSpPr>
         <p:spPr>
           <a:xfrm>
-            <a:off x="7935014" y="5054785"/>
-            <a:ext cx="504056" cy="0"/>
+            <a:off x="8017679" y="6151306"/>
+            <a:ext cx="360000" cy="0"/>
           </a:xfrm>
           <a:prstGeom prst="straightConnector1">
             <a:avLst/>
@@ -8046,13 +7648,13 @@
         </p:nvCxnSpPr>
         <p:spPr>
           <a:xfrm>
-            <a:off x="6558970" y="4637733"/>
+            <a:off x="6435812" y="5556776"/>
             <a:ext cx="4433574" cy="0"/>
           </a:xfrm>
           <a:prstGeom prst="line">
             <a:avLst/>
           </a:prstGeom>
-          <a:ln w="9525">
+          <a:ln w="12700">
             <a:solidFill>
               <a:schemeClr val="bg2">
                 <a:lumMod val="90000"/>
@@ -8090,7 +7692,7 @@
         </p:nvGrpSpPr>
         <p:grpSpPr>
           <a:xfrm>
-            <a:off x="10200456" y="4708868"/>
+            <a:off x="10108501" y="5795753"/>
             <a:ext cx="601448" cy="710733"/>
             <a:chOff x="9441498" y="4704429"/>
             <a:chExt cx="601448" cy="710733"/>
@@ -8196,7 +7798,7 @@
         </p:nvCxnSpPr>
         <p:spPr>
           <a:xfrm>
-            <a:off x="9470179" y="4995318"/>
+            <a:off x="9336360" y="6082202"/>
             <a:ext cx="586261" cy="0"/>
           </a:xfrm>
           <a:prstGeom prst="straightConnector1">
@@ -8221,6 +7823,734 @@
           </a:fontRef>
         </p:style>
       </p:cxnSp>
+      <p:sp>
+        <p:nvSpPr>
+          <p:cNvPr id="136" name="圆角矩形 135">
+            <a:extLst>
+              <a:ext uri="{FF2B5EF4-FFF2-40B4-BE49-F238E27FC236}">
+                <a16:creationId xmlns:a16="http://schemas.microsoft.com/office/drawing/2014/main" id="{39FAC72E-6D2C-FDB3-FC80-EF3ACAD26458}"/>
+              </a:ext>
+            </a:extLst>
+          </p:cNvPr>
+          <p:cNvSpPr/>
+          <p:nvPr/>
+        </p:nvSpPr>
+        <p:spPr>
+          <a:xfrm>
+            <a:off x="2778013" y="3422701"/>
+            <a:ext cx="1128408" cy="340468"/>
+          </a:xfrm>
+          <a:prstGeom prst="roundRect">
+            <a:avLst/>
+          </a:prstGeom>
+          <a:solidFill>
+            <a:srgbClr val="2342BF"/>
+          </a:solidFill>
+          <a:ln>
+            <a:solidFill>
+              <a:srgbClr val="2342BF"/>
+            </a:solidFill>
+          </a:ln>
+        </p:spPr>
+        <p:style>
+          <a:lnRef idx="2">
+            <a:schemeClr val="accent1">
+              <a:shade val="50000"/>
+            </a:schemeClr>
+          </a:lnRef>
+          <a:fillRef idx="1">
+            <a:schemeClr val="accent1"/>
+          </a:fillRef>
+          <a:effectRef idx="0">
+            <a:schemeClr val="accent1"/>
+          </a:effectRef>
+          <a:fontRef idx="minor">
+            <a:schemeClr val="lt1"/>
+          </a:fontRef>
+        </p:style>
+        <p:txBody>
+          <a:bodyPr rtlCol="0" anchor="ctr"/>
+          <a:lstStyle/>
+          <a:p>
+            <a:pPr algn="ctr"/>
+            <a:r>
+              <a:rPr kumimoji="1" lang="en-US" altLang="zh-CN" b="1" dirty="0">
+                <a:latin typeface="Open Sans" panose="020B0606030504020204" pitchFamily="34" charset="0"/>
+                <a:ea typeface="Open Sans" panose="020B0606030504020204" pitchFamily="34" charset="0"/>
+                <a:cs typeface="Open Sans" panose="020B0606030504020204" pitchFamily="34" charset="0"/>
+              </a:rPr>
+              <a:t>TLS</a:t>
+            </a:r>
+            <a:endParaRPr kumimoji="1" lang="zh-CN" altLang="en-US" b="1" dirty="0">
+              <a:latin typeface="Open Sans" panose="020B0606030504020204" pitchFamily="34" charset="0"/>
+              <a:cs typeface="Open Sans" panose="020B0606030504020204" pitchFamily="34" charset="0"/>
+            </a:endParaRPr>
+          </a:p>
+        </p:txBody>
+      </p:sp>
+      <p:cxnSp>
+        <p:nvCxnSpPr>
+          <p:cNvPr id="137" name="直线箭头连接符 136">
+            <a:extLst>
+              <a:ext uri="{FF2B5EF4-FFF2-40B4-BE49-F238E27FC236}">
+                <a16:creationId xmlns:a16="http://schemas.microsoft.com/office/drawing/2014/main" id="{83562DEC-3592-197F-5F6B-96B7FD166D03}"/>
+              </a:ext>
+            </a:extLst>
+          </p:cNvPr>
+          <p:cNvCxnSpPr>
+            <a:cxnSpLocks/>
+          </p:cNvCxnSpPr>
+          <p:nvPr/>
+        </p:nvCxnSpPr>
+        <p:spPr>
+          <a:xfrm flipH="1">
+            <a:off x="2280849" y="3631644"/>
+            <a:ext cx="357455" cy="0"/>
+          </a:xfrm>
+          <a:prstGeom prst="straightConnector1">
+            <a:avLst/>
+          </a:prstGeom>
+          <a:ln>
+            <a:tailEnd type="triangle"/>
+          </a:ln>
+        </p:spPr>
+        <p:style>
+          <a:lnRef idx="1">
+            <a:schemeClr val="accent1"/>
+          </a:lnRef>
+          <a:fillRef idx="0">
+            <a:schemeClr val="accent1"/>
+          </a:fillRef>
+          <a:effectRef idx="0">
+            <a:schemeClr val="accent1"/>
+          </a:effectRef>
+          <a:fontRef idx="minor">
+            <a:schemeClr val="tx1"/>
+          </a:fontRef>
+        </p:style>
+      </p:cxnSp>
+      <p:pic>
+        <p:nvPicPr>
+          <p:cNvPr id="1026" name="Picture 2" descr="SSL Toolkit — Powerful On Every Platform | Medium">
+            <a:extLst>
+              <a:ext uri="{FF2B5EF4-FFF2-40B4-BE49-F238E27FC236}">
+                <a16:creationId xmlns:a16="http://schemas.microsoft.com/office/drawing/2014/main" id="{B5B48984-91FE-8398-1C5D-891104A332A5}"/>
+              </a:ext>
+            </a:extLst>
+          </p:cNvPr>
+          <p:cNvPicPr>
+            <a:picLocks noChangeAspect="1" noChangeArrowheads="1"/>
+          </p:cNvPicPr>
+          <p:nvPr/>
+        </p:nvPicPr>
+        <p:blipFill>
+          <a:blip r:embed="rId37">
+            <a:extLst>
+              <a:ext uri="{28A0092B-C50C-407E-A947-70E740481C1C}">
+                <a14:useLocalDpi xmlns:a14="http://schemas.microsoft.com/office/drawing/2010/main" val="0"/>
+              </a:ext>
+            </a:extLst>
+          </a:blip>
+          <a:srcRect/>
+          <a:stretch>
+            <a:fillRect/>
+          </a:stretch>
+        </p:blipFill>
+        <p:spPr bwMode="auto">
+          <a:xfrm>
+            <a:off x="1549795" y="3344825"/>
+            <a:ext cx="595811" cy="595811"/>
+          </a:xfrm>
+          <a:prstGeom prst="rect">
+            <a:avLst/>
+          </a:prstGeom>
+          <a:noFill/>
+          <a:extLst>
+            <a:ext uri="{909E8E84-426E-40DD-AFC4-6F175D3DCCD1}">
+              <a14:hiddenFill xmlns:a14="http://schemas.microsoft.com/office/drawing/2010/main">
+                <a:solidFill>
+                  <a:srgbClr val="FFFFFF"/>
+                </a:solidFill>
+              </a14:hiddenFill>
+            </a:ext>
+          </a:extLst>
+        </p:spPr>
+      </p:pic>
+      <p:cxnSp>
+        <p:nvCxnSpPr>
+          <p:cNvPr id="139" name="直线连接符 138">
+            <a:extLst>
+              <a:ext uri="{FF2B5EF4-FFF2-40B4-BE49-F238E27FC236}">
+                <a16:creationId xmlns:a16="http://schemas.microsoft.com/office/drawing/2014/main" id="{BF246A40-B404-6549-4EC8-B8C38A5F7A11}"/>
+              </a:ext>
+            </a:extLst>
+          </p:cNvPr>
+          <p:cNvCxnSpPr>
+            <a:cxnSpLocks/>
+          </p:cNvCxnSpPr>
+          <p:nvPr/>
+        </p:nvCxnSpPr>
+        <p:spPr>
+          <a:xfrm>
+            <a:off x="552738" y="3907672"/>
+            <a:ext cx="3348000" cy="0"/>
+          </a:xfrm>
+          <a:prstGeom prst="line">
+            <a:avLst/>
+          </a:prstGeom>
+          <a:ln w="9525">
+            <a:solidFill>
+              <a:schemeClr val="bg2">
+                <a:lumMod val="90000"/>
+              </a:schemeClr>
+            </a:solidFill>
+            <a:prstDash val="dash"/>
+          </a:ln>
+        </p:spPr>
+        <p:style>
+          <a:lnRef idx="1">
+            <a:schemeClr val="accent1"/>
+          </a:lnRef>
+          <a:fillRef idx="0">
+            <a:schemeClr val="accent1"/>
+          </a:fillRef>
+          <a:effectRef idx="0">
+            <a:schemeClr val="accent1"/>
+          </a:effectRef>
+          <a:fontRef idx="minor">
+            <a:schemeClr val="tx1"/>
+          </a:fontRef>
+        </p:style>
+      </p:cxnSp>
+      <p:grpSp>
+        <p:nvGrpSpPr>
+          <p:cNvPr id="140" name="组合 139">
+            <a:extLst>
+              <a:ext uri="{FF2B5EF4-FFF2-40B4-BE49-F238E27FC236}">
+                <a16:creationId xmlns:a16="http://schemas.microsoft.com/office/drawing/2014/main" id="{41CB010A-C93A-326D-870D-7B2736FFE586}"/>
+              </a:ext>
+            </a:extLst>
+          </p:cNvPr>
+          <p:cNvGrpSpPr/>
+          <p:nvPr/>
+        </p:nvGrpSpPr>
+        <p:grpSpPr>
+          <a:xfrm>
+            <a:off x="8435501" y="1440578"/>
+            <a:ext cx="862737" cy="718943"/>
+            <a:chOff x="1147446" y="2208664"/>
+            <a:chExt cx="862737" cy="718943"/>
+          </a:xfrm>
+        </p:grpSpPr>
+        <p:pic>
+          <p:nvPicPr>
+            <p:cNvPr id="141" name="图片 140">
+              <a:extLst>
+                <a:ext uri="{FF2B5EF4-FFF2-40B4-BE49-F238E27FC236}">
+                  <a16:creationId xmlns:a16="http://schemas.microsoft.com/office/drawing/2014/main" id="{353311BF-C1D3-7693-C183-0881E63ED5FD}"/>
+                </a:ext>
+              </a:extLst>
+            </p:cNvPr>
+            <p:cNvPicPr>
+              <a:picLocks noChangeAspect="1"/>
+            </p:cNvPicPr>
+            <p:nvPr/>
+          </p:nvPicPr>
+          <p:blipFill>
+            <a:blip r:embed="rId15"/>
+            <a:stretch>
+              <a:fillRect/>
+            </a:stretch>
+          </p:blipFill>
+          <p:spPr>
+            <a:xfrm>
+              <a:off x="1353267" y="2208664"/>
+              <a:ext cx="451095" cy="515537"/>
+            </a:xfrm>
+            <a:prstGeom prst="rect">
+              <a:avLst/>
+            </a:prstGeom>
+          </p:spPr>
+        </p:pic>
+        <p:sp>
+          <p:nvSpPr>
+            <p:cNvPr id="142" name="文本框 141">
+              <a:extLst>
+                <a:ext uri="{FF2B5EF4-FFF2-40B4-BE49-F238E27FC236}">
+                  <a16:creationId xmlns:a16="http://schemas.microsoft.com/office/drawing/2014/main" id="{1E1FF3DB-C6AA-AD37-4948-722769DD97B6}"/>
+                </a:ext>
+              </a:extLst>
+            </p:cNvPr>
+            <p:cNvSpPr txBox="1"/>
+            <p:nvPr/>
+          </p:nvSpPr>
+          <p:spPr>
+            <a:xfrm>
+              <a:off x="1147446" y="2681386"/>
+              <a:ext cx="862737" cy="246221"/>
+            </a:xfrm>
+            <a:prstGeom prst="rect">
+              <a:avLst/>
+            </a:prstGeom>
+            <a:noFill/>
+          </p:spPr>
+          <p:txBody>
+            <a:bodyPr wrap="none" rtlCol="0">
+              <a:spAutoFit/>
+            </a:bodyPr>
+            <a:lstStyle/>
+            <a:p>
+              <a:r>
+                <a:rPr kumimoji="1" lang="en-US" altLang="zh-CN" sz="1000" dirty="0">
+                  <a:solidFill>
+                    <a:schemeClr val="tx1">
+                      <a:lumMod val="65000"/>
+                      <a:lumOff val="35000"/>
+                    </a:schemeClr>
+                  </a:solidFill>
+                  <a:latin typeface="Francois One" panose="02000503040000020004" pitchFamily="2" charset="0"/>
+                </a:rPr>
+                <a:t>Shell</a:t>
+              </a:r>
+              <a:r>
+                <a:rPr kumimoji="1" lang="zh-CN" altLang="en-US" sz="1000" dirty="0">
+                  <a:solidFill>
+                    <a:schemeClr val="tx1">
+                      <a:lumMod val="65000"/>
+                      <a:lumOff val="35000"/>
+                    </a:schemeClr>
+                  </a:solidFill>
+                  <a:latin typeface="Francois One" panose="02000503040000020004" pitchFamily="2" charset="0"/>
+                </a:rPr>
+                <a:t> </a:t>
+              </a:r>
+              <a:r>
+                <a:rPr kumimoji="1" lang="en-US" altLang="zh-CN" sz="1000" dirty="0">
+                  <a:solidFill>
+                    <a:schemeClr val="tx1">
+                      <a:lumMod val="65000"/>
+                      <a:lumOff val="35000"/>
+                    </a:schemeClr>
+                  </a:solidFill>
+                  <a:latin typeface="Francois One" panose="02000503040000020004" pitchFamily="2" charset="0"/>
+                </a:rPr>
+                <a:t>Scripts</a:t>
+              </a:r>
+              <a:endParaRPr kumimoji="1" lang="zh-CN" altLang="en-US" sz="1000" dirty="0">
+                <a:solidFill>
+                  <a:schemeClr val="tx1">
+                    <a:lumMod val="65000"/>
+                    <a:lumOff val="35000"/>
+                  </a:schemeClr>
+                </a:solidFill>
+                <a:latin typeface="Francois One" panose="02000503040000020004" pitchFamily="2" charset="0"/>
+              </a:endParaRPr>
+            </a:p>
+          </p:txBody>
+        </p:sp>
+      </p:grpSp>
+      <p:grpSp>
+        <p:nvGrpSpPr>
+          <p:cNvPr id="83" name="组合 82">
+            <a:extLst>
+              <a:ext uri="{FF2B5EF4-FFF2-40B4-BE49-F238E27FC236}">
+                <a16:creationId xmlns:a16="http://schemas.microsoft.com/office/drawing/2014/main" id="{CB09AEB6-5E7B-B73C-45E6-1DF5EB3135CF}"/>
+              </a:ext>
+            </a:extLst>
+          </p:cNvPr>
+          <p:cNvGrpSpPr/>
+          <p:nvPr/>
+        </p:nvGrpSpPr>
+        <p:grpSpPr>
+          <a:xfrm>
+            <a:off x="10147234" y="2254072"/>
+            <a:ext cx="519694" cy="733786"/>
+            <a:chOff x="9316832" y="1557623"/>
+            <a:chExt cx="519694" cy="733786"/>
+          </a:xfrm>
+        </p:grpSpPr>
+        <p:pic>
+          <p:nvPicPr>
+            <p:cNvPr id="76" name="图片 75">
+              <a:extLst>
+                <a:ext uri="{FF2B5EF4-FFF2-40B4-BE49-F238E27FC236}">
+                  <a16:creationId xmlns:a16="http://schemas.microsoft.com/office/drawing/2014/main" id="{E5F091F6-C237-1B69-7C10-DE03FA8706FB}"/>
+                </a:ext>
+              </a:extLst>
+            </p:cNvPr>
+            <p:cNvPicPr>
+              <a:picLocks noChangeAspect="1"/>
+            </p:cNvPicPr>
+            <p:nvPr/>
+          </p:nvPicPr>
+          <p:blipFill>
+            <a:blip r:embed="rId38"/>
+            <a:stretch>
+              <a:fillRect/>
+            </a:stretch>
+          </p:blipFill>
+          <p:spPr>
+            <a:xfrm>
+              <a:off x="9316832" y="1557623"/>
+              <a:ext cx="519694" cy="483349"/>
+            </a:xfrm>
+            <a:prstGeom prst="rect">
+              <a:avLst/>
+            </a:prstGeom>
+          </p:spPr>
+        </p:pic>
+        <p:sp>
+          <p:nvSpPr>
+            <p:cNvPr id="143" name="文本框 142">
+              <a:extLst>
+                <a:ext uri="{FF2B5EF4-FFF2-40B4-BE49-F238E27FC236}">
+                  <a16:creationId xmlns:a16="http://schemas.microsoft.com/office/drawing/2014/main" id="{97ABEF91-F178-A2CF-5B81-4212E69D4638}"/>
+                </a:ext>
+              </a:extLst>
+            </p:cNvPr>
+            <p:cNvSpPr txBox="1"/>
+            <p:nvPr/>
+          </p:nvSpPr>
+          <p:spPr>
+            <a:xfrm>
+              <a:off x="9316832" y="2045188"/>
+              <a:ext cx="519694" cy="246221"/>
+            </a:xfrm>
+            <a:prstGeom prst="rect">
+              <a:avLst/>
+            </a:prstGeom>
+            <a:noFill/>
+          </p:spPr>
+          <p:txBody>
+            <a:bodyPr wrap="none" rtlCol="0">
+              <a:spAutoFit/>
+            </a:bodyPr>
+            <a:lstStyle/>
+            <a:p>
+              <a:r>
+                <a:rPr kumimoji="1" lang="en-US" altLang="zh-CN" sz="1000" dirty="0">
+                  <a:solidFill>
+                    <a:schemeClr val="tx1">
+                      <a:lumMod val="65000"/>
+                      <a:lumOff val="35000"/>
+                    </a:schemeClr>
+                  </a:solidFill>
+                  <a:latin typeface="Francois One" panose="02000503040000020004" pitchFamily="2" charset="0"/>
+                </a:rPr>
+                <a:t>Teams</a:t>
+              </a:r>
+              <a:endParaRPr kumimoji="1" lang="zh-CN" altLang="en-US" sz="1000" dirty="0">
+                <a:solidFill>
+                  <a:schemeClr val="tx1">
+                    <a:lumMod val="65000"/>
+                    <a:lumOff val="35000"/>
+                  </a:schemeClr>
+                </a:solidFill>
+                <a:latin typeface="Francois One" panose="02000503040000020004" pitchFamily="2" charset="0"/>
+              </a:endParaRPr>
+            </a:p>
+          </p:txBody>
+        </p:sp>
+      </p:grpSp>
+      <p:grpSp>
+        <p:nvGrpSpPr>
+          <p:cNvPr id="84" name="组合 83">
+            <a:extLst>
+              <a:ext uri="{FF2B5EF4-FFF2-40B4-BE49-F238E27FC236}">
+                <a16:creationId xmlns:a16="http://schemas.microsoft.com/office/drawing/2014/main" id="{7166348A-DC82-B521-F5C3-F623EEA3E5EF}"/>
+              </a:ext>
+            </a:extLst>
+          </p:cNvPr>
+          <p:cNvGrpSpPr/>
+          <p:nvPr/>
+        </p:nvGrpSpPr>
+        <p:grpSpPr>
+          <a:xfrm>
+            <a:off x="10140822" y="1471086"/>
+            <a:ext cx="532518" cy="688435"/>
+            <a:chOff x="10122129" y="1583142"/>
+            <a:chExt cx="532518" cy="688435"/>
+          </a:xfrm>
+        </p:grpSpPr>
+        <p:pic>
+          <p:nvPicPr>
+            <p:cNvPr id="1030" name="Picture 6" descr="List of Data Sources | Fluentd">
+              <a:extLst>
+                <a:ext uri="{FF2B5EF4-FFF2-40B4-BE49-F238E27FC236}">
+                  <a16:creationId xmlns:a16="http://schemas.microsoft.com/office/drawing/2014/main" id="{5FC81D9D-0CC4-DF49-BBB9-883F7E2D84E1}"/>
+                </a:ext>
+              </a:extLst>
+            </p:cNvPr>
+            <p:cNvPicPr>
+              <a:picLocks noChangeAspect="1" noChangeArrowheads="1"/>
+            </p:cNvPicPr>
+            <p:nvPr/>
+          </p:nvPicPr>
+          <p:blipFill>
+            <a:blip r:embed="rId39">
+              <a:extLst>
+                <a:ext uri="{28A0092B-C50C-407E-A947-70E740481C1C}">
+                  <a14:useLocalDpi xmlns:a14="http://schemas.microsoft.com/office/drawing/2010/main" val="0"/>
+                </a:ext>
+              </a:extLst>
+            </a:blip>
+            <a:srcRect/>
+            <a:stretch>
+              <a:fillRect/>
+            </a:stretch>
+          </p:blipFill>
+          <p:spPr bwMode="auto">
+            <a:xfrm>
+              <a:off x="10195775" y="1583142"/>
+              <a:ext cx="385226" cy="432000"/>
+            </a:xfrm>
+            <a:prstGeom prst="rect">
+              <a:avLst/>
+            </a:prstGeom>
+            <a:noFill/>
+            <a:extLst>
+              <a:ext uri="{909E8E84-426E-40DD-AFC4-6F175D3DCCD1}">
+                <a14:hiddenFill xmlns:a14="http://schemas.microsoft.com/office/drawing/2010/main">
+                  <a:solidFill>
+                    <a:srgbClr val="FFFFFF"/>
+                  </a:solidFill>
+                </a14:hiddenFill>
+              </a:ext>
+            </a:extLst>
+          </p:spPr>
+        </p:pic>
+        <p:sp>
+          <p:nvSpPr>
+            <p:cNvPr id="144" name="文本框 143">
+              <a:extLst>
+                <a:ext uri="{FF2B5EF4-FFF2-40B4-BE49-F238E27FC236}">
+                  <a16:creationId xmlns:a16="http://schemas.microsoft.com/office/drawing/2014/main" id="{B35E44E7-CA02-762E-C8BD-FA4B63333D1A}"/>
+                </a:ext>
+              </a:extLst>
+            </p:cNvPr>
+            <p:cNvSpPr txBox="1"/>
+            <p:nvPr/>
+          </p:nvSpPr>
+          <p:spPr>
+            <a:xfrm>
+              <a:off x="10122129" y="2025356"/>
+              <a:ext cx="532518" cy="246221"/>
+            </a:xfrm>
+            <a:prstGeom prst="rect">
+              <a:avLst/>
+            </a:prstGeom>
+            <a:noFill/>
+          </p:spPr>
+          <p:txBody>
+            <a:bodyPr wrap="none" rtlCol="0">
+              <a:spAutoFit/>
+            </a:bodyPr>
+            <a:lstStyle/>
+            <a:p>
+              <a:r>
+                <a:rPr kumimoji="1" lang="en-US" altLang="zh-CN" sz="1000" dirty="0">
+                  <a:solidFill>
+                    <a:schemeClr val="tx1">
+                      <a:lumMod val="65000"/>
+                      <a:lumOff val="35000"/>
+                    </a:schemeClr>
+                  </a:solidFill>
+                  <a:latin typeface="Francois One" panose="02000503040000020004" pitchFamily="2" charset="0"/>
+                </a:rPr>
+                <a:t>Syslog</a:t>
+              </a:r>
+              <a:endParaRPr kumimoji="1" lang="zh-CN" altLang="en-US" sz="1000" dirty="0">
+                <a:solidFill>
+                  <a:schemeClr val="tx1">
+                    <a:lumMod val="65000"/>
+                    <a:lumOff val="35000"/>
+                  </a:schemeClr>
+                </a:solidFill>
+                <a:latin typeface="Francois One" panose="02000503040000020004" pitchFamily="2" charset="0"/>
+              </a:endParaRPr>
+            </a:p>
+          </p:txBody>
+        </p:sp>
+      </p:grpSp>
+      <p:sp>
+        <p:nvSpPr>
+          <p:cNvPr id="148" name="右箭头 147">
+            <a:extLst>
+              <a:ext uri="{FF2B5EF4-FFF2-40B4-BE49-F238E27FC236}">
+                <a16:creationId xmlns:a16="http://schemas.microsoft.com/office/drawing/2014/main" id="{778E085E-ABE0-57BD-055A-215FEC5E4933}"/>
+              </a:ext>
+            </a:extLst>
+          </p:cNvPr>
+          <p:cNvSpPr/>
+          <p:nvPr/>
+        </p:nvSpPr>
+        <p:spPr>
+          <a:xfrm>
+            <a:off x="4624279" y="5624005"/>
+            <a:ext cx="1331242" cy="812580"/>
+          </a:xfrm>
+          <a:prstGeom prst="rightArrow">
+            <a:avLst/>
+          </a:prstGeom>
+          <a:solidFill>
+            <a:srgbClr val="2342BF"/>
+          </a:solidFill>
+          <a:ln>
+            <a:solidFill>
+              <a:srgbClr val="2342BF"/>
+            </a:solidFill>
+          </a:ln>
+        </p:spPr>
+        <p:style>
+          <a:lnRef idx="2">
+            <a:schemeClr val="accent1">
+              <a:shade val="50000"/>
+            </a:schemeClr>
+          </a:lnRef>
+          <a:fillRef idx="1">
+            <a:schemeClr val="accent1"/>
+          </a:fillRef>
+          <a:effectRef idx="0">
+            <a:schemeClr val="accent1"/>
+          </a:effectRef>
+          <a:fontRef idx="minor">
+            <a:schemeClr val="lt1"/>
+          </a:fontRef>
+        </p:style>
+        <p:txBody>
+          <a:bodyPr rtlCol="0" anchor="ctr"/>
+          <a:lstStyle/>
+          <a:p>
+            <a:pPr algn="ctr"/>
+            <a:endParaRPr kumimoji="1" lang="zh-CN" altLang="en-US" sz="1600" b="1" dirty="0">
+              <a:latin typeface="Open Sans" panose="020B0606030504020204" pitchFamily="34" charset="0"/>
+              <a:cs typeface="Open Sans" panose="020B0606030504020204" pitchFamily="34" charset="0"/>
+            </a:endParaRPr>
+          </a:p>
+        </p:txBody>
+      </p:sp>
+      <p:sp>
+        <p:nvSpPr>
+          <p:cNvPr id="149" name="右箭头 148">
+            <a:extLst>
+              <a:ext uri="{FF2B5EF4-FFF2-40B4-BE49-F238E27FC236}">
+                <a16:creationId xmlns:a16="http://schemas.microsoft.com/office/drawing/2014/main" id="{8328AF68-3D74-AA65-57C8-B51579A6F413}"/>
+              </a:ext>
+            </a:extLst>
+          </p:cNvPr>
+          <p:cNvSpPr/>
+          <p:nvPr/>
+        </p:nvSpPr>
+        <p:spPr>
+          <a:xfrm>
+            <a:off x="4692750" y="3265400"/>
+            <a:ext cx="1331242" cy="812579"/>
+          </a:xfrm>
+          <a:prstGeom prst="rightArrow">
+            <a:avLst/>
+          </a:prstGeom>
+          <a:solidFill>
+            <a:srgbClr val="2342BF"/>
+          </a:solidFill>
+          <a:ln>
+            <a:solidFill>
+              <a:schemeClr val="bg1"/>
+            </a:solidFill>
+          </a:ln>
+        </p:spPr>
+        <p:style>
+          <a:lnRef idx="2">
+            <a:schemeClr val="accent1">
+              <a:shade val="50000"/>
+            </a:schemeClr>
+          </a:lnRef>
+          <a:fillRef idx="1">
+            <a:schemeClr val="accent1"/>
+          </a:fillRef>
+          <a:effectRef idx="0">
+            <a:schemeClr val="accent1"/>
+          </a:effectRef>
+          <a:fontRef idx="minor">
+            <a:schemeClr val="lt1"/>
+          </a:fontRef>
+        </p:style>
+        <p:txBody>
+          <a:bodyPr rtlCol="0" anchor="ctr"/>
+          <a:lstStyle/>
+          <a:p>
+            <a:pPr algn="ctr"/>
+            <a:endParaRPr kumimoji="1" lang="zh-CN" altLang="en-US" sz="1600" b="1" dirty="0">
+              <a:latin typeface="Open Sans" panose="020B0606030504020204" pitchFamily="34" charset="0"/>
+              <a:cs typeface="Open Sans" panose="020B0606030504020204" pitchFamily="34" charset="0"/>
+            </a:endParaRPr>
+          </a:p>
+        </p:txBody>
+      </p:sp>
+      <p:sp>
+        <p:nvSpPr>
+          <p:cNvPr id="150" name="右箭头 149">
+            <a:extLst>
+              <a:ext uri="{FF2B5EF4-FFF2-40B4-BE49-F238E27FC236}">
+                <a16:creationId xmlns:a16="http://schemas.microsoft.com/office/drawing/2014/main" id="{212A5595-2EA3-34C0-AA3D-CDBCA11C6837}"/>
+              </a:ext>
+            </a:extLst>
+          </p:cNvPr>
+          <p:cNvSpPr/>
+          <p:nvPr/>
+        </p:nvSpPr>
+        <p:spPr>
+          <a:xfrm>
+            <a:off x="4764758" y="3383657"/>
+            <a:ext cx="1331242" cy="812579"/>
+          </a:xfrm>
+          <a:prstGeom prst="rightArrow">
+            <a:avLst/>
+          </a:prstGeom>
+          <a:solidFill>
+            <a:srgbClr val="2342BF"/>
+          </a:solidFill>
+          <a:ln>
+            <a:solidFill>
+              <a:schemeClr val="bg1"/>
+            </a:solidFill>
+          </a:ln>
+        </p:spPr>
+        <p:style>
+          <a:lnRef idx="2">
+            <a:schemeClr val="accent1">
+              <a:shade val="50000"/>
+            </a:schemeClr>
+          </a:lnRef>
+          <a:fillRef idx="1">
+            <a:schemeClr val="accent1"/>
+          </a:fillRef>
+          <a:effectRef idx="0">
+            <a:schemeClr val="accent1"/>
+          </a:effectRef>
+          <a:fontRef idx="minor">
+            <a:schemeClr val="lt1"/>
+          </a:fontRef>
+        </p:style>
+        <p:txBody>
+          <a:bodyPr rtlCol="0" anchor="ctr"/>
+          <a:lstStyle/>
+          <a:p>
+            <a:pPr algn="ctr"/>
+            <a:r>
+              <a:rPr kumimoji="1" lang="en-US" altLang="zh-CN" sz="1600" b="1" dirty="0">
+                <a:latin typeface="Open Sans" panose="020B0606030504020204" pitchFamily="34" charset="0"/>
+                <a:ea typeface="Open Sans" panose="020B0606030504020204" pitchFamily="34" charset="0"/>
+                <a:cs typeface="Open Sans" panose="020B0606030504020204" pitchFamily="34" charset="0"/>
+              </a:rPr>
+              <a:t>Channels</a:t>
+            </a:r>
+            <a:endParaRPr kumimoji="1" lang="zh-CN" altLang="en-US" sz="1600" b="1" dirty="0">
+              <a:latin typeface="Open Sans" panose="020B0606030504020204" pitchFamily="34" charset="0"/>
+              <a:cs typeface="Open Sans" panose="020B0606030504020204" pitchFamily="34" charset="0"/>
+            </a:endParaRPr>
+          </a:p>
+        </p:txBody>
+      </p:sp>
     </p:spTree>
     <p:extLst>
       <p:ext uri="{BB962C8B-B14F-4D97-AF65-F5344CB8AC3E}">
@@ -8237,7 +8567,7 @@
 <file path=ppt/theme/theme1.xml><?xml version="1.0" encoding="utf-8"?>
 <a:theme xmlns:a="http://schemas.openxmlformats.org/drawingml/2006/main" name="Office 主题​​">
   <a:themeElements>
-    <a:clrScheme name="Office">
+    <a:clrScheme name="Office 主题​​">
       <a:dk1>
         <a:sysClr val="windowText" lastClr="000000"/>
       </a:dk1>
@@ -8275,9 +8605,9 @@
         <a:srgbClr val="954F72"/>
       </a:folHlink>
     </a:clrScheme>
-    <a:fontScheme name="Office">
+    <a:fontScheme name="Office 主题​​">
       <a:majorFont>
-        <a:latin typeface="等线 Light" panose="020F0302020204030204"/>
+        <a:latin typeface="Calibri Light" panose="020F0302020204030204"/>
         <a:ea typeface=""/>
         <a:cs typeface=""/>
         <a:font script="Jpan" typeface="游ゴシック Light"/>
@@ -8310,26 +8640,9 @@
         <a:font script="Viet" typeface="Times New Roman"/>
         <a:font script="Uigh" typeface="Microsoft Uighur"/>
         <a:font script="Geor" typeface="Sylfaen"/>
-        <a:font script="Armn" typeface="Arial"/>
-        <a:font script="Bugi" typeface="Leelawadee UI"/>
-        <a:font script="Bopo" typeface="Microsoft JhengHei"/>
-        <a:font script="Java" typeface="Javanese Text"/>
-        <a:font script="Lisu" typeface="Segoe UI"/>
-        <a:font script="Mymr" typeface="Myanmar Text"/>
-        <a:font script="Nkoo" typeface="Ebrima"/>
-        <a:font script="Olck" typeface="Nirmala UI"/>
-        <a:font script="Osma" typeface="Ebrima"/>
-        <a:font script="Phag" typeface="Phagspa"/>
-        <a:font script="Syrn" typeface="Estrangelo Edessa"/>
-        <a:font script="Syrj" typeface="Estrangelo Edessa"/>
-        <a:font script="Syre" typeface="Estrangelo Edessa"/>
-        <a:font script="Sora" typeface="Nirmala UI"/>
-        <a:font script="Tale" typeface="Microsoft Tai Le"/>
-        <a:font script="Talu" typeface="Microsoft New Tai Lue"/>
-        <a:font script="Tfng" typeface="Ebrima"/>
       </a:majorFont>
       <a:minorFont>
-        <a:latin typeface="等线" panose="020F0502020204030204"/>
+        <a:latin typeface="Calibri" panose="020F0502020204030204"/>
         <a:ea typeface=""/>
         <a:cs typeface=""/>
         <a:font script="Jpan" typeface="游ゴシック"/>
@@ -8362,26 +8675,9 @@
         <a:font script="Viet" typeface="Arial"/>
         <a:font script="Uigh" typeface="Microsoft Uighur"/>
         <a:font script="Geor" typeface="Sylfaen"/>
-        <a:font script="Armn" typeface="Arial"/>
-        <a:font script="Bugi" typeface="Leelawadee UI"/>
-        <a:font script="Bopo" typeface="Microsoft JhengHei"/>
-        <a:font script="Java" typeface="Javanese Text"/>
-        <a:font script="Lisu" typeface="Segoe UI"/>
-        <a:font script="Mymr" typeface="Myanmar Text"/>
-        <a:font script="Nkoo" typeface="Ebrima"/>
-        <a:font script="Olck" typeface="Nirmala UI"/>
-        <a:font script="Osma" typeface="Ebrima"/>
-        <a:font script="Phag" typeface="Phagspa"/>
-        <a:font script="Syrn" typeface="Estrangelo Edessa"/>
-        <a:font script="Syrj" typeface="Estrangelo Edessa"/>
-        <a:font script="Syre" typeface="Estrangelo Edessa"/>
-        <a:font script="Sora" typeface="Nirmala UI"/>
-        <a:font script="Tale" typeface="Microsoft Tai Le"/>
-        <a:font script="Talu" typeface="Microsoft New Tai Lue"/>
-        <a:font script="Tfng" typeface="Ebrima"/>
       </a:minorFont>
     </a:fontScheme>
-    <a:fmtScheme name="Office">
+    <a:fmtScheme name="Office 主题​​">
       <a:fillStyleLst>
         <a:solidFill>
           <a:schemeClr val="phClr"/>

</xml_diff>

<commit_message>
Update the README.md (#140)
* update the README.md

* update the picture
</commit_message>
<xml_diff>
--- a/docs/diagrams.pptx
+++ b/docs/diagrams.pptx
@@ -254,7 +254,7 @@
           <a:p>
             <a:fld id="{ADEA6865-5F8B-9C4A-950D-1D161D0F2BB5}" type="datetimeFigureOut">
               <a:rPr kumimoji="1" lang="zh-CN" altLang="en-US" smtClean="0"/>
-              <a:t>2022/6/8</a:t>
+              <a:t>2022/6/15</a:t>
             </a:fld>
             <a:endParaRPr kumimoji="1" lang="zh-CN" altLang="en-US"/>
           </a:p>
@@ -424,7 +424,7 @@
           <a:p>
             <a:fld id="{ADEA6865-5F8B-9C4A-950D-1D161D0F2BB5}" type="datetimeFigureOut">
               <a:rPr kumimoji="1" lang="zh-CN" altLang="en-US" smtClean="0"/>
-              <a:t>2022/6/8</a:t>
+              <a:t>2022/6/15</a:t>
             </a:fld>
             <a:endParaRPr kumimoji="1" lang="zh-CN" altLang="en-US"/>
           </a:p>
@@ -604,7 +604,7 @@
           <a:p>
             <a:fld id="{ADEA6865-5F8B-9C4A-950D-1D161D0F2BB5}" type="datetimeFigureOut">
               <a:rPr kumimoji="1" lang="zh-CN" altLang="en-US" smtClean="0"/>
-              <a:t>2022/6/8</a:t>
+              <a:t>2022/6/15</a:t>
             </a:fld>
             <a:endParaRPr kumimoji="1" lang="zh-CN" altLang="en-US"/>
           </a:p>
@@ -774,7 +774,7 @@
           <a:p>
             <a:fld id="{ADEA6865-5F8B-9C4A-950D-1D161D0F2BB5}" type="datetimeFigureOut">
               <a:rPr kumimoji="1" lang="zh-CN" altLang="en-US" smtClean="0"/>
-              <a:t>2022/6/8</a:t>
+              <a:t>2022/6/15</a:t>
             </a:fld>
             <a:endParaRPr kumimoji="1" lang="zh-CN" altLang="en-US"/>
           </a:p>
@@ -1018,7 +1018,7 @@
           <a:p>
             <a:fld id="{ADEA6865-5F8B-9C4A-950D-1D161D0F2BB5}" type="datetimeFigureOut">
               <a:rPr kumimoji="1" lang="zh-CN" altLang="en-US" smtClean="0"/>
-              <a:t>2022/6/8</a:t>
+              <a:t>2022/6/15</a:t>
             </a:fld>
             <a:endParaRPr kumimoji="1" lang="zh-CN" altLang="en-US"/>
           </a:p>
@@ -1250,7 +1250,7 @@
           <a:p>
             <a:fld id="{ADEA6865-5F8B-9C4A-950D-1D161D0F2BB5}" type="datetimeFigureOut">
               <a:rPr kumimoji="1" lang="zh-CN" altLang="en-US" smtClean="0"/>
-              <a:t>2022/6/8</a:t>
+              <a:t>2022/6/15</a:t>
             </a:fld>
             <a:endParaRPr kumimoji="1" lang="zh-CN" altLang="en-US"/>
           </a:p>
@@ -1617,7 +1617,7 @@
           <a:p>
             <a:fld id="{ADEA6865-5F8B-9C4A-950D-1D161D0F2BB5}" type="datetimeFigureOut">
               <a:rPr kumimoji="1" lang="zh-CN" altLang="en-US" smtClean="0"/>
-              <a:t>2022/6/8</a:t>
+              <a:t>2022/6/15</a:t>
             </a:fld>
             <a:endParaRPr kumimoji="1" lang="zh-CN" altLang="en-US"/>
           </a:p>
@@ -1735,7 +1735,7 @@
           <a:p>
             <a:fld id="{ADEA6865-5F8B-9C4A-950D-1D161D0F2BB5}" type="datetimeFigureOut">
               <a:rPr kumimoji="1" lang="zh-CN" altLang="en-US" smtClean="0"/>
-              <a:t>2022/6/8</a:t>
+              <a:t>2022/6/15</a:t>
             </a:fld>
             <a:endParaRPr kumimoji="1" lang="zh-CN" altLang="en-US"/>
           </a:p>
@@ -1830,7 +1830,7 @@
           <a:p>
             <a:fld id="{ADEA6865-5F8B-9C4A-950D-1D161D0F2BB5}" type="datetimeFigureOut">
               <a:rPr kumimoji="1" lang="zh-CN" altLang="en-US" smtClean="0"/>
-              <a:t>2022/6/8</a:t>
+              <a:t>2022/6/15</a:t>
             </a:fld>
             <a:endParaRPr kumimoji="1" lang="zh-CN" altLang="en-US"/>
           </a:p>
@@ -2107,7 +2107,7 @@
           <a:p>
             <a:fld id="{ADEA6865-5F8B-9C4A-950D-1D161D0F2BB5}" type="datetimeFigureOut">
               <a:rPr kumimoji="1" lang="zh-CN" altLang="en-US" smtClean="0"/>
-              <a:t>2022/6/8</a:t>
+              <a:t>2022/6/15</a:t>
             </a:fld>
             <a:endParaRPr kumimoji="1" lang="zh-CN" altLang="en-US"/>
           </a:p>
@@ -2364,7 +2364,7 @@
           <a:p>
             <a:fld id="{ADEA6865-5F8B-9C4A-950D-1D161D0F2BB5}" type="datetimeFigureOut">
               <a:rPr kumimoji="1" lang="zh-CN" altLang="en-US" smtClean="0"/>
-              <a:t>2022/6/8</a:t>
+              <a:t>2022/6/15</a:t>
             </a:fld>
             <a:endParaRPr kumimoji="1" lang="zh-CN" altLang="en-US"/>
           </a:p>
@@ -2577,7 +2577,7 @@
           <a:p>
             <a:fld id="{ADEA6865-5F8B-9C4A-950D-1D161D0F2BB5}" type="datetimeFigureOut">
               <a:rPr kumimoji="1" lang="zh-CN" altLang="en-US" smtClean="0"/>
-              <a:t>2022/6/8</a:t>
+              <a:t>2022/6/15</a:t>
             </a:fld>
             <a:endParaRPr kumimoji="1" lang="zh-CN" altLang="en-US"/>
           </a:p>
@@ -2984,10 +2984,10 @@
       </p:grpSpPr>
       <p:sp>
         <p:nvSpPr>
-          <p:cNvPr id="5" name="圆角矩形 4">
+          <p:cNvPr id="35" name="矩形 34">
             <a:extLst>
               <a:ext uri="{FF2B5EF4-FFF2-40B4-BE49-F238E27FC236}">
-                <a16:creationId xmlns:a16="http://schemas.microsoft.com/office/drawing/2014/main" id="{CF230E5E-3A06-FA06-3FA5-5CCE8265CDBA}"/>
+                <a16:creationId xmlns:a16="http://schemas.microsoft.com/office/drawing/2014/main" id="{968A8439-BA6D-9DFB-64CA-BD4DB657C720}"/>
               </a:ext>
             </a:extLst>
           </p:cNvPr>
@@ -2996,20 +2996,18 @@
         </p:nvSpPr>
         <p:spPr>
           <a:xfrm>
-            <a:off x="2778013" y="2184485"/>
-            <a:ext cx="1128408" cy="340468"/>
-          </a:xfrm>
-          <a:prstGeom prst="roundRect">
+            <a:off x="0" y="0"/>
+            <a:ext cx="12192000" cy="10799763"/>
+          </a:xfrm>
+          <a:prstGeom prst="rect">
             <a:avLst/>
           </a:prstGeom>
           <a:solidFill>
-            <a:srgbClr val="2342BF"/>
+            <a:schemeClr val="tx1">
+              <a:lumMod val="75000"/>
+              <a:lumOff val="25000"/>
+            </a:schemeClr>
           </a:solidFill>
-          <a:ln>
-            <a:solidFill>
-              <a:srgbClr val="2342BF"/>
-            </a:solidFill>
-          </a:ln>
         </p:spPr>
         <p:style>
           <a:lnRef idx="2">
@@ -3032,27 +3030,16 @@
           <a:lstStyle/>
           <a:p>
             <a:pPr algn="ctr"/>
-            <a:r>
-              <a:rPr kumimoji="1" lang="en-US" altLang="zh-CN" b="1" dirty="0">
-                <a:latin typeface="Open Sans" panose="020B0606030504020204" pitchFamily="34" charset="0"/>
-                <a:ea typeface="Open Sans" panose="020B0606030504020204" pitchFamily="34" charset="0"/>
-                <a:cs typeface="Open Sans" panose="020B0606030504020204" pitchFamily="34" charset="0"/>
-              </a:rPr>
-              <a:t>HTTP</a:t>
-            </a:r>
-            <a:endParaRPr kumimoji="1" lang="zh-CN" altLang="en-US" b="1" dirty="0">
-              <a:latin typeface="Open Sans" panose="020B0606030504020204" pitchFamily="34" charset="0"/>
-              <a:cs typeface="Open Sans" panose="020B0606030504020204" pitchFamily="34" charset="0"/>
-            </a:endParaRPr>
+            <a:endParaRPr kumimoji="1" lang="zh-CN" altLang="en-US"/>
           </a:p>
         </p:txBody>
       </p:sp>
       <p:sp>
         <p:nvSpPr>
-          <p:cNvPr id="7" name="圆角矩形 6">
+          <p:cNvPr id="5" name="圆角矩形 4">
             <a:extLst>
               <a:ext uri="{FF2B5EF4-FFF2-40B4-BE49-F238E27FC236}">
-                <a16:creationId xmlns:a16="http://schemas.microsoft.com/office/drawing/2014/main" id="{BF2E926A-3675-7B16-BF4F-C259FD133280}"/>
+                <a16:creationId xmlns:a16="http://schemas.microsoft.com/office/drawing/2014/main" id="{CF230E5E-3A06-FA06-3FA5-5CCE8265CDBA}"/>
               </a:ext>
             </a:extLst>
           </p:cNvPr>
@@ -3061,7 +3048,7 @@
         </p:nvSpPr>
         <p:spPr>
           <a:xfrm>
-            <a:off x="2778013" y="2803593"/>
+            <a:off x="2778013" y="2184485"/>
             <a:ext cx="1128408" cy="340468"/>
           </a:xfrm>
           <a:prstGeom prst="roundRect">
@@ -3072,9 +3059,14 @@
           </a:solidFill>
           <a:ln>
             <a:solidFill>
-              <a:srgbClr val="2342BF"/>
+              <a:schemeClr val="bg1"/>
             </a:solidFill>
           </a:ln>
+          <a:effectLst>
+            <a:glow rad="25400">
+              <a:schemeClr val="bg1"/>
+            </a:glow>
+          </a:effectLst>
         </p:spPr>
         <p:style>
           <a:lnRef idx="2">
@@ -3103,7 +3095,7 @@
                 <a:ea typeface="Open Sans" panose="020B0606030504020204" pitchFamily="34" charset="0"/>
                 <a:cs typeface="Open Sans" panose="020B0606030504020204" pitchFamily="34" charset="0"/>
               </a:rPr>
-              <a:t>TCP</a:t>
+              <a:t>HTTP</a:t>
             </a:r>
             <a:endParaRPr kumimoji="1" lang="zh-CN" altLang="en-US" b="1" dirty="0">
               <a:latin typeface="Open Sans" panose="020B0606030504020204" pitchFamily="34" charset="0"/>
@@ -3114,10 +3106,10 @@
       </p:sp>
       <p:sp>
         <p:nvSpPr>
-          <p:cNvPr id="8" name="圆角矩形 7">
+          <p:cNvPr id="7" name="圆角矩形 6">
             <a:extLst>
               <a:ext uri="{FF2B5EF4-FFF2-40B4-BE49-F238E27FC236}">
-                <a16:creationId xmlns:a16="http://schemas.microsoft.com/office/drawing/2014/main" id="{4F739783-1201-CDAE-2EEB-063BEC77324A}"/>
+                <a16:creationId xmlns:a16="http://schemas.microsoft.com/office/drawing/2014/main" id="{BF2E926A-3675-7B16-BF4F-C259FD133280}"/>
               </a:ext>
             </a:extLst>
           </p:cNvPr>
@@ -3126,7 +3118,7 @@
         </p:nvSpPr>
         <p:spPr>
           <a:xfrm>
-            <a:off x="2778013" y="4041809"/>
+            <a:off x="2778013" y="2803593"/>
             <a:ext cx="1128408" cy="340468"/>
           </a:xfrm>
           <a:prstGeom prst="roundRect">
@@ -3137,9 +3129,14 @@
           </a:solidFill>
           <a:ln>
             <a:solidFill>
-              <a:srgbClr val="2342BF"/>
+              <a:schemeClr val="bg1"/>
             </a:solidFill>
           </a:ln>
+          <a:effectLst>
+            <a:glow rad="25400">
+              <a:schemeClr val="bg1"/>
+            </a:glow>
+          </a:effectLst>
         </p:spPr>
         <p:style>
           <a:lnRef idx="2">
@@ -3168,7 +3165,7 @@
                 <a:ea typeface="Open Sans" panose="020B0606030504020204" pitchFamily="34" charset="0"/>
                 <a:cs typeface="Open Sans" panose="020B0606030504020204" pitchFamily="34" charset="0"/>
               </a:rPr>
-              <a:t>Shell</a:t>
+              <a:t>TCP</a:t>
             </a:r>
             <a:endParaRPr kumimoji="1" lang="zh-CN" altLang="en-US" b="1" dirty="0">
               <a:latin typeface="Open Sans" panose="020B0606030504020204" pitchFamily="34" charset="0"/>
@@ -3179,10 +3176,10 @@
       </p:sp>
       <p:sp>
         <p:nvSpPr>
-          <p:cNvPr id="9" name="圆角矩形 8">
+          <p:cNvPr id="8" name="圆角矩形 7">
             <a:extLst>
               <a:ext uri="{FF2B5EF4-FFF2-40B4-BE49-F238E27FC236}">
-                <a16:creationId xmlns:a16="http://schemas.microsoft.com/office/drawing/2014/main" id="{849E8CEB-67C9-6879-2649-BDBFE5AB0768}"/>
+                <a16:creationId xmlns:a16="http://schemas.microsoft.com/office/drawing/2014/main" id="{4F739783-1201-CDAE-2EEB-063BEC77324A}"/>
               </a:ext>
             </a:extLst>
           </p:cNvPr>
@@ -3191,7 +3188,7 @@
         </p:nvSpPr>
         <p:spPr>
           <a:xfrm>
-            <a:off x="2778013" y="4660917"/>
+            <a:off x="2778013" y="4041809"/>
             <a:ext cx="1128408" cy="340468"/>
           </a:xfrm>
           <a:prstGeom prst="roundRect">
@@ -3202,9 +3199,14 @@
           </a:solidFill>
           <a:ln>
             <a:solidFill>
-              <a:srgbClr val="2342BF"/>
+              <a:schemeClr val="bg1"/>
             </a:solidFill>
           </a:ln>
+          <a:effectLst>
+            <a:glow rad="25400">
+              <a:schemeClr val="bg1"/>
+            </a:glow>
+          </a:effectLst>
         </p:spPr>
         <p:style>
           <a:lnRef idx="2">
@@ -3233,7 +3235,7 @@
                 <a:ea typeface="Open Sans" panose="020B0606030504020204" pitchFamily="34" charset="0"/>
                 <a:cs typeface="Open Sans" panose="020B0606030504020204" pitchFamily="34" charset="0"/>
               </a:rPr>
-              <a:t>SSH</a:t>
+              <a:t>Shell</a:t>
             </a:r>
             <a:endParaRPr kumimoji="1" lang="zh-CN" altLang="en-US" b="1" dirty="0">
               <a:latin typeface="Open Sans" panose="020B0606030504020204" pitchFamily="34" charset="0"/>
@@ -3244,10 +3246,10 @@
       </p:sp>
       <p:sp>
         <p:nvSpPr>
-          <p:cNvPr id="10" name="圆角矩形 9">
+          <p:cNvPr id="9" name="圆角矩形 8">
             <a:extLst>
               <a:ext uri="{FF2B5EF4-FFF2-40B4-BE49-F238E27FC236}">
-                <a16:creationId xmlns:a16="http://schemas.microsoft.com/office/drawing/2014/main" id="{893CFD0F-8DAA-6570-B52C-697A019566BA}"/>
+                <a16:creationId xmlns:a16="http://schemas.microsoft.com/office/drawing/2014/main" id="{849E8CEB-67C9-6879-2649-BDBFE5AB0768}"/>
               </a:ext>
             </a:extLst>
           </p:cNvPr>
@@ -3256,7 +3258,7 @@
         </p:nvSpPr>
         <p:spPr>
           <a:xfrm>
-            <a:off x="2778013" y="5280025"/>
+            <a:off x="2778013" y="4660917"/>
             <a:ext cx="1128408" cy="340468"/>
           </a:xfrm>
           <a:prstGeom prst="roundRect">
@@ -3267,9 +3269,14 @@
           </a:solidFill>
           <a:ln>
             <a:solidFill>
-              <a:srgbClr val="2342BF"/>
+              <a:schemeClr val="bg1"/>
             </a:solidFill>
           </a:ln>
+          <a:effectLst>
+            <a:glow rad="25400">
+              <a:schemeClr val="bg1"/>
+            </a:glow>
+          </a:effectLst>
         </p:spPr>
         <p:style>
           <a:lnRef idx="2">
@@ -3298,7 +3305,7 @@
                 <a:ea typeface="Open Sans" panose="020B0606030504020204" pitchFamily="34" charset="0"/>
                 <a:cs typeface="Open Sans" panose="020B0606030504020204" pitchFamily="34" charset="0"/>
               </a:rPr>
-              <a:t>Host</a:t>
+              <a:t>SSH</a:t>
             </a:r>
             <a:endParaRPr kumimoji="1" lang="zh-CN" altLang="en-US" b="1" dirty="0">
               <a:latin typeface="Open Sans" panose="020B0606030504020204" pitchFamily="34" charset="0"/>
@@ -3309,10 +3316,10 @@
       </p:sp>
       <p:sp>
         <p:nvSpPr>
-          <p:cNvPr id="11" name="圆角矩形 10">
+          <p:cNvPr id="10" name="圆角矩形 9">
             <a:extLst>
               <a:ext uri="{FF2B5EF4-FFF2-40B4-BE49-F238E27FC236}">
-                <a16:creationId xmlns:a16="http://schemas.microsoft.com/office/drawing/2014/main" id="{21CC31B3-33E3-4D0D-BC04-D10366ED29AE}"/>
+                <a16:creationId xmlns:a16="http://schemas.microsoft.com/office/drawing/2014/main" id="{893CFD0F-8DAA-6570-B52C-697A019566BA}"/>
               </a:ext>
             </a:extLst>
           </p:cNvPr>
@@ -3321,7 +3328,7 @@
         </p:nvSpPr>
         <p:spPr>
           <a:xfrm>
-            <a:off x="2778013" y="5899133"/>
+            <a:off x="2778013" y="5280025"/>
             <a:ext cx="1128408" cy="340468"/>
           </a:xfrm>
           <a:prstGeom prst="roundRect">
@@ -3332,9 +3339,14 @@
           </a:solidFill>
           <a:ln>
             <a:solidFill>
-              <a:srgbClr val="2342BF"/>
+              <a:schemeClr val="bg1"/>
             </a:solidFill>
           </a:ln>
+          <a:effectLst>
+            <a:glow rad="25400">
+              <a:schemeClr val="bg1"/>
+            </a:glow>
+          </a:effectLst>
         </p:spPr>
         <p:style>
           <a:lnRef idx="2">
@@ -3363,6 +3375,76 @@
                 <a:ea typeface="Open Sans" panose="020B0606030504020204" pitchFamily="34" charset="0"/>
                 <a:cs typeface="Open Sans" panose="020B0606030504020204" pitchFamily="34" charset="0"/>
               </a:rPr>
+              <a:t>Host</a:t>
+            </a:r>
+            <a:endParaRPr kumimoji="1" lang="zh-CN" altLang="en-US" b="1" dirty="0">
+              <a:latin typeface="Open Sans" panose="020B0606030504020204" pitchFamily="34" charset="0"/>
+              <a:cs typeface="Open Sans" panose="020B0606030504020204" pitchFamily="34" charset="0"/>
+            </a:endParaRPr>
+          </a:p>
+        </p:txBody>
+      </p:sp>
+      <p:sp>
+        <p:nvSpPr>
+          <p:cNvPr id="11" name="圆角矩形 10">
+            <a:extLst>
+              <a:ext uri="{FF2B5EF4-FFF2-40B4-BE49-F238E27FC236}">
+                <a16:creationId xmlns:a16="http://schemas.microsoft.com/office/drawing/2014/main" id="{21CC31B3-33E3-4D0D-BC04-D10366ED29AE}"/>
+              </a:ext>
+            </a:extLst>
+          </p:cNvPr>
+          <p:cNvSpPr/>
+          <p:nvPr/>
+        </p:nvSpPr>
+        <p:spPr>
+          <a:xfrm>
+            <a:off x="2778013" y="5899133"/>
+            <a:ext cx="1128408" cy="340468"/>
+          </a:xfrm>
+          <a:prstGeom prst="roundRect">
+            <a:avLst/>
+          </a:prstGeom>
+          <a:solidFill>
+            <a:srgbClr val="2342BF"/>
+          </a:solidFill>
+          <a:ln>
+            <a:solidFill>
+              <a:schemeClr val="bg1"/>
+            </a:solidFill>
+          </a:ln>
+          <a:effectLst>
+            <a:glow rad="25400">
+              <a:schemeClr val="bg1"/>
+            </a:glow>
+          </a:effectLst>
+        </p:spPr>
+        <p:style>
+          <a:lnRef idx="2">
+            <a:schemeClr val="accent1">
+              <a:shade val="50000"/>
+            </a:schemeClr>
+          </a:lnRef>
+          <a:fillRef idx="1">
+            <a:schemeClr val="accent1"/>
+          </a:fillRef>
+          <a:effectRef idx="0">
+            <a:schemeClr val="accent1"/>
+          </a:effectRef>
+          <a:fontRef idx="minor">
+            <a:schemeClr val="lt1"/>
+          </a:fontRef>
+        </p:style>
+        <p:txBody>
+          <a:bodyPr rtlCol="0" anchor="ctr"/>
+          <a:lstStyle/>
+          <a:p>
+            <a:pPr algn="ctr"/>
+            <a:r>
+              <a:rPr kumimoji="1" lang="en-US" altLang="zh-CN" b="1" dirty="0">
+                <a:latin typeface="Open Sans" panose="020B0606030504020204" pitchFamily="34" charset="0"/>
+                <a:ea typeface="Open Sans" panose="020B0606030504020204" pitchFamily="34" charset="0"/>
+                <a:cs typeface="Open Sans" panose="020B0606030504020204" pitchFamily="34" charset="0"/>
+              </a:rPr>
               <a:t>Client</a:t>
             </a:r>
             <a:endParaRPr kumimoji="1" lang="zh-CN" altLang="en-US" b="1" dirty="0">
@@ -3391,6 +3473,11 @@
             <a:chOff x="241936" y="701927"/>
             <a:chExt cx="524503" cy="500260"/>
           </a:xfrm>
+          <a:effectLst>
+            <a:glow rad="25400">
+              <a:schemeClr val="bg1"/>
+            </a:glow>
+          </a:effectLst>
         </p:grpSpPr>
         <p:pic>
           <p:nvPicPr>
@@ -3493,6 +3580,11 @@
             <a:chOff x="615190" y="701927"/>
             <a:chExt cx="495649" cy="493245"/>
           </a:xfrm>
+          <a:effectLst>
+            <a:glow rad="25400">
+              <a:schemeClr val="bg1"/>
+            </a:glow>
+          </a:effectLst>
         </p:grpSpPr>
         <p:pic>
           <p:nvPicPr>
@@ -3602,6 +3694,11 @@
             <a:chOff x="1061603" y="701927"/>
             <a:chExt cx="697627" cy="493245"/>
           </a:xfrm>
+          <a:effectLst>
+            <a:glow rad="25400">
+              <a:schemeClr val="bg1"/>
+            </a:glow>
+          </a:effectLst>
         </p:grpSpPr>
         <p:pic>
           <p:nvPicPr>
@@ -3711,6 +3808,11 @@
             <a:chOff x="1788412" y="701927"/>
             <a:chExt cx="784189" cy="493245"/>
           </a:xfrm>
+          <a:effectLst>
+            <a:glow rad="25400">
+              <a:schemeClr val="bg1"/>
+            </a:glow>
+          </a:effectLst>
         </p:grpSpPr>
         <p:pic>
           <p:nvPicPr>
@@ -3813,6 +3915,11 @@
             <a:chOff x="223549" y="4788025"/>
             <a:chExt cx="425116" cy="554565"/>
           </a:xfrm>
+          <a:effectLst>
+            <a:glow rad="25400">
+              <a:schemeClr val="bg1"/>
+            </a:glow>
+          </a:effectLst>
         </p:grpSpPr>
         <p:pic>
           <p:nvPicPr>
@@ -3916,6 +4023,11 @@
             <a:chOff x="846420" y="4791547"/>
             <a:chExt cx="470000" cy="527055"/>
           </a:xfrm>
+          <a:effectLst>
+            <a:glow rad="25400">
+              <a:schemeClr val="bg1"/>
+            </a:glow>
+          </a:effectLst>
         </p:grpSpPr>
         <p:pic>
           <p:nvPicPr>
@@ -4019,6 +4131,11 @@
             <a:chOff x="1339808" y="4839205"/>
             <a:chExt cx="417102" cy="503385"/>
           </a:xfrm>
+          <a:effectLst>
+            <a:glow rad="25400">
+              <a:schemeClr val="bg1"/>
+            </a:glow>
+          </a:effectLst>
         </p:grpSpPr>
         <p:pic>
           <p:nvPicPr>
@@ -4122,6 +4239,11 @@
             <a:chOff x="1803825" y="4693696"/>
             <a:chExt cx="587020" cy="583015"/>
           </a:xfrm>
+          <a:effectLst>
+            <a:glow rad="25400">
+              <a:schemeClr val="bg1"/>
+            </a:glow>
+          </a:effectLst>
         </p:grpSpPr>
         <p:pic>
           <p:nvPicPr>
@@ -4225,6 +4347,11 @@
             <a:chOff x="2226015" y="4790679"/>
             <a:chExt cx="675185" cy="518677"/>
           </a:xfrm>
+          <a:effectLst>
+            <a:glow rad="25400">
+              <a:schemeClr val="bg1"/>
+            </a:glow>
+          </a:effectLst>
         </p:grpSpPr>
         <p:pic>
           <p:nvPicPr>
@@ -4328,6 +4455,11 @@
             <a:chOff x="4116932" y="5255034"/>
             <a:chExt cx="620683" cy="565709"/>
           </a:xfrm>
+          <a:effectLst>
+            <a:glow rad="25400">
+              <a:schemeClr val="bg1"/>
+            </a:glow>
+          </a:effectLst>
         </p:grpSpPr>
         <p:pic>
           <p:nvPicPr>
@@ -4431,6 +4563,11 @@
             <a:chOff x="1162963" y="1674063"/>
             <a:chExt cx="545342" cy="522398"/>
           </a:xfrm>
+          <a:effectLst>
+            <a:glow rad="25400">
+              <a:schemeClr val="bg1"/>
+            </a:glow>
+          </a:effectLst>
         </p:grpSpPr>
         <p:pic>
           <p:nvPicPr>
@@ -4581,6 +4718,11 @@
             <a:chOff x="1147446" y="2324148"/>
             <a:chExt cx="724878" cy="572682"/>
           </a:xfrm>
+          <a:effectLst>
+            <a:glow rad="25400">
+              <a:schemeClr val="bg1"/>
+            </a:glow>
+          </a:effectLst>
         </p:grpSpPr>
         <p:pic>
           <p:nvPicPr>
@@ -4708,6 +4850,11 @@
             <a:chOff x="1487713" y="3030733"/>
             <a:chExt cx="787395" cy="551362"/>
           </a:xfrm>
+          <a:effectLst>
+            <a:glow rad="25400">
+              <a:schemeClr val="bg1"/>
+            </a:glow>
+          </a:effectLst>
         </p:grpSpPr>
         <p:pic>
           <p:nvPicPr>
@@ -4835,6 +4982,11 @@
             <a:chOff x="983973" y="3960891"/>
             <a:chExt cx="380959" cy="577208"/>
           </a:xfrm>
+          <a:effectLst>
+            <a:glow rad="25400">
+              <a:schemeClr val="bg1"/>
+            </a:glow>
+          </a:effectLst>
         </p:grpSpPr>
         <p:pic>
           <p:nvPicPr>
@@ -4938,6 +5090,11 @@
             <a:chOff x="1479129" y="3817424"/>
             <a:chExt cx="526106" cy="612953"/>
           </a:xfrm>
+          <a:effectLst>
+            <a:glow rad="25400">
+              <a:schemeClr val="bg1"/>
+            </a:glow>
+          </a:effectLst>
         </p:grpSpPr>
         <p:pic>
           <p:nvPicPr>
@@ -5056,6 +5213,11 @@
             <a:chOff x="2065415" y="3858155"/>
             <a:chExt cx="433493" cy="592555"/>
           </a:xfrm>
+          <a:effectLst>
+            <a:glow rad="25400">
+              <a:schemeClr val="bg1"/>
+            </a:glow>
+          </a:effectLst>
         </p:grpSpPr>
         <p:pic>
           <p:nvPicPr>
@@ -5172,8 +5334,8 @@
         </p:nvCxnSpPr>
         <p:spPr>
           <a:xfrm>
-            <a:off x="552738" y="2651352"/>
-            <a:ext cx="3348000" cy="0"/>
+            <a:off x="216000" y="2651352"/>
+            <a:ext cx="3672000" cy="0"/>
           </a:xfrm>
           <a:prstGeom prst="line">
             <a:avLst/>
@@ -5186,6 +5348,7 @@
             </a:solidFill>
             <a:prstDash val="dash"/>
           </a:ln>
+          <a:effectLst/>
         </p:spPr>
         <p:style>
           <a:lnRef idx="1">
@@ -5218,8 +5381,8 @@
         </p:nvCxnSpPr>
         <p:spPr>
           <a:xfrm>
-            <a:off x="552738" y="3279512"/>
-            <a:ext cx="3348000" cy="0"/>
+            <a:off x="216000" y="3279512"/>
+            <a:ext cx="3672000" cy="0"/>
           </a:xfrm>
           <a:prstGeom prst="line">
             <a:avLst/>
@@ -5232,6 +5395,7 @@
             </a:solidFill>
             <a:prstDash val="dash"/>
           </a:ln>
+          <a:effectLst/>
         </p:spPr>
         <p:style>
           <a:lnRef idx="1">
@@ -5264,8 +5428,8 @@
         </p:nvCxnSpPr>
         <p:spPr>
           <a:xfrm>
-            <a:off x="552738" y="4535832"/>
-            <a:ext cx="3348000" cy="0"/>
+            <a:off x="216000" y="4535832"/>
+            <a:ext cx="3672000" cy="0"/>
           </a:xfrm>
           <a:prstGeom prst="line">
             <a:avLst/>
@@ -5278,6 +5442,7 @@
             </a:solidFill>
             <a:prstDash val="dash"/>
           </a:ln>
+          <a:effectLst/>
         </p:spPr>
         <p:style>
           <a:lnRef idx="1">
@@ -5310,8 +5475,8 @@
         </p:nvCxnSpPr>
         <p:spPr>
           <a:xfrm>
-            <a:off x="552738" y="5163992"/>
-            <a:ext cx="3348000" cy="0"/>
+            <a:off x="216000" y="5163992"/>
+            <a:ext cx="3672000" cy="0"/>
           </a:xfrm>
           <a:prstGeom prst="line">
             <a:avLst/>
@@ -5324,6 +5489,7 @@
             </a:solidFill>
             <a:prstDash val="dash"/>
           </a:ln>
+          <a:effectLst/>
         </p:spPr>
         <p:style>
           <a:lnRef idx="1">
@@ -5356,8 +5522,8 @@
         </p:nvCxnSpPr>
         <p:spPr>
           <a:xfrm>
-            <a:off x="552738" y="5792150"/>
-            <a:ext cx="3348000" cy="0"/>
+            <a:off x="216000" y="5792150"/>
+            <a:ext cx="3672000" cy="0"/>
           </a:xfrm>
           <a:prstGeom prst="line">
             <a:avLst/>
@@ -5370,6 +5536,7 @@
             </a:solidFill>
             <a:prstDash val="dash"/>
           </a:ln>
+          <a:effectLst/>
         </p:spPr>
         <p:style>
           <a:lnRef idx="1">
@@ -5411,6 +5578,11 @@
           <a:ln>
             <a:tailEnd type="triangle"/>
           </a:ln>
+          <a:effectLst>
+            <a:glow rad="25400">
+              <a:schemeClr val="bg1"/>
+            </a:glow>
+          </a:effectLst>
         </p:spPr>
         <p:style>
           <a:lnRef idx="1">
@@ -5452,6 +5624,11 @@
           <a:ln>
             <a:tailEnd type="triangle"/>
           </a:ln>
+          <a:effectLst>
+            <a:glow rad="25400">
+              <a:schemeClr val="bg1"/>
+            </a:glow>
+          </a:effectLst>
         </p:spPr>
         <p:style>
           <a:lnRef idx="1">
@@ -5493,6 +5670,11 @@
           <a:ln>
             <a:tailEnd type="triangle"/>
           </a:ln>
+          <a:effectLst>
+            <a:glow rad="25400">
+              <a:schemeClr val="bg1"/>
+            </a:glow>
+          </a:effectLst>
         </p:spPr>
         <p:style>
           <a:lnRef idx="1">
@@ -5534,6 +5716,11 @@
           <a:ln>
             <a:tailEnd type="triangle"/>
           </a:ln>
+          <a:effectLst>
+            <a:glow rad="25400">
+              <a:schemeClr val="bg1"/>
+            </a:glow>
+          </a:effectLst>
         </p:spPr>
         <p:style>
           <a:lnRef idx="1">
@@ -5575,6 +5762,11 @@
           <a:ln>
             <a:tailEnd type="triangle"/>
           </a:ln>
+          <a:effectLst>
+            <a:glow rad="25400">
+              <a:schemeClr val="bg1"/>
+            </a:glow>
+          </a:effectLst>
         </p:spPr>
         <p:style>
           <a:lnRef idx="1">
@@ -5616,6 +5808,11 @@
           <a:ln>
             <a:tailEnd type="triangle"/>
           </a:ln>
+          <a:effectLst>
+            <a:glow rad="25400">
+              <a:schemeClr val="bg1"/>
+            </a:glow>
+          </a:effectLst>
         </p:spPr>
         <p:style>
           <a:lnRef idx="1">
@@ -5646,7 +5843,7 @@
         </p:nvSpPr>
         <p:spPr>
           <a:xfrm>
-            <a:off x="2284574" y="329360"/>
+            <a:off x="2284574" y="291920"/>
             <a:ext cx="1754391" cy="646331"/>
           </a:xfrm>
           <a:prstGeom prst="rect">
@@ -5662,9 +5859,17 @@
           <a:p>
             <a:r>
               <a:rPr kumimoji="1" lang="en-US" altLang="zh-CN" sz="3600" b="1" dirty="0">
+                <a:ln w="3175">
+                  <a:noFill/>
+                </a:ln>
                 <a:solidFill>
                   <a:srgbClr val="2342BF"/>
                 </a:solidFill>
+                <a:effectLst>
+                  <a:glow rad="50800">
+                    <a:schemeClr val="bg1"/>
+                  </a:glow>
+                </a:effectLst>
                 <a:latin typeface="Open Sans" panose="020B0606030504020204" pitchFamily="34" charset="0"/>
                 <a:ea typeface="Open Sans" panose="020B0606030504020204" pitchFamily="34" charset="0"/>
                 <a:cs typeface="Open Sans" panose="020B0606030504020204" pitchFamily="34" charset="0"/>
@@ -5672,9 +5877,17 @@
               <a:t>Probes</a:t>
             </a:r>
             <a:endParaRPr kumimoji="1" lang="zh-CN" altLang="en-US" sz="3600" b="1" dirty="0">
+              <a:ln w="3175">
+                <a:noFill/>
+              </a:ln>
               <a:solidFill>
                 <a:srgbClr val="2342BF"/>
               </a:solidFill>
+              <a:effectLst>
+                <a:glow rad="50800">
+                  <a:schemeClr val="bg1"/>
+                </a:glow>
+              </a:effectLst>
               <a:latin typeface="Open Sans" panose="020B0606030504020204" pitchFamily="34" charset="0"/>
               <a:cs typeface="Open Sans" panose="020B0606030504020204" pitchFamily="34" charset="0"/>
             </a:endParaRPr>
@@ -5695,7 +5908,7 @@
         </p:nvSpPr>
         <p:spPr>
           <a:xfrm>
-            <a:off x="6352144" y="291920"/>
+            <a:off x="6692819" y="291920"/>
             <a:ext cx="3182281" cy="646331"/>
           </a:xfrm>
           <a:prstGeom prst="rect">
@@ -5711,9 +5924,17 @@
           <a:p>
             <a:r>
               <a:rPr kumimoji="1" lang="en-US" altLang="zh-CN" sz="3600" b="1" dirty="0">
+                <a:ln w="3175">
+                  <a:noFill/>
+                </a:ln>
                 <a:solidFill>
                   <a:srgbClr val="2342BF"/>
                 </a:solidFill>
+                <a:effectLst>
+                  <a:glow rad="50800">
+                    <a:schemeClr val="bg1"/>
+                  </a:glow>
+                </a:effectLst>
                 <a:latin typeface="Open Sans" panose="020B0606030504020204" pitchFamily="34" charset="0"/>
                 <a:ea typeface="Open Sans" panose="020B0606030504020204" pitchFamily="34" charset="0"/>
                 <a:cs typeface="Open Sans" panose="020B0606030504020204" pitchFamily="34" charset="0"/>
@@ -5721,9 +5942,17 @@
               <a:t>Notifications</a:t>
             </a:r>
             <a:endParaRPr kumimoji="1" lang="zh-CN" altLang="en-US" sz="3600" b="1" dirty="0">
+              <a:ln w="3175">
+                <a:noFill/>
+              </a:ln>
               <a:solidFill>
                 <a:srgbClr val="2342BF"/>
               </a:solidFill>
+              <a:effectLst>
+                <a:glow rad="50800">
+                  <a:schemeClr val="bg1"/>
+                </a:glow>
+              </a:effectLst>
               <a:latin typeface="Open Sans" panose="020B0606030504020204" pitchFamily="34" charset="0"/>
               <a:cs typeface="Open Sans" panose="020B0606030504020204" pitchFamily="34" charset="0"/>
             </a:endParaRPr>
@@ -5749,6 +5978,11 @@
             <a:chOff x="9372487" y="1367754"/>
             <a:chExt cx="470000" cy="679715"/>
           </a:xfrm>
+          <a:effectLst>
+            <a:glow rad="25400">
+              <a:schemeClr val="bg1"/>
+            </a:glow>
+          </a:effectLst>
         </p:grpSpPr>
         <p:pic>
           <p:nvPicPr>
@@ -5852,6 +6086,11 @@
             <a:chOff x="10160020" y="1361565"/>
             <a:chExt cx="583814" cy="676588"/>
           </a:xfrm>
+          <a:effectLst>
+            <a:glow rad="25400">
+              <a:schemeClr val="bg1"/>
+            </a:glow>
+          </a:effectLst>
         </p:grpSpPr>
         <p:pic>
           <p:nvPicPr>
@@ -5961,6 +6200,11 @@
             <a:chOff x="9372487" y="2082656"/>
             <a:chExt cx="676788" cy="721492"/>
           </a:xfrm>
+          <a:effectLst>
+            <a:glow rad="25400">
+              <a:schemeClr val="bg1"/>
+            </a:glow>
+          </a:effectLst>
         </p:grpSpPr>
         <p:pic>
           <p:nvPicPr>
@@ -6064,6 +6308,11 @@
             <a:chOff x="10076827" y="2062616"/>
             <a:chExt cx="671979" cy="736261"/>
           </a:xfrm>
+          <a:effectLst>
+            <a:glow rad="25400">
+              <a:schemeClr val="bg1"/>
+            </a:glow>
+          </a:effectLst>
         </p:grpSpPr>
         <p:pic>
           <p:nvPicPr>
@@ -6190,6 +6439,11 @@
             <a:chOff x="10230401" y="3665725"/>
             <a:chExt cx="548034" cy="714173"/>
           </a:xfrm>
+          <a:effectLst>
+            <a:glow rad="25400">
+              <a:schemeClr val="bg1"/>
+            </a:glow>
+          </a:effectLst>
         </p:grpSpPr>
         <p:pic>
           <p:nvPicPr>
@@ -6293,6 +6547,11 @@
             <a:chOff x="9935576" y="4496187"/>
             <a:chExt cx="898003" cy="664268"/>
           </a:xfrm>
+          <a:effectLst>
+            <a:glow rad="25400">
+              <a:schemeClr val="bg1"/>
+            </a:glow>
+          </a:effectLst>
         </p:grpSpPr>
         <p:pic>
           <p:nvPicPr>
@@ -6420,6 +6679,11 @@
             <a:chOff x="9317095" y="5490246"/>
             <a:chExt cx="646331" cy="697175"/>
           </a:xfrm>
+          <a:effectLst>
+            <a:glow rad="25400">
+              <a:schemeClr val="bg1"/>
+            </a:glow>
+          </a:effectLst>
         </p:grpSpPr>
         <p:pic>
           <p:nvPicPr>
@@ -6523,6 +6787,11 @@
             <a:chOff x="8715440" y="3658513"/>
             <a:chExt cx="470001" cy="755330"/>
           </a:xfrm>
+          <a:effectLst>
+            <a:glow rad="25400">
+              <a:schemeClr val="bg1"/>
+            </a:glow>
+          </a:effectLst>
         </p:grpSpPr>
         <p:pic>
           <p:nvPicPr>
@@ -6632,9 +6901,14 @@
           </a:solidFill>
           <a:ln>
             <a:solidFill>
-              <a:srgbClr val="2342BF"/>
+              <a:schemeClr val="bg1"/>
             </a:solidFill>
           </a:ln>
+          <a:effectLst>
+            <a:glow rad="25400">
+              <a:schemeClr val="bg1"/>
+            </a:glow>
+          </a:effectLst>
         </p:spPr>
         <p:style>
           <a:lnRef idx="2">
@@ -6697,9 +6971,14 @@
           </a:solidFill>
           <a:ln>
             <a:solidFill>
-              <a:srgbClr val="2342BF"/>
+              <a:schemeClr val="bg1"/>
             </a:solidFill>
           </a:ln>
+          <a:effectLst>
+            <a:glow rad="25400">
+              <a:schemeClr val="bg1"/>
+            </a:glow>
+          </a:effectLst>
         </p:spPr>
         <p:style>
           <a:lnRef idx="2">
@@ -6762,9 +7041,14 @@
           </a:solidFill>
           <a:ln>
             <a:solidFill>
-              <a:srgbClr val="2342BF"/>
+              <a:schemeClr val="bg1"/>
             </a:solidFill>
           </a:ln>
+          <a:effectLst>
+            <a:glow rad="25400">
+              <a:schemeClr val="bg1"/>
+            </a:glow>
+          </a:effectLst>
         </p:spPr>
         <p:style>
           <a:lnRef idx="2">
@@ -6821,6 +7105,11 @@
             <a:chOff x="9854490" y="1774086"/>
             <a:chExt cx="495140" cy="718944"/>
           </a:xfrm>
+          <a:effectLst>
+            <a:glow rad="25400">
+              <a:schemeClr val="bg1"/>
+            </a:glow>
+          </a:effectLst>
         </p:grpSpPr>
         <p:pic>
           <p:nvPicPr>
@@ -6930,6 +7219,11 @@
           <a:ln>
             <a:tailEnd type="triangle"/>
           </a:ln>
+          <a:effectLst>
+            <a:glow rad="25400">
+              <a:schemeClr val="bg1"/>
+            </a:glow>
+          </a:effectLst>
         </p:spPr>
         <p:style>
           <a:lnRef idx="1">
@@ -6971,6 +7265,11 @@
           <a:ln>
             <a:tailEnd type="triangle"/>
           </a:ln>
+          <a:effectLst>
+            <a:glow rad="25400">
+              <a:schemeClr val="bg1"/>
+            </a:glow>
+          </a:effectLst>
         </p:spPr>
         <p:style>
           <a:lnRef idx="1">
@@ -7012,6 +7311,11 @@
           <a:ln>
             <a:tailEnd type="triangle"/>
           </a:ln>
+          <a:effectLst>
+            <a:glow rad="25400">
+              <a:schemeClr val="bg1"/>
+            </a:glow>
+          </a:effectLst>
         </p:spPr>
         <p:style>
           <a:lnRef idx="1">
@@ -7042,7 +7346,7 @@
         </p:nvSpPr>
         <p:spPr>
           <a:xfrm>
-            <a:off x="4628316" y="3147142"/>
+            <a:off x="4628316" y="2910627"/>
             <a:ext cx="1331242" cy="812579"/>
           </a:xfrm>
           <a:prstGeom prst="rightArrow">
@@ -7056,6 +7360,11 @@
               <a:schemeClr val="bg1"/>
             </a:solidFill>
           </a:ln>
+          <a:effectLst>
+            <a:glow rad="25400">
+              <a:schemeClr val="bg1"/>
+            </a:glow>
+          </a:effectLst>
         </p:spPr>
         <p:style>
           <a:lnRef idx="2">
@@ -7104,6 +7413,11 @@
             <a:chOff x="8624518" y="4844946"/>
             <a:chExt cx="490840" cy="639831"/>
           </a:xfrm>
+          <a:effectLst>
+            <a:glow rad="25400">
+              <a:schemeClr val="bg1"/>
+            </a:glow>
+          </a:effectLst>
         </p:grpSpPr>
         <p:pic>
           <p:nvPicPr>
@@ -7213,6 +7527,11 @@
             <a:chOff x="9412218" y="4790137"/>
             <a:chExt cx="540533" cy="694640"/>
           </a:xfrm>
+          <a:effectLst>
+            <a:glow rad="25400">
+              <a:schemeClr val="bg1"/>
+            </a:glow>
+          </a:effectLst>
         </p:grpSpPr>
         <p:pic>
           <p:nvPicPr>
@@ -7333,6 +7652,11 @@
             <a:chOff x="10171444" y="4869438"/>
             <a:chExt cx="619080" cy="615339"/>
           </a:xfrm>
+          <a:effectLst>
+            <a:glow rad="25400">
+              <a:schemeClr val="bg1"/>
+            </a:glow>
+          </a:effectLst>
         </p:grpSpPr>
         <p:pic>
           <p:nvPicPr>
@@ -7441,9 +7765,14 @@
           </a:solidFill>
           <a:ln>
             <a:solidFill>
-              <a:srgbClr val="2342BF"/>
+              <a:schemeClr val="bg1"/>
             </a:solidFill>
           </a:ln>
+          <a:effectLst>
+            <a:glow rad="25400">
+              <a:schemeClr val="bg1"/>
+            </a:glow>
+          </a:effectLst>
         </p:spPr>
         <p:style>
           <a:lnRef idx="2">
@@ -7500,6 +7829,11 @@
             <a:chOff x="1125642" y="682053"/>
             <a:chExt cx="569547" cy="467478"/>
           </a:xfrm>
+          <a:effectLst>
+            <a:glow rad="25400">
+              <a:schemeClr val="bg1"/>
+            </a:glow>
+          </a:effectLst>
         </p:grpSpPr>
         <p:pic>
           <p:nvPicPr>
@@ -7616,6 +7950,11 @@
           <a:ln>
             <a:tailEnd type="triangle"/>
           </a:ln>
+          <a:effectLst>
+            <a:glow rad="25400">
+              <a:schemeClr val="bg1"/>
+            </a:glow>
+          </a:effectLst>
         </p:spPr>
         <p:style>
           <a:lnRef idx="1">
@@ -7662,6 +8001,7 @@
             </a:solidFill>
             <a:prstDash val="dash"/>
           </a:ln>
+          <a:effectLst/>
         </p:spPr>
         <p:style>
           <a:lnRef idx="1">
@@ -7697,6 +8037,11 @@
             <a:chOff x="9441498" y="4704429"/>
             <a:chExt cx="601448" cy="710733"/>
           </a:xfrm>
+          <a:effectLst>
+            <a:glow rad="25400">
+              <a:schemeClr val="bg1"/>
+            </a:glow>
+          </a:effectLst>
         </p:grpSpPr>
         <p:pic>
           <p:nvPicPr>
@@ -7807,6 +8152,11 @@
           <a:ln>
             <a:tailEnd type="triangle"/>
           </a:ln>
+          <a:effectLst>
+            <a:glow rad="25400">
+              <a:schemeClr val="bg1"/>
+            </a:glow>
+          </a:effectLst>
         </p:spPr>
         <p:style>
           <a:lnRef idx="1">
@@ -7848,9 +8198,14 @@
           </a:solidFill>
           <a:ln>
             <a:solidFill>
-              <a:srgbClr val="2342BF"/>
+              <a:schemeClr val="bg1"/>
             </a:solidFill>
           </a:ln>
+          <a:effectLst>
+            <a:glow rad="25400">
+              <a:schemeClr val="bg1"/>
+            </a:glow>
+          </a:effectLst>
         </p:spPr>
         <p:style>
           <a:lnRef idx="2">
@@ -7913,6 +8268,11 @@
           <a:ln>
             <a:tailEnd type="triangle"/>
           </a:ln>
+          <a:effectLst>
+            <a:glow rad="25400">
+              <a:schemeClr val="bg1"/>
+            </a:glow>
+          </a:effectLst>
         </p:spPr>
         <p:style>
           <a:lnRef idx="1">
@@ -7929,53 +8289,6 @@
           </a:fontRef>
         </p:style>
       </p:cxnSp>
-      <p:pic>
-        <p:nvPicPr>
-          <p:cNvPr id="1026" name="Picture 2" descr="SSL Toolkit — Powerful On Every Platform | Medium">
-            <a:extLst>
-              <a:ext uri="{FF2B5EF4-FFF2-40B4-BE49-F238E27FC236}">
-                <a16:creationId xmlns:a16="http://schemas.microsoft.com/office/drawing/2014/main" id="{B5B48984-91FE-8398-1C5D-891104A332A5}"/>
-              </a:ext>
-            </a:extLst>
-          </p:cNvPr>
-          <p:cNvPicPr>
-            <a:picLocks noChangeAspect="1" noChangeArrowheads="1"/>
-          </p:cNvPicPr>
-          <p:nvPr/>
-        </p:nvPicPr>
-        <p:blipFill>
-          <a:blip r:embed="rId37">
-            <a:extLst>
-              <a:ext uri="{28A0092B-C50C-407E-A947-70E740481C1C}">
-                <a14:useLocalDpi xmlns:a14="http://schemas.microsoft.com/office/drawing/2010/main" val="0"/>
-              </a:ext>
-            </a:extLst>
-          </a:blip>
-          <a:srcRect/>
-          <a:stretch>
-            <a:fillRect/>
-          </a:stretch>
-        </p:blipFill>
-        <p:spPr bwMode="auto">
-          <a:xfrm>
-            <a:off x="1549795" y="3344825"/>
-            <a:ext cx="595811" cy="595811"/>
-          </a:xfrm>
-          <a:prstGeom prst="rect">
-            <a:avLst/>
-          </a:prstGeom>
-          <a:noFill/>
-          <a:extLst>
-            <a:ext uri="{909E8E84-426E-40DD-AFC4-6F175D3DCCD1}">
-              <a14:hiddenFill xmlns:a14="http://schemas.microsoft.com/office/drawing/2010/main">
-                <a:solidFill>
-                  <a:srgbClr val="FFFFFF"/>
-                </a:solidFill>
-              </a14:hiddenFill>
-            </a:ext>
-          </a:extLst>
-        </p:spPr>
-      </p:pic>
       <p:cxnSp>
         <p:nvCxnSpPr>
           <p:cNvPr id="139" name="直线连接符 138">
@@ -7992,8 +8305,8 @@
         </p:nvCxnSpPr>
         <p:spPr>
           <a:xfrm>
-            <a:off x="552738" y="3907672"/>
-            <a:ext cx="3348000" cy="0"/>
+            <a:off x="216000" y="3907672"/>
+            <a:ext cx="3672000" cy="0"/>
           </a:xfrm>
           <a:prstGeom prst="line">
             <a:avLst/>
@@ -8006,6 +8319,7 @@
             </a:solidFill>
             <a:prstDash val="dash"/>
           </a:ln>
+          <a:effectLst/>
         </p:spPr>
         <p:style>
           <a:lnRef idx="1">
@@ -8041,6 +8355,11 @@
             <a:chOff x="1147446" y="2208664"/>
             <a:chExt cx="862737" cy="718943"/>
           </a:xfrm>
+          <a:effectLst>
+            <a:glow rad="25400">
+              <a:schemeClr val="bg1"/>
+            </a:glow>
+          </a:effectLst>
         </p:grpSpPr>
         <p:pic>
           <p:nvPicPr>
@@ -8168,6 +8487,11 @@
             <a:chOff x="9316832" y="1557623"/>
             <a:chExt cx="519694" cy="733786"/>
           </a:xfrm>
+          <a:effectLst>
+            <a:glow rad="25400">
+              <a:schemeClr val="bg1"/>
+            </a:glow>
+          </a:effectLst>
         </p:grpSpPr>
         <p:pic>
           <p:nvPicPr>
@@ -8184,7 +8508,7 @@
             <p:nvPr/>
           </p:nvPicPr>
           <p:blipFill>
-            <a:blip r:embed="rId38"/>
+            <a:blip r:embed="rId37"/>
             <a:stretch>
               <a:fillRect/>
             </a:stretch>
@@ -8271,6 +8595,11 @@
             <a:chOff x="10122129" y="1583142"/>
             <a:chExt cx="532518" cy="688435"/>
           </a:xfrm>
+          <a:effectLst>
+            <a:glow rad="25400">
+              <a:schemeClr val="bg1"/>
+            </a:glow>
+          </a:effectLst>
         </p:grpSpPr>
         <p:pic>
           <p:nvPicPr>
@@ -8287,7 +8616,7 @@
             <p:nvPr/>
           </p:nvPicPr>
           <p:blipFill>
-            <a:blip r:embed="rId39">
+            <a:blip r:embed="rId38">
               <a:extLst>
                 <a:ext uri="{28A0092B-C50C-407E-A947-70E740481C1C}">
                   <a14:useLocalDpi xmlns:a14="http://schemas.microsoft.com/office/drawing/2010/main" val="0"/>
@@ -8397,9 +8726,14 @@
           </a:solidFill>
           <a:ln>
             <a:solidFill>
-              <a:srgbClr val="2342BF"/>
+              <a:schemeClr val="bg1"/>
             </a:solidFill>
           </a:ln>
+          <a:effectLst>
+            <a:glow rad="25400">
+              <a:schemeClr val="bg1"/>
+            </a:glow>
+          </a:effectLst>
         </p:spPr>
         <p:style>
           <a:lnRef idx="2">
@@ -8443,7 +8777,7 @@
         </p:nvSpPr>
         <p:spPr>
           <a:xfrm>
-            <a:off x="4692750" y="3265400"/>
+            <a:off x="4692750" y="3028885"/>
             <a:ext cx="1331242" cy="812579"/>
           </a:xfrm>
           <a:prstGeom prst="rightArrow">
@@ -8457,6 +8791,11 @@
               <a:schemeClr val="bg1"/>
             </a:solidFill>
           </a:ln>
+          <a:effectLst>
+            <a:glow rad="25400">
+              <a:schemeClr val="bg1"/>
+            </a:glow>
+          </a:effectLst>
         </p:spPr>
         <p:style>
           <a:lnRef idx="2">
@@ -8500,7 +8839,7 @@
         </p:nvSpPr>
         <p:spPr>
           <a:xfrm>
-            <a:off x="4764758" y="3383657"/>
+            <a:off x="4764758" y="3147142"/>
             <a:ext cx="1331242" cy="812579"/>
           </a:xfrm>
           <a:prstGeom prst="rightArrow">
@@ -8514,6 +8853,11 @@
               <a:schemeClr val="bg1"/>
             </a:solidFill>
           </a:ln>
+          <a:effectLst>
+            <a:glow rad="25400">
+              <a:schemeClr val="bg1"/>
+            </a:glow>
+          </a:effectLst>
         </p:spPr>
         <p:style>
           <a:lnRef idx="2">
@@ -8551,6 +8895,239 @@
           </a:p>
         </p:txBody>
       </p:sp>
+      <p:grpSp>
+        <p:nvGrpSpPr>
+          <p:cNvPr id="2" name="组合 1">
+            <a:extLst>
+              <a:ext uri="{FF2B5EF4-FFF2-40B4-BE49-F238E27FC236}">
+                <a16:creationId xmlns:a16="http://schemas.microsoft.com/office/drawing/2014/main" id="{B239382F-3078-09BB-C40A-52F0E13CB9E5}"/>
+              </a:ext>
+            </a:extLst>
+          </p:cNvPr>
+          <p:cNvGrpSpPr/>
+          <p:nvPr/>
+        </p:nvGrpSpPr>
+        <p:grpSpPr>
+          <a:xfrm>
+            <a:off x="1492308" y="3265674"/>
+            <a:ext cx="715260" cy="684658"/>
+            <a:chOff x="1492308" y="3265674"/>
+            <a:chExt cx="715260" cy="684658"/>
+          </a:xfrm>
+          <a:effectLst>
+            <a:glow rad="25400">
+              <a:schemeClr val="bg1"/>
+            </a:glow>
+          </a:effectLst>
+        </p:grpSpPr>
+        <p:pic>
+          <p:nvPicPr>
+            <p:cNvPr id="1026" name="Picture 2" descr="SSL Toolkit — Powerful On Every Platform | Medium">
+              <a:extLst>
+                <a:ext uri="{FF2B5EF4-FFF2-40B4-BE49-F238E27FC236}">
+                  <a16:creationId xmlns:a16="http://schemas.microsoft.com/office/drawing/2014/main" id="{B5B48984-91FE-8398-1C5D-891104A332A5}"/>
+                </a:ext>
+              </a:extLst>
+            </p:cNvPr>
+            <p:cNvPicPr>
+              <a:picLocks noChangeAspect="1" noChangeArrowheads="1"/>
+            </p:cNvPicPr>
+            <p:nvPr/>
+          </p:nvPicPr>
+          <p:blipFill>
+            <a:blip r:embed="rId39">
+              <a:extLst>
+                <a:ext uri="{28A0092B-C50C-407E-A947-70E740481C1C}">
+                  <a14:useLocalDpi xmlns:a14="http://schemas.microsoft.com/office/drawing/2010/main" val="0"/>
+                </a:ext>
+              </a:extLst>
+            </a:blip>
+            <a:srcRect/>
+            <a:stretch>
+              <a:fillRect/>
+            </a:stretch>
+          </p:blipFill>
+          <p:spPr bwMode="auto">
+            <a:xfrm>
+              <a:off x="1574923" y="3265674"/>
+              <a:ext cx="550031" cy="550031"/>
+            </a:xfrm>
+            <a:prstGeom prst="rect">
+              <a:avLst/>
+            </a:prstGeom>
+            <a:noFill/>
+            <a:extLst>
+              <a:ext uri="{909E8E84-426E-40DD-AFC4-6F175D3DCCD1}">
+                <a14:hiddenFill xmlns:a14="http://schemas.microsoft.com/office/drawing/2010/main">
+                  <a:solidFill>
+                    <a:srgbClr val="FFFFFF"/>
+                  </a:solidFill>
+                </a14:hiddenFill>
+              </a:ext>
+            </a:extLst>
+          </p:spPr>
+        </p:pic>
+        <p:sp>
+          <p:nvSpPr>
+            <p:cNvPr id="138" name="文本框 137">
+              <a:extLst>
+                <a:ext uri="{FF2B5EF4-FFF2-40B4-BE49-F238E27FC236}">
+                  <a16:creationId xmlns:a16="http://schemas.microsoft.com/office/drawing/2014/main" id="{C7679CFB-7A71-98B2-6C75-697026B6A9F5}"/>
+                </a:ext>
+              </a:extLst>
+            </p:cNvPr>
+            <p:cNvSpPr txBox="1"/>
+            <p:nvPr/>
+          </p:nvSpPr>
+          <p:spPr>
+            <a:xfrm>
+              <a:off x="1492308" y="3734888"/>
+              <a:ext cx="715260" cy="215444"/>
+            </a:xfrm>
+            <a:prstGeom prst="rect">
+              <a:avLst/>
+            </a:prstGeom>
+            <a:noFill/>
+          </p:spPr>
+          <p:txBody>
+            <a:bodyPr wrap="none" rtlCol="0">
+              <a:spAutoFit/>
+            </a:bodyPr>
+            <a:lstStyle/>
+            <a:p>
+              <a:r>
+                <a:rPr kumimoji="1" lang="en-US" altLang="zh-CN" sz="800" dirty="0">
+                  <a:solidFill>
+                    <a:schemeClr val="tx1">
+                      <a:lumMod val="65000"/>
+                      <a:lumOff val="35000"/>
+                    </a:schemeClr>
+                  </a:solidFill>
+                  <a:latin typeface="Francois One" panose="02000503040000020004" pitchFamily="2" charset="0"/>
+                </a:rPr>
+                <a:t>Certification</a:t>
+              </a:r>
+              <a:endParaRPr kumimoji="1" lang="zh-CN" altLang="en-US" sz="800" dirty="0">
+                <a:solidFill>
+                  <a:schemeClr val="tx1">
+                    <a:lumMod val="65000"/>
+                    <a:lumOff val="35000"/>
+                  </a:schemeClr>
+                </a:solidFill>
+                <a:latin typeface="Francois One" panose="02000503040000020004" pitchFamily="2" charset="0"/>
+              </a:endParaRPr>
+            </a:p>
+          </p:txBody>
+        </p:sp>
+      </p:grpSp>
+      <p:grpSp>
+        <p:nvGrpSpPr>
+          <p:cNvPr id="36" name="组合 35">
+            <a:extLst>
+              <a:ext uri="{FF2B5EF4-FFF2-40B4-BE49-F238E27FC236}">
+                <a16:creationId xmlns:a16="http://schemas.microsoft.com/office/drawing/2014/main" id="{6BE8BE54-D5E5-B694-2E34-B2AB39F38E7E}"/>
+              </a:ext>
+            </a:extLst>
+          </p:cNvPr>
+          <p:cNvGrpSpPr/>
+          <p:nvPr/>
+        </p:nvGrpSpPr>
+        <p:grpSpPr>
+          <a:xfrm>
+            <a:off x="58577" y="5951484"/>
+            <a:ext cx="638316" cy="456509"/>
+            <a:chOff x="8978" y="5957764"/>
+            <a:chExt cx="638316" cy="456509"/>
+          </a:xfrm>
+          <a:effectLst>
+            <a:glow rad="25400">
+              <a:schemeClr val="bg1"/>
+            </a:glow>
+          </a:effectLst>
+        </p:grpSpPr>
+        <p:pic>
+          <p:nvPicPr>
+            <p:cNvPr id="3" name="图片 2">
+              <a:extLst>
+                <a:ext uri="{FF2B5EF4-FFF2-40B4-BE49-F238E27FC236}">
+                  <a16:creationId xmlns:a16="http://schemas.microsoft.com/office/drawing/2014/main" id="{9E9431F9-0211-D139-3914-EC62DA4F3F40}"/>
+                </a:ext>
+              </a:extLst>
+            </p:cNvPr>
+            <p:cNvPicPr>
+              <a:picLocks noChangeAspect="1"/>
+            </p:cNvPicPr>
+            <p:nvPr/>
+          </p:nvPicPr>
+          <p:blipFill>
+            <a:blip r:embed="rId40"/>
+            <a:stretch>
+              <a:fillRect/>
+            </a:stretch>
+          </p:blipFill>
+          <p:spPr>
+            <a:xfrm>
+              <a:off x="169643" y="5957764"/>
+              <a:ext cx="297121" cy="297121"/>
+            </a:xfrm>
+            <a:prstGeom prst="rect">
+              <a:avLst/>
+            </a:prstGeom>
+          </p:spPr>
+        </p:pic>
+        <p:sp>
+          <p:nvSpPr>
+            <p:cNvPr id="145" name="文本框 144">
+              <a:extLst>
+                <a:ext uri="{FF2B5EF4-FFF2-40B4-BE49-F238E27FC236}">
+                  <a16:creationId xmlns:a16="http://schemas.microsoft.com/office/drawing/2014/main" id="{44606BFA-2ACB-6DDE-EEDB-230C98319F89}"/>
+                </a:ext>
+              </a:extLst>
+            </p:cNvPr>
+            <p:cNvSpPr txBox="1"/>
+            <p:nvPr/>
+          </p:nvSpPr>
+          <p:spPr>
+            <a:xfrm>
+              <a:off x="8978" y="6252407"/>
+              <a:ext cx="638316" cy="161866"/>
+            </a:xfrm>
+            <a:prstGeom prst="rect">
+              <a:avLst/>
+            </a:prstGeom>
+            <a:noFill/>
+          </p:spPr>
+          <p:txBody>
+            <a:bodyPr wrap="none" rtlCol="0">
+              <a:spAutoFit/>
+            </a:bodyPr>
+            <a:lstStyle/>
+            <a:p>
+              <a:r>
+                <a:rPr kumimoji="1" lang="en-US" altLang="zh-CN" sz="800" dirty="0">
+                  <a:solidFill>
+                    <a:schemeClr val="tx1">
+                      <a:lumMod val="65000"/>
+                      <a:lumOff val="35000"/>
+                    </a:schemeClr>
+                  </a:solidFill>
+                  <a:latin typeface="Francois One" panose="02000503040000020004" pitchFamily="2" charset="0"/>
+                </a:rPr>
+                <a:t>MemCache</a:t>
+              </a:r>
+              <a:endParaRPr kumimoji="1" lang="zh-CN" altLang="en-US" sz="800" dirty="0">
+                <a:solidFill>
+                  <a:schemeClr val="tx1">
+                    <a:lumMod val="65000"/>
+                    <a:lumOff val="35000"/>
+                  </a:schemeClr>
+                </a:solidFill>
+                <a:latin typeface="Francois One" panose="02000503040000020004" pitchFamily="2" charset="0"/>
+              </a:endParaRPr>
+            </a:p>
+          </p:txBody>
+        </p:sp>
+      </p:grpSp>
     </p:spTree>
     <p:extLst>
       <p:ext uri="{BB962C8B-B14F-4D97-AF65-F5344CB8AC3E}">

</xml_diff>